<commit_message>
Enhanced ABMsAsAlgebraic.pptx and ABMsAsAlgebraic.docx
</commit_message>
<xml_diff>
--- a/docs/ABMsAsAlgebraic.pptx
+++ b/docs/ABMsAsAlgebraic.pptx
@@ -6,7 +6,7 @@
     <p:sldMasterId id="2147483674" r:id="rId5"/>
   </p:sldMasterIdLst>
   <p:notesMasterIdLst>
-    <p:notesMasterId r:id="rId34"/>
+    <p:notesMasterId r:id="rId35"/>
   </p:notesMasterIdLst>
   <p:sldIdLst>
     <p:sldId id="257" r:id="rId6"/>
@@ -37,6 +37,7 @@
     <p:sldId id="290" r:id="rId31"/>
     <p:sldId id="268" r:id="rId32"/>
     <p:sldId id="307" r:id="rId33"/>
+    <p:sldId id="308" r:id="rId34"/>
   </p:sldIdLst>
   <p:sldSz cx="9144000" cy="6858000" type="screen4x3"/>
   <p:notesSz cx="6858000" cy="9144000"/>
@@ -30227,7 +30228,7 @@
         <p:spPr>
           <a:xfrm>
             <a:off x="381000" y="1676400"/>
-            <a:ext cx="4114800" cy="3776418"/>
+            <a:ext cx="3581400" cy="4648200"/>
           </a:xfrm>
         </p:spPr>
         <p:txBody>
@@ -30320,25 +30321,35 @@
           </a:p>
         </p:txBody>
       </p:sp>
-      <p:sp>
-        <p:nvSpPr>
-          <p:cNvPr id="4" name="Content Placeholder 3"/>
-          <p:cNvSpPr>
-            <a:spLocks noGrp="1"/>
-          </p:cNvSpPr>
+      <p:pic>
+        <p:nvPicPr>
+          <p:cNvPr id="5" name="Content Placeholder 4"/>
+          <p:cNvPicPr>
+            <a:picLocks noGrp="1" noChangeAspect="1"/>
+          </p:cNvPicPr>
           <p:nvPr>
             <p:ph sz="half" idx="2"/>
           </p:nvPr>
-        </p:nvSpPr>
-        <p:spPr/>
-        <p:txBody>
-          <a:bodyPr/>
-          <a:lstStyle/>
-          <a:p>
-            <a:endParaRPr lang="en-US"/>
-          </a:p>
-        </p:txBody>
-      </p:sp>
+        </p:nvPicPr>
+        <p:blipFill>
+          <a:blip r:embed="rId3">
+            <a:extLst>
+              <a:ext uri="{28A0092B-C50C-407E-A947-70E740481C1C}">
+                <a14:useLocalDpi xmlns:a14="http://schemas.microsoft.com/office/drawing/2010/main" val="0"/>
+              </a:ext>
+            </a:extLst>
+          </a:blip>
+          <a:stretch>
+            <a:fillRect/>
+          </a:stretch>
+        </p:blipFill>
+        <p:spPr>
+          <a:xfrm>
+            <a:off x="4699000" y="2133600"/>
+            <a:ext cx="4064000" cy="2956560"/>
+          </a:xfrm>
+        </p:spPr>
+      </p:pic>
     </p:spTree>
     <p:extLst>
       <p:ext uri="{BB962C8B-B14F-4D97-AF65-F5344CB8AC3E}">
@@ -30526,7 +30537,7 @@
         </p:nvSpPr>
         <p:spPr>
           <a:xfrm>
-            <a:off x="381000" y="1676400"/>
+            <a:off x="381000" y="2209800"/>
             <a:ext cx="4114800" cy="3465564"/>
           </a:xfrm>
         </p:spPr>
@@ -30557,25 +30568,35 @@
           </a:p>
         </p:txBody>
       </p:sp>
-      <p:sp>
-        <p:nvSpPr>
-          <p:cNvPr id="4" name="Content Placeholder 3"/>
-          <p:cNvSpPr>
-            <a:spLocks noGrp="1"/>
-          </p:cNvSpPr>
+      <p:pic>
+        <p:nvPicPr>
+          <p:cNvPr id="5" name="Content Placeholder 4"/>
+          <p:cNvPicPr>
+            <a:picLocks noGrp="1" noChangeAspect="1"/>
+          </p:cNvPicPr>
           <p:nvPr>
             <p:ph sz="half" idx="2"/>
           </p:nvPr>
-        </p:nvSpPr>
-        <p:spPr/>
-        <p:txBody>
-          <a:bodyPr/>
-          <a:lstStyle/>
-          <a:p>
-            <a:endParaRPr lang="en-US"/>
-          </a:p>
-        </p:txBody>
-      </p:sp>
+        </p:nvPicPr>
+        <p:blipFill>
+          <a:blip r:embed="rId3">
+            <a:extLst>
+              <a:ext uri="{28A0092B-C50C-407E-A947-70E740481C1C}">
+                <a14:useLocalDpi xmlns:a14="http://schemas.microsoft.com/office/drawing/2010/main" val="0"/>
+              </a:ext>
+            </a:extLst>
+          </a:blip>
+          <a:stretch>
+            <a:fillRect/>
+          </a:stretch>
+        </p:blipFill>
+        <p:spPr>
+          <a:xfrm>
+            <a:off x="5178647" y="1676400"/>
+            <a:ext cx="3053906" cy="4191000"/>
+          </a:xfrm>
+        </p:spPr>
+      </p:pic>
     </p:spTree>
     <p:extLst>
       <p:ext uri="{BB962C8B-B14F-4D97-AF65-F5344CB8AC3E}">
@@ -31048,8 +31069,8 @@
         </p:nvSpPr>
         <p:spPr>
           <a:xfrm>
-            <a:off x="381000" y="1676400"/>
-            <a:ext cx="4114800" cy="1803571"/>
+            <a:off x="381000" y="2819400"/>
+            <a:ext cx="3810000" cy="1803571"/>
           </a:xfrm>
         </p:spPr>
         <p:txBody>
@@ -31074,25 +31095,35 @@
           </a:p>
         </p:txBody>
       </p:sp>
-      <p:sp>
-        <p:nvSpPr>
-          <p:cNvPr id="4" name="Content Placeholder 3"/>
-          <p:cNvSpPr>
-            <a:spLocks noGrp="1"/>
-          </p:cNvSpPr>
+      <p:pic>
+        <p:nvPicPr>
+          <p:cNvPr id="5" name="Content Placeholder 4"/>
+          <p:cNvPicPr>
+            <a:picLocks noGrp="1" noChangeAspect="1"/>
+          </p:cNvPicPr>
           <p:nvPr>
             <p:ph sz="half" idx="2"/>
           </p:nvPr>
-        </p:nvSpPr>
-        <p:spPr/>
-        <p:txBody>
-          <a:bodyPr/>
-          <a:lstStyle/>
-          <a:p>
-            <a:endParaRPr lang="en-US"/>
-          </a:p>
-        </p:txBody>
-      </p:sp>
+        </p:nvPicPr>
+        <p:blipFill>
+          <a:blip r:embed="rId3">
+            <a:extLst>
+              <a:ext uri="{28A0092B-C50C-407E-A947-70E740481C1C}">
+                <a14:useLocalDpi xmlns:a14="http://schemas.microsoft.com/office/drawing/2010/main" val="0"/>
+              </a:ext>
+            </a:extLst>
+          </a:blip>
+          <a:stretch>
+            <a:fillRect/>
+          </a:stretch>
+        </p:blipFill>
+        <p:spPr>
+          <a:xfrm>
+            <a:off x="4800600" y="2399228"/>
+            <a:ext cx="3962400" cy="2745343"/>
+          </a:xfrm>
+        </p:spPr>
+      </p:pic>
     </p:spTree>
     <p:extLst>
       <p:ext uri="{BB962C8B-B14F-4D97-AF65-F5344CB8AC3E}">
@@ -31585,7 +31616,7 @@
         <p:spPr>
           <a:xfrm>
             <a:off x="381000" y="1676400"/>
-            <a:ext cx="8382000" cy="2326791"/>
+            <a:ext cx="8382000" cy="4739759"/>
           </a:xfrm>
         </p:spPr>
         <p:txBody>
@@ -31610,7 +31641,58 @@
             </a:r>
             <a:r>
               <a:rPr lang="en-US" sz="2800" dirty="0"/>
-              <a:t> via Commons - https://</a:t>
+              <a:t> via Commons - </a:t>
+            </a:r>
+            <a:r>
+              <a:rPr lang="en-US" sz="2800" dirty="0">
+                <a:hlinkClick r:id="rId2"/>
+              </a:rPr>
+              <a:t>https://commons.wikimedia.org/wiki/File:Bronze_Age_spear_tip_mould_IMG_5123.jpg#/</a:t>
+            </a:r>
+            <a:r>
+              <a:rPr lang="en-US" sz="2800" dirty="0" smtClean="0">
+                <a:hlinkClick r:id="rId2"/>
+              </a:rPr>
+              <a:t>media/File:Bronze_Age_spear_tip_mould_IMG_5123.jpg</a:t>
+            </a:r>
+            <a:endParaRPr lang="en-US" sz="2800" dirty="0" smtClean="0"/>
+          </a:p>
+          <a:p>
+            <a:r>
+              <a:rPr lang="en-US" sz="2800" dirty="0"/>
+              <a:t>"</a:t>
+            </a:r>
+            <a:r>
+              <a:rPr lang="en-US" sz="2800" dirty="0" err="1"/>
+              <a:t>Axentowicz</a:t>
+            </a:r>
+            <a:r>
+              <a:rPr lang="en-US" sz="2800" dirty="0"/>
+              <a:t> The Anchorite" by </a:t>
+            </a:r>
+            <a:r>
+              <a:rPr lang="en-US" sz="2800" dirty="0" err="1"/>
+              <a:t>Teodor</a:t>
+            </a:r>
+            <a:r>
+              <a:rPr lang="en-US" sz="2800" dirty="0"/>
+              <a:t> </a:t>
+            </a:r>
+            <a:r>
+              <a:rPr lang="en-US" sz="2800" dirty="0" err="1"/>
+              <a:t>Axentowicz</a:t>
+            </a:r>
+            <a:r>
+              <a:rPr lang="en-US" sz="2800" dirty="0"/>
+              <a:t> - </a:t>
+            </a:r>
+            <a:r>
+              <a:rPr lang="en-US" sz="2800" dirty="0" err="1"/>
+              <a:t>cyfrowe.mnw.art.pl</a:t>
+            </a:r>
+            <a:r>
+              <a:rPr lang="en-US" sz="2800" dirty="0"/>
+              <a:t>. Licensed under Public Domain via Commons - https://</a:t>
             </a:r>
             <a:r>
               <a:rPr lang="en-US" sz="2800" dirty="0" err="1"/>
@@ -31618,8 +31700,21 @@
             </a:r>
             <a:r>
               <a:rPr lang="en-US" sz="2800" dirty="0"/>
-              <a:t>/wiki/File:Bronze_Age_spear_tip_mould_IMG_5123.jpg#/media/File:Bronze_Age_spear_tip_mould_IMG_5123.jpg</a:t>
-            </a:r>
+              <a:t>/wiki/</a:t>
+            </a:r>
+            <a:r>
+              <a:rPr lang="en-US" sz="2800" dirty="0" err="1"/>
+              <a:t>File:Axentowicz_The_Anchorite.jpg</a:t>
+            </a:r>
+            <a:r>
+              <a:rPr lang="en-US" sz="2800" dirty="0"/>
+              <a:t>#/media/</a:t>
+            </a:r>
+            <a:r>
+              <a:rPr lang="en-US" sz="2800" dirty="0" err="1"/>
+              <a:t>File:Axentowicz_The_Anchorite.jpg</a:t>
+            </a:r>
+            <a:endParaRPr lang="en-US" sz="2800" dirty="0"/>
           </a:p>
         </p:txBody>
       </p:sp>
@@ -31627,6 +31722,123 @@
     <p:extLst>
       <p:ext uri="{BB962C8B-B14F-4D97-AF65-F5344CB8AC3E}">
         <p14:creationId xmlns:p14="http://schemas.microsoft.com/office/powerpoint/2010/main" val="1548311111"/>
+      </p:ext>
+    </p:extLst>
+  </p:cSld>
+  <p:clrMapOvr>
+    <a:masterClrMapping/>
+  </p:clrMapOvr>
+  <p:transition>
+    <p:fade/>
+  </p:transition>
+</p:sld>
+</file>
+
+<file path=ppt/slides/slide29.xml><?xml version="1.0" encoding="utf-8"?>
+<p:sld xmlns:a="http://schemas.openxmlformats.org/drawingml/2006/main" xmlns:r="http://schemas.openxmlformats.org/officeDocument/2006/relationships" xmlns:p="http://schemas.openxmlformats.org/presentationml/2006/main">
+  <p:cSld>
+    <p:spTree>
+      <p:nvGrpSpPr>
+        <p:cNvPr id="1" name=""/>
+        <p:cNvGrpSpPr/>
+        <p:nvPr/>
+      </p:nvGrpSpPr>
+      <p:grpSpPr>
+        <a:xfrm>
+          <a:off x="0" y="0"/>
+          <a:ext cx="0" cy="0"/>
+          <a:chOff x="0" y="0"/>
+          <a:chExt cx="0" cy="0"/>
+        </a:xfrm>
+      </p:grpSpPr>
+      <p:sp>
+        <p:nvSpPr>
+          <p:cNvPr id="2" name="Title 1"/>
+          <p:cNvSpPr>
+            <a:spLocks noGrp="1"/>
+          </p:cNvSpPr>
+          <p:nvPr>
+            <p:ph type="title"/>
+          </p:nvPr>
+        </p:nvSpPr>
+        <p:spPr>
+          <a:xfrm>
+            <a:off x="381000" y="230188"/>
+            <a:ext cx="8382000" cy="664797"/>
+          </a:xfrm>
+        </p:spPr>
+        <p:txBody>
+          <a:bodyPr/>
+          <a:lstStyle/>
+          <a:p>
+            <a:r>
+              <a:rPr lang="en-US" dirty="0" smtClean="0"/>
+              <a:t>Credits</a:t>
+            </a:r>
+            <a:endParaRPr lang="en-US" dirty="0"/>
+          </a:p>
+        </p:txBody>
+      </p:sp>
+      <p:sp>
+        <p:nvSpPr>
+          <p:cNvPr id="3" name="Text Placeholder 2"/>
+          <p:cNvSpPr>
+            <a:spLocks noGrp="1"/>
+          </p:cNvSpPr>
+          <p:nvPr>
+            <p:ph type="body" sz="quarter" idx="10"/>
+          </p:nvPr>
+        </p:nvSpPr>
+        <p:spPr>
+          <a:xfrm>
+            <a:off x="381000" y="1676400"/>
+            <a:ext cx="8382000" cy="1551194"/>
+          </a:xfrm>
+        </p:spPr>
+        <p:txBody>
+          <a:bodyPr/>
+          <a:lstStyle/>
+          <a:p>
+            <a:r>
+              <a:rPr lang="en-US" sz="2800" dirty="0"/>
+              <a:t>"</a:t>
+            </a:r>
+            <a:r>
+              <a:rPr lang="en-US" sz="2800" dirty="0" err="1"/>
+              <a:t>Perspectivephoto</a:t>
+            </a:r>
+            <a:r>
+              <a:rPr lang="en-US" sz="2800" dirty="0"/>
+              <a:t>". Licensed under CC BY 2.5 via Wikipedia - https://</a:t>
+            </a:r>
+            <a:r>
+              <a:rPr lang="en-US" sz="2800" dirty="0" err="1"/>
+              <a:t>en.wikipedia.org</a:t>
+            </a:r>
+            <a:r>
+              <a:rPr lang="en-US" sz="2800" dirty="0"/>
+              <a:t>/wiki/</a:t>
+            </a:r>
+            <a:r>
+              <a:rPr lang="en-US" sz="2800" dirty="0" err="1"/>
+              <a:t>File:Perspectivephoto.jpg</a:t>
+            </a:r>
+            <a:r>
+              <a:rPr lang="en-US" sz="2800" dirty="0"/>
+              <a:t>#/media/</a:t>
+            </a:r>
+            <a:r>
+              <a:rPr lang="en-US" sz="2800" dirty="0" err="1"/>
+              <a:t>File:Perspectivephoto.jpg</a:t>
+            </a:r>
+            <a:endParaRPr lang="en-US" sz="2800" dirty="0"/>
+          </a:p>
+        </p:txBody>
+      </p:sp>
+    </p:spTree>
+    <p:extLst>
+      <p:ext uri="{BB962C8B-B14F-4D97-AF65-F5344CB8AC3E}">
+        <p14:creationId xmlns:p14="http://schemas.microsoft.com/office/powerpoint/2010/main" val="1596891371"/>
       </p:ext>
     </p:extLst>
   </p:cSld>

</xml_diff>

<commit_message>
Updating ABMAlgebraic present for conference.
</commit_message>
<xml_diff>
--- a/docs/ABMsAsAlgebraic.pptx
+++ b/docs/ABMsAsAlgebraic.pptx
@@ -7919,11 +7919,26 @@
 <dgm:dataModel xmlns:dgm="http://schemas.openxmlformats.org/drawingml/2006/diagram" xmlns:a="http://schemas.openxmlformats.org/drawingml/2006/main">
   <dgm:ptLst>
     <dgm:pt modelId="{B17668EC-E26C-0B49-A152-3C66765905A8}" type="doc">
-      <dgm:prSet loTypeId="urn:microsoft.com/office/officeart/2005/8/layout/equation1" loCatId="" qsTypeId="urn:microsoft.com/office/officeart/2005/8/quickstyle/simple4" qsCatId="simple" csTypeId="urn:microsoft.com/office/officeart/2005/8/colors/accent1_2" csCatId="accent1" phldr="0"/>
+      <dgm:prSet loTypeId="urn:microsoft.com/office/officeart/2005/8/layout/equation1" loCatId="" qsTypeId="urn:microsoft.com/office/officeart/2005/8/quickstyle/simple4" qsCatId="simple" csTypeId="urn:microsoft.com/office/officeart/2005/8/colors/accent1_2" csCatId="accent1" phldr="1"/>
       <dgm:spPr/>
     </dgm:pt>
     <dgm:pt modelId="{71D61559-1B46-724D-B982-1621C3AACA4B}">
-      <dgm:prSet phldrT="[Text]" phldr="1"/>
+      <dgm:prSet phldrT="[Text]"/>
+      <dgm:spPr/>
+      <dgm:t>
+        <a:bodyPr/>
+        <a:lstStyle/>
+        <a:p>
+          <a:r>
+            <a:rPr lang="en-US" smtClean="0"/>
+            <a:t>Pre</a:t>
+          </a:r>
+          <a:endParaRPr lang="en-US"/>
+        </a:p>
+      </dgm:t>
+    </dgm:pt>
+    <dgm:pt modelId="{9F6AEFA3-185D-8146-9270-DE0C671D7FAA}" type="parTrans" cxnId="{542E6AC4-EDDE-BF47-89B6-E1AA4B93D6E2}">
+      <dgm:prSet/>
       <dgm:spPr/>
       <dgm:t>
         <a:bodyPr/>
@@ -7932,10 +7947,6 @@
           <a:endParaRPr lang="en-US"/>
         </a:p>
       </dgm:t>
-    </dgm:pt>
-    <dgm:pt modelId="{9F6AEFA3-185D-8146-9270-DE0C671D7FAA}" type="parTrans" cxnId="{542E6AC4-EDDE-BF47-89B6-E1AA4B93D6E2}">
-      <dgm:prSet/>
-      <dgm:spPr/>
     </dgm:pt>
     <dgm:pt modelId="{02562BB2-DF6A-2B41-9658-2164E1CEF651}" type="sibTrans" cxnId="{542E6AC4-EDDE-BF47-89B6-E1AA4B93D6E2}">
       <dgm:prSet/>
@@ -7949,7 +7960,22 @@
       </dgm:t>
     </dgm:pt>
     <dgm:pt modelId="{8A03BCB5-79F1-004D-ABE0-B1E051BE2228}">
-      <dgm:prSet phldrT="[Text]" phldr="1"/>
+      <dgm:prSet phldrT="[Text]"/>
+      <dgm:spPr/>
+      <dgm:t>
+        <a:bodyPr/>
+        <a:lstStyle/>
+        <a:p>
+          <a:r>
+            <a:rPr lang="en-US" dirty="0" smtClean="0"/>
+            <a:t>Null</a:t>
+          </a:r>
+          <a:endParaRPr lang="en-US" dirty="0"/>
+        </a:p>
+      </dgm:t>
+    </dgm:pt>
+    <dgm:pt modelId="{740B7817-ED12-8C40-B966-A20A94DFDA48}" type="parTrans" cxnId="{31FF00AB-2A09-CF4E-A85C-C62CDAB6B2EC}">
+      <dgm:prSet/>
       <dgm:spPr/>
       <dgm:t>
         <a:bodyPr/>
@@ -7958,10 +7984,6 @@
           <a:endParaRPr lang="en-US"/>
         </a:p>
       </dgm:t>
-    </dgm:pt>
-    <dgm:pt modelId="{740B7817-ED12-8C40-B966-A20A94DFDA48}" type="parTrans" cxnId="{31FF00AB-2A09-CF4E-A85C-C62CDAB6B2EC}">
-      <dgm:prSet/>
-      <dgm:spPr/>
     </dgm:pt>
     <dgm:pt modelId="{8CBB45B8-B840-CB4F-A6C6-7D0C3DBE4211}" type="sibTrans" cxnId="{31FF00AB-2A09-CF4E-A85C-C62CDAB6B2EC}">
       <dgm:prSet/>
@@ -7975,7 +7997,22 @@
       </dgm:t>
     </dgm:pt>
     <dgm:pt modelId="{6986377E-B4D2-A049-9E50-21815A9B1A0E}">
-      <dgm:prSet phldrT="[Text]" phldr="1"/>
+      <dgm:prSet phldrT="[Text]"/>
+      <dgm:spPr/>
+      <dgm:t>
+        <a:bodyPr/>
+        <a:lstStyle/>
+        <a:p>
+          <a:r>
+            <a:rPr lang="en-US" dirty="0" smtClean="0"/>
+            <a:t>Pre</a:t>
+          </a:r>
+          <a:endParaRPr lang="en-US" dirty="0"/>
+        </a:p>
+      </dgm:t>
+    </dgm:pt>
+    <dgm:pt modelId="{1E58748C-F4CC-A248-B1B9-4515EF77ED81}" type="parTrans" cxnId="{49388D81-947E-2F4F-92CC-342E1609A311}">
+      <dgm:prSet/>
       <dgm:spPr/>
       <dgm:t>
         <a:bodyPr/>
@@ -7985,13 +8022,16 @@
         </a:p>
       </dgm:t>
     </dgm:pt>
-    <dgm:pt modelId="{1E58748C-F4CC-A248-B1B9-4515EF77ED81}" type="parTrans" cxnId="{49388D81-947E-2F4F-92CC-342E1609A311}">
-      <dgm:prSet/>
-      <dgm:spPr/>
-    </dgm:pt>
     <dgm:pt modelId="{80DEEF14-98CE-5248-9147-06D758ED233B}" type="sibTrans" cxnId="{49388D81-947E-2F4F-92CC-342E1609A311}">
       <dgm:prSet/>
       <dgm:spPr/>
+      <dgm:t>
+        <a:bodyPr/>
+        <a:lstStyle/>
+        <a:p>
+          <a:endParaRPr lang="en-US"/>
+        </a:p>
+      </dgm:t>
     </dgm:pt>
     <dgm:pt modelId="{0D43A316-1EB7-6746-8427-515F40701667}" type="pres">
       <dgm:prSet presAssocID="{B17668EC-E26C-0B49-A152-3C66765905A8}" presName="linearFlow" presStyleCnt="0">
@@ -12079,12 +12119,12 @@
         </a:fontRef>
       </dsp:style>
       <dsp:txBody>
-        <a:bodyPr spcFirstLastPara="0" vert="horz" wrap="square" lIns="25400" tIns="25400" rIns="25400" bIns="25400" numCol="1" spcCol="1270" anchor="ctr" anchorCtr="0">
+        <a:bodyPr spcFirstLastPara="0" vert="horz" wrap="square" lIns="34290" tIns="34290" rIns="34290" bIns="34290" numCol="1" spcCol="1270" anchor="ctr" anchorCtr="0">
           <a:noAutofit/>
         </a:bodyPr>
         <a:lstStyle/>
         <a:p>
-          <a:pPr lvl="0" algn="ctr" defTabSz="889000">
+          <a:pPr lvl="0" algn="ctr" defTabSz="1200150">
             <a:lnSpc>
               <a:spcPct val="90000"/>
             </a:lnSpc>
@@ -12095,7 +12135,11 @@
               <a:spcPct val="35000"/>
             </a:spcAft>
           </a:pPr>
-          <a:endParaRPr lang="en-US" sz="2000" kern="1200"/>
+          <a:r>
+            <a:rPr lang="en-US" sz="2700" kern="1200" smtClean="0"/>
+            <a:t>Pre</a:t>
+          </a:r>
+          <a:endParaRPr lang="en-US" sz="2700" kern="1200"/>
         </a:p>
       </dsp:txBody>
       <dsp:txXfrm>
@@ -12303,12 +12347,12 @@
         </a:fontRef>
       </dsp:style>
       <dsp:txBody>
-        <a:bodyPr spcFirstLastPara="0" vert="horz" wrap="square" lIns="25400" tIns="25400" rIns="25400" bIns="25400" numCol="1" spcCol="1270" anchor="ctr" anchorCtr="0">
+        <a:bodyPr spcFirstLastPara="0" vert="horz" wrap="square" lIns="34290" tIns="34290" rIns="34290" bIns="34290" numCol="1" spcCol="1270" anchor="ctr" anchorCtr="0">
           <a:noAutofit/>
         </a:bodyPr>
         <a:lstStyle/>
         <a:p>
-          <a:pPr lvl="0" algn="ctr" defTabSz="889000">
+          <a:pPr lvl="0" algn="ctr" defTabSz="1200150">
             <a:lnSpc>
               <a:spcPct val="90000"/>
             </a:lnSpc>
@@ -12319,7 +12363,11 @@
               <a:spcPct val="35000"/>
             </a:spcAft>
           </a:pPr>
-          <a:endParaRPr lang="en-US" sz="2000" kern="1200"/>
+          <a:r>
+            <a:rPr lang="en-US" sz="2700" kern="1200" dirty="0" smtClean="0"/>
+            <a:t>Null</a:t>
+          </a:r>
+          <a:endParaRPr lang="en-US" sz="2700" kern="1200" dirty="0"/>
         </a:p>
       </dsp:txBody>
       <dsp:txXfrm>
@@ -12527,12 +12575,12 @@
         </a:fontRef>
       </dsp:style>
       <dsp:txBody>
-        <a:bodyPr spcFirstLastPara="0" vert="horz" wrap="square" lIns="25400" tIns="25400" rIns="25400" bIns="25400" numCol="1" spcCol="1270" anchor="ctr" anchorCtr="0">
+        <a:bodyPr spcFirstLastPara="0" vert="horz" wrap="square" lIns="34290" tIns="34290" rIns="34290" bIns="34290" numCol="1" spcCol="1270" anchor="ctr" anchorCtr="0">
           <a:noAutofit/>
         </a:bodyPr>
         <a:lstStyle/>
         <a:p>
-          <a:pPr lvl="0" algn="ctr" defTabSz="889000">
+          <a:pPr lvl="0" algn="ctr" defTabSz="1200150">
             <a:lnSpc>
               <a:spcPct val="90000"/>
             </a:lnSpc>
@@ -12543,7 +12591,11 @@
               <a:spcPct val="35000"/>
             </a:spcAft>
           </a:pPr>
-          <a:endParaRPr lang="en-US" sz="2000" kern="1200"/>
+          <a:r>
+            <a:rPr lang="en-US" sz="2700" kern="1200" dirty="0" smtClean="0"/>
+            <a:t>Pre</a:t>
+          </a:r>
+          <a:endParaRPr lang="en-US" sz="2700" kern="1200" dirty="0"/>
         </a:p>
       </dsp:txBody>
       <dsp:txXfrm>
@@ -23520,7 +23572,7 @@
             <a:fld id="{AB1CDEB6-C0D8-439D-94AA-7569540F08E4}" type="datetimeFigureOut">
               <a:rPr lang="en-US" smtClean="0"/>
               <a:pPr/>
-              <a:t>12/13/15</a:t>
+              <a:t>2/26/16</a:t>
             </a:fld>
             <a:endParaRPr lang="en-US"/>
           </a:p>
@@ -23878,7 +23930,7 @@
             <a:fld id="{81331B57-0BE5-4F82-AA58-76F53EFF3ADA}" type="datetime8">
               <a:rPr lang="en-US" smtClean="0"/>
               <a:pPr/>
-              <a:t>12/13/15 5:09 PM</a:t>
+              <a:t>2/26/16 8:14 AM</a:t>
             </a:fld>
             <a:endParaRPr lang="en-US" dirty="0"/>
           </a:p>
@@ -24072,7 +24124,7 @@
             <a:fld id="{81331B57-0BE5-4F82-AA58-76F53EFF3ADA}" type="datetime8">
               <a:rPr lang="en-US" smtClean="0"/>
               <a:pPr/>
-              <a:t>12/13/15 5:09 PM</a:t>
+              <a:t>2/26/16 8:14 AM</a:t>
             </a:fld>
             <a:endParaRPr lang="en-US"/>
           </a:p>
@@ -24256,7 +24308,7 @@
             <a:fld id="{81331B57-0BE5-4F82-AA58-76F53EFF3ADA}" type="datetime8">
               <a:rPr lang="en-US" smtClean="0"/>
               <a:pPr/>
-              <a:t>12/13/15 5:09 PM</a:t>
+              <a:t>2/26/16 8:14 AM</a:t>
             </a:fld>
             <a:endParaRPr lang="en-US"/>
           </a:p>
@@ -24440,7 +24492,7 @@
             <a:fld id="{81331B57-0BE5-4F82-AA58-76F53EFF3ADA}" type="datetime8">
               <a:rPr lang="en-US" smtClean="0"/>
               <a:pPr/>
-              <a:t>12/13/15 5:09 PM</a:t>
+              <a:t>2/26/16 8:14 AM</a:t>
             </a:fld>
             <a:endParaRPr lang="en-US"/>
           </a:p>
@@ -24624,7 +24676,7 @@
             <a:fld id="{81331B57-0BE5-4F82-AA58-76F53EFF3ADA}" type="datetime8">
               <a:rPr lang="en-US" smtClean="0"/>
               <a:pPr/>
-              <a:t>12/13/15 5:09 PM</a:t>
+              <a:t>2/26/16 8:14 AM</a:t>
             </a:fld>
             <a:endParaRPr lang="en-US"/>
           </a:p>
@@ -24808,7 +24860,7 @@
             <a:fld id="{81331B57-0BE5-4F82-AA58-76F53EFF3ADA}" type="datetime8">
               <a:rPr lang="en-US" smtClean="0"/>
               <a:pPr/>
-              <a:t>12/13/15 5:09 PM</a:t>
+              <a:t>2/26/16 8:14 AM</a:t>
             </a:fld>
             <a:endParaRPr lang="en-US"/>
           </a:p>
@@ -24992,7 +25044,7 @@
             <a:fld id="{81331B57-0BE5-4F82-AA58-76F53EFF3ADA}" type="datetime8">
               <a:rPr lang="en-US" smtClean="0"/>
               <a:pPr/>
-              <a:t>12/13/15 5:09 PM</a:t>
+              <a:t>2/26/16 8:14 AM</a:t>
             </a:fld>
             <a:endParaRPr lang="en-US"/>
           </a:p>
@@ -25176,7 +25228,7 @@
             <a:fld id="{81331B57-0BE5-4F82-AA58-76F53EFF3ADA}" type="datetime8">
               <a:rPr lang="en-US" smtClean="0"/>
               <a:pPr/>
-              <a:t>12/13/15 8:46 PM</a:t>
+              <a:t>2/26/16 8:14 AM</a:t>
             </a:fld>
             <a:endParaRPr lang="en-US"/>
           </a:p>
@@ -25360,7 +25412,7 @@
             <a:fld id="{81331B57-0BE5-4F82-AA58-76F53EFF3ADA}" type="datetime8">
               <a:rPr lang="en-US" smtClean="0"/>
               <a:pPr/>
-              <a:t>12/13/15 5:09 PM</a:t>
+              <a:t>2/26/16 8:14 AM</a:t>
             </a:fld>
             <a:endParaRPr lang="en-US"/>
           </a:p>
@@ -30080,7 +30132,7 @@
             <p:ph sz="half" idx="2"/>
             <p:extLst>
               <p:ext uri="{D42A27DB-BD31-4B8C-83A1-F6EECF244321}">
-                <p14:modId xmlns:p14="http://schemas.microsoft.com/office/powerpoint/2010/main" val="696378925"/>
+                <p14:modId xmlns:p14="http://schemas.microsoft.com/office/powerpoint/2010/main" val="1399496209"/>
               </p:ext>
             </p:extLst>
           </p:nvPr>
@@ -33166,15 +33218,7 @@
             <a:pPr lvl="1"/>
             <a:r>
               <a:rPr lang="en-US" sz="2800" dirty="0" smtClean="0"/>
-              <a:t>Look to </a:t>
-            </a:r>
-            <a:r>
-              <a:rPr lang="en-US" sz="2800" dirty="0" smtClean="0"/>
-              <a:t>their goals and the </a:t>
-            </a:r>
-            <a:r>
-              <a:rPr lang="en-US" sz="2800" dirty="0" smtClean="0"/>
-              <a:t>environment to decide what to do</a:t>
+              <a:t>Look to their goals and the environment to decide what to do</a:t>
             </a:r>
           </a:p>
           <a:p>
@@ -33279,11 +33323,7 @@
           <a:p>
             <a:r>
               <a:rPr lang="en-US" smtClean="0"/>
-              <a:t>Agent-Based </a:t>
-            </a:r>
-            <a:r>
-              <a:rPr lang="en-US" smtClean="0"/>
-              <a:t>Modeling </a:t>
+              <a:t>Agent-Based Modeling </a:t>
             </a:r>
             <a:r>
               <a:rPr lang="en-US"/>
@@ -33448,15 +33488,7 @@
           <a:p>
             <a:r>
               <a:rPr lang="en-US" dirty="0" smtClean="0"/>
-              <a:t>Agent-Based </a:t>
-            </a:r>
-            <a:r>
-              <a:rPr lang="en-US" dirty="0" smtClean="0"/>
-              <a:t>Modeling</a:t>
-            </a:r>
-            <a:r>
-              <a:rPr lang="en-US" dirty="0" smtClean="0"/>
-              <a:t/>
+              <a:t>Agent-Based Modeling</a:t>
             </a:r>
             <a:br>
               <a:rPr lang="en-US" dirty="0" smtClean="0"/>

</xml_diff>

<commit_message>
Updated Algebra and ABMs presentation.
</commit_message>
<xml_diff>
--- a/docs/ABMsAsAlgebraic.pptx
+++ b/docs/ABMsAsAlgebraic.pptx
@@ -6,42 +6,45 @@
     <p:sldMasterId id="2147483674" r:id="rId5"/>
   </p:sldMasterIdLst>
   <p:notesMasterIdLst>
-    <p:notesMasterId r:id="rId39"/>
+    <p:notesMasterId r:id="rId42"/>
   </p:notesMasterIdLst>
   <p:sldIdLst>
     <p:sldId id="257" r:id="rId6"/>
     <p:sldId id="259" r:id="rId7"/>
-    <p:sldId id="289" r:id="rId8"/>
-    <p:sldId id="266" r:id="rId9"/>
-    <p:sldId id="267" r:id="rId10"/>
-    <p:sldId id="269" r:id="rId11"/>
-    <p:sldId id="270" r:id="rId12"/>
-    <p:sldId id="271" r:id="rId13"/>
-    <p:sldId id="282" r:id="rId14"/>
-    <p:sldId id="283" r:id="rId15"/>
-    <p:sldId id="284" r:id="rId16"/>
-    <p:sldId id="291" r:id="rId17"/>
-    <p:sldId id="292" r:id="rId18"/>
-    <p:sldId id="311" r:id="rId19"/>
-    <p:sldId id="293" r:id="rId20"/>
-    <p:sldId id="294" r:id="rId21"/>
-    <p:sldId id="295" r:id="rId22"/>
-    <p:sldId id="296" r:id="rId23"/>
-    <p:sldId id="297" r:id="rId24"/>
-    <p:sldId id="299" r:id="rId25"/>
-    <p:sldId id="301" r:id="rId26"/>
-    <p:sldId id="302" r:id="rId27"/>
-    <p:sldId id="303" r:id="rId28"/>
-    <p:sldId id="304" r:id="rId29"/>
-    <p:sldId id="305" r:id="rId30"/>
-    <p:sldId id="306" r:id="rId31"/>
-    <p:sldId id="312" r:id="rId32"/>
-    <p:sldId id="290" r:id="rId33"/>
-    <p:sldId id="268" r:id="rId34"/>
-    <p:sldId id="307" r:id="rId35"/>
-    <p:sldId id="308" r:id="rId36"/>
-    <p:sldId id="309" r:id="rId37"/>
-    <p:sldId id="310" r:id="rId38"/>
+    <p:sldId id="313" r:id="rId8"/>
+    <p:sldId id="315" r:id="rId9"/>
+    <p:sldId id="289" r:id="rId10"/>
+    <p:sldId id="266" r:id="rId11"/>
+    <p:sldId id="267" r:id="rId12"/>
+    <p:sldId id="269" r:id="rId13"/>
+    <p:sldId id="270" r:id="rId14"/>
+    <p:sldId id="271" r:id="rId15"/>
+    <p:sldId id="282" r:id="rId16"/>
+    <p:sldId id="283" r:id="rId17"/>
+    <p:sldId id="284" r:id="rId18"/>
+    <p:sldId id="291" r:id="rId19"/>
+    <p:sldId id="292" r:id="rId20"/>
+    <p:sldId id="311" r:id="rId21"/>
+    <p:sldId id="293" r:id="rId22"/>
+    <p:sldId id="294" r:id="rId23"/>
+    <p:sldId id="295" r:id="rId24"/>
+    <p:sldId id="296" r:id="rId25"/>
+    <p:sldId id="297" r:id="rId26"/>
+    <p:sldId id="299" r:id="rId27"/>
+    <p:sldId id="301" r:id="rId28"/>
+    <p:sldId id="302" r:id="rId29"/>
+    <p:sldId id="303" r:id="rId30"/>
+    <p:sldId id="304" r:id="rId31"/>
+    <p:sldId id="305" r:id="rId32"/>
+    <p:sldId id="306" r:id="rId33"/>
+    <p:sldId id="312" r:id="rId34"/>
+    <p:sldId id="290" r:id="rId35"/>
+    <p:sldId id="268" r:id="rId36"/>
+    <p:sldId id="307" r:id="rId37"/>
+    <p:sldId id="308" r:id="rId38"/>
+    <p:sldId id="309" r:id="rId39"/>
+    <p:sldId id="310" r:id="rId40"/>
+    <p:sldId id="314" r:id="rId41"/>
   </p:sldIdLst>
   <p:sldSz cx="9144000" cy="6858000" type="screen4x3"/>
   <p:notesSz cx="6858000" cy="9144000"/>
@@ -23574,7 +23577,7 @@
             <a:fld id="{AB1CDEB6-C0D8-439D-94AA-7569540F08E4}" type="datetimeFigureOut">
               <a:rPr lang="en-US" smtClean="0"/>
               <a:pPr/>
-              <a:t>2/26/16</a:t>
+              <a:t>6/17/16</a:t>
             </a:fld>
             <a:endParaRPr lang="en-US"/>
           </a:p>
@@ -23932,7 +23935,7 @@
             <a:fld id="{81331B57-0BE5-4F82-AA58-76F53EFF3ADA}" type="datetime8">
               <a:rPr lang="en-US" smtClean="0"/>
               <a:pPr/>
-              <a:t>2/26/16 8:14 AM</a:t>
+              <a:t>6/17/16 2:49 PM</a:t>
             </a:fld>
             <a:endParaRPr lang="en-US" dirty="0"/>
           </a:p>
@@ -24126,7 +24129,7 @@
             <a:fld id="{81331B57-0BE5-4F82-AA58-76F53EFF3ADA}" type="datetime8">
               <a:rPr lang="en-US" smtClean="0"/>
               <a:pPr/>
-              <a:t>2/26/16 8:14 AM</a:t>
+              <a:t>6/17/16 2:49 PM</a:t>
             </a:fld>
             <a:endParaRPr lang="en-US"/>
           </a:p>
@@ -24204,7 +24207,7 @@
             <a:fld id="{EC87E0CF-87F6-4B58-B8B8-DCAB2DAAF3CA}" type="slidenum">
               <a:rPr lang="en-US" smtClean="0"/>
               <a:pPr/>
-              <a:t>29</a:t>
+              <a:t>31</a:t>
             </a:fld>
             <a:endParaRPr lang="en-US" dirty="0"/>
           </a:p>
@@ -24310,7 +24313,7 @@
             <a:fld id="{81331B57-0BE5-4F82-AA58-76F53EFF3ADA}" type="datetime8">
               <a:rPr lang="en-US" smtClean="0"/>
               <a:pPr/>
-              <a:t>2/26/16 8:14 AM</a:t>
+              <a:t>6/17/16 2:49 PM</a:t>
             </a:fld>
             <a:endParaRPr lang="en-US"/>
           </a:p>
@@ -24494,7 +24497,7 @@
             <a:fld id="{81331B57-0BE5-4F82-AA58-76F53EFF3ADA}" type="datetime8">
               <a:rPr lang="en-US" smtClean="0"/>
               <a:pPr/>
-              <a:t>2/26/16 8:14 AM</a:t>
+              <a:t>6/17/16 2:49 PM</a:t>
             </a:fld>
             <a:endParaRPr lang="en-US"/>
           </a:p>
@@ -24572,7 +24575,7 @@
             <a:fld id="{EC87E0CF-87F6-4B58-B8B8-DCAB2DAAF3CA}" type="slidenum">
               <a:rPr lang="en-US" smtClean="0"/>
               <a:pPr/>
-              <a:t>3</a:t>
+              <a:t>5</a:t>
             </a:fld>
             <a:endParaRPr lang="en-US" dirty="0"/>
           </a:p>
@@ -24678,7 +24681,7 @@
             <a:fld id="{81331B57-0BE5-4F82-AA58-76F53EFF3ADA}" type="datetime8">
               <a:rPr lang="en-US" smtClean="0"/>
               <a:pPr/>
-              <a:t>2/26/16 8:14 AM</a:t>
+              <a:t>6/17/16 2:49 PM</a:t>
             </a:fld>
             <a:endParaRPr lang="en-US"/>
           </a:p>
@@ -24756,7 +24759,7 @@
             <a:fld id="{EC87E0CF-87F6-4B58-B8B8-DCAB2DAAF3CA}" type="slidenum">
               <a:rPr lang="en-US" smtClean="0"/>
               <a:pPr/>
-              <a:t>4</a:t>
+              <a:t>6</a:t>
             </a:fld>
             <a:endParaRPr lang="en-US" dirty="0"/>
           </a:p>
@@ -24862,7 +24865,7 @@
             <a:fld id="{81331B57-0BE5-4F82-AA58-76F53EFF3ADA}" type="datetime8">
               <a:rPr lang="en-US" smtClean="0"/>
               <a:pPr/>
-              <a:t>2/26/16 8:14 AM</a:t>
+              <a:t>6/17/16 2:49 PM</a:t>
             </a:fld>
             <a:endParaRPr lang="en-US"/>
           </a:p>
@@ -24940,7 +24943,7 @@
             <a:fld id="{EC87E0CF-87F6-4B58-B8B8-DCAB2DAAF3CA}" type="slidenum">
               <a:rPr lang="en-US" smtClean="0"/>
               <a:pPr/>
-              <a:t>5</a:t>
+              <a:t>7</a:t>
             </a:fld>
             <a:endParaRPr lang="en-US" dirty="0"/>
           </a:p>
@@ -25046,7 +25049,7 @@
             <a:fld id="{81331B57-0BE5-4F82-AA58-76F53EFF3ADA}" type="datetime8">
               <a:rPr lang="en-US" smtClean="0"/>
               <a:pPr/>
-              <a:t>2/26/16 8:14 AM</a:t>
+              <a:t>6/17/16 2:49 PM</a:t>
             </a:fld>
             <a:endParaRPr lang="en-US"/>
           </a:p>
@@ -25124,7 +25127,7 @@
             <a:fld id="{EC87E0CF-87F6-4B58-B8B8-DCAB2DAAF3CA}" type="slidenum">
               <a:rPr lang="en-US" smtClean="0"/>
               <a:pPr/>
-              <a:t>6</a:t>
+              <a:t>8</a:t>
             </a:fld>
             <a:endParaRPr lang="en-US" dirty="0"/>
           </a:p>
@@ -25230,7 +25233,7 @@
             <a:fld id="{81331B57-0BE5-4F82-AA58-76F53EFF3ADA}" type="datetime8">
               <a:rPr lang="en-US" smtClean="0"/>
               <a:pPr/>
-              <a:t>2/26/16 8:14 AM</a:t>
+              <a:t>6/17/16 2:49 PM</a:t>
             </a:fld>
             <a:endParaRPr lang="en-US"/>
           </a:p>
@@ -25308,7 +25311,7 @@
             <a:fld id="{EC87E0CF-87F6-4B58-B8B8-DCAB2DAAF3CA}" type="slidenum">
               <a:rPr lang="en-US" smtClean="0"/>
               <a:pPr/>
-              <a:t>7</a:t>
+              <a:t>9</a:t>
             </a:fld>
             <a:endParaRPr lang="en-US" dirty="0"/>
           </a:p>
@@ -25414,7 +25417,7 @@
             <a:fld id="{81331B57-0BE5-4F82-AA58-76F53EFF3ADA}" type="datetime8">
               <a:rPr lang="en-US" smtClean="0"/>
               <a:pPr/>
-              <a:t>2/26/16 8:14 AM</a:t>
+              <a:t>6/17/16 2:49 PM</a:t>
             </a:fld>
             <a:endParaRPr lang="en-US"/>
           </a:p>
@@ -25492,7 +25495,7 @@
             <a:fld id="{EC87E0CF-87F6-4B58-B8B8-DCAB2DAAF3CA}" type="slidenum">
               <a:rPr lang="en-US" smtClean="0"/>
               <a:pPr/>
-              <a:t>8</a:t>
+              <a:t>10</a:t>
             </a:fld>
             <a:endParaRPr lang="en-US" dirty="0"/>
           </a:p>
@@ -25577,7 +25580,7 @@
             <a:fld id="{033A6C6C-526F-4C16-B273-CA96130954AF}" type="slidenum">
               <a:rPr lang="en-US" smtClean="0"/>
               <a:pPr/>
-              <a:t>16</a:t>
+              <a:t>18</a:t>
             </a:fld>
             <a:endParaRPr lang="en-US"/>
           </a:p>
@@ -28782,14 +28785,23 @@
             <p:ph type="ctrTitle"/>
           </p:nvPr>
         </p:nvSpPr>
-        <p:spPr/>
+        <p:spPr>
+          <a:xfrm>
+            <a:off x="227805" y="1828800"/>
+            <a:ext cx="8686800" cy="1523495"/>
+          </a:xfrm>
+        </p:spPr>
         <p:txBody>
           <a:bodyPr/>
           <a:lstStyle/>
           <a:p>
             <a:r>
               <a:rPr lang="en-US" dirty="0" smtClean="0"/>
-              <a:t>ABM Interactions as Algebraic Structures</a:t>
+              <a:t>Write Less Code</a:t>
+            </a:r>
+            <a:r>
+              <a:rPr lang="is-IS" dirty="0" smtClean="0"/>
+              <a:t>… Using Algebra!</a:t>
             </a:r>
             <a:endParaRPr lang="en-US" dirty="0"/>
           </a:p>
@@ -28867,6 +28879,379 @@
 </file>
 
 <file path=ppt/slides/slide10.xml><?xml version="1.0" encoding="utf-8"?>
+<p:sld xmlns:a="http://schemas.openxmlformats.org/drawingml/2006/main" xmlns:r="http://schemas.openxmlformats.org/officeDocument/2006/relationships" xmlns:p="http://schemas.openxmlformats.org/presentationml/2006/main">
+  <p:cSld>
+    <p:spTree>
+      <p:nvGrpSpPr>
+        <p:cNvPr id="1" name=""/>
+        <p:cNvGrpSpPr/>
+        <p:nvPr/>
+      </p:nvGrpSpPr>
+      <p:grpSpPr>
+        <a:xfrm>
+          <a:off x="0" y="0"/>
+          <a:ext cx="0" cy="0"/>
+          <a:chOff x="0" y="0"/>
+          <a:chExt cx="0" cy="0"/>
+        </a:xfrm>
+      </p:grpSpPr>
+      <p:sp>
+        <p:nvSpPr>
+          <p:cNvPr id="2" name="Title 1"/>
+          <p:cNvSpPr>
+            <a:spLocks noGrp="1"/>
+          </p:cNvSpPr>
+          <p:nvPr>
+            <p:ph type="title"/>
+          </p:nvPr>
+        </p:nvSpPr>
+        <p:spPr>
+          <a:xfrm>
+            <a:off x="381000" y="230188"/>
+            <a:ext cx="8382000" cy="912812"/>
+          </a:xfrm>
+        </p:spPr>
+        <p:txBody>
+          <a:bodyPr>
+            <a:normAutofit fontScale="90000"/>
+          </a:bodyPr>
+          <a:lstStyle/>
+          <a:p>
+            <a:r>
+              <a:rPr lang="en-US" dirty="0" smtClean="0"/>
+              <a:t>Agent-Based Modeling</a:t>
+            </a:r>
+            <a:br>
+              <a:rPr lang="en-US" dirty="0" smtClean="0"/>
+            </a:br>
+            <a:endParaRPr lang="en-US" dirty="0">
+              <a:solidFill>
+                <a:schemeClr val="tx2"/>
+              </a:solidFill>
+            </a:endParaRPr>
+          </a:p>
+        </p:txBody>
+      </p:sp>
+      <p:sp>
+        <p:nvSpPr>
+          <p:cNvPr id="3" name="Text Placeholder 2"/>
+          <p:cNvSpPr>
+            <a:spLocks noGrp="1"/>
+          </p:cNvSpPr>
+          <p:nvPr>
+            <p:ph type="body" sz="quarter" idx="10"/>
+          </p:nvPr>
+        </p:nvSpPr>
+        <p:spPr>
+          <a:xfrm>
+            <a:off x="381000" y="990600"/>
+            <a:ext cx="8382000" cy="2209800"/>
+          </a:xfrm>
+        </p:spPr>
+        <p:txBody>
+          <a:bodyPr>
+            <a:normAutofit/>
+          </a:bodyPr>
+          <a:lstStyle/>
+          <a:p>
+            <a:r>
+              <a:rPr lang="en-US" dirty="0" smtClean="0"/>
+              <a:t>Example: Schelling’s segregation model</a:t>
+            </a:r>
+          </a:p>
+          <a:p>
+            <a:pPr lvl="1"/>
+            <a:r>
+              <a:rPr lang="en-US" dirty="0" smtClean="0"/>
+              <a:t>Agent’s preferences are just not to be too small a minority, not for fully segregated neighborhoods</a:t>
+            </a:r>
+          </a:p>
+          <a:p>
+            <a:pPr lvl="1"/>
+            <a:r>
+              <a:rPr lang="en-US" dirty="0" smtClean="0"/>
+              <a:t>But that can be the result anyway:</a:t>
+            </a:r>
+          </a:p>
+        </p:txBody>
+      </p:sp>
+      <p:pic>
+        <p:nvPicPr>
+          <p:cNvPr id="5" name="Picture 4" descr="segregation.png"/>
+          <p:cNvPicPr>
+            <a:picLocks noChangeAspect="1"/>
+          </p:cNvPicPr>
+          <p:nvPr/>
+        </p:nvPicPr>
+        <p:blipFill>
+          <a:blip r:embed="rId3">
+            <a:extLst>
+              <a:ext uri="{28A0092B-C50C-407E-A947-70E740481C1C}">
+                <a14:useLocalDpi xmlns:a14="http://schemas.microsoft.com/office/drawing/2010/main" val="0"/>
+              </a:ext>
+            </a:extLst>
+          </a:blip>
+          <a:stretch>
+            <a:fillRect/>
+          </a:stretch>
+        </p:blipFill>
+        <p:spPr>
+          <a:xfrm>
+            <a:off x="3581400" y="3048000"/>
+            <a:ext cx="4699000" cy="3524250"/>
+          </a:xfrm>
+          <a:prstGeom prst="rect">
+            <a:avLst/>
+          </a:prstGeom>
+        </p:spPr>
+      </p:pic>
+    </p:spTree>
+    <p:extLst>
+      <p:ext uri="{BB962C8B-B14F-4D97-AF65-F5344CB8AC3E}">
+        <p14:creationId xmlns:p14="http://schemas.microsoft.com/office/powerpoint/2010/main" val="1235514271"/>
+      </p:ext>
+    </p:extLst>
+  </p:cSld>
+  <p:clrMapOvr>
+    <a:masterClrMapping/>
+  </p:clrMapOvr>
+  <p:transition>
+    <p:fade/>
+  </p:transition>
+  <p:timing>
+    <p:tnLst>
+      <p:par>
+        <p:cTn id="1" dur="indefinite" restart="never" nodeType="tmRoot"/>
+      </p:par>
+    </p:tnLst>
+  </p:timing>
+</p:sld>
+</file>
+
+<file path=ppt/slides/slide11.xml><?xml version="1.0" encoding="utf-8"?>
+<p:sld xmlns:a="http://schemas.openxmlformats.org/drawingml/2006/main" xmlns:r="http://schemas.openxmlformats.org/officeDocument/2006/relationships" xmlns:p="http://schemas.openxmlformats.org/presentationml/2006/main">
+  <p:cSld>
+    <p:spTree>
+      <p:nvGrpSpPr>
+        <p:cNvPr id="1" name=""/>
+        <p:cNvGrpSpPr/>
+        <p:nvPr/>
+      </p:nvGrpSpPr>
+      <p:grpSpPr>
+        <a:xfrm>
+          <a:off x="0" y="0"/>
+          <a:ext cx="0" cy="0"/>
+          <a:chOff x="0" y="0"/>
+          <a:chExt cx="0" cy="0"/>
+        </a:xfrm>
+      </p:grpSpPr>
+      <p:sp>
+        <p:nvSpPr>
+          <p:cNvPr id="2" name="Title 1"/>
+          <p:cNvSpPr>
+            <a:spLocks noGrp="1"/>
+          </p:cNvSpPr>
+          <p:nvPr>
+            <p:ph type="title"/>
+          </p:nvPr>
+        </p:nvSpPr>
+        <p:spPr>
+          <a:xfrm>
+            <a:off x="381000" y="230188"/>
+            <a:ext cx="8382000" cy="677108"/>
+          </a:xfrm>
+        </p:spPr>
+        <p:txBody>
+          <a:bodyPr/>
+          <a:lstStyle/>
+          <a:p>
+            <a:r>
+              <a:rPr lang="en-US" dirty="0" smtClean="0"/>
+              <a:t>How to Do Generic Programming</a:t>
+            </a:r>
+            <a:endParaRPr lang="en-US" dirty="0"/>
+          </a:p>
+        </p:txBody>
+      </p:sp>
+      <p:sp>
+        <p:nvSpPr>
+          <p:cNvPr id="3" name="Text Placeholder 2"/>
+          <p:cNvSpPr>
+            <a:spLocks noGrp="1"/>
+          </p:cNvSpPr>
+          <p:nvPr>
+            <p:ph type="body" sz="quarter" idx="10"/>
+          </p:nvPr>
+        </p:nvSpPr>
+        <p:spPr>
+          <a:xfrm>
+            <a:off x="381000" y="1125149"/>
+            <a:ext cx="8382000" cy="5580451"/>
+          </a:xfrm>
+        </p:spPr>
+        <p:txBody>
+          <a:bodyPr/>
+          <a:lstStyle/>
+          <a:p>
+            <a:r>
+              <a:rPr lang="en-US" dirty="0"/>
+              <a:t>In </a:t>
+            </a:r>
+            <a:r>
+              <a:rPr lang="en-US" dirty="0" smtClean="0"/>
+              <a:t>math, the process </a:t>
+            </a:r>
+            <a:r>
+              <a:rPr lang="en-US" dirty="0"/>
+              <a:t>of generalization </a:t>
+            </a:r>
+            <a:r>
+              <a:rPr lang="en-US" dirty="0" smtClean="0"/>
+              <a:t>was</a:t>
+            </a:r>
+            <a:r>
+              <a:rPr lang="en-US" dirty="0"/>
+              <a:t>:</a:t>
+            </a:r>
+          </a:p>
+          <a:p>
+            <a:pPr lvl="1"/>
+            <a:r>
+              <a:rPr lang="en-US" dirty="0"/>
+              <a:t>Common measures</a:t>
+            </a:r>
+          </a:p>
+          <a:p>
+            <a:pPr lvl="1"/>
+            <a:r>
+              <a:rPr lang="en-US" dirty="0"/>
+              <a:t>Natural numbers </a:t>
+            </a:r>
+          </a:p>
+          <a:p>
+            <a:pPr lvl="1"/>
+            <a:r>
+              <a:rPr lang="en-US" dirty="0"/>
+              <a:t>Integers</a:t>
+            </a:r>
+          </a:p>
+          <a:p>
+            <a:pPr lvl="1"/>
+            <a:r>
+              <a:rPr lang="en-US" dirty="0"/>
+              <a:t>Rational numbers</a:t>
+            </a:r>
+          </a:p>
+          <a:p>
+            <a:pPr lvl="1"/>
+            <a:r>
+              <a:rPr lang="en-US" dirty="0"/>
+              <a:t>Polynomials</a:t>
+            </a:r>
+          </a:p>
+          <a:p>
+            <a:pPr lvl="1"/>
+            <a:r>
+              <a:rPr lang="en-US" dirty="0"/>
+              <a:t>Real </a:t>
+            </a:r>
+            <a:r>
+              <a:rPr lang="en-US" dirty="0" smtClean="0"/>
+              <a:t>numbers</a:t>
+            </a:r>
+          </a:p>
+          <a:p>
+            <a:pPr lvl="1"/>
+            <a:r>
+              <a:rPr lang="en-US" dirty="0" smtClean="0"/>
+              <a:t>Complex </a:t>
+            </a:r>
+            <a:r>
+              <a:rPr lang="en-US" dirty="0"/>
+              <a:t>numbers</a:t>
+            </a:r>
+          </a:p>
+          <a:p>
+            <a:pPr lvl="1"/>
+            <a:r>
+              <a:rPr lang="en-US" dirty="0" smtClean="0"/>
+              <a:t>Groups</a:t>
+            </a:r>
+          </a:p>
+          <a:p>
+            <a:pPr lvl="1"/>
+            <a:r>
+              <a:rPr lang="en-US" dirty="0" smtClean="0"/>
+              <a:t>Rings</a:t>
+            </a:r>
+            <a:endParaRPr lang="en-US" dirty="0"/>
+          </a:p>
+          <a:p>
+            <a:pPr lvl="1"/>
+            <a:r>
+              <a:rPr lang="en-US" dirty="0"/>
+              <a:t>Fields</a:t>
+            </a:r>
+          </a:p>
+          <a:p>
+            <a:endParaRPr lang="en-US" dirty="0"/>
+          </a:p>
+        </p:txBody>
+      </p:sp>
+      <p:pic>
+        <p:nvPicPr>
+          <p:cNvPr id="4" name="Picture 3" descr="Stonehenge.jpg"/>
+          <p:cNvPicPr>
+            <a:picLocks noChangeAspect="1"/>
+          </p:cNvPicPr>
+          <p:nvPr/>
+        </p:nvPicPr>
+        <p:blipFill>
+          <a:blip r:embed="rId2">
+            <a:extLst>
+              <a:ext uri="{28A0092B-C50C-407E-A947-70E740481C1C}">
+                <a14:useLocalDpi xmlns:a14="http://schemas.microsoft.com/office/drawing/2010/main" val="0"/>
+              </a:ext>
+            </a:extLst>
+          </a:blip>
+          <a:stretch>
+            <a:fillRect/>
+          </a:stretch>
+        </p:blipFill>
+        <p:spPr>
+          <a:xfrm>
+            <a:off x="4521200" y="3048000"/>
+            <a:ext cx="4140200" cy="3105150"/>
+          </a:xfrm>
+          <a:prstGeom prst="rect">
+            <a:avLst/>
+          </a:prstGeom>
+        </p:spPr>
+      </p:pic>
+    </p:spTree>
+    <p:extLst>
+      <p:ext uri="{BB962C8B-B14F-4D97-AF65-F5344CB8AC3E}">
+        <p14:creationId xmlns:p14="http://schemas.microsoft.com/office/powerpoint/2010/main" val="2427681662"/>
+      </p:ext>
+    </p:extLst>
+  </p:cSld>
+  <p:clrMapOvr>
+    <a:masterClrMapping/>
+  </p:clrMapOvr>
+  <p:transition>
+    <p:fade/>
+  </p:transition>
+  <p:timing>
+    <p:tnLst>
+      <p:par>
+        <p:cTn id="1" dur="indefinite" restart="never" nodeType="tmRoot"/>
+      </p:par>
+    </p:tnLst>
+  </p:timing>
+</p:sld>
+</file>
+
+<file path=ppt/slides/slide12.xml><?xml version="1.0" encoding="utf-8"?>
 <p:sld xmlns:a="http://schemas.openxmlformats.org/drawingml/2006/main" xmlns:r="http://schemas.openxmlformats.org/officeDocument/2006/relationships" xmlns:p="http://schemas.openxmlformats.org/presentationml/2006/main">
   <p:cSld>
     <p:spTree>
@@ -29122,7 +29507,7 @@
 </p:sld>
 </file>
 
-<file path=ppt/slides/slide11.xml><?xml version="1.0" encoding="utf-8"?>
+<file path=ppt/slides/slide13.xml><?xml version="1.0" encoding="utf-8"?>
 <p:sld xmlns:a="http://schemas.openxmlformats.org/drawingml/2006/main" xmlns:r="http://schemas.openxmlformats.org/officeDocument/2006/relationships" xmlns:p="http://schemas.openxmlformats.org/presentationml/2006/main">
   <p:cSld>
     <p:spTree>
@@ -29271,304 +29656,6 @@
     <p:extLst>
       <p:ext uri="{BB962C8B-B14F-4D97-AF65-F5344CB8AC3E}">
         <p14:creationId xmlns:p14="http://schemas.microsoft.com/office/powerpoint/2010/main" val="3526871055"/>
-      </p:ext>
-    </p:extLst>
-  </p:cSld>
-  <p:clrMapOvr>
-    <a:masterClrMapping/>
-  </p:clrMapOvr>
-  <p:transition>
-    <p:fade/>
-  </p:transition>
-  <p:timing>
-    <p:tnLst>
-      <p:par>
-        <p:cTn id="1" dur="indefinite" restart="never" nodeType="tmRoot"/>
-      </p:par>
-    </p:tnLst>
-  </p:timing>
-</p:sld>
-</file>
-
-<file path=ppt/slides/slide12.xml><?xml version="1.0" encoding="utf-8"?>
-<p:sld xmlns:a="http://schemas.openxmlformats.org/drawingml/2006/main" xmlns:r="http://schemas.openxmlformats.org/officeDocument/2006/relationships" xmlns:p="http://schemas.openxmlformats.org/presentationml/2006/main">
-  <p:cSld>
-    <p:spTree>
-      <p:nvGrpSpPr>
-        <p:cNvPr id="1" name=""/>
-        <p:cNvGrpSpPr/>
-        <p:nvPr/>
-      </p:nvGrpSpPr>
-      <p:grpSpPr>
-        <a:xfrm>
-          <a:off x="0" y="0"/>
-          <a:ext cx="0" cy="0"/>
-          <a:chOff x="0" y="0"/>
-          <a:chExt cx="0" cy="0"/>
-        </a:xfrm>
-      </p:grpSpPr>
-      <p:sp>
-        <p:nvSpPr>
-          <p:cNvPr id="2" name="Title 1"/>
-          <p:cNvSpPr>
-            <a:spLocks noGrp="1"/>
-          </p:cNvSpPr>
-          <p:nvPr>
-            <p:ph type="title"/>
-          </p:nvPr>
-        </p:nvSpPr>
-        <p:spPr>
-          <a:xfrm>
-            <a:off x="381000" y="230188"/>
-            <a:ext cx="8382000" cy="664797"/>
-          </a:xfrm>
-        </p:spPr>
-        <p:txBody>
-          <a:bodyPr/>
-          <a:lstStyle/>
-          <a:p>
-            <a:r>
-              <a:rPr lang="en-US" dirty="0" smtClean="0"/>
-              <a:t>An Algebraic Module</a:t>
-            </a:r>
-            <a:endParaRPr lang="en-US" dirty="0"/>
-          </a:p>
-        </p:txBody>
-      </p:sp>
-      <p:sp>
-        <p:nvSpPr>
-          <p:cNvPr id="3" name="Content Placeholder 2"/>
-          <p:cNvSpPr>
-            <a:spLocks noGrp="1"/>
-          </p:cNvSpPr>
-          <p:nvPr>
-            <p:ph type="body" sz="quarter" idx="10"/>
-          </p:nvPr>
-        </p:nvSpPr>
-        <p:spPr>
-          <a:xfrm>
-            <a:off x="381000" y="1676400"/>
-            <a:ext cx="8382000" cy="4505849"/>
-          </a:xfrm>
-        </p:spPr>
-        <p:txBody>
-          <a:bodyPr/>
-          <a:lstStyle/>
-          <a:p>
-            <a:r>
-              <a:rPr lang="en-US" sz="2800" dirty="0"/>
-              <a:t>To be a module an algebraic structure must contain a primary set that is an Abelian group, G, satisfying four group axioms: closure, associativity, identity and </a:t>
-            </a:r>
-            <a:r>
-              <a:rPr lang="en-US" sz="2800" dirty="0" err="1"/>
-              <a:t>invertibility</a:t>
-            </a:r>
-            <a:r>
-              <a:rPr lang="en-US" sz="2800" dirty="0"/>
-              <a:t>. There is an operator </a:t>
-            </a:r>
-            <a:r>
-              <a:rPr lang="en-US" sz="2800" dirty="0">
-                <a:sym typeface="Symbol" charset="2"/>
-              </a:rPr>
-              <a:t></a:t>
-            </a:r>
-            <a:r>
-              <a:rPr lang="en-US" sz="2800" dirty="0"/>
-              <a:t> which takes two elements of the group and yields an element, and its operation satisfies these axioms.</a:t>
-            </a:r>
-          </a:p>
-          <a:p>
-            <a:r>
-              <a:rPr lang="en-US" sz="2800" dirty="0"/>
-              <a:t>In addition, a module contains a secondary set, R, a ring of coefficients, with a second operation, </a:t>
-            </a:r>
-            <a:r>
-              <a:rPr lang="en-US" sz="2800" dirty="0">
-                <a:sym typeface="Symbol" charset="2"/>
-              </a:rPr>
-              <a:t></a:t>
-            </a:r>
-            <a:r>
-              <a:rPr lang="en-US" sz="2800" dirty="0"/>
-              <a:t>, which takes an element of R and an element of G and produces and element of G.</a:t>
-            </a:r>
-          </a:p>
-          <a:p>
-            <a:endParaRPr lang="en-US" dirty="0"/>
-          </a:p>
-        </p:txBody>
-      </p:sp>
-    </p:spTree>
-    <p:extLst>
-      <p:ext uri="{BB962C8B-B14F-4D97-AF65-F5344CB8AC3E}">
-        <p14:creationId xmlns:p14="http://schemas.microsoft.com/office/powerpoint/2010/main" val="1957043964"/>
-      </p:ext>
-    </p:extLst>
-  </p:cSld>
-  <p:clrMapOvr>
-    <a:masterClrMapping/>
-  </p:clrMapOvr>
-  <p:transition>
-    <p:fade/>
-  </p:transition>
-  <p:timing>
-    <p:tnLst>
-      <p:par>
-        <p:cTn id="1" dur="indefinite" restart="never" nodeType="tmRoot"/>
-      </p:par>
-    </p:tnLst>
-  </p:timing>
-</p:sld>
-</file>
-
-<file path=ppt/slides/slide13.xml><?xml version="1.0" encoding="utf-8"?>
-<p:sld xmlns:a="http://schemas.openxmlformats.org/drawingml/2006/main" xmlns:r="http://schemas.openxmlformats.org/officeDocument/2006/relationships" xmlns:p="http://schemas.openxmlformats.org/presentationml/2006/main">
-  <p:cSld>
-    <p:spTree>
-      <p:nvGrpSpPr>
-        <p:cNvPr id="1" name=""/>
-        <p:cNvGrpSpPr/>
-        <p:nvPr/>
-      </p:nvGrpSpPr>
-      <p:grpSpPr>
-        <a:xfrm>
-          <a:off x="0" y="0"/>
-          <a:ext cx="0" cy="0"/>
-          <a:chOff x="0" y="0"/>
-          <a:chExt cx="0" cy="0"/>
-        </a:xfrm>
-      </p:grpSpPr>
-      <p:sp>
-        <p:nvSpPr>
-          <p:cNvPr id="2" name="Title 1"/>
-          <p:cNvSpPr>
-            <a:spLocks noGrp="1"/>
-          </p:cNvSpPr>
-          <p:nvPr>
-            <p:ph type="title"/>
-          </p:nvPr>
-        </p:nvSpPr>
-        <p:spPr>
-          <a:xfrm>
-            <a:off x="381000" y="230188"/>
-            <a:ext cx="8382000" cy="664797"/>
-          </a:xfrm>
-        </p:spPr>
-        <p:txBody>
-          <a:bodyPr/>
-          <a:lstStyle/>
-          <a:p>
-            <a:r>
-              <a:rPr lang="en-US" dirty="0" smtClean="0">
-                <a:effectLst/>
-              </a:rPr>
-              <a:t>ABM </a:t>
-            </a:r>
-            <a:r>
-              <a:rPr lang="en-US" dirty="0">
-                <a:effectLst/>
-              </a:rPr>
-              <a:t>Interaction as a </a:t>
-            </a:r>
-            <a:r>
-              <a:rPr lang="en-US" dirty="0" smtClean="0">
-                <a:effectLst/>
-              </a:rPr>
-              <a:t>Module</a:t>
-            </a:r>
-            <a:endParaRPr lang="en-US" dirty="0"/>
-          </a:p>
-        </p:txBody>
-      </p:sp>
-      <p:sp>
-        <p:nvSpPr>
-          <p:cNvPr id="3" name="Content Placeholder 2"/>
-          <p:cNvSpPr>
-            <a:spLocks noGrp="1"/>
-          </p:cNvSpPr>
-          <p:nvPr>
-            <p:ph sz="half" idx="1"/>
-          </p:nvPr>
-        </p:nvSpPr>
-        <p:spPr>
-          <a:xfrm>
-            <a:off x="381000" y="1752600"/>
-            <a:ext cx="3657600" cy="3877985"/>
-          </a:xfrm>
-        </p:spPr>
-        <p:txBody>
-          <a:bodyPr/>
-          <a:lstStyle/>
-          <a:p>
-            <a:r>
-              <a:rPr lang="en-US" dirty="0"/>
-              <a:t>Elements: Following </a:t>
-            </a:r>
-            <a:r>
-              <a:rPr lang="en-US" dirty="0" smtClean="0"/>
-              <a:t>A. N. Whitehead, </a:t>
-            </a:r>
-            <a:r>
-              <a:rPr lang="en-US" dirty="0"/>
-              <a:t>we call the elements of our group G </a:t>
-            </a:r>
-            <a:r>
-              <a:rPr lang="en-US" i="1" dirty="0" err="1"/>
-              <a:t>prehensions</a:t>
-            </a:r>
-            <a:r>
-              <a:rPr lang="en-US" dirty="0"/>
-              <a:t>. A </a:t>
-            </a:r>
-            <a:r>
-              <a:rPr lang="en-US" dirty="0" err="1"/>
-              <a:t>prehension</a:t>
-            </a:r>
-            <a:r>
-              <a:rPr lang="en-US" dirty="0"/>
-              <a:t> can be roughly understood as a state of affairs in the world </a:t>
-            </a:r>
-            <a:r>
-              <a:rPr lang="en-US" i="1" dirty="0"/>
-              <a:t>as seen from a particular point of view</a:t>
-            </a:r>
-            <a:r>
-              <a:rPr lang="en-US" dirty="0"/>
-              <a:t>. </a:t>
-            </a:r>
-          </a:p>
-        </p:txBody>
-      </p:sp>
-      <p:graphicFrame>
-        <p:nvGraphicFramePr>
-          <p:cNvPr id="5" name="Content Placeholder 4"/>
-          <p:cNvGraphicFramePr>
-            <a:graphicFrameLocks noGrp="1"/>
-          </p:cNvGraphicFramePr>
-          <p:nvPr>
-            <p:ph sz="half" idx="2"/>
-            <p:extLst>
-              <p:ext uri="{D42A27DB-BD31-4B8C-83A1-F6EECF244321}">
-                <p14:modId xmlns:p14="http://schemas.microsoft.com/office/powerpoint/2010/main" val="1082365804"/>
-              </p:ext>
-            </p:extLst>
-          </p:nvPr>
-        </p:nvGraphicFramePr>
-        <p:xfrm>
-          <a:off x="4648200" y="1676400"/>
-          <a:ext cx="4114800" cy="4191000"/>
-        </p:xfrm>
-        <a:graphic>
-          <a:graphicData uri="http://schemas.openxmlformats.org/drawingml/2006/diagram">
-            <dgm:relIds xmlns:dgm="http://schemas.openxmlformats.org/drawingml/2006/diagram" xmlns:r="http://schemas.openxmlformats.org/officeDocument/2006/relationships" r:dm="rId2" r:lo="rId3" r:qs="rId4" r:cs="rId5"/>
-          </a:graphicData>
-        </a:graphic>
-      </p:graphicFrame>
-    </p:spTree>
-    <p:extLst>
-      <p:ext uri="{BB962C8B-B14F-4D97-AF65-F5344CB8AC3E}">
-        <p14:creationId xmlns:p14="http://schemas.microsoft.com/office/powerpoint/2010/main" val="1849000610"/>
       </p:ext>
     </p:extLst>
   </p:cSld>
@@ -29626,8 +29713,8 @@
           <a:lstStyle/>
           <a:p>
             <a:r>
-              <a:rPr lang="en-US" dirty="0" err="1" smtClean="0"/>
-              <a:t>Prehensions</a:t>
+              <a:rPr lang="en-US" dirty="0" smtClean="0"/>
+              <a:t>An Algebraic Module</a:t>
             </a:r>
             <a:endParaRPr lang="en-US" dirty="0"/>
           </a:p>
@@ -29635,7 +29722,7 @@
       </p:sp>
       <p:sp>
         <p:nvSpPr>
-          <p:cNvPr id="3" name="Text Placeholder 2"/>
+          <p:cNvPr id="3" name="Content Placeholder 2"/>
           <p:cNvSpPr>
             <a:spLocks noGrp="1"/>
           </p:cNvSpPr>
@@ -29645,8 +29732,8 @@
         </p:nvSpPr>
         <p:spPr>
           <a:xfrm>
-            <a:off x="381000" y="1219200"/>
-            <a:ext cx="8382000" cy="2609945"/>
+            <a:off x="381000" y="1676400"/>
+            <a:ext cx="8382000" cy="4505849"/>
           </a:xfrm>
         </p:spPr>
         <p:txBody>
@@ -29654,61 +29741,53 @@
           <a:lstStyle/>
           <a:p>
             <a:r>
-              <a:rPr lang="en-US" dirty="0" smtClean="0"/>
-              <a:t>Even before implementing this as a module, we had made it easy to:</a:t>
+              <a:rPr lang="en-US" sz="2800" dirty="0"/>
+              <a:t>To be a module an algebraic structure must contain a primary set that is an Abelian group, G, satisfying four group axioms: closure, associativity, identity and </a:t>
+            </a:r>
+            <a:r>
+              <a:rPr lang="en-US" sz="2800" dirty="0" err="1"/>
+              <a:t>invertibility</a:t>
+            </a:r>
+            <a:r>
+              <a:rPr lang="en-US" sz="2800" dirty="0"/>
+              <a:t>. There is an operator </a:t>
+            </a:r>
+            <a:r>
+              <a:rPr lang="en-US" sz="2800" dirty="0">
+                <a:sym typeface="Symbol" charset="2"/>
+              </a:rPr>
+              <a:t></a:t>
+            </a:r>
+            <a:r>
+              <a:rPr lang="en-US" sz="2800" dirty="0"/>
+              <a:t> which takes two elements of the group and yields an element, and its operation satisfies these axioms.</a:t>
             </a:r>
           </a:p>
           <a:p>
-            <a:pPr lvl="1"/>
-            <a:r>
-              <a:rPr lang="en-US" dirty="0" smtClean="0"/>
-              <a:t>Get arbitrary slices of the agent’s environment as a “view.”</a:t>
+            <a:r>
+              <a:rPr lang="en-US" sz="2800" dirty="0"/>
+              <a:t>In addition, a module contains a secondary set, R, a ring of coefficients, with a second operation, </a:t>
+            </a:r>
+            <a:r>
+              <a:rPr lang="en-US" sz="2800" dirty="0">
+                <a:sym typeface="Symbol" charset="2"/>
+              </a:rPr>
+              <a:t></a:t>
+            </a:r>
+            <a:r>
+              <a:rPr lang="en-US" sz="2800" dirty="0"/>
+              <a:t>, which takes an element of R and an element of G and produces and element of G.</a:t>
             </a:r>
           </a:p>
           <a:p>
-            <a:pPr lvl="1"/>
-            <a:r>
-              <a:rPr lang="en-US" dirty="0" smtClean="0"/>
-              <a:t>Filter that view to, e.g., see only agents of a type of particular interest.</a:t>
-            </a:r>
             <a:endParaRPr lang="en-US" dirty="0"/>
           </a:p>
         </p:txBody>
       </p:sp>
-      <p:pic>
-        <p:nvPicPr>
-          <p:cNvPr id="4" name="Picture 3"/>
-          <p:cNvPicPr>
-            <a:picLocks noChangeAspect="1"/>
-          </p:cNvPicPr>
-          <p:nvPr/>
-        </p:nvPicPr>
-        <p:blipFill>
-          <a:blip r:embed="rId2">
-            <a:extLst>
-              <a:ext uri="{28A0092B-C50C-407E-A947-70E740481C1C}">
-                <a14:useLocalDpi xmlns:a14="http://schemas.microsoft.com/office/drawing/2010/main" val="0"/>
-              </a:ext>
-            </a:extLst>
-          </a:blip>
-          <a:stretch>
-            <a:fillRect/>
-          </a:stretch>
-        </p:blipFill>
-        <p:spPr>
-          <a:xfrm>
-            <a:off x="381000" y="4419600"/>
-            <a:ext cx="8407831" cy="1600200"/>
-          </a:xfrm>
-          <a:prstGeom prst="rect">
-            <a:avLst/>
-          </a:prstGeom>
-        </p:spPr>
-      </p:pic>
     </p:spTree>
     <p:extLst>
       <p:ext uri="{BB962C8B-B14F-4D97-AF65-F5344CB8AC3E}">
-        <p14:creationId xmlns:p14="http://schemas.microsoft.com/office/powerpoint/2010/main" val="1931021824"/>
+        <p14:creationId xmlns:p14="http://schemas.microsoft.com/office/powerpoint/2010/main" val="1957043964"/>
       </p:ext>
     </p:extLst>
   </p:cSld>
@@ -29718,6 +29797,13 @@
   <p:transition>
     <p:fade/>
   </p:transition>
+  <p:timing>
+    <p:tnLst>
+      <p:par>
+        <p:cTn id="1" dur="indefinite" restart="never" nodeType="tmRoot"/>
+      </p:par>
+    </p:tnLst>
+  </p:timing>
 </p:sld>
 </file>
 
@@ -29759,8 +29845,22 @@
           <a:lstStyle/>
           <a:p>
             <a:r>
-              <a:rPr lang="en-US" dirty="0" err="1" smtClean="0"/>
-              <a:t>Prehending</a:t>
+              <a:rPr lang="en-US" dirty="0" smtClean="0">
+                <a:effectLst/>
+              </a:rPr>
+              <a:t>ABM </a:t>
+            </a:r>
+            <a:r>
+              <a:rPr lang="en-US" dirty="0">
+                <a:effectLst/>
+              </a:rPr>
+              <a:t>Interaction as a </a:t>
+            </a:r>
+            <a:r>
+              <a:rPr lang="en-US" dirty="0" smtClean="0">
+                <a:effectLst/>
+              </a:rPr>
+              <a:t>Module</a:t>
             </a:r>
             <a:endParaRPr lang="en-US" dirty="0"/>
           </a:p>
@@ -29778,74 +29878,50 @@
         </p:nvSpPr>
         <p:spPr>
           <a:xfrm>
-            <a:off x="381000" y="1943100"/>
-            <a:ext cx="3276600" cy="3988784"/>
+            <a:off x="381000" y="1752600"/>
+            <a:ext cx="3657600" cy="3877985"/>
           </a:xfrm>
         </p:spPr>
         <p:txBody>
           <a:bodyPr/>
           <a:lstStyle/>
           <a:p>
-            <a:pPr marL="339976" lvl="2" indent="-339976">
-              <a:buBlip>
-                <a:blip r:embed="rId2"/>
-              </a:buBlip>
-            </a:pPr>
-            <a:r>
-              <a:rPr lang="en-US" sz="3200" b="1" dirty="0"/>
-              <a:t>The operation </a:t>
-            </a:r>
-            <a:r>
-              <a:rPr lang="en-US" sz="3200" b="1" dirty="0">
-                <a:sym typeface="Symbol" charset="2"/>
-              </a:rPr>
-              <a:t></a:t>
-            </a:r>
-            <a:r>
-              <a:rPr lang="en-US" sz="3200" b="1" dirty="0"/>
-              <a:t>, which we will call “</a:t>
-            </a:r>
-            <a:r>
-              <a:rPr lang="en-US" sz="3200" b="1" dirty="0" err="1"/>
-              <a:t>prehend</a:t>
-            </a:r>
-            <a:r>
-              <a:rPr lang="en-US" sz="3200" b="1" dirty="0"/>
-              <a:t>”, accepts two </a:t>
-            </a:r>
-            <a:r>
-              <a:rPr lang="en-US" sz="3200" b="1" dirty="0" err="1"/>
+            <a:r>
+              <a:rPr lang="en-US" dirty="0"/>
+              <a:t>Elements: Following </a:t>
+            </a:r>
+            <a:r>
+              <a:rPr lang="en-US" dirty="0" smtClean="0"/>
+              <a:t>A. N. Whitehead, </a:t>
+            </a:r>
+            <a:r>
+              <a:rPr lang="en-US" dirty="0"/>
+              <a:t>we call the elements of our group G </a:t>
+            </a:r>
+            <a:r>
+              <a:rPr lang="en-US" i="1" dirty="0" err="1"/>
               <a:t>prehensions</a:t>
             </a:r>
             <a:r>
-              <a:rPr lang="en-US" sz="3200" b="1" dirty="0"/>
-              <a:t> as arguments and produces a third </a:t>
-            </a:r>
-            <a:r>
-              <a:rPr lang="en-US" sz="3200" b="1" dirty="0" err="1" smtClean="0"/>
+              <a:rPr lang="en-US" dirty="0"/>
+              <a:t>. A </a:t>
+            </a:r>
+            <a:r>
+              <a:rPr lang="en-US" dirty="0" err="1"/>
               <a:t>prehension</a:t>
             </a:r>
             <a:r>
-              <a:rPr lang="en-US" sz="3200" b="1" dirty="0"/>
-              <a:t> </a:t>
-            </a:r>
-            <a:r>
-              <a:rPr lang="en-US" sz="3200" b="1" dirty="0" smtClean="0"/>
-              <a:t>(</a:t>
-            </a:r>
-            <a:r>
-              <a:rPr lang="en-US" sz="3200" b="1" dirty="0" smtClean="0">
-                <a:solidFill>
-                  <a:schemeClr val="accent6"/>
-                </a:solidFill>
-              </a:rPr>
-              <a:t>Closure</a:t>
-            </a:r>
-            <a:r>
-              <a:rPr lang="en-US" sz="3200" b="1" dirty="0" smtClean="0"/>
-              <a:t>).</a:t>
-            </a:r>
-            <a:endParaRPr lang="en-US" sz="3200" b="1" dirty="0"/>
+              <a:rPr lang="en-US" dirty="0"/>
+              <a:t> can be roughly understood as a state of affairs in the world </a:t>
+            </a:r>
+            <a:r>
+              <a:rPr lang="en-US" i="1" dirty="0"/>
+              <a:t>as seen from a particular point of view</a:t>
+            </a:r>
+            <a:r>
+              <a:rPr lang="en-US" dirty="0"/>
+              <a:t>. </a:t>
+            </a:r>
           </a:p>
         </p:txBody>
       </p:sp>
@@ -29859,25 +29935,25 @@
             <p:ph sz="half" idx="2"/>
             <p:extLst>
               <p:ext uri="{D42A27DB-BD31-4B8C-83A1-F6EECF244321}">
-                <p14:modId xmlns:p14="http://schemas.microsoft.com/office/powerpoint/2010/main" val="1356543855"/>
+                <p14:modId xmlns:p14="http://schemas.microsoft.com/office/powerpoint/2010/main" val="1082365804"/>
               </p:ext>
             </p:extLst>
           </p:nvPr>
         </p:nvGraphicFramePr>
         <p:xfrm>
-          <a:off x="4419600" y="1676400"/>
-          <a:ext cx="4343400" cy="4419600"/>
+          <a:off x="4648200" y="1676400"/>
+          <a:ext cx="4114800" cy="4191000"/>
         </p:xfrm>
         <a:graphic>
           <a:graphicData uri="http://schemas.openxmlformats.org/drawingml/2006/diagram">
-            <dgm:relIds xmlns:dgm="http://schemas.openxmlformats.org/drawingml/2006/diagram" xmlns:r="http://schemas.openxmlformats.org/officeDocument/2006/relationships" r:dm="rId3" r:lo="rId4" r:qs="rId5" r:cs="rId6"/>
+            <dgm:relIds xmlns:dgm="http://schemas.openxmlformats.org/drawingml/2006/diagram" xmlns:r="http://schemas.openxmlformats.org/officeDocument/2006/relationships" r:dm="rId2" r:lo="rId3" r:qs="rId4" r:cs="rId5"/>
           </a:graphicData>
         </a:graphic>
       </p:graphicFrame>
     </p:spTree>
     <p:extLst>
       <p:ext uri="{BB962C8B-B14F-4D97-AF65-F5344CB8AC3E}">
-        <p14:creationId xmlns:p14="http://schemas.microsoft.com/office/powerpoint/2010/main" val="406889955"/>
+        <p14:creationId xmlns:p14="http://schemas.microsoft.com/office/powerpoint/2010/main" val="1849000610"/>
       </p:ext>
     </p:extLst>
   </p:cSld>
@@ -29935,8 +30011,8 @@
           <a:lstStyle/>
           <a:p>
             <a:r>
-              <a:rPr lang="en-US" dirty="0" smtClean="0"/>
-              <a:t>Associativity</a:t>
+              <a:rPr lang="en-US" dirty="0" err="1" smtClean="0"/>
+              <a:t>Prehensions</a:t>
             </a:r>
             <a:endParaRPr lang="en-US" dirty="0"/>
           </a:p>
@@ -29944,18 +30020,18 @@
       </p:sp>
       <p:sp>
         <p:nvSpPr>
-          <p:cNvPr id="3" name="Content Placeholder 2"/>
+          <p:cNvPr id="3" name="Text Placeholder 2"/>
           <p:cNvSpPr>
             <a:spLocks noGrp="1"/>
           </p:cNvSpPr>
           <p:nvPr>
-            <p:ph sz="half" idx="1"/>
+            <p:ph type="body" sz="quarter" idx="10"/>
           </p:nvPr>
         </p:nvSpPr>
         <p:spPr>
           <a:xfrm>
-            <a:off x="381000" y="1676400"/>
-            <a:ext cx="4114800" cy="4062651"/>
+            <a:off x="381000" y="1219200"/>
+            <a:ext cx="8382000" cy="2609945"/>
           </a:xfrm>
         </p:spPr>
         <p:txBody>
@@ -29963,177 +30039,61 @@
           <a:lstStyle/>
           <a:p>
             <a:r>
-              <a:rPr lang="en-US" sz="2400" dirty="0"/>
-              <a:t>(a </a:t>
-            </a:r>
-            <a:r>
-              <a:rPr lang="en-US" sz="2400" dirty="0">
-                <a:sym typeface="Symbol" charset="2"/>
-              </a:rPr>
-              <a:t></a:t>
-            </a:r>
-            <a:r>
-              <a:rPr lang="en-US" sz="2400" dirty="0"/>
-              <a:t> b) </a:t>
-            </a:r>
-            <a:r>
-              <a:rPr lang="en-US" sz="2400" dirty="0">
-                <a:sym typeface="Symbol" charset="2"/>
-              </a:rPr>
-              <a:t></a:t>
-            </a:r>
-            <a:r>
-              <a:rPr lang="en-US" sz="2400" dirty="0"/>
-              <a:t> c = a </a:t>
-            </a:r>
-            <a:r>
-              <a:rPr lang="en-US" sz="2400" dirty="0">
-                <a:sym typeface="Symbol" charset="2"/>
-              </a:rPr>
-              <a:t></a:t>
-            </a:r>
-            <a:r>
-              <a:rPr lang="en-US" sz="2400" dirty="0"/>
-              <a:t> (b </a:t>
-            </a:r>
-            <a:r>
-              <a:rPr lang="en-US" sz="2400" dirty="0">
-                <a:sym typeface="Symbol" charset="2"/>
-              </a:rPr>
-              <a:t></a:t>
-            </a:r>
-            <a:r>
-              <a:rPr lang="en-US" sz="2400" dirty="0"/>
-              <a:t> c) for all a, b and c. </a:t>
-            </a:r>
-            <a:endParaRPr lang="en-US" sz="2400" dirty="0" smtClean="0"/>
+              <a:rPr lang="en-US" dirty="0" smtClean="0"/>
+              <a:t>Even before implementing this as a module, we had made it easy to:</a:t>
+            </a:r>
           </a:p>
           <a:p>
-            <a:r>
-              <a:rPr lang="en-US" sz="2400" dirty="0" smtClean="0"/>
-              <a:t>We </a:t>
-            </a:r>
-            <a:r>
-              <a:rPr lang="en-US" sz="2400" dirty="0"/>
-              <a:t>must ensure that, say, a neighborhood can interact with a neighborhood (b </a:t>
-            </a:r>
-            <a:r>
-              <a:rPr lang="en-US" sz="2400" dirty="0">
-                <a:solidFill>
-                  <a:srgbClr val="FFFFFF"/>
-                </a:solidFill>
-                <a:sym typeface="Symbol" charset="2"/>
-              </a:rPr>
-              <a:t></a:t>
-            </a:r>
-            <a:r>
-              <a:rPr lang="en-US" sz="2400" dirty="0" smtClean="0"/>
-              <a:t> </a:t>
-            </a:r>
-            <a:r>
-              <a:rPr lang="en-US" sz="2400" dirty="0"/>
-              <a:t>c), and then with an agent (a </a:t>
-            </a:r>
-            <a:r>
-              <a:rPr lang="en-US" sz="2400" dirty="0">
-                <a:sym typeface="Symbol" charset="2"/>
-              </a:rPr>
-              <a:t></a:t>
-            </a:r>
-            <a:r>
-              <a:rPr lang="en-US" sz="2400" dirty="0" smtClean="0"/>
-              <a:t> </a:t>
-            </a:r>
-            <a:r>
-              <a:rPr lang="en-US" sz="2400" dirty="0"/>
-              <a:t>(b </a:t>
-            </a:r>
-            <a:r>
-              <a:rPr lang="en-US" sz="2400" dirty="0">
-                <a:sym typeface="Symbol" charset="2"/>
-              </a:rPr>
-              <a:t></a:t>
-            </a:r>
-            <a:r>
-              <a:rPr lang="en-US" sz="2400" dirty="0" smtClean="0"/>
-              <a:t> </a:t>
-            </a:r>
-            <a:r>
-              <a:rPr lang="en-US" sz="2400" dirty="0"/>
-              <a:t>c)). Furthermore, this must produce an identical </a:t>
-            </a:r>
-            <a:r>
-              <a:rPr lang="en-US" sz="2400" dirty="0" err="1"/>
-              <a:t>prehension</a:t>
-            </a:r>
-            <a:r>
-              <a:rPr lang="en-US" sz="2400" dirty="0"/>
-              <a:t> to that produced by an agent interacting with one neighborhood and then another one ((a </a:t>
-            </a:r>
-            <a:r>
-              <a:rPr lang="en-US" sz="2400" dirty="0">
-                <a:sym typeface="Symbol" charset="2"/>
-              </a:rPr>
-              <a:t></a:t>
-            </a:r>
-            <a:r>
-              <a:rPr lang="en-US" sz="2400" dirty="0" smtClean="0"/>
-              <a:t> </a:t>
-            </a:r>
-            <a:r>
-              <a:rPr lang="en-US" sz="2400" dirty="0"/>
-              <a:t>b</a:t>
-            </a:r>
-            <a:r>
-              <a:rPr lang="en-US" sz="2400"/>
-              <a:t>) </a:t>
-            </a:r>
-            <a:r>
-              <a:rPr lang="en-US" sz="2400">
-                <a:sym typeface="Symbol" charset="2"/>
-              </a:rPr>
-              <a:t></a:t>
-            </a:r>
-            <a:r>
-              <a:rPr lang="en-US" sz="2400" smtClean="0"/>
-              <a:t> </a:t>
-            </a:r>
-            <a:r>
-              <a:rPr lang="en-US" sz="2400" dirty="0"/>
-              <a:t>c).</a:t>
-            </a:r>
+            <a:pPr lvl="1"/>
+            <a:r>
+              <a:rPr lang="en-US" dirty="0" smtClean="0"/>
+              <a:t>Get arbitrary slices of the agent’s environment as a “view.”</a:t>
+            </a:r>
+          </a:p>
+          <a:p>
+            <a:pPr lvl="1"/>
+            <a:r>
+              <a:rPr lang="en-US" dirty="0" smtClean="0"/>
+              <a:t>Filter that view to, e.g., see only agents of a type of particular interest.</a:t>
+            </a:r>
+            <a:endParaRPr lang="en-US" dirty="0"/>
           </a:p>
         </p:txBody>
       </p:sp>
-      <p:graphicFrame>
-        <p:nvGraphicFramePr>
-          <p:cNvPr id="5" name="Content Placeholder 4"/>
-          <p:cNvGraphicFramePr>
-            <a:graphicFrameLocks noGrp="1"/>
-          </p:cNvGraphicFramePr>
-          <p:nvPr>
-            <p:ph sz="half" idx="2"/>
-            <p:extLst>
-              <p:ext uri="{D42A27DB-BD31-4B8C-83A1-F6EECF244321}">
-                <p14:modId xmlns:p14="http://schemas.microsoft.com/office/powerpoint/2010/main" val="1760850255"/>
-              </p:ext>
-            </p:extLst>
-          </p:nvPr>
-        </p:nvGraphicFramePr>
-        <p:xfrm>
-          <a:off x="4648200" y="1676400"/>
-          <a:ext cx="4114800" cy="4191000"/>
-        </p:xfrm>
-        <a:graphic>
-          <a:graphicData uri="http://schemas.openxmlformats.org/drawingml/2006/diagram">
-            <dgm:relIds xmlns:dgm="http://schemas.openxmlformats.org/drawingml/2006/diagram" xmlns:r="http://schemas.openxmlformats.org/officeDocument/2006/relationships" r:dm="rId3" r:lo="rId4" r:qs="rId5" r:cs="rId6"/>
-          </a:graphicData>
-        </a:graphic>
-      </p:graphicFrame>
+      <p:pic>
+        <p:nvPicPr>
+          <p:cNvPr id="4" name="Picture 3"/>
+          <p:cNvPicPr>
+            <a:picLocks noChangeAspect="1"/>
+          </p:cNvPicPr>
+          <p:nvPr/>
+        </p:nvPicPr>
+        <p:blipFill>
+          <a:blip r:embed="rId2">
+            <a:extLst>
+              <a:ext uri="{28A0092B-C50C-407E-A947-70E740481C1C}">
+                <a14:useLocalDpi xmlns:a14="http://schemas.microsoft.com/office/drawing/2010/main" val="0"/>
+              </a:ext>
+            </a:extLst>
+          </a:blip>
+          <a:stretch>
+            <a:fillRect/>
+          </a:stretch>
+        </p:blipFill>
+        <p:spPr>
+          <a:xfrm>
+            <a:off x="381000" y="4419600"/>
+            <a:ext cx="8407831" cy="1600200"/>
+          </a:xfrm>
+          <a:prstGeom prst="rect">
+            <a:avLst/>
+          </a:prstGeom>
+        </p:spPr>
+      </p:pic>
     </p:spTree>
     <p:extLst>
       <p:ext uri="{BB962C8B-B14F-4D97-AF65-F5344CB8AC3E}">
-        <p14:creationId xmlns:p14="http://schemas.microsoft.com/office/powerpoint/2010/main" val="272259747"/>
+        <p14:creationId xmlns:p14="http://schemas.microsoft.com/office/powerpoint/2010/main" val="1931021824"/>
       </p:ext>
     </p:extLst>
   </p:cSld>
@@ -30143,13 +30103,6 @@
   <p:transition>
     <p:fade/>
   </p:transition>
-  <p:timing>
-    <p:tnLst>
-      <p:par>
-        <p:cTn id="1" dur="indefinite" restart="never" nodeType="tmRoot"/>
-      </p:par>
-    </p:tnLst>
-  </p:timing>
 </p:sld>
 </file>
 
@@ -30191,8 +30144,8 @@
           <a:lstStyle/>
           <a:p>
             <a:r>
-              <a:rPr lang="en-US" dirty="0" smtClean="0"/>
-              <a:t>Identity</a:t>
+              <a:rPr lang="en-US" dirty="0" err="1" smtClean="0"/>
+              <a:t>Prehending</a:t>
             </a:r>
             <a:endParaRPr lang="en-US" dirty="0"/>
           </a:p>
@@ -30210,50 +30163,74 @@
         </p:nvSpPr>
         <p:spPr>
           <a:xfrm>
-            <a:off x="381000" y="2743200"/>
-            <a:ext cx="4114800" cy="1551194"/>
+            <a:off x="381000" y="1943100"/>
+            <a:ext cx="3276600" cy="3988784"/>
           </a:xfrm>
         </p:spPr>
         <p:txBody>
           <a:bodyPr/>
           <a:lstStyle/>
           <a:p>
-            <a:r>
-              <a:rPr lang="en-US" dirty="0" smtClean="0">
+            <a:pPr marL="339976" lvl="2" indent="-339976">
+              <a:buBlip>
+                <a:blip r:embed="rId2"/>
+              </a:buBlip>
+            </a:pPr>
+            <a:r>
+              <a:rPr lang="en-US" sz="3200" b="1" dirty="0"/>
+              <a:t>The operation </a:t>
+            </a:r>
+            <a:r>
+              <a:rPr lang="en-US" sz="3200" b="1" dirty="0">
+                <a:sym typeface="Symbol" charset="2"/>
+              </a:rPr>
+              <a:t></a:t>
+            </a:r>
+            <a:r>
+              <a:rPr lang="en-US" sz="3200" b="1" dirty="0"/>
+              <a:t>, which we will call “</a:t>
+            </a:r>
+            <a:r>
+              <a:rPr lang="en-US" sz="3200" b="1" dirty="0" err="1"/>
+              <a:t>prehend</a:t>
+            </a:r>
+            <a:r>
+              <a:rPr lang="en-US" sz="3200" b="1" dirty="0"/>
+              <a:t>”, accepts two </a:t>
+            </a:r>
+            <a:r>
+              <a:rPr lang="en-US" sz="3200" b="1" dirty="0" err="1"/>
+              <a:t>prehensions</a:t>
+            </a:r>
+            <a:r>
+              <a:rPr lang="en-US" sz="3200" b="1" dirty="0"/>
+              <a:t> as arguments and produces a third </a:t>
+            </a:r>
+            <a:r>
+              <a:rPr lang="en-US" sz="3200" b="1" dirty="0" err="1" smtClean="0"/>
+              <a:t>prehension</a:t>
+            </a:r>
+            <a:r>
+              <a:rPr lang="en-US" sz="3200" b="1" dirty="0"/>
+              <a:t> </a:t>
+            </a:r>
+            <a:r>
+              <a:rPr lang="en-US" sz="3200" b="1" dirty="0" smtClean="0"/>
+              <a:t>(</a:t>
+            </a:r>
+            <a:r>
+              <a:rPr lang="en-US" sz="3200" b="1" dirty="0" smtClean="0">
                 <a:solidFill>
                   <a:schemeClr val="accent6"/>
                 </a:solidFill>
               </a:rPr>
-              <a:t>Identity</a:t>
-            </a:r>
-            <a:r>
-              <a:rPr lang="en-US" dirty="0"/>
-              <a:t>: Any </a:t>
-            </a:r>
-            <a:r>
-              <a:rPr lang="en-US" dirty="0" err="1"/>
-              <a:t>prehension</a:t>
-            </a:r>
-            <a:r>
-              <a:rPr lang="en-US" dirty="0"/>
-              <a:t> </a:t>
-            </a:r>
-            <a:r>
-              <a:rPr lang="en-US" dirty="0" err="1"/>
-              <a:t>prehending</a:t>
-            </a:r>
-            <a:r>
-              <a:rPr lang="en-US" dirty="0"/>
-              <a:t> the null </a:t>
-            </a:r>
-            <a:r>
-              <a:rPr lang="en-US" dirty="0" err="1"/>
-              <a:t>prehension</a:t>
-            </a:r>
-            <a:r>
-              <a:rPr lang="en-US" dirty="0"/>
-              <a:t> remains unchanged.</a:t>
-            </a:r>
+              <a:t>Closure</a:t>
+            </a:r>
+            <a:r>
+              <a:rPr lang="en-US" sz="3200" b="1" dirty="0" smtClean="0"/>
+              <a:t>).</a:t>
+            </a:r>
+            <a:endParaRPr lang="en-US" sz="3200" b="1" dirty="0"/>
           </a:p>
         </p:txBody>
       </p:sp>
@@ -30267,25 +30244,25 @@
             <p:ph sz="half" idx="2"/>
             <p:extLst>
               <p:ext uri="{D42A27DB-BD31-4B8C-83A1-F6EECF244321}">
-                <p14:modId xmlns:p14="http://schemas.microsoft.com/office/powerpoint/2010/main" val="1399496209"/>
+                <p14:modId xmlns:p14="http://schemas.microsoft.com/office/powerpoint/2010/main" val="1356543855"/>
               </p:ext>
             </p:extLst>
           </p:nvPr>
         </p:nvGraphicFramePr>
         <p:xfrm>
-          <a:off x="4648200" y="1676400"/>
-          <a:ext cx="4114800" cy="4191000"/>
+          <a:off x="4419600" y="1676400"/>
+          <a:ext cx="4343400" cy="4419600"/>
         </p:xfrm>
         <a:graphic>
           <a:graphicData uri="http://schemas.openxmlformats.org/drawingml/2006/diagram">
-            <dgm:relIds xmlns:dgm="http://schemas.openxmlformats.org/drawingml/2006/diagram" xmlns:r="http://schemas.openxmlformats.org/officeDocument/2006/relationships" r:dm="rId2" r:lo="rId3" r:qs="rId4" r:cs="rId5"/>
+            <dgm:relIds xmlns:dgm="http://schemas.openxmlformats.org/drawingml/2006/diagram" xmlns:r="http://schemas.openxmlformats.org/officeDocument/2006/relationships" r:dm="rId3" r:lo="rId4" r:qs="rId5" r:cs="rId6"/>
           </a:graphicData>
         </a:graphic>
       </p:graphicFrame>
     </p:spTree>
     <p:extLst>
       <p:ext uri="{BB962C8B-B14F-4D97-AF65-F5344CB8AC3E}">
-        <p14:creationId xmlns:p14="http://schemas.microsoft.com/office/powerpoint/2010/main" val="1039198004"/>
+        <p14:creationId xmlns:p14="http://schemas.microsoft.com/office/powerpoint/2010/main" val="406889955"/>
       </p:ext>
     </p:extLst>
   </p:cSld>
@@ -30343,8 +30320,8 @@
           <a:lstStyle/>
           <a:p>
             <a:r>
-              <a:rPr lang="en-US" dirty="0" err="1" smtClean="0"/>
-              <a:t>Commutativity</a:t>
+              <a:rPr lang="en-US" dirty="0" smtClean="0"/>
+              <a:t>Associativity</a:t>
             </a:r>
             <a:endParaRPr lang="en-US" dirty="0"/>
           </a:p>
@@ -30362,8 +30339,8 @@
         </p:nvSpPr>
         <p:spPr>
           <a:xfrm>
-            <a:off x="381000" y="2743200"/>
-            <a:ext cx="4114800" cy="1495794"/>
+            <a:off x="381000" y="1676400"/>
+            <a:ext cx="4114800" cy="4062651"/>
           </a:xfrm>
         </p:spPr>
         <p:txBody>
@@ -30371,44 +30348,144 @@
           <a:lstStyle/>
           <a:p>
             <a:r>
-              <a:rPr lang="en-US" sz="3600" b="1" dirty="0" err="1">
-                <a:solidFill>
-                  <a:schemeClr val="accent6"/>
-                </a:solidFill>
-              </a:rPr>
-              <a:t>Commutativity</a:t>
-            </a:r>
-            <a:r>
-              <a:rPr lang="en-US" sz="3600" b="1" dirty="0"/>
-              <a:t>: </a:t>
-            </a:r>
-            <a:r>
-              <a:rPr lang="en-US" sz="3600" dirty="0" smtClean="0"/>
-              <a:t>(</a:t>
-            </a:r>
-            <a:r>
-              <a:rPr lang="en-US" sz="3600" dirty="0"/>
-              <a:t>a </a:t>
-            </a:r>
-            <a:r>
-              <a:rPr lang="en-US" sz="3600" dirty="0">
+              <a:rPr lang="en-US" sz="2400" dirty="0"/>
+              <a:t>(a </a:t>
+            </a:r>
+            <a:r>
+              <a:rPr lang="en-US" sz="2400" dirty="0">
                 <a:sym typeface="Symbol" charset="2"/>
               </a:rPr>
               <a:t></a:t>
             </a:r>
             <a:r>
-              <a:rPr lang="en-US" sz="3600" dirty="0"/>
-              <a:t> b) =  (b </a:t>
-            </a:r>
-            <a:r>
-              <a:rPr lang="en-US" sz="3600" dirty="0">
+              <a:rPr lang="en-US" sz="2400" dirty="0"/>
+              <a:t> b) </a:t>
+            </a:r>
+            <a:r>
+              <a:rPr lang="en-US" sz="2400" dirty="0">
                 <a:sym typeface="Symbol" charset="2"/>
               </a:rPr>
               <a:t></a:t>
             </a:r>
             <a:r>
-              <a:rPr lang="en-US" sz="3600" dirty="0"/>
-              <a:t> a)  for all a and b. </a:t>
+              <a:rPr lang="en-US" sz="2400" dirty="0"/>
+              <a:t> c = a </a:t>
+            </a:r>
+            <a:r>
+              <a:rPr lang="en-US" sz="2400" dirty="0">
+                <a:sym typeface="Symbol" charset="2"/>
+              </a:rPr>
+              <a:t></a:t>
+            </a:r>
+            <a:r>
+              <a:rPr lang="en-US" sz="2400" dirty="0"/>
+              <a:t> (b </a:t>
+            </a:r>
+            <a:r>
+              <a:rPr lang="en-US" sz="2400" dirty="0">
+                <a:sym typeface="Symbol" charset="2"/>
+              </a:rPr>
+              <a:t></a:t>
+            </a:r>
+            <a:r>
+              <a:rPr lang="en-US" sz="2400" dirty="0"/>
+              <a:t> c) for all a, b and c. </a:t>
+            </a:r>
+            <a:endParaRPr lang="en-US" sz="2400" dirty="0" smtClean="0"/>
+          </a:p>
+          <a:p>
+            <a:r>
+              <a:rPr lang="en-US" sz="2400" dirty="0" smtClean="0"/>
+              <a:t>We </a:t>
+            </a:r>
+            <a:r>
+              <a:rPr lang="en-US" sz="2400" dirty="0"/>
+              <a:t>must ensure that, say, a neighborhood can interact with a neighborhood (b </a:t>
+            </a:r>
+            <a:r>
+              <a:rPr lang="en-US" sz="2400" dirty="0">
+                <a:solidFill>
+                  <a:srgbClr val="FFFFFF"/>
+                </a:solidFill>
+                <a:sym typeface="Symbol" charset="2"/>
+              </a:rPr>
+              <a:t></a:t>
+            </a:r>
+            <a:r>
+              <a:rPr lang="en-US" sz="2400" dirty="0" smtClean="0"/>
+              <a:t> </a:t>
+            </a:r>
+            <a:r>
+              <a:rPr lang="en-US" sz="2400" dirty="0"/>
+              <a:t>c), and then with an agent (a </a:t>
+            </a:r>
+            <a:r>
+              <a:rPr lang="en-US" sz="2400" dirty="0">
+                <a:sym typeface="Symbol" charset="2"/>
+              </a:rPr>
+              <a:t></a:t>
+            </a:r>
+            <a:r>
+              <a:rPr lang="en-US" sz="2400" dirty="0" smtClean="0"/>
+              <a:t> </a:t>
+            </a:r>
+            <a:r>
+              <a:rPr lang="en-US" sz="2400" dirty="0"/>
+              <a:t>(b </a:t>
+            </a:r>
+            <a:r>
+              <a:rPr lang="en-US" sz="2400" dirty="0">
+                <a:sym typeface="Symbol" charset="2"/>
+              </a:rPr>
+              <a:t></a:t>
+            </a:r>
+            <a:r>
+              <a:rPr lang="en-US" sz="2400" dirty="0" smtClean="0"/>
+              <a:t> </a:t>
+            </a:r>
+            <a:r>
+              <a:rPr lang="en-US" sz="2400" dirty="0"/>
+              <a:t>c)). Furthermore, this must produce an identical </a:t>
+            </a:r>
+            <a:r>
+              <a:rPr lang="en-US" sz="2400" dirty="0" err="1"/>
+              <a:t>prehension</a:t>
+            </a:r>
+            <a:r>
+              <a:rPr lang="en-US" sz="2400" dirty="0"/>
+              <a:t> to that produced by an agent interacting with one neighborhood and then another one ((a </a:t>
+            </a:r>
+            <a:r>
+              <a:rPr lang="en-US" sz="2400" dirty="0">
+                <a:sym typeface="Symbol" charset="2"/>
+              </a:rPr>
+              <a:t></a:t>
+            </a:r>
+            <a:r>
+              <a:rPr lang="en-US" sz="2400" dirty="0" smtClean="0"/>
+              <a:t> </a:t>
+            </a:r>
+            <a:r>
+              <a:rPr lang="en-US" sz="2400" dirty="0"/>
+              <a:t>b</a:t>
+            </a:r>
+            <a:r>
+              <a:rPr lang="en-US" sz="2400"/>
+              <a:t>) </a:t>
+            </a:r>
+            <a:r>
+              <a:rPr lang="en-US" sz="2400">
+                <a:sym typeface="Symbol" charset="2"/>
+              </a:rPr>
+              <a:t></a:t>
+            </a:r>
+            <a:r>
+              <a:rPr lang="en-US" sz="2400" smtClean="0"/>
+              <a:t> </a:t>
+            </a:r>
+            <a:r>
+              <a:rPr lang="en-US" sz="2400" dirty="0"/>
+              <a:t>c).</a:t>
             </a:r>
           </a:p>
         </p:txBody>
@@ -30423,25 +30500,25 @@
             <p:ph sz="half" idx="2"/>
             <p:extLst>
               <p:ext uri="{D42A27DB-BD31-4B8C-83A1-F6EECF244321}">
-                <p14:modId xmlns:p14="http://schemas.microsoft.com/office/powerpoint/2010/main" val="1181747192"/>
+                <p14:modId xmlns:p14="http://schemas.microsoft.com/office/powerpoint/2010/main" val="1760850255"/>
               </p:ext>
             </p:extLst>
           </p:nvPr>
         </p:nvGraphicFramePr>
         <p:xfrm>
-          <a:off x="4657253" y="1531544"/>
+          <a:off x="4648200" y="1676400"/>
           <a:ext cx="4114800" cy="4191000"/>
         </p:xfrm>
         <a:graphic>
           <a:graphicData uri="http://schemas.openxmlformats.org/drawingml/2006/diagram">
-            <dgm:relIds xmlns:dgm="http://schemas.openxmlformats.org/drawingml/2006/diagram" xmlns:r="http://schemas.openxmlformats.org/officeDocument/2006/relationships" r:dm="rId2" r:lo="rId3" r:qs="rId4" r:cs="rId5"/>
+            <dgm:relIds xmlns:dgm="http://schemas.openxmlformats.org/drawingml/2006/diagram" xmlns:r="http://schemas.openxmlformats.org/officeDocument/2006/relationships" r:dm="rId3" r:lo="rId4" r:qs="rId5" r:cs="rId6"/>
           </a:graphicData>
         </a:graphic>
       </p:graphicFrame>
     </p:spTree>
     <p:extLst>
       <p:ext uri="{BB962C8B-B14F-4D97-AF65-F5344CB8AC3E}">
-        <p14:creationId xmlns:p14="http://schemas.microsoft.com/office/powerpoint/2010/main" val="654603717"/>
+        <p14:creationId xmlns:p14="http://schemas.microsoft.com/office/powerpoint/2010/main" val="272259747"/>
       </p:ext>
     </p:extLst>
   </p:cSld>
@@ -30499,8 +30576,8 @@
           <a:lstStyle/>
           <a:p>
             <a:r>
-              <a:rPr lang="en-US" dirty="0" err="1" smtClean="0"/>
-              <a:t>Invertability</a:t>
+              <a:rPr lang="en-US" dirty="0" smtClean="0"/>
+              <a:t>Identity</a:t>
             </a:r>
             <a:endParaRPr lang="en-US" dirty="0"/>
           </a:p>
@@ -30518,54 +30595,50 @@
         </p:nvSpPr>
         <p:spPr>
           <a:xfrm>
-            <a:off x="228600" y="2205317"/>
-            <a:ext cx="4114800" cy="3133165"/>
+            <a:off x="381000" y="2743200"/>
+            <a:ext cx="4114800" cy="1551194"/>
           </a:xfrm>
         </p:spPr>
         <p:txBody>
           <a:bodyPr/>
           <a:lstStyle/>
           <a:p>
-            <a:pPr marL="339976" lvl="4" indent="-339976">
-              <a:buBlip>
-                <a:blip r:embed="rId2"/>
-              </a:buBlip>
-            </a:pPr>
-            <a:r>
-              <a:rPr lang="en-US" sz="3200" dirty="0" smtClean="0"/>
-              <a:t>For </a:t>
-            </a:r>
-            <a:r>
-              <a:rPr lang="en-US" sz="3200" dirty="0"/>
-              <a:t>any </a:t>
-            </a:r>
-            <a:r>
-              <a:rPr lang="en-US" sz="3200" dirty="0" err="1"/>
+            <a:r>
+              <a:rPr lang="en-US" dirty="0" smtClean="0">
+                <a:solidFill>
+                  <a:schemeClr val="accent6"/>
+                </a:solidFill>
+              </a:rPr>
+              <a:t>Identity</a:t>
+            </a:r>
+            <a:r>
+              <a:rPr lang="en-US" dirty="0"/>
+              <a:t>: Any </a:t>
+            </a:r>
+            <a:r>
+              <a:rPr lang="en-US" dirty="0" err="1"/>
               <a:t>prehension</a:t>
             </a:r>
             <a:r>
-              <a:rPr lang="en-US" sz="3200" dirty="0"/>
-              <a:t>, there is another </a:t>
-            </a:r>
-            <a:r>
-              <a:rPr lang="en-US" sz="3200" dirty="0" err="1"/>
+              <a:rPr lang="en-US" dirty="0"/>
+              <a:t> </a:t>
+            </a:r>
+            <a:r>
+              <a:rPr lang="en-US" dirty="0" err="1"/>
+              <a:t>prehending</a:t>
+            </a:r>
+            <a:r>
+              <a:rPr lang="en-US" dirty="0"/>
+              <a:t> the null </a:t>
+            </a:r>
+            <a:r>
+              <a:rPr lang="en-US" dirty="0" err="1"/>
               <a:t>prehension</a:t>
             </a:r>
             <a:r>
-              <a:rPr lang="en-US" sz="3200" dirty="0"/>
-              <a:t> that combines with it to produce the null </a:t>
-            </a:r>
-            <a:r>
-              <a:rPr lang="en-US" sz="3200" dirty="0" err="1"/>
-              <a:t>prehension</a:t>
-            </a:r>
-            <a:r>
-              <a:rPr lang="en-US" sz="3200" dirty="0"/>
-              <a:t>.</a:t>
-            </a:r>
-          </a:p>
-          <a:p>
-            <a:endParaRPr lang="en-US" dirty="0"/>
+              <a:rPr lang="en-US" dirty="0"/>
+              <a:t> remains unchanged.</a:t>
+            </a:r>
           </a:p>
         </p:txBody>
       </p:sp>
@@ -30579,25 +30652,25 @@
             <p:ph sz="half" idx="2"/>
             <p:extLst>
               <p:ext uri="{D42A27DB-BD31-4B8C-83A1-F6EECF244321}">
-                <p14:modId xmlns:p14="http://schemas.microsoft.com/office/powerpoint/2010/main" val="1194417742"/>
+                <p14:modId xmlns:p14="http://schemas.microsoft.com/office/powerpoint/2010/main" val="1399496209"/>
               </p:ext>
             </p:extLst>
           </p:nvPr>
         </p:nvGraphicFramePr>
         <p:xfrm>
-          <a:off x="4648200" y="1524000"/>
+          <a:off x="4648200" y="1676400"/>
           <a:ext cx="4114800" cy="4191000"/>
         </p:xfrm>
         <a:graphic>
           <a:graphicData uri="http://schemas.openxmlformats.org/drawingml/2006/diagram">
-            <dgm:relIds xmlns:dgm="http://schemas.openxmlformats.org/drawingml/2006/diagram" xmlns:r="http://schemas.openxmlformats.org/officeDocument/2006/relationships" r:dm="rId3" r:lo="rId4" r:qs="rId5" r:cs="rId6"/>
+            <dgm:relIds xmlns:dgm="http://schemas.openxmlformats.org/drawingml/2006/diagram" xmlns:r="http://schemas.openxmlformats.org/officeDocument/2006/relationships" r:dm="rId2" r:lo="rId3" r:qs="rId4" r:cs="rId5"/>
           </a:graphicData>
         </a:graphic>
       </p:graphicFrame>
     </p:spTree>
     <p:extLst>
       <p:ext uri="{BB962C8B-B14F-4D97-AF65-F5344CB8AC3E}">
-        <p14:creationId xmlns:p14="http://schemas.microsoft.com/office/powerpoint/2010/main" val="1029124452"/>
+        <p14:creationId xmlns:p14="http://schemas.microsoft.com/office/powerpoint/2010/main" val="1039198004"/>
       </p:ext>
     </p:extLst>
   </p:cSld>
@@ -30765,6 +30838,318 @@
           <a:lstStyle/>
           <a:p>
             <a:r>
+              <a:rPr lang="en-US" dirty="0" err="1" smtClean="0"/>
+              <a:t>Commutativity</a:t>
+            </a:r>
+            <a:endParaRPr lang="en-US" dirty="0"/>
+          </a:p>
+        </p:txBody>
+      </p:sp>
+      <p:sp>
+        <p:nvSpPr>
+          <p:cNvPr id="3" name="Content Placeholder 2"/>
+          <p:cNvSpPr>
+            <a:spLocks noGrp="1"/>
+          </p:cNvSpPr>
+          <p:nvPr>
+            <p:ph sz="half" idx="1"/>
+          </p:nvPr>
+        </p:nvSpPr>
+        <p:spPr>
+          <a:xfrm>
+            <a:off x="381000" y="2743200"/>
+            <a:ext cx="4114800" cy="1495794"/>
+          </a:xfrm>
+        </p:spPr>
+        <p:txBody>
+          <a:bodyPr/>
+          <a:lstStyle/>
+          <a:p>
+            <a:r>
+              <a:rPr lang="en-US" sz="3600" b="1" dirty="0" err="1">
+                <a:solidFill>
+                  <a:schemeClr val="accent6"/>
+                </a:solidFill>
+              </a:rPr>
+              <a:t>Commutativity</a:t>
+            </a:r>
+            <a:r>
+              <a:rPr lang="en-US" sz="3600" b="1" dirty="0"/>
+              <a:t>: </a:t>
+            </a:r>
+            <a:r>
+              <a:rPr lang="en-US" sz="3600" dirty="0" smtClean="0"/>
+              <a:t>(</a:t>
+            </a:r>
+            <a:r>
+              <a:rPr lang="en-US" sz="3600" dirty="0"/>
+              <a:t>a </a:t>
+            </a:r>
+            <a:r>
+              <a:rPr lang="en-US" sz="3600" dirty="0">
+                <a:sym typeface="Symbol" charset="2"/>
+              </a:rPr>
+              <a:t></a:t>
+            </a:r>
+            <a:r>
+              <a:rPr lang="en-US" sz="3600" dirty="0"/>
+              <a:t> b) =  (b </a:t>
+            </a:r>
+            <a:r>
+              <a:rPr lang="en-US" sz="3600" dirty="0">
+                <a:sym typeface="Symbol" charset="2"/>
+              </a:rPr>
+              <a:t></a:t>
+            </a:r>
+            <a:r>
+              <a:rPr lang="en-US" sz="3600" dirty="0"/>
+              <a:t> a)  for all a and b. </a:t>
+            </a:r>
+          </a:p>
+        </p:txBody>
+      </p:sp>
+      <p:graphicFrame>
+        <p:nvGraphicFramePr>
+          <p:cNvPr id="5" name="Content Placeholder 4"/>
+          <p:cNvGraphicFramePr>
+            <a:graphicFrameLocks noGrp="1"/>
+          </p:cNvGraphicFramePr>
+          <p:nvPr>
+            <p:ph sz="half" idx="2"/>
+            <p:extLst>
+              <p:ext uri="{D42A27DB-BD31-4B8C-83A1-F6EECF244321}">
+                <p14:modId xmlns:p14="http://schemas.microsoft.com/office/powerpoint/2010/main" val="1181747192"/>
+              </p:ext>
+            </p:extLst>
+          </p:nvPr>
+        </p:nvGraphicFramePr>
+        <p:xfrm>
+          <a:off x="4657253" y="1531544"/>
+          <a:ext cx="4114800" cy="4191000"/>
+        </p:xfrm>
+        <a:graphic>
+          <a:graphicData uri="http://schemas.openxmlformats.org/drawingml/2006/diagram">
+            <dgm:relIds xmlns:dgm="http://schemas.openxmlformats.org/drawingml/2006/diagram" xmlns:r="http://schemas.openxmlformats.org/officeDocument/2006/relationships" r:dm="rId2" r:lo="rId3" r:qs="rId4" r:cs="rId5"/>
+          </a:graphicData>
+        </a:graphic>
+      </p:graphicFrame>
+    </p:spTree>
+    <p:extLst>
+      <p:ext uri="{BB962C8B-B14F-4D97-AF65-F5344CB8AC3E}">
+        <p14:creationId xmlns:p14="http://schemas.microsoft.com/office/powerpoint/2010/main" val="654603717"/>
+      </p:ext>
+    </p:extLst>
+  </p:cSld>
+  <p:clrMapOvr>
+    <a:masterClrMapping/>
+  </p:clrMapOvr>
+  <p:transition>
+    <p:fade/>
+  </p:transition>
+  <p:timing>
+    <p:tnLst>
+      <p:par>
+        <p:cTn id="1" dur="indefinite" restart="never" nodeType="tmRoot"/>
+      </p:par>
+    </p:tnLst>
+  </p:timing>
+</p:sld>
+</file>
+
+<file path=ppt/slides/slide21.xml><?xml version="1.0" encoding="utf-8"?>
+<p:sld xmlns:a="http://schemas.openxmlformats.org/drawingml/2006/main" xmlns:r="http://schemas.openxmlformats.org/officeDocument/2006/relationships" xmlns:p="http://schemas.openxmlformats.org/presentationml/2006/main">
+  <p:cSld>
+    <p:spTree>
+      <p:nvGrpSpPr>
+        <p:cNvPr id="1" name=""/>
+        <p:cNvGrpSpPr/>
+        <p:nvPr/>
+      </p:nvGrpSpPr>
+      <p:grpSpPr>
+        <a:xfrm>
+          <a:off x="0" y="0"/>
+          <a:ext cx="0" cy="0"/>
+          <a:chOff x="0" y="0"/>
+          <a:chExt cx="0" cy="0"/>
+        </a:xfrm>
+      </p:grpSpPr>
+      <p:sp>
+        <p:nvSpPr>
+          <p:cNvPr id="2" name="Title 1"/>
+          <p:cNvSpPr>
+            <a:spLocks noGrp="1"/>
+          </p:cNvSpPr>
+          <p:nvPr>
+            <p:ph type="title"/>
+          </p:nvPr>
+        </p:nvSpPr>
+        <p:spPr>
+          <a:xfrm>
+            <a:off x="381000" y="230188"/>
+            <a:ext cx="8382000" cy="664797"/>
+          </a:xfrm>
+        </p:spPr>
+        <p:txBody>
+          <a:bodyPr/>
+          <a:lstStyle/>
+          <a:p>
+            <a:r>
+              <a:rPr lang="en-US" dirty="0" err="1" smtClean="0"/>
+              <a:t>Invertability</a:t>
+            </a:r>
+            <a:endParaRPr lang="en-US" dirty="0"/>
+          </a:p>
+        </p:txBody>
+      </p:sp>
+      <p:sp>
+        <p:nvSpPr>
+          <p:cNvPr id="3" name="Content Placeholder 2"/>
+          <p:cNvSpPr>
+            <a:spLocks noGrp="1"/>
+          </p:cNvSpPr>
+          <p:nvPr>
+            <p:ph sz="half" idx="1"/>
+          </p:nvPr>
+        </p:nvSpPr>
+        <p:spPr>
+          <a:xfrm>
+            <a:off x="228600" y="2205317"/>
+            <a:ext cx="4114800" cy="3133165"/>
+          </a:xfrm>
+        </p:spPr>
+        <p:txBody>
+          <a:bodyPr/>
+          <a:lstStyle/>
+          <a:p>
+            <a:pPr marL="339976" lvl="4" indent="-339976">
+              <a:buBlip>
+                <a:blip r:embed="rId2"/>
+              </a:buBlip>
+            </a:pPr>
+            <a:r>
+              <a:rPr lang="en-US" sz="3200" dirty="0" smtClean="0"/>
+              <a:t>For </a:t>
+            </a:r>
+            <a:r>
+              <a:rPr lang="en-US" sz="3200" dirty="0"/>
+              <a:t>any </a:t>
+            </a:r>
+            <a:r>
+              <a:rPr lang="en-US" sz="3200" dirty="0" err="1"/>
+              <a:t>prehension</a:t>
+            </a:r>
+            <a:r>
+              <a:rPr lang="en-US" sz="3200" dirty="0"/>
+              <a:t>, there is another </a:t>
+            </a:r>
+            <a:r>
+              <a:rPr lang="en-US" sz="3200" dirty="0" err="1"/>
+              <a:t>prehension</a:t>
+            </a:r>
+            <a:r>
+              <a:rPr lang="en-US" sz="3200" dirty="0"/>
+              <a:t> that combines with it to produce the null </a:t>
+            </a:r>
+            <a:r>
+              <a:rPr lang="en-US" sz="3200" dirty="0" err="1"/>
+              <a:t>prehension</a:t>
+            </a:r>
+            <a:r>
+              <a:rPr lang="en-US" sz="3200" dirty="0"/>
+              <a:t>.</a:t>
+            </a:r>
+          </a:p>
+          <a:p>
+            <a:endParaRPr lang="en-US" dirty="0"/>
+          </a:p>
+        </p:txBody>
+      </p:sp>
+      <p:graphicFrame>
+        <p:nvGraphicFramePr>
+          <p:cNvPr id="5" name="Content Placeholder 4"/>
+          <p:cNvGraphicFramePr>
+            <a:graphicFrameLocks noGrp="1"/>
+          </p:cNvGraphicFramePr>
+          <p:nvPr>
+            <p:ph sz="half" idx="2"/>
+            <p:extLst>
+              <p:ext uri="{D42A27DB-BD31-4B8C-83A1-F6EECF244321}">
+                <p14:modId xmlns:p14="http://schemas.microsoft.com/office/powerpoint/2010/main" val="1194417742"/>
+              </p:ext>
+            </p:extLst>
+          </p:nvPr>
+        </p:nvGraphicFramePr>
+        <p:xfrm>
+          <a:off x="4648200" y="1524000"/>
+          <a:ext cx="4114800" cy="4191000"/>
+        </p:xfrm>
+        <a:graphic>
+          <a:graphicData uri="http://schemas.openxmlformats.org/drawingml/2006/diagram">
+            <dgm:relIds xmlns:dgm="http://schemas.openxmlformats.org/drawingml/2006/diagram" xmlns:r="http://schemas.openxmlformats.org/officeDocument/2006/relationships" r:dm="rId3" r:lo="rId4" r:qs="rId5" r:cs="rId6"/>
+          </a:graphicData>
+        </a:graphic>
+      </p:graphicFrame>
+    </p:spTree>
+    <p:extLst>
+      <p:ext uri="{BB962C8B-B14F-4D97-AF65-F5344CB8AC3E}">
+        <p14:creationId xmlns:p14="http://schemas.microsoft.com/office/powerpoint/2010/main" val="1029124452"/>
+      </p:ext>
+    </p:extLst>
+  </p:cSld>
+  <p:clrMapOvr>
+    <a:masterClrMapping/>
+  </p:clrMapOvr>
+  <p:transition>
+    <p:fade/>
+  </p:transition>
+  <p:timing>
+    <p:tnLst>
+      <p:par>
+        <p:cTn id="1" dur="indefinite" restart="never" nodeType="tmRoot"/>
+      </p:par>
+    </p:tnLst>
+  </p:timing>
+</p:sld>
+</file>
+
+<file path=ppt/slides/slide22.xml><?xml version="1.0" encoding="utf-8"?>
+<p:sld xmlns:a="http://schemas.openxmlformats.org/drawingml/2006/main" xmlns:r="http://schemas.openxmlformats.org/officeDocument/2006/relationships" xmlns:p="http://schemas.openxmlformats.org/presentationml/2006/main">
+  <p:cSld>
+    <p:spTree>
+      <p:nvGrpSpPr>
+        <p:cNvPr id="1" name=""/>
+        <p:cNvGrpSpPr/>
+        <p:nvPr/>
+      </p:nvGrpSpPr>
+      <p:grpSpPr>
+        <a:xfrm>
+          <a:off x="0" y="0"/>
+          <a:ext cx="0" cy="0"/>
+          <a:chOff x="0" y="0"/>
+          <a:chExt cx="0" cy="0"/>
+        </a:xfrm>
+      </p:grpSpPr>
+      <p:sp>
+        <p:nvSpPr>
+          <p:cNvPr id="2" name="Title 1"/>
+          <p:cNvSpPr>
+            <a:spLocks noGrp="1"/>
+          </p:cNvSpPr>
+          <p:nvPr>
+            <p:ph type="title"/>
+          </p:nvPr>
+        </p:nvSpPr>
+        <p:spPr>
+          <a:xfrm>
+            <a:off x="381000" y="230188"/>
+            <a:ext cx="8382000" cy="664797"/>
+          </a:xfrm>
+        </p:spPr>
+        <p:txBody>
+          <a:bodyPr/>
+          <a:lstStyle/>
+          <a:p>
+            <a:r>
               <a:rPr lang="en-US" dirty="0" smtClean="0"/>
               <a:t>The Meaning of </a:t>
             </a:r>
@@ -30934,7 +31319,7 @@
 </p:sld>
 </file>
 
-<file path=ppt/slides/slide21.xml><?xml version="1.0" encoding="utf-8"?>
+<file path=ppt/slides/slide23.xml><?xml version="1.0" encoding="utf-8"?>
 <p:sld xmlns:a="http://schemas.openxmlformats.org/drawingml/2006/main" xmlns:r="http://schemas.openxmlformats.org/officeDocument/2006/relationships" xmlns:p="http://schemas.openxmlformats.org/presentationml/2006/main">
   <p:cSld>
     <p:spTree>
@@ -31078,7 +31463,7 @@
 </p:sld>
 </file>
 
-<file path=ppt/slides/slide22.xml><?xml version="1.0" encoding="utf-8"?>
+<file path=ppt/slides/slide24.xml><?xml version="1.0" encoding="utf-8"?>
 <p:sld xmlns:a="http://schemas.openxmlformats.org/drawingml/2006/main" xmlns:r="http://schemas.openxmlformats.org/officeDocument/2006/relationships" xmlns:p="http://schemas.openxmlformats.org/presentationml/2006/main">
   <p:cSld>
     <p:spTree>
@@ -31254,7 +31639,7 @@
 </p:sld>
 </file>
 
-<file path=ppt/slides/slide23.xml><?xml version="1.0" encoding="utf-8"?>
+<file path=ppt/slides/slide25.xml><?xml version="1.0" encoding="utf-8"?>
 <p:sld xmlns:a="http://schemas.openxmlformats.org/drawingml/2006/main" xmlns:r="http://schemas.openxmlformats.org/officeDocument/2006/relationships" xmlns:p="http://schemas.openxmlformats.org/presentationml/2006/main">
   <p:cSld>
     <p:spTree>
@@ -31410,7 +31795,7 @@
 </p:sld>
 </file>
 
-<file path=ppt/slides/slide24.xml><?xml version="1.0" encoding="utf-8"?>
+<file path=ppt/slides/slide26.xml><?xml version="1.0" encoding="utf-8"?>
 <p:sld xmlns:a="http://schemas.openxmlformats.org/drawingml/2006/main" xmlns:r="http://schemas.openxmlformats.org/officeDocument/2006/relationships" xmlns:p="http://schemas.openxmlformats.org/presentationml/2006/main">
   <p:cSld>
     <p:spTree>
@@ -31545,7 +31930,7 @@
 </p:sld>
 </file>
 
-<file path=ppt/slides/slide25.xml><?xml version="1.0" encoding="utf-8"?>
+<file path=ppt/slides/slide27.xml><?xml version="1.0" encoding="utf-8"?>
 <p:sld xmlns:a="http://schemas.openxmlformats.org/drawingml/2006/main" xmlns:r="http://schemas.openxmlformats.org/officeDocument/2006/relationships" xmlns:p="http://schemas.openxmlformats.org/presentationml/2006/main">
   <p:cSld>
     <p:spTree>
@@ -31679,7 +32064,7 @@
 </p:sld>
 </file>
 
-<file path=ppt/slides/slide26.xml><?xml version="1.0" encoding="utf-8"?>
+<file path=ppt/slides/slide28.xml><?xml version="1.0" encoding="utf-8"?>
 <p:sld xmlns:a="http://schemas.openxmlformats.org/drawingml/2006/main" xmlns:r="http://schemas.openxmlformats.org/officeDocument/2006/relationships" xmlns:p="http://schemas.openxmlformats.org/presentationml/2006/main">
   <p:cSld>
     <p:spTree>
@@ -31824,7 +32209,7 @@
 </p:sld>
 </file>
 
-<file path=ppt/slides/slide27.xml><?xml version="1.0" encoding="utf-8"?>
+<file path=ppt/slides/slide29.xml><?xml version="1.0" encoding="utf-8"?>
 <p:sld xmlns:a="http://schemas.openxmlformats.org/drawingml/2006/main" xmlns:r="http://schemas.openxmlformats.org/officeDocument/2006/relationships" xmlns:p="http://schemas.openxmlformats.org/presentationml/2006/main">
   <p:cSld>
     <p:spTree>
@@ -31952,7 +32337,140 @@
 </p:sld>
 </file>
 
-<file path=ppt/slides/slide28.xml><?xml version="1.0" encoding="utf-8"?>
+<file path=ppt/slides/slide3.xml><?xml version="1.0" encoding="utf-8"?>
+<p:sld xmlns:a="http://schemas.openxmlformats.org/drawingml/2006/main" xmlns:r="http://schemas.openxmlformats.org/officeDocument/2006/relationships" xmlns:p="http://schemas.openxmlformats.org/presentationml/2006/main">
+  <p:cSld>
+    <p:spTree>
+      <p:nvGrpSpPr>
+        <p:cNvPr id="1" name=""/>
+        <p:cNvGrpSpPr/>
+        <p:nvPr/>
+      </p:nvGrpSpPr>
+      <p:grpSpPr>
+        <a:xfrm>
+          <a:off x="0" y="0"/>
+          <a:ext cx="0" cy="0"/>
+          <a:chOff x="0" y="0"/>
+          <a:chExt cx="0" cy="0"/>
+        </a:xfrm>
+      </p:grpSpPr>
+      <p:sp>
+        <p:nvSpPr>
+          <p:cNvPr id="2" name="Title 1"/>
+          <p:cNvSpPr>
+            <a:spLocks noGrp="1"/>
+          </p:cNvSpPr>
+          <p:nvPr>
+            <p:ph type="title"/>
+          </p:nvPr>
+        </p:nvSpPr>
+        <p:spPr>
+          <a:xfrm>
+            <a:off x="381000" y="230188"/>
+            <a:ext cx="8382000" cy="664797"/>
+          </a:xfrm>
+        </p:spPr>
+        <p:txBody>
+          <a:bodyPr/>
+          <a:lstStyle/>
+          <a:p>
+            <a:r>
+              <a:rPr lang="en-US" dirty="0" smtClean="0"/>
+              <a:t>Python</a:t>
+            </a:r>
+            <a:endParaRPr lang="en-US" dirty="0"/>
+          </a:p>
+        </p:txBody>
+      </p:sp>
+      <p:sp>
+        <p:nvSpPr>
+          <p:cNvPr id="3" name="Text Placeholder 2"/>
+          <p:cNvSpPr>
+            <a:spLocks noGrp="1"/>
+          </p:cNvSpPr>
+          <p:nvPr>
+            <p:ph type="body" sz="quarter" idx="10"/>
+          </p:nvPr>
+        </p:nvSpPr>
+        <p:spPr>
+          <a:xfrm>
+            <a:off x="417214" y="1600200"/>
+            <a:ext cx="8382000" cy="1828800"/>
+          </a:xfrm>
+        </p:spPr>
+        <p:txBody>
+          <a:bodyPr/>
+          <a:lstStyle/>
+          <a:p>
+            <a:r>
+              <a:rPr lang="en-US" sz="3600" dirty="0" smtClean="0"/>
+              <a:t>A great generic programming language!</a:t>
+            </a:r>
+          </a:p>
+          <a:p>
+            <a:r>
+              <a:rPr lang="en-US" sz="3600" dirty="0" smtClean="0"/>
+              <a:t>Don’t repeat yourself</a:t>
+            </a:r>
+          </a:p>
+          <a:p>
+            <a:r>
+              <a:rPr lang="en-US" sz="3600" dirty="0"/>
+              <a:t>Duck typing</a:t>
+            </a:r>
+          </a:p>
+          <a:p>
+            <a:endParaRPr lang="en-US" sz="3600" dirty="0"/>
+          </a:p>
+        </p:txBody>
+      </p:sp>
+      <p:pic>
+        <p:nvPicPr>
+          <p:cNvPr id="5" name="Picture 4"/>
+          <p:cNvPicPr>
+            <a:picLocks noChangeAspect="1"/>
+          </p:cNvPicPr>
+          <p:nvPr/>
+        </p:nvPicPr>
+        <p:blipFill>
+          <a:blip r:embed="rId2">
+            <a:extLst>
+              <a:ext uri="{28A0092B-C50C-407E-A947-70E740481C1C}">
+                <a14:useLocalDpi xmlns:a14="http://schemas.microsoft.com/office/drawing/2010/main" val="0"/>
+              </a:ext>
+            </a:extLst>
+          </a:blip>
+          <a:stretch>
+            <a:fillRect/>
+          </a:stretch>
+        </p:blipFill>
+        <p:spPr>
+          <a:xfrm>
+            <a:off x="4038600" y="3124200"/>
+            <a:ext cx="4556125" cy="3258362"/>
+          </a:xfrm>
+          <a:prstGeom prst="rect">
+            <a:avLst/>
+          </a:prstGeom>
+        </p:spPr>
+      </p:pic>
+    </p:spTree>
+    <p:extLst>
+      <p:ext uri="{BB962C8B-B14F-4D97-AF65-F5344CB8AC3E}">
+        <p14:creationId xmlns:p14="http://schemas.microsoft.com/office/powerpoint/2010/main" val="334257492"/>
+      </p:ext>
+    </p:extLst>
+  </p:cSld>
+  <p:clrMapOvr>
+    <a:masterClrMapping/>
+  </p:clrMapOvr>
+  <p:transition>
+    <p:fade/>
+  </p:transition>
+</p:sld>
+</file>
+
+<file path=ppt/slides/slide30.xml><?xml version="1.0" encoding="utf-8"?>
 <p:sld xmlns:a="http://schemas.openxmlformats.org/drawingml/2006/main" xmlns:r="http://schemas.openxmlformats.org/officeDocument/2006/relationships" xmlns:p="http://schemas.openxmlformats.org/presentationml/2006/main">
   <p:cSld>
     <p:spTree>
@@ -32010,7 +32528,7 @@
         <p:spPr>
           <a:xfrm>
             <a:off x="381000" y="1371600"/>
-            <a:ext cx="8382000" cy="886397"/>
+            <a:ext cx="8382000" cy="1661993"/>
           </a:xfrm>
         </p:spPr>
         <p:txBody>
@@ -32018,38 +32536,53 @@
           <a:lstStyle/>
           <a:p>
             <a:r>
-              <a:rPr lang="en-US" dirty="0" smtClean="0"/>
-              <a:t>Contributors welcome! The project is on </a:t>
-            </a:r>
-            <a:r>
-              <a:rPr lang="en-US" dirty="0" err="1" smtClean="0"/>
+              <a:rPr lang="en-US" sz="4000" dirty="0" smtClean="0"/>
+              <a:t>Contributors </a:t>
+            </a:r>
+            <a:r>
+              <a:rPr lang="en-US" sz="4000" dirty="0" smtClean="0"/>
+              <a:t>welcome!</a:t>
+            </a:r>
+            <a:br>
+              <a:rPr lang="en-US" sz="4000" dirty="0" smtClean="0"/>
+            </a:br>
+            <a:r>
+              <a:rPr lang="en-US" sz="4000" dirty="0" smtClean="0"/>
+              <a:t>The </a:t>
+            </a:r>
+            <a:r>
+              <a:rPr lang="en-US" sz="4000" dirty="0" smtClean="0"/>
+              <a:t>project is on </a:t>
+            </a:r>
+            <a:r>
+              <a:rPr lang="en-US" sz="4000" dirty="0" err="1" smtClean="0"/>
               <a:t>GitHub</a:t>
             </a:r>
             <a:r>
-              <a:rPr lang="en-US" dirty="0"/>
+              <a:rPr lang="en-US" sz="4000" dirty="0"/>
               <a:t>: https://</a:t>
             </a:r>
             <a:r>
-              <a:rPr lang="en-US" dirty="0" err="1"/>
+              <a:rPr lang="en-US" sz="4000" dirty="0" err="1"/>
               <a:t>github.com</a:t>
             </a:r>
             <a:r>
-              <a:rPr lang="en-US" dirty="0"/>
+              <a:rPr lang="en-US" sz="4000" dirty="0"/>
               <a:t>/</a:t>
             </a:r>
             <a:r>
-              <a:rPr lang="en-US" dirty="0" err="1"/>
+              <a:rPr lang="en-US" sz="4000" dirty="0" err="1"/>
               <a:t>gcallah</a:t>
             </a:r>
             <a:r>
-              <a:rPr lang="en-US" dirty="0"/>
+              <a:rPr lang="en-US" sz="4000" dirty="0"/>
               <a:t>/</a:t>
             </a:r>
             <a:r>
-              <a:rPr lang="en-US" dirty="0" err="1"/>
+              <a:rPr lang="en-US" sz="4000" dirty="0" err="1"/>
               <a:t>Indra</a:t>
             </a:r>
-            <a:endParaRPr lang="en-US" dirty="0" smtClean="0"/>
+            <a:endParaRPr lang="en-US" sz="4000" dirty="0" smtClean="0"/>
           </a:p>
         </p:txBody>
       </p:sp>
@@ -32057,546 +32590,6 @@
     <p:extLst>
       <p:ext uri="{BB962C8B-B14F-4D97-AF65-F5344CB8AC3E}">
         <p14:creationId xmlns:p14="http://schemas.microsoft.com/office/powerpoint/2010/main" val="3965056846"/>
-      </p:ext>
-    </p:extLst>
-  </p:cSld>
-  <p:clrMapOvr>
-    <a:masterClrMapping/>
-  </p:clrMapOvr>
-  <p:transition>
-    <p:fade/>
-  </p:transition>
-  <p:timing>
-    <p:tnLst>
-      <p:par>
-        <p:cTn id="1" dur="indefinite" restart="never" nodeType="tmRoot"/>
-      </p:par>
-    </p:tnLst>
-  </p:timing>
-</p:sld>
-</file>
-
-<file path=ppt/slides/slide29.xml><?xml version="1.0" encoding="utf-8"?>
-<p:sld xmlns:a="http://schemas.openxmlformats.org/drawingml/2006/main" xmlns:r="http://schemas.openxmlformats.org/officeDocument/2006/relationships" xmlns:p="http://schemas.openxmlformats.org/presentationml/2006/main">
-  <p:cSld>
-    <p:spTree>
-      <p:nvGrpSpPr>
-        <p:cNvPr id="1" name=""/>
-        <p:cNvGrpSpPr/>
-        <p:nvPr/>
-      </p:nvGrpSpPr>
-      <p:grpSpPr>
-        <a:xfrm>
-          <a:off x="0" y="0"/>
-          <a:ext cx="0" cy="0"/>
-          <a:chOff x="0" y="0"/>
-          <a:chExt cx="0" cy="0"/>
-        </a:xfrm>
-      </p:grpSpPr>
-      <p:sp>
-        <p:nvSpPr>
-          <p:cNvPr id="2" name="Title 1"/>
-          <p:cNvSpPr>
-            <a:spLocks noGrp="1"/>
-          </p:cNvSpPr>
-          <p:nvPr>
-            <p:ph type="title"/>
-          </p:nvPr>
-        </p:nvSpPr>
-        <p:spPr>
-          <a:xfrm>
-            <a:off x="381000" y="230189"/>
-            <a:ext cx="8382000" cy="836612"/>
-          </a:xfrm>
-        </p:spPr>
-        <p:txBody>
-          <a:bodyPr>
-            <a:normAutofit fontScale="90000"/>
-          </a:bodyPr>
-          <a:lstStyle/>
-          <a:p>
-            <a:r>
-              <a:rPr lang="en-US" dirty="0" smtClean="0"/>
-              <a:t>Credits</a:t>
-            </a:r>
-            <a:br>
-              <a:rPr lang="en-US" dirty="0" smtClean="0"/>
-            </a:br>
-            <a:endParaRPr lang="en-US" dirty="0">
-              <a:solidFill>
-                <a:schemeClr val="tx2"/>
-              </a:solidFill>
-            </a:endParaRPr>
-          </a:p>
-        </p:txBody>
-      </p:sp>
-      <p:sp>
-        <p:nvSpPr>
-          <p:cNvPr id="3" name="Text Placeholder 2"/>
-          <p:cNvSpPr>
-            <a:spLocks noGrp="1"/>
-          </p:cNvSpPr>
-          <p:nvPr>
-            <p:ph type="body" sz="quarter" idx="10"/>
-          </p:nvPr>
-        </p:nvSpPr>
-        <p:spPr>
-          <a:xfrm>
-            <a:off x="381000" y="838200"/>
-            <a:ext cx="8382000" cy="5486400"/>
-          </a:xfrm>
-        </p:spPr>
-        <p:txBody>
-          <a:bodyPr>
-            <a:normAutofit fontScale="92500" lnSpcReduction="10000"/>
-          </a:bodyPr>
-          <a:lstStyle/>
-          <a:p>
-            <a:endParaRPr lang="en-US" dirty="0" smtClean="0"/>
-          </a:p>
-          <a:p>
-            <a:r>
-              <a:rPr lang="en-US" sz="3000" dirty="0"/>
-              <a:t>"Knot with </a:t>
-            </a:r>
-            <a:r>
-              <a:rPr lang="en-US" sz="3000" dirty="0" err="1"/>
-              <a:t>borromean</a:t>
-            </a:r>
-            <a:r>
-              <a:rPr lang="en-US" sz="3000" dirty="0"/>
-              <a:t> rings in </a:t>
-            </a:r>
-            <a:r>
-              <a:rPr lang="en-US" sz="3000" dirty="0" err="1"/>
-              <a:t>jsj</a:t>
-            </a:r>
-            <a:r>
-              <a:rPr lang="en-US" sz="3000" dirty="0"/>
-              <a:t> </a:t>
-            </a:r>
-            <a:r>
-              <a:rPr lang="en-US" sz="3000" dirty="0" err="1"/>
-              <a:t>decomp</a:t>
-            </a:r>
-            <a:r>
-              <a:rPr lang="en-US" sz="3000" dirty="0"/>
-              <a:t> small". Licensed under CC BY-SA 3.0 via Wikipedia - </a:t>
-            </a:r>
-            <a:r>
-              <a:rPr lang="en-US" sz="3000" dirty="0">
-                <a:hlinkClick r:id="rId3"/>
-              </a:rPr>
-              <a:t>https://en.wikipedia.org/wiki/File:Knot_with_borromean_rings_in_jsj_decomp_small.png#/media/</a:t>
-            </a:r>
-            <a:r>
-              <a:rPr lang="en-US" sz="3000" dirty="0" smtClean="0">
-                <a:hlinkClick r:id="rId3"/>
-              </a:rPr>
-              <a:t>File:Knot_with_borromean_rings_in_jsj_decomp_small.png</a:t>
-            </a:r>
-            <a:endParaRPr lang="en-US" sz="3000" dirty="0" smtClean="0"/>
-          </a:p>
-          <a:p>
-            <a:r>
-              <a:rPr lang="en-US" sz="3000" dirty="0"/>
-              <a:t>"Stonehenge on 27.01.08" by </a:t>
-            </a:r>
-            <a:r>
-              <a:rPr lang="en-US" sz="3000" dirty="0" err="1"/>
-              <a:t>Mavratti</a:t>
-            </a:r>
-            <a:r>
-              <a:rPr lang="en-US" sz="3000" dirty="0"/>
-              <a:t> - Own work. Licensed under Public Domain via Wikimedia Commons - https://</a:t>
-            </a:r>
-            <a:r>
-              <a:rPr lang="en-US" sz="3000" dirty="0" err="1"/>
-              <a:t>commons.wikimedia.org</a:t>
-            </a:r>
-            <a:r>
-              <a:rPr lang="en-US" sz="3000" dirty="0"/>
-              <a:t>/wiki/File:Stonehenge_on_27.01.08.jpg#/media/File:Stonehenge_on_27.01.08.jpg</a:t>
-            </a:r>
-            <a:endParaRPr lang="en-US" sz="3000" dirty="0" smtClean="0"/>
-          </a:p>
-          <a:p>
-            <a:r>
-              <a:rPr lang="en-US" sz="3000" dirty="0" smtClean="0"/>
-              <a:t>The Mesa team at George Mason has contributed code to this project.</a:t>
-            </a:r>
-          </a:p>
-          <a:p>
-            <a:endParaRPr lang="en-US" dirty="0" smtClean="0"/>
-          </a:p>
-        </p:txBody>
-      </p:sp>
-    </p:spTree>
-    <p:extLst>
-      <p:ext uri="{BB962C8B-B14F-4D97-AF65-F5344CB8AC3E}">
-        <p14:creationId xmlns:p14="http://schemas.microsoft.com/office/powerpoint/2010/main" val="3776600832"/>
-      </p:ext>
-    </p:extLst>
-  </p:cSld>
-  <p:clrMapOvr>
-    <a:masterClrMapping/>
-  </p:clrMapOvr>
-  <p:transition>
-    <p:fade/>
-  </p:transition>
-  <p:timing>
-    <p:tnLst>
-      <p:par>
-        <p:cTn id="1" dur="indefinite" restart="never" nodeType="tmRoot"/>
-      </p:par>
-    </p:tnLst>
-  </p:timing>
-</p:sld>
-</file>
-
-<file path=ppt/slides/slide3.xml><?xml version="1.0" encoding="utf-8"?>
-<p:sld xmlns:a="http://schemas.openxmlformats.org/drawingml/2006/main" xmlns:r="http://schemas.openxmlformats.org/officeDocument/2006/relationships" xmlns:p="http://schemas.openxmlformats.org/presentationml/2006/main">
-  <p:cSld>
-    <p:spTree>
-      <p:nvGrpSpPr>
-        <p:cNvPr id="1" name=""/>
-        <p:cNvGrpSpPr/>
-        <p:nvPr/>
-      </p:nvGrpSpPr>
-      <p:grpSpPr>
-        <a:xfrm>
-          <a:off x="0" y="0"/>
-          <a:ext cx="0" cy="0"/>
-          <a:chOff x="0" y="0"/>
-          <a:chExt cx="0" cy="0"/>
-        </a:xfrm>
-      </p:grpSpPr>
-      <p:sp>
-        <p:nvSpPr>
-          <p:cNvPr id="2" name="Title 1"/>
-          <p:cNvSpPr>
-            <a:spLocks noGrp="1"/>
-          </p:cNvSpPr>
-          <p:nvPr>
-            <p:ph type="title"/>
-          </p:nvPr>
-        </p:nvSpPr>
-        <p:spPr>
-          <a:xfrm>
-            <a:off x="381000" y="230188"/>
-            <a:ext cx="8382000" cy="1163395"/>
-          </a:xfrm>
-        </p:spPr>
-        <p:txBody>
-          <a:bodyPr>
-            <a:normAutofit/>
-          </a:bodyPr>
-          <a:lstStyle/>
-          <a:p>
-            <a:r>
-              <a:rPr lang="en-US" dirty="0" smtClean="0"/>
-              <a:t>Generic Programming</a:t>
-            </a:r>
-            <a:br>
-              <a:rPr lang="en-US" dirty="0" smtClean="0"/>
-            </a:br>
-            <a:r>
-              <a:rPr lang="en-US" sz="3600" dirty="0" smtClean="0">
-                <a:solidFill>
-                  <a:schemeClr val="tx2"/>
-                </a:solidFill>
-              </a:rPr>
-              <a:t>Abstracting logic from data</a:t>
-            </a:r>
-            <a:endParaRPr lang="en-US" dirty="0">
-              <a:solidFill>
-                <a:schemeClr val="tx2"/>
-              </a:solidFill>
-            </a:endParaRPr>
-          </a:p>
-        </p:txBody>
-      </p:sp>
-      <p:sp>
-        <p:nvSpPr>
-          <p:cNvPr id="3" name="Text Placeholder 2"/>
-          <p:cNvSpPr>
-            <a:spLocks noGrp="1"/>
-          </p:cNvSpPr>
-          <p:nvPr>
-            <p:ph type="body" sz="quarter" idx="10"/>
-          </p:nvPr>
-        </p:nvSpPr>
-        <p:spPr>
-          <a:xfrm>
-            <a:off x="381000" y="1828800"/>
-            <a:ext cx="8382000" cy="3502497"/>
-          </a:xfrm>
-        </p:spPr>
-        <p:txBody>
-          <a:bodyPr>
-            <a:normAutofit/>
-          </a:bodyPr>
-          <a:lstStyle/>
-          <a:p>
-            <a:r>
-              <a:rPr lang="en-US" dirty="0" smtClean="0"/>
-              <a:t>Inspired by abstract algebra</a:t>
-            </a:r>
-          </a:p>
-          <a:p>
-            <a:pPr lvl="1"/>
-            <a:r>
-              <a:rPr lang="en-US" dirty="0" smtClean="0"/>
-              <a:t>“Addition” can be any operation that follows the </a:t>
-            </a:r>
-            <a:r>
-              <a:rPr lang="en-US" i="1" dirty="0" smtClean="0"/>
-              <a:t>pattern</a:t>
-            </a:r>
-            <a:r>
-              <a:rPr lang="en-US" dirty="0" smtClean="0"/>
-              <a:t> of addition</a:t>
-            </a:r>
-          </a:p>
-          <a:p>
-            <a:pPr lvl="1"/>
-            <a:r>
-              <a:rPr lang="en-US" dirty="0" smtClean="0"/>
-              <a:t>The addition operation should:</a:t>
-            </a:r>
-          </a:p>
-          <a:p>
-            <a:pPr lvl="2"/>
-            <a:r>
-              <a:rPr lang="en-US" dirty="0" smtClean="0"/>
-              <a:t>Be associative</a:t>
-            </a:r>
-          </a:p>
-          <a:p>
-            <a:pPr lvl="2"/>
-            <a:r>
-              <a:rPr lang="en-US" dirty="0" smtClean="0"/>
-              <a:t>Be commutative</a:t>
-            </a:r>
-          </a:p>
-          <a:p>
-            <a:pPr lvl="2"/>
-            <a:r>
-              <a:rPr lang="en-US" dirty="0" smtClean="0"/>
-              <a:t>Have an identity element (e.g., 0, or the unknot)</a:t>
-            </a:r>
-          </a:p>
-        </p:txBody>
-      </p:sp>
-      <p:graphicFrame>
-        <p:nvGraphicFramePr>
-          <p:cNvPr id="5" name="Diagram 4"/>
-          <p:cNvGraphicFramePr/>
-          <p:nvPr>
-            <p:extLst>
-              <p:ext uri="{D42A27DB-BD31-4B8C-83A1-F6EECF244321}">
-                <p14:modId xmlns:p14="http://schemas.microsoft.com/office/powerpoint/2010/main" val="1420844482"/>
-              </p:ext>
-            </p:extLst>
-          </p:nvPr>
-        </p:nvGraphicFramePr>
-        <p:xfrm>
-          <a:off x="5181600" y="5029200"/>
-          <a:ext cx="3124200" cy="1676400"/>
-        </p:xfrm>
-        <a:graphic>
-          <a:graphicData uri="http://schemas.openxmlformats.org/drawingml/2006/diagram">
-            <dgm:relIds xmlns:dgm="http://schemas.openxmlformats.org/drawingml/2006/diagram" xmlns:r="http://schemas.openxmlformats.org/officeDocument/2006/relationships" r:dm="rId3" r:lo="rId4" r:qs="rId5" r:cs="rId6"/>
-          </a:graphicData>
-        </a:graphic>
-      </p:graphicFrame>
-    </p:spTree>
-    <p:extLst>
-      <p:ext uri="{BB962C8B-B14F-4D97-AF65-F5344CB8AC3E}">
-        <p14:creationId xmlns:p14="http://schemas.microsoft.com/office/powerpoint/2010/main" val="181375898"/>
-      </p:ext>
-    </p:extLst>
-  </p:cSld>
-  <p:clrMapOvr>
-    <a:masterClrMapping/>
-  </p:clrMapOvr>
-  <p:transition>
-    <p:fade/>
-  </p:transition>
-  <p:timing>
-    <p:tnLst>
-      <p:par>
-        <p:cTn id="1" dur="indefinite" restart="never" nodeType="tmRoot"/>
-      </p:par>
-    </p:tnLst>
-  </p:timing>
-</p:sld>
-</file>
-
-<file path=ppt/slides/slide30.xml><?xml version="1.0" encoding="utf-8"?>
-<p:sld xmlns:a="http://schemas.openxmlformats.org/drawingml/2006/main" xmlns:r="http://schemas.openxmlformats.org/officeDocument/2006/relationships" xmlns:p="http://schemas.openxmlformats.org/presentationml/2006/main">
-  <p:cSld>
-    <p:spTree>
-      <p:nvGrpSpPr>
-        <p:cNvPr id="1" name=""/>
-        <p:cNvGrpSpPr/>
-        <p:nvPr/>
-      </p:nvGrpSpPr>
-      <p:grpSpPr>
-        <a:xfrm>
-          <a:off x="0" y="0"/>
-          <a:ext cx="0" cy="0"/>
-          <a:chOff x="0" y="0"/>
-          <a:chExt cx="0" cy="0"/>
-        </a:xfrm>
-      </p:grpSpPr>
-      <p:sp>
-        <p:nvSpPr>
-          <p:cNvPr id="2" name="Title 1"/>
-          <p:cNvSpPr>
-            <a:spLocks noGrp="1"/>
-          </p:cNvSpPr>
-          <p:nvPr>
-            <p:ph type="title"/>
-          </p:nvPr>
-        </p:nvSpPr>
-        <p:spPr>
-          <a:xfrm>
-            <a:off x="381000" y="230188"/>
-            <a:ext cx="8382000" cy="664797"/>
-          </a:xfrm>
-        </p:spPr>
-        <p:txBody>
-          <a:bodyPr/>
-          <a:lstStyle/>
-          <a:p>
-            <a:r>
-              <a:rPr lang="en-US" dirty="0" smtClean="0"/>
-              <a:t>Credits</a:t>
-            </a:r>
-            <a:endParaRPr lang="en-US" dirty="0"/>
-          </a:p>
-        </p:txBody>
-      </p:sp>
-      <p:sp>
-        <p:nvSpPr>
-          <p:cNvPr id="3" name="Text Placeholder 2"/>
-          <p:cNvSpPr>
-            <a:spLocks noGrp="1"/>
-          </p:cNvSpPr>
-          <p:nvPr>
-            <p:ph type="body" sz="quarter" idx="10"/>
-          </p:nvPr>
-        </p:nvSpPr>
-        <p:spPr>
-          <a:xfrm>
-            <a:off x="381000" y="1676400"/>
-            <a:ext cx="8382000" cy="4739759"/>
-          </a:xfrm>
-        </p:spPr>
-        <p:txBody>
-          <a:bodyPr/>
-          <a:lstStyle/>
-          <a:p>
-            <a:r>
-              <a:rPr lang="en-US" sz="2800" dirty="0"/>
-              <a:t>"Bronze Age spear tip </a:t>
-            </a:r>
-            <a:r>
-              <a:rPr lang="en-US" sz="2800" dirty="0" err="1"/>
-              <a:t>mould</a:t>
-            </a:r>
-            <a:r>
-              <a:rPr lang="en-US" sz="2800" dirty="0"/>
-              <a:t> IMG 5123" by Photograph by Rama, Wikimedia Commons, Cc-by-sa-2.0-fr. Licensed under CC BY-SA 2.0 </a:t>
-            </a:r>
-            <a:r>
-              <a:rPr lang="en-US" sz="2800" dirty="0" err="1"/>
-              <a:t>fr</a:t>
-            </a:r>
-            <a:r>
-              <a:rPr lang="en-US" sz="2800" dirty="0"/>
-              <a:t> via Commons - </a:t>
-            </a:r>
-            <a:r>
-              <a:rPr lang="en-US" sz="2800" dirty="0">
-                <a:hlinkClick r:id="rId2"/>
-              </a:rPr>
-              <a:t>https://commons.wikimedia.org/wiki/File:Bronze_Age_spear_tip_mould_IMG_5123.jpg#/</a:t>
-            </a:r>
-            <a:r>
-              <a:rPr lang="en-US" sz="2800" dirty="0" smtClean="0">
-                <a:hlinkClick r:id="rId2"/>
-              </a:rPr>
-              <a:t>media/File:Bronze_Age_spear_tip_mould_IMG_5123.jpg</a:t>
-            </a:r>
-            <a:endParaRPr lang="en-US" sz="2800" dirty="0" smtClean="0"/>
-          </a:p>
-          <a:p>
-            <a:r>
-              <a:rPr lang="en-US" sz="2800" dirty="0"/>
-              <a:t>"</a:t>
-            </a:r>
-            <a:r>
-              <a:rPr lang="en-US" sz="2800" dirty="0" err="1"/>
-              <a:t>Axentowicz</a:t>
-            </a:r>
-            <a:r>
-              <a:rPr lang="en-US" sz="2800" dirty="0"/>
-              <a:t> The Anchorite" by </a:t>
-            </a:r>
-            <a:r>
-              <a:rPr lang="en-US" sz="2800" dirty="0" err="1"/>
-              <a:t>Teodor</a:t>
-            </a:r>
-            <a:r>
-              <a:rPr lang="en-US" sz="2800" dirty="0"/>
-              <a:t> </a:t>
-            </a:r>
-            <a:r>
-              <a:rPr lang="en-US" sz="2800" dirty="0" err="1"/>
-              <a:t>Axentowicz</a:t>
-            </a:r>
-            <a:r>
-              <a:rPr lang="en-US" sz="2800" dirty="0"/>
-              <a:t> - </a:t>
-            </a:r>
-            <a:r>
-              <a:rPr lang="en-US" sz="2800" dirty="0" err="1"/>
-              <a:t>cyfrowe.mnw.art.pl</a:t>
-            </a:r>
-            <a:r>
-              <a:rPr lang="en-US" sz="2800" dirty="0"/>
-              <a:t>. Licensed under Public Domain via Commons - https://</a:t>
-            </a:r>
-            <a:r>
-              <a:rPr lang="en-US" sz="2800" dirty="0" err="1"/>
-              <a:t>commons.wikimedia.org</a:t>
-            </a:r>
-            <a:r>
-              <a:rPr lang="en-US" sz="2800" dirty="0"/>
-              <a:t>/wiki/</a:t>
-            </a:r>
-            <a:r>
-              <a:rPr lang="en-US" sz="2800" dirty="0" err="1"/>
-              <a:t>File:Axentowicz_The_Anchorite.jpg</a:t>
-            </a:r>
-            <a:r>
-              <a:rPr lang="en-US" sz="2800" dirty="0"/>
-              <a:t>#/media/</a:t>
-            </a:r>
-            <a:r>
-              <a:rPr lang="en-US" sz="2800" dirty="0" err="1"/>
-              <a:t>File:Axentowicz_The_Anchorite.jpg</a:t>
-            </a:r>
-            <a:endParaRPr lang="en-US" sz="2800" dirty="0"/>
-          </a:p>
-        </p:txBody>
-      </p:sp>
-    </p:spTree>
-    <p:extLst>
-      <p:ext uri="{BB962C8B-B14F-4D97-AF65-F5344CB8AC3E}">
-        <p14:creationId xmlns:p14="http://schemas.microsoft.com/office/powerpoint/2010/main" val="1548311111"/>
       </p:ext>
     </p:extLst>
   </p:cSld>
@@ -32645,19 +32638,28 @@
         </p:nvSpPr>
         <p:spPr>
           <a:xfrm>
-            <a:off x="381000" y="230188"/>
-            <a:ext cx="8382000" cy="664797"/>
+            <a:off x="381000" y="230189"/>
+            <a:ext cx="8382000" cy="836612"/>
           </a:xfrm>
         </p:spPr>
         <p:txBody>
-          <a:bodyPr/>
+          <a:bodyPr>
+            <a:normAutofit fontScale="90000"/>
+          </a:bodyPr>
           <a:lstStyle/>
           <a:p>
             <a:r>
               <a:rPr lang="en-US" dirty="0" smtClean="0"/>
               <a:t>Credits</a:t>
             </a:r>
-            <a:endParaRPr lang="en-US" dirty="0"/>
+            <a:br>
+              <a:rPr lang="en-US" dirty="0" smtClean="0"/>
+            </a:br>
+            <a:endParaRPr lang="en-US" dirty="0">
+              <a:solidFill>
+                <a:schemeClr val="tx2"/>
+              </a:solidFill>
+            </a:endParaRPr>
           </a:p>
         </p:txBody>
       </p:sp>
@@ -32673,76 +32675,99 @@
         </p:nvSpPr>
         <p:spPr>
           <a:xfrm>
-            <a:off x="381000" y="1371600"/>
-            <a:ext cx="8382000" cy="5127558"/>
+            <a:off x="381000" y="838200"/>
+            <a:ext cx="8382000" cy="5486400"/>
           </a:xfrm>
         </p:spPr>
         <p:txBody>
-          <a:bodyPr/>
+          <a:bodyPr>
+            <a:normAutofit fontScale="92500" lnSpcReduction="10000"/>
+          </a:bodyPr>
           <a:lstStyle/>
           <a:p>
-            <a:r>
-              <a:rPr lang="en-US" sz="2800" dirty="0"/>
-              <a:t>"</a:t>
-            </a:r>
-            <a:r>
-              <a:rPr lang="en-US" sz="2800" dirty="0" err="1"/>
-              <a:t>Perspectivephoto</a:t>
-            </a:r>
-            <a:r>
-              <a:rPr lang="en-US" sz="2800" dirty="0"/>
-              <a:t>". Licensed under CC BY 2.5 via Wikipedia - </a:t>
-            </a:r>
-            <a:r>
-              <a:rPr lang="en-US" sz="2800" dirty="0">
-                <a:hlinkClick r:id="rId2"/>
-              </a:rPr>
-              <a:t>https://en.wikipedia.org/wiki/File:Perspectivephoto.jpg#/</a:t>
-            </a:r>
-            <a:r>
-              <a:rPr lang="en-US" sz="2800" dirty="0" smtClean="0">
-                <a:hlinkClick r:id="rId2"/>
-              </a:rPr>
-              <a:t>media/File:Perspectivephoto.jpg</a:t>
-            </a:r>
-            <a:endParaRPr lang="en-US" sz="2800" dirty="0" smtClean="0"/>
+            <a:endParaRPr lang="en-US" dirty="0" smtClean="0"/>
           </a:p>
           <a:p>
             <a:r>
-              <a:rPr lang="en-US" sz="2800" dirty="0"/>
-              <a:t>"</a:t>
-            </a:r>
-            <a:r>
-              <a:rPr lang="en-US" sz="2800" dirty="0" err="1"/>
-              <a:t>Eugène</a:t>
-            </a:r>
-            <a:r>
-              <a:rPr lang="en-US" sz="2800" dirty="0"/>
-              <a:t> Delacroix - The Fanatics of Tangier - WGA06195" by </a:t>
-            </a:r>
-            <a:r>
-              <a:rPr lang="en-US" sz="2800" dirty="0" err="1"/>
-              <a:t>Eugène</a:t>
-            </a:r>
-            <a:r>
-              <a:rPr lang="en-US" sz="2800" dirty="0"/>
-              <a:t> Delacroix - 1. Web Gallery of Art:   Image  Info about artwork2. The Minneapolis Institute of Arts. Licensed under Public Domain via Commons - https://</a:t>
-            </a:r>
-            <a:r>
-              <a:rPr lang="en-US" sz="2800" dirty="0" err="1"/>
+              <a:rPr lang="en-US" sz="3000" dirty="0"/>
+              <a:t>"Knot with </a:t>
+            </a:r>
+            <a:r>
+              <a:rPr lang="en-US" sz="3000" dirty="0" err="1"/>
+              <a:t>borromean</a:t>
+            </a:r>
+            <a:r>
+              <a:rPr lang="en-US" sz="3000" dirty="0"/>
+              <a:t> rings in </a:t>
+            </a:r>
+            <a:r>
+              <a:rPr lang="en-US" sz="3000" dirty="0" err="1"/>
+              <a:t>jsj</a:t>
+            </a:r>
+            <a:r>
+              <a:rPr lang="en-US" sz="3000" dirty="0"/>
+              <a:t> </a:t>
+            </a:r>
+            <a:r>
+              <a:rPr lang="en-US" sz="3000" dirty="0" err="1"/>
+              <a:t>decomp</a:t>
+            </a:r>
+            <a:r>
+              <a:rPr lang="en-US" sz="3000" dirty="0"/>
+              <a:t> small". Licensed under CC BY-SA 3.0 via Wikipedia - </a:t>
+            </a:r>
+            <a:r>
+              <a:rPr lang="en-US" sz="3000" dirty="0">
+                <a:hlinkClick r:id="rId3"/>
+              </a:rPr>
+              <a:t>https://en.wikipedia.org/wiki/File:Knot_with_borromean_rings_in_jsj_decomp_small.png#/media/</a:t>
+            </a:r>
+            <a:r>
+              <a:rPr lang="en-US" sz="3000" dirty="0" smtClean="0">
+                <a:hlinkClick r:id="rId3"/>
+              </a:rPr>
+              <a:t>File:Knot_with_borromean_rings_in_jsj_decomp_small.png</a:t>
+            </a:r>
+            <a:endParaRPr lang="en-US" sz="3000" dirty="0" smtClean="0"/>
+          </a:p>
+          <a:p>
+            <a:r>
+              <a:rPr lang="en-US" sz="3000" dirty="0"/>
+              <a:t>"Stonehenge on 27.01.08" by </a:t>
+            </a:r>
+            <a:r>
+              <a:rPr lang="en-US" sz="3000" dirty="0" err="1"/>
+              <a:t>Mavratti</a:t>
+            </a:r>
+            <a:r>
+              <a:rPr lang="en-US" sz="3000" dirty="0"/>
+              <a:t> - Own work. Licensed under Public Domain via Wikimedia Commons - https://</a:t>
+            </a:r>
+            <a:r>
+              <a:rPr lang="en-US" sz="3000" dirty="0" err="1"/>
               <a:t>commons.wikimedia.org</a:t>
             </a:r>
             <a:r>
-              <a:rPr lang="en-US" sz="2800" dirty="0"/>
-              <a:t>/wiki/File:Eug%C3%A8ne_Delacroix_-_The_Fanatics_of_Tangier_-_WGA06195.jpg#/media/File:Eug%C3%A8ne_Delacroix_-_The_Fanatics_of_Tangier_-_WGA06195.jpg</a:t>
-            </a:r>
+              <a:rPr lang="en-US" sz="3000" dirty="0"/>
+              <a:t>/wiki/File:Stonehenge_on_27.01.08.jpg#/media/File:Stonehenge_on_27.01.08.jpg</a:t>
+            </a:r>
+            <a:endParaRPr lang="en-US" sz="3000" dirty="0" smtClean="0"/>
+          </a:p>
+          <a:p>
+            <a:r>
+              <a:rPr lang="en-US" sz="3000" dirty="0" smtClean="0"/>
+              <a:t>The Mesa team at George Mason has contributed code to this project.</a:t>
+            </a:r>
+          </a:p>
+          <a:p>
+            <a:endParaRPr lang="en-US" dirty="0" smtClean="0"/>
           </a:p>
         </p:txBody>
       </p:sp>
     </p:spTree>
     <p:extLst>
       <p:ext uri="{BB962C8B-B14F-4D97-AF65-F5344CB8AC3E}">
-        <p14:creationId xmlns:p14="http://schemas.microsoft.com/office/powerpoint/2010/main" val="1596891371"/>
+        <p14:creationId xmlns:p14="http://schemas.microsoft.com/office/powerpoint/2010/main" val="3776600832"/>
       </p:ext>
     </p:extLst>
   </p:cSld>
@@ -32820,7 +32845,7 @@
         <p:spPr>
           <a:xfrm>
             <a:off x="381000" y="1676400"/>
-            <a:ext cx="8382000" cy="3877985"/>
+            <a:ext cx="8382000" cy="4739759"/>
           </a:xfrm>
         </p:spPr>
         <p:txBody>
@@ -32829,63 +32854,74 @@
           <a:p>
             <a:r>
               <a:rPr lang="en-US" sz="2800" dirty="0"/>
-              <a:t>"Linear subspaces with shading" by </a:t>
+              <a:t>"Bronze Age spear tip </a:t>
             </a:r>
             <a:r>
               <a:rPr lang="en-US" sz="2800" dirty="0" err="1"/>
-              <a:t>Alksentrs</a:t>
+              <a:t>mould</a:t>
             </a:r>
             <a:r>
               <a:rPr lang="en-US" sz="2800" dirty="0"/>
-              <a:t> at </a:t>
+              <a:t> IMG 5123" by Photograph by Rama, Wikimedia Commons, Cc-by-sa-2.0-fr. Licensed under CC BY-SA 2.0 </a:t>
             </a:r>
             <a:r>
               <a:rPr lang="en-US" sz="2800" dirty="0" err="1"/>
-              <a:t>en.wikipedia</a:t>
+              <a:t>fr</a:t>
             </a:r>
             <a:r>
               <a:rPr lang="en-US" sz="2800" dirty="0"/>
-              <a:t> - Own work (Original text: Own work, based on en::</a:t>
+              <a:t> via Commons - </a:t>
+            </a:r>
+            <a:r>
+              <a:rPr lang="en-US" sz="2800" dirty="0">
+                <a:hlinkClick r:id="rId2"/>
+              </a:rPr>
+              <a:t>https://commons.wikimedia.org/wiki/File:Bronze_Age_spear_tip_mould_IMG_5123.jpg#/</a:t>
+            </a:r>
+            <a:r>
+              <a:rPr lang="en-US" sz="2800" dirty="0" smtClean="0">
+                <a:hlinkClick r:id="rId2"/>
+              </a:rPr>
+              <a:t>media/File:Bronze_Age_spear_tip_mould_IMG_5123.jpg</a:t>
+            </a:r>
+            <a:endParaRPr lang="en-US" sz="2800" dirty="0" smtClean="0"/>
+          </a:p>
+          <a:p>
+            <a:r>
+              <a:rPr lang="en-US" sz="2800" dirty="0"/>
+              <a:t>"</a:t>
             </a:r>
             <a:r>
               <a:rPr lang="en-US" sz="2800" dirty="0" err="1"/>
-              <a:t>Image:Linearsubspace.svg</a:t>
+              <a:t>Axentowicz</a:t>
             </a:r>
             <a:r>
               <a:rPr lang="en-US" sz="2800" dirty="0"/>
-              <a:t> (by </a:t>
+              <a:t> The Anchorite" by </a:t>
             </a:r>
             <a:r>
               <a:rPr lang="en-US" sz="2800" dirty="0" err="1"/>
-              <a:t>en:User:Jakob.scholbach</a:t>
+              <a:t>Teodor</a:t>
             </a:r>
             <a:r>
               <a:rPr lang="en-US" sz="2800" dirty="0"/>
-              <a:t>).)Transferred from </a:t>
+              <a:t> </a:t>
             </a:r>
             <a:r>
               <a:rPr lang="en-US" sz="2800" dirty="0" err="1"/>
-              <a:t>en.wikipedia</a:t>
+              <a:t>Axentowicz</a:t>
             </a:r>
             <a:r>
               <a:rPr lang="en-US" sz="2800" dirty="0"/>
-              <a:t> to Commons by </a:t>
+              <a:t> - </a:t>
             </a:r>
             <a:r>
               <a:rPr lang="en-US" sz="2800" dirty="0" err="1"/>
-              <a:t>User:Ylebru</a:t>
+              <a:t>cyfrowe.mnw.art.pl</a:t>
             </a:r>
             <a:r>
               <a:rPr lang="en-US" sz="2800" dirty="0"/>
-              <a:t> using </a:t>
-            </a:r>
-            <a:r>
-              <a:rPr lang="en-US" sz="2800" dirty="0" err="1"/>
-              <a:t>CommonsHelper</a:t>
-            </a:r>
-            <a:r>
-              <a:rPr lang="en-US" sz="2800" dirty="0"/>
-              <a:t>.. Licensed under CC BY-SA 3.0 via Commons - https://</a:t>
+              <a:t>. Licensed under Public Domain via Commons - https://</a:t>
             </a:r>
             <a:r>
               <a:rPr lang="en-US" sz="2800" dirty="0" err="1"/>
@@ -32897,7 +32933,7 @@
             </a:r>
             <a:r>
               <a:rPr lang="en-US" sz="2800" dirty="0" err="1"/>
-              <a:t>File:Linear_subspaces_with_shading.svg</a:t>
+              <a:t>File:Axentowicz_The_Anchorite.jpg</a:t>
             </a:r>
             <a:r>
               <a:rPr lang="en-US" sz="2800" dirty="0"/>
@@ -32905,7 +32941,7 @@
             </a:r>
             <a:r>
               <a:rPr lang="en-US" sz="2800" dirty="0" err="1"/>
-              <a:t>File:Linear_subspaces_with_shading.svg</a:t>
+              <a:t>File:Axentowicz_The_Anchorite.jpg</a:t>
             </a:r>
             <a:endParaRPr lang="en-US" sz="2800" dirty="0"/>
           </a:p>
@@ -32914,7 +32950,7 @@
     </p:spTree>
     <p:extLst>
       <p:ext uri="{BB962C8B-B14F-4D97-AF65-F5344CB8AC3E}">
-        <p14:creationId xmlns:p14="http://schemas.microsoft.com/office/powerpoint/2010/main" val="901497122"/>
+        <p14:creationId xmlns:p14="http://schemas.microsoft.com/office/powerpoint/2010/main" val="1548311111"/>
       </p:ext>
     </p:extLst>
   </p:cSld>
@@ -32991,8 +33027,8 @@
         </p:nvSpPr>
         <p:spPr>
           <a:xfrm>
-            <a:off x="381000" y="1676400"/>
-            <a:ext cx="8382000" cy="3102388"/>
+            <a:off x="381000" y="1371600"/>
+            <a:ext cx="8382000" cy="5127558"/>
           </a:xfrm>
         </p:spPr>
         <p:txBody>
@@ -33001,6 +33037,324 @@
           <a:p>
             <a:r>
               <a:rPr lang="en-US" sz="2800" dirty="0"/>
+              <a:t>"</a:t>
+            </a:r>
+            <a:r>
+              <a:rPr lang="en-US" sz="2800" dirty="0" err="1"/>
+              <a:t>Perspectivephoto</a:t>
+            </a:r>
+            <a:r>
+              <a:rPr lang="en-US" sz="2800" dirty="0"/>
+              <a:t>". Licensed under CC BY 2.5 via Wikipedia - </a:t>
+            </a:r>
+            <a:r>
+              <a:rPr lang="en-US" sz="2800" dirty="0">
+                <a:hlinkClick r:id="rId2"/>
+              </a:rPr>
+              <a:t>https://en.wikipedia.org/wiki/File:Perspectivephoto.jpg#/</a:t>
+            </a:r>
+            <a:r>
+              <a:rPr lang="en-US" sz="2800" dirty="0" smtClean="0">
+                <a:hlinkClick r:id="rId2"/>
+              </a:rPr>
+              <a:t>media/File:Perspectivephoto.jpg</a:t>
+            </a:r>
+            <a:endParaRPr lang="en-US" sz="2800" dirty="0" smtClean="0"/>
+          </a:p>
+          <a:p>
+            <a:r>
+              <a:rPr lang="en-US" sz="2800" dirty="0"/>
+              <a:t>"</a:t>
+            </a:r>
+            <a:r>
+              <a:rPr lang="en-US" sz="2800" dirty="0" err="1"/>
+              <a:t>Eugène</a:t>
+            </a:r>
+            <a:r>
+              <a:rPr lang="en-US" sz="2800" dirty="0"/>
+              <a:t> Delacroix - The Fanatics of Tangier - WGA06195" by </a:t>
+            </a:r>
+            <a:r>
+              <a:rPr lang="en-US" sz="2800" dirty="0" err="1"/>
+              <a:t>Eugène</a:t>
+            </a:r>
+            <a:r>
+              <a:rPr lang="en-US" sz="2800" dirty="0"/>
+              <a:t> Delacroix - 1. Web Gallery of Art:   Image  Info about artwork2. The Minneapolis Institute of Arts. Licensed under Public Domain via Commons - https://</a:t>
+            </a:r>
+            <a:r>
+              <a:rPr lang="en-US" sz="2800" dirty="0" err="1"/>
+              <a:t>commons.wikimedia.org</a:t>
+            </a:r>
+            <a:r>
+              <a:rPr lang="en-US" sz="2800" dirty="0"/>
+              <a:t>/wiki/File:Eug%C3%A8ne_Delacroix_-_The_Fanatics_of_Tangier_-_WGA06195.jpg#/media/File:Eug%C3%A8ne_Delacroix_-_The_Fanatics_of_Tangier_-_WGA06195.jpg</a:t>
+            </a:r>
+          </a:p>
+        </p:txBody>
+      </p:sp>
+    </p:spTree>
+    <p:extLst>
+      <p:ext uri="{BB962C8B-B14F-4D97-AF65-F5344CB8AC3E}">
+        <p14:creationId xmlns:p14="http://schemas.microsoft.com/office/powerpoint/2010/main" val="1596891371"/>
+      </p:ext>
+    </p:extLst>
+  </p:cSld>
+  <p:clrMapOvr>
+    <a:masterClrMapping/>
+  </p:clrMapOvr>
+  <p:transition>
+    <p:fade/>
+  </p:transition>
+  <p:timing>
+    <p:tnLst>
+      <p:par>
+        <p:cTn id="1" dur="indefinite" restart="never" nodeType="tmRoot"/>
+      </p:par>
+    </p:tnLst>
+  </p:timing>
+</p:sld>
+</file>
+
+<file path=ppt/slides/slide34.xml><?xml version="1.0" encoding="utf-8"?>
+<p:sld xmlns:a="http://schemas.openxmlformats.org/drawingml/2006/main" xmlns:r="http://schemas.openxmlformats.org/officeDocument/2006/relationships" xmlns:p="http://schemas.openxmlformats.org/presentationml/2006/main">
+  <p:cSld>
+    <p:spTree>
+      <p:nvGrpSpPr>
+        <p:cNvPr id="1" name=""/>
+        <p:cNvGrpSpPr/>
+        <p:nvPr/>
+      </p:nvGrpSpPr>
+      <p:grpSpPr>
+        <a:xfrm>
+          <a:off x="0" y="0"/>
+          <a:ext cx="0" cy="0"/>
+          <a:chOff x="0" y="0"/>
+          <a:chExt cx="0" cy="0"/>
+        </a:xfrm>
+      </p:grpSpPr>
+      <p:sp>
+        <p:nvSpPr>
+          <p:cNvPr id="2" name="Title 1"/>
+          <p:cNvSpPr>
+            <a:spLocks noGrp="1"/>
+          </p:cNvSpPr>
+          <p:nvPr>
+            <p:ph type="title"/>
+          </p:nvPr>
+        </p:nvSpPr>
+        <p:spPr>
+          <a:xfrm>
+            <a:off x="381000" y="230188"/>
+            <a:ext cx="8382000" cy="664797"/>
+          </a:xfrm>
+        </p:spPr>
+        <p:txBody>
+          <a:bodyPr/>
+          <a:lstStyle/>
+          <a:p>
+            <a:r>
+              <a:rPr lang="en-US" dirty="0" smtClean="0"/>
+              <a:t>Credits</a:t>
+            </a:r>
+            <a:endParaRPr lang="en-US" dirty="0"/>
+          </a:p>
+        </p:txBody>
+      </p:sp>
+      <p:sp>
+        <p:nvSpPr>
+          <p:cNvPr id="3" name="Text Placeholder 2"/>
+          <p:cNvSpPr>
+            <a:spLocks noGrp="1"/>
+          </p:cNvSpPr>
+          <p:nvPr>
+            <p:ph type="body" sz="quarter" idx="10"/>
+          </p:nvPr>
+        </p:nvSpPr>
+        <p:spPr>
+          <a:xfrm>
+            <a:off x="381000" y="1676400"/>
+            <a:ext cx="8382000" cy="3877985"/>
+          </a:xfrm>
+        </p:spPr>
+        <p:txBody>
+          <a:bodyPr/>
+          <a:lstStyle/>
+          <a:p>
+            <a:r>
+              <a:rPr lang="en-US" sz="2800" dirty="0"/>
+              <a:t>"Linear subspaces with shading" by </a:t>
+            </a:r>
+            <a:r>
+              <a:rPr lang="en-US" sz="2800" dirty="0" err="1"/>
+              <a:t>Alksentrs</a:t>
+            </a:r>
+            <a:r>
+              <a:rPr lang="en-US" sz="2800" dirty="0"/>
+              <a:t> at </a:t>
+            </a:r>
+            <a:r>
+              <a:rPr lang="en-US" sz="2800" dirty="0" err="1"/>
+              <a:t>en.wikipedia</a:t>
+            </a:r>
+            <a:r>
+              <a:rPr lang="en-US" sz="2800" dirty="0"/>
+              <a:t> - Own work (Original text: Own work, based on en::</a:t>
+            </a:r>
+            <a:r>
+              <a:rPr lang="en-US" sz="2800" dirty="0" err="1"/>
+              <a:t>Image:Linearsubspace.svg</a:t>
+            </a:r>
+            <a:r>
+              <a:rPr lang="en-US" sz="2800" dirty="0"/>
+              <a:t> (by </a:t>
+            </a:r>
+            <a:r>
+              <a:rPr lang="en-US" sz="2800" dirty="0" err="1"/>
+              <a:t>en:User:Jakob.scholbach</a:t>
+            </a:r>
+            <a:r>
+              <a:rPr lang="en-US" sz="2800" dirty="0"/>
+              <a:t>).)Transferred from </a:t>
+            </a:r>
+            <a:r>
+              <a:rPr lang="en-US" sz="2800" dirty="0" err="1"/>
+              <a:t>en.wikipedia</a:t>
+            </a:r>
+            <a:r>
+              <a:rPr lang="en-US" sz="2800" dirty="0"/>
+              <a:t> to Commons by </a:t>
+            </a:r>
+            <a:r>
+              <a:rPr lang="en-US" sz="2800" dirty="0" err="1"/>
+              <a:t>User:Ylebru</a:t>
+            </a:r>
+            <a:r>
+              <a:rPr lang="en-US" sz="2800" dirty="0"/>
+              <a:t> using </a:t>
+            </a:r>
+            <a:r>
+              <a:rPr lang="en-US" sz="2800" dirty="0" err="1"/>
+              <a:t>CommonsHelper</a:t>
+            </a:r>
+            <a:r>
+              <a:rPr lang="en-US" sz="2800" dirty="0"/>
+              <a:t>.. Licensed under CC BY-SA 3.0 via Commons - https://</a:t>
+            </a:r>
+            <a:r>
+              <a:rPr lang="en-US" sz="2800" dirty="0" err="1"/>
+              <a:t>commons.wikimedia.org</a:t>
+            </a:r>
+            <a:r>
+              <a:rPr lang="en-US" sz="2800" dirty="0"/>
+              <a:t>/wiki/</a:t>
+            </a:r>
+            <a:r>
+              <a:rPr lang="en-US" sz="2800" dirty="0" err="1"/>
+              <a:t>File:Linear_subspaces_with_shading.svg</a:t>
+            </a:r>
+            <a:r>
+              <a:rPr lang="en-US" sz="2800" dirty="0"/>
+              <a:t>#/media/</a:t>
+            </a:r>
+            <a:r>
+              <a:rPr lang="en-US" sz="2800" dirty="0" err="1"/>
+              <a:t>File:Linear_subspaces_with_shading.svg</a:t>
+            </a:r>
+            <a:endParaRPr lang="en-US" sz="2800" dirty="0"/>
+          </a:p>
+        </p:txBody>
+      </p:sp>
+    </p:spTree>
+    <p:extLst>
+      <p:ext uri="{BB962C8B-B14F-4D97-AF65-F5344CB8AC3E}">
+        <p14:creationId xmlns:p14="http://schemas.microsoft.com/office/powerpoint/2010/main" val="901497122"/>
+      </p:ext>
+    </p:extLst>
+  </p:cSld>
+  <p:clrMapOvr>
+    <a:masterClrMapping/>
+  </p:clrMapOvr>
+  <p:transition>
+    <p:fade/>
+  </p:transition>
+  <p:timing>
+    <p:tnLst>
+      <p:par>
+        <p:cTn id="1" dur="indefinite" restart="never" nodeType="tmRoot"/>
+      </p:par>
+    </p:tnLst>
+  </p:timing>
+</p:sld>
+</file>
+
+<file path=ppt/slides/slide35.xml><?xml version="1.0" encoding="utf-8"?>
+<p:sld xmlns:a="http://schemas.openxmlformats.org/drawingml/2006/main" xmlns:r="http://schemas.openxmlformats.org/officeDocument/2006/relationships" xmlns:p="http://schemas.openxmlformats.org/presentationml/2006/main">
+  <p:cSld>
+    <p:spTree>
+      <p:nvGrpSpPr>
+        <p:cNvPr id="1" name=""/>
+        <p:cNvGrpSpPr/>
+        <p:nvPr/>
+      </p:nvGrpSpPr>
+      <p:grpSpPr>
+        <a:xfrm>
+          <a:off x="0" y="0"/>
+          <a:ext cx="0" cy="0"/>
+          <a:chOff x="0" y="0"/>
+          <a:chExt cx="0" cy="0"/>
+        </a:xfrm>
+      </p:grpSpPr>
+      <p:sp>
+        <p:nvSpPr>
+          <p:cNvPr id="2" name="Title 1"/>
+          <p:cNvSpPr>
+            <a:spLocks noGrp="1"/>
+          </p:cNvSpPr>
+          <p:nvPr>
+            <p:ph type="title"/>
+          </p:nvPr>
+        </p:nvSpPr>
+        <p:spPr>
+          <a:xfrm>
+            <a:off x="381000" y="230188"/>
+            <a:ext cx="8382000" cy="664797"/>
+          </a:xfrm>
+        </p:spPr>
+        <p:txBody>
+          <a:bodyPr/>
+          <a:lstStyle/>
+          <a:p>
+            <a:r>
+              <a:rPr lang="en-US" dirty="0" smtClean="0"/>
+              <a:t>Credits</a:t>
+            </a:r>
+            <a:endParaRPr lang="en-US" dirty="0"/>
+          </a:p>
+        </p:txBody>
+      </p:sp>
+      <p:sp>
+        <p:nvSpPr>
+          <p:cNvPr id="3" name="Text Placeholder 2"/>
+          <p:cNvSpPr>
+            <a:spLocks noGrp="1"/>
+          </p:cNvSpPr>
+          <p:nvPr>
+            <p:ph type="body" sz="quarter" idx="10"/>
+          </p:nvPr>
+        </p:nvSpPr>
+        <p:spPr>
+          <a:xfrm>
+            <a:off x="381000" y="1295400"/>
+            <a:ext cx="8382000" cy="5120759"/>
+          </a:xfrm>
+        </p:spPr>
+        <p:txBody>
+          <a:bodyPr/>
+          <a:lstStyle/>
+          <a:p>
+            <a:r>
+              <a:rPr lang="en-US" sz="2800" dirty="0"/>
               <a:t>"Hokusai-sketches---hokusai-manga-vol6-crop" by Katsushika </a:t>
             </a:r>
             <a:r>
@@ -33017,7 +33371,42 @@
             </a:r>
             <a:r>
               <a:rPr lang="en-US" sz="2800" dirty="0"/>
-              <a:t> - Hokusai_sketches_-_hokusai_manga_vol6.jpg. Licensed under Public Domain via Commons - https://</a:t>
+              <a:t> - Hokusai_sketches_-_hokusai_manga_vol6.jpg. Licensed under Public Domain via Commons - </a:t>
+            </a:r>
+            <a:r>
+              <a:rPr lang="en-US" sz="2800" dirty="0">
+                <a:hlinkClick r:id="rId2"/>
+              </a:rPr>
+              <a:t>https://commons.wikimedia.org/wiki/File:Hokusai-sketches---hokusai-manga-vol6-crop.jpg#/media/File:Hokusai-sketches---</a:t>
+            </a:r>
+            <a:r>
+              <a:rPr lang="en-US" sz="2800" dirty="0" smtClean="0">
+                <a:hlinkClick r:id="rId2"/>
+              </a:rPr>
+              <a:t>hokusai-manga-vol6-crop.jpg</a:t>
+            </a:r>
+            <a:endParaRPr lang="en-US" sz="2800" dirty="0" smtClean="0"/>
+          </a:p>
+          <a:p>
+            <a:r>
+              <a:rPr lang="en-US" sz="2800" dirty="0"/>
+              <a:t>Daffy Duck: By Directed by </a:t>
+            </a:r>
+            <a:r>
+              <a:rPr lang="en-US" sz="2800" dirty="0" err="1"/>
+              <a:t>Friz</a:t>
+            </a:r>
+            <a:r>
+              <a:rPr lang="en-US" sz="2800" dirty="0"/>
+              <a:t> </a:t>
+            </a:r>
+            <a:r>
+              <a:rPr lang="en-US" sz="2800" dirty="0" err="1"/>
+              <a:t>Freleng</a:t>
+            </a:r>
+            <a:r>
+              <a:rPr lang="en-US" sz="2800" dirty="0"/>
+              <a:t>, (Warner Bros.) - YouTube, Public Domain, https://</a:t>
             </a:r>
             <a:r>
               <a:rPr lang="en-US" sz="2800" dirty="0" err="1"/>
@@ -33025,24 +33414,17 @@
             </a:r>
             <a:r>
               <a:rPr lang="en-US" sz="2800" dirty="0"/>
-              <a:t>/wiki/</a:t>
+              <a:t>/w/</a:t>
             </a:r>
             <a:r>
               <a:rPr lang="en-US" sz="2800" dirty="0" err="1"/>
-              <a:t>File:Hokusai-sketches</a:t>
+              <a:t>index.php?curid</a:t>
             </a:r>
             <a:r>
               <a:rPr lang="en-US" sz="2800" dirty="0"/>
-              <a:t>---hokusai-manga-vol6-crop.jpg#/media/</a:t>
-            </a:r>
-            <a:r>
-              <a:rPr lang="en-US" sz="2800" dirty="0" err="1"/>
-              <a:t>File:Hokusai-sketches</a:t>
-            </a:r>
-            <a:r>
-              <a:rPr lang="en-US" sz="2800" dirty="0"/>
-              <a:t>---hokusai-manga-vol6-crop.jpg</a:t>
-            </a:r>
+              <a:t>=34296734</a:t>
+            </a:r>
+            <a:endParaRPr lang="en-US" sz="2800" dirty="0" smtClean="0"/>
           </a:p>
         </p:txBody>
       </p:sp>
@@ -33069,7 +33451,391 @@
 </p:sld>
 </file>
 
+<file path=ppt/slides/slide36.xml><?xml version="1.0" encoding="utf-8"?>
+<p:sld xmlns:a="http://schemas.openxmlformats.org/drawingml/2006/main" xmlns:r="http://schemas.openxmlformats.org/officeDocument/2006/relationships" xmlns:p="http://schemas.openxmlformats.org/presentationml/2006/main">
+  <p:cSld>
+    <p:spTree>
+      <p:nvGrpSpPr>
+        <p:cNvPr id="1" name=""/>
+        <p:cNvGrpSpPr/>
+        <p:nvPr/>
+      </p:nvGrpSpPr>
+      <p:grpSpPr>
+        <a:xfrm>
+          <a:off x="0" y="0"/>
+          <a:ext cx="0" cy="0"/>
+          <a:chOff x="0" y="0"/>
+          <a:chExt cx="0" cy="0"/>
+        </a:xfrm>
+      </p:grpSpPr>
+      <p:sp>
+        <p:nvSpPr>
+          <p:cNvPr id="2" name="Title 1"/>
+          <p:cNvSpPr>
+            <a:spLocks noGrp="1"/>
+          </p:cNvSpPr>
+          <p:nvPr>
+            <p:ph type="title"/>
+          </p:nvPr>
+        </p:nvSpPr>
+        <p:spPr>
+          <a:xfrm>
+            <a:off x="381000" y="230188"/>
+            <a:ext cx="8382000" cy="664797"/>
+          </a:xfrm>
+        </p:spPr>
+        <p:txBody>
+          <a:bodyPr/>
+          <a:lstStyle/>
+          <a:p>
+            <a:r>
+              <a:rPr lang="en-US" dirty="0" smtClean="0"/>
+              <a:t>Credits</a:t>
+            </a:r>
+            <a:endParaRPr lang="en-US" dirty="0"/>
+          </a:p>
+        </p:txBody>
+      </p:sp>
+      <p:sp>
+        <p:nvSpPr>
+          <p:cNvPr id="3" name="Text Placeholder 2"/>
+          <p:cNvSpPr>
+            <a:spLocks noGrp="1"/>
+          </p:cNvSpPr>
+          <p:nvPr>
+            <p:ph type="body" sz="quarter" idx="10"/>
+          </p:nvPr>
+        </p:nvSpPr>
+        <p:spPr>
+          <a:xfrm>
+            <a:off x="381000" y="1295400"/>
+            <a:ext cx="8382000" cy="3102388"/>
+          </a:xfrm>
+        </p:spPr>
+        <p:txBody>
+          <a:bodyPr/>
+          <a:lstStyle/>
+          <a:p>
+            <a:r>
+              <a:rPr lang="en-US" sz="2800" dirty="0" smtClean="0"/>
+              <a:t>Earth</a:t>
+            </a:r>
+            <a:r>
+              <a:rPr lang="en-US" sz="2800" dirty="0"/>
+              <a:t>: By NASA/Apollo 17 crew; taken by either Harrison Schmitt or Ron Evans - http://</a:t>
+            </a:r>
+            <a:r>
+              <a:rPr lang="en-US" sz="2800" dirty="0" err="1"/>
+              <a:t>www.nasa.gov</a:t>
+            </a:r>
+            <a:r>
+              <a:rPr lang="en-US" sz="2800" dirty="0"/>
+              <a:t>/images/content/115334main_image_feature_329_ys_full.jpgAlt: http://</a:t>
+            </a:r>
+            <a:r>
+              <a:rPr lang="en-US" sz="2800" dirty="0" err="1"/>
+              <a:t>grin.hq.nasa.gov</a:t>
+            </a:r>
+            <a:r>
+              <a:rPr lang="en-US" sz="2800" dirty="0"/>
+              <a:t>/ABSTRACTS/GPN-2000-001138.html (direct link), Public Domain, https://</a:t>
+            </a:r>
+            <a:r>
+              <a:rPr lang="en-US" sz="2800" dirty="0" err="1"/>
+              <a:t>commons.wikimedia.org</a:t>
+            </a:r>
+            <a:r>
+              <a:rPr lang="en-US" sz="2800" dirty="0"/>
+              <a:t>/w/</a:t>
+            </a:r>
+            <a:r>
+              <a:rPr lang="en-US" sz="2800" dirty="0" err="1"/>
+              <a:t>index.php?curid</a:t>
+            </a:r>
+            <a:r>
+              <a:rPr lang="en-US" sz="2800" dirty="0"/>
+              <a:t>=43894484</a:t>
+            </a:r>
+            <a:endParaRPr lang="en-US" sz="2800" dirty="0" smtClean="0"/>
+          </a:p>
+        </p:txBody>
+      </p:sp>
+    </p:spTree>
+    <p:extLst>
+      <p:ext uri="{BB962C8B-B14F-4D97-AF65-F5344CB8AC3E}">
+        <p14:creationId xmlns:p14="http://schemas.microsoft.com/office/powerpoint/2010/main" val="511046477"/>
+      </p:ext>
+    </p:extLst>
+  </p:cSld>
+  <p:clrMapOvr>
+    <a:masterClrMapping/>
+  </p:clrMapOvr>
+  <p:transition>
+    <p:fade/>
+  </p:transition>
+  <p:timing>
+    <p:tnLst>
+      <p:par>
+        <p:cTn id="1" dur="indefinite" restart="never" nodeType="tmRoot"/>
+      </p:par>
+    </p:tnLst>
+  </p:timing>
+</p:sld>
+</file>
+
 <file path=ppt/slides/slide4.xml><?xml version="1.0" encoding="utf-8"?>
+<p:sld xmlns:a="http://schemas.openxmlformats.org/drawingml/2006/main" xmlns:r="http://schemas.openxmlformats.org/officeDocument/2006/relationships" xmlns:p="http://schemas.openxmlformats.org/presentationml/2006/main">
+  <p:cSld>
+    <p:spTree>
+      <p:nvGrpSpPr>
+        <p:cNvPr id="1" name=""/>
+        <p:cNvGrpSpPr/>
+        <p:nvPr/>
+      </p:nvGrpSpPr>
+      <p:grpSpPr>
+        <a:xfrm>
+          <a:off x="0" y="0"/>
+          <a:ext cx="0" cy="0"/>
+          <a:chOff x="0" y="0"/>
+          <a:chExt cx="0" cy="0"/>
+        </a:xfrm>
+      </p:grpSpPr>
+      <p:pic>
+        <p:nvPicPr>
+          <p:cNvPr id="2" name="Picture 1"/>
+          <p:cNvPicPr>
+            <a:picLocks noChangeAspect="1"/>
+          </p:cNvPicPr>
+          <p:nvPr/>
+        </p:nvPicPr>
+        <p:blipFill>
+          <a:blip r:embed="rId2" cstate="print">
+            <a:clrChange>
+              <a:clrFrom>
+                <a:srgbClr val="020003"/>
+              </a:clrFrom>
+              <a:clrTo>
+                <a:srgbClr val="020003">
+                  <a:alpha val="0"/>
+                </a:srgbClr>
+              </a:clrTo>
+            </a:clrChange>
+            <a:extLst>
+              <a:ext uri="{28A0092B-C50C-407E-A947-70E740481C1C}">
+                <a14:useLocalDpi xmlns:a14="http://schemas.microsoft.com/office/drawing/2010/main" val="0"/>
+              </a:ext>
+            </a:extLst>
+          </a:blip>
+          <a:stretch>
+            <a:fillRect/>
+          </a:stretch>
+        </p:blipFill>
+        <p:spPr>
+          <a:xfrm>
+            <a:off x="2209800" y="1219200"/>
+            <a:ext cx="4648200" cy="4653371"/>
+          </a:xfrm>
+          <a:prstGeom prst="rect">
+            <a:avLst/>
+          </a:prstGeom>
+        </p:spPr>
+      </p:pic>
+    </p:spTree>
+    <p:extLst>
+      <p:ext uri="{BB962C8B-B14F-4D97-AF65-F5344CB8AC3E}">
+        <p14:creationId xmlns:p14="http://schemas.microsoft.com/office/powerpoint/2010/main" val="2139863441"/>
+      </p:ext>
+    </p:extLst>
+  </p:cSld>
+  <p:clrMapOvr>
+    <a:masterClrMapping/>
+  </p:clrMapOvr>
+  <p:transition>
+    <p:fade/>
+  </p:transition>
+</p:sld>
+</file>
+
+<file path=ppt/slides/slide5.xml><?xml version="1.0" encoding="utf-8"?>
+<p:sld xmlns:a="http://schemas.openxmlformats.org/drawingml/2006/main" xmlns:r="http://schemas.openxmlformats.org/officeDocument/2006/relationships" xmlns:p="http://schemas.openxmlformats.org/presentationml/2006/main">
+  <p:cSld>
+    <p:spTree>
+      <p:nvGrpSpPr>
+        <p:cNvPr id="1" name=""/>
+        <p:cNvGrpSpPr/>
+        <p:nvPr/>
+      </p:nvGrpSpPr>
+      <p:grpSpPr>
+        <a:xfrm>
+          <a:off x="0" y="0"/>
+          <a:ext cx="0" cy="0"/>
+          <a:chOff x="0" y="0"/>
+          <a:chExt cx="0" cy="0"/>
+        </a:xfrm>
+      </p:grpSpPr>
+      <p:sp>
+        <p:nvSpPr>
+          <p:cNvPr id="2" name="Title 1"/>
+          <p:cNvSpPr>
+            <a:spLocks noGrp="1"/>
+          </p:cNvSpPr>
+          <p:nvPr>
+            <p:ph type="title"/>
+          </p:nvPr>
+        </p:nvSpPr>
+        <p:spPr>
+          <a:xfrm>
+            <a:off x="381000" y="230188"/>
+            <a:ext cx="8382000" cy="1163395"/>
+          </a:xfrm>
+        </p:spPr>
+        <p:txBody>
+          <a:bodyPr>
+            <a:normAutofit/>
+          </a:bodyPr>
+          <a:lstStyle/>
+          <a:p>
+            <a:r>
+              <a:rPr lang="en-US" dirty="0" smtClean="0"/>
+              <a:t>Generic Programming</a:t>
+            </a:r>
+            <a:br>
+              <a:rPr lang="en-US" dirty="0" smtClean="0"/>
+            </a:br>
+            <a:r>
+              <a:rPr lang="en-US" sz="3600" dirty="0" smtClean="0">
+                <a:solidFill>
+                  <a:schemeClr val="tx2"/>
+                </a:solidFill>
+              </a:rPr>
+              <a:t>Abstracting logic from data</a:t>
+            </a:r>
+            <a:endParaRPr lang="en-US" dirty="0">
+              <a:solidFill>
+                <a:schemeClr val="tx2"/>
+              </a:solidFill>
+            </a:endParaRPr>
+          </a:p>
+        </p:txBody>
+      </p:sp>
+      <p:sp>
+        <p:nvSpPr>
+          <p:cNvPr id="3" name="Text Placeholder 2"/>
+          <p:cNvSpPr>
+            <a:spLocks noGrp="1"/>
+          </p:cNvSpPr>
+          <p:nvPr>
+            <p:ph type="body" sz="quarter" idx="10"/>
+          </p:nvPr>
+        </p:nvSpPr>
+        <p:spPr>
+          <a:xfrm>
+            <a:off x="381000" y="1828800"/>
+            <a:ext cx="8382000" cy="3502497"/>
+          </a:xfrm>
+        </p:spPr>
+        <p:txBody>
+          <a:bodyPr>
+            <a:normAutofit/>
+          </a:bodyPr>
+          <a:lstStyle/>
+          <a:p>
+            <a:r>
+              <a:rPr lang="en-US" dirty="0" smtClean="0"/>
+              <a:t>Inspired by abstract algebra</a:t>
+            </a:r>
+          </a:p>
+          <a:p>
+            <a:pPr lvl="1"/>
+            <a:r>
+              <a:rPr lang="en-US" dirty="0" smtClean="0"/>
+              <a:t>“Addition” can be any operation that follows the </a:t>
+            </a:r>
+            <a:r>
+              <a:rPr lang="en-US" i="1" dirty="0" smtClean="0"/>
+              <a:t>pattern</a:t>
+            </a:r>
+            <a:r>
+              <a:rPr lang="en-US" dirty="0" smtClean="0"/>
+              <a:t> of addition</a:t>
+            </a:r>
+          </a:p>
+          <a:p>
+            <a:pPr lvl="1"/>
+            <a:r>
+              <a:rPr lang="en-US" dirty="0" smtClean="0"/>
+              <a:t>The addition operation should:</a:t>
+            </a:r>
+          </a:p>
+          <a:p>
+            <a:pPr lvl="2"/>
+            <a:r>
+              <a:rPr lang="en-US" dirty="0" smtClean="0"/>
+              <a:t>Be associative</a:t>
+            </a:r>
+          </a:p>
+          <a:p>
+            <a:pPr lvl="2"/>
+            <a:r>
+              <a:rPr lang="en-US" dirty="0" smtClean="0"/>
+              <a:t>Be commutative</a:t>
+            </a:r>
+          </a:p>
+          <a:p>
+            <a:pPr lvl="2"/>
+            <a:r>
+              <a:rPr lang="en-US" dirty="0" smtClean="0"/>
+              <a:t>Have an identity element (e.g., 0, or the unknot)</a:t>
+            </a:r>
+          </a:p>
+        </p:txBody>
+      </p:sp>
+      <p:graphicFrame>
+        <p:nvGraphicFramePr>
+          <p:cNvPr id="5" name="Diagram 4"/>
+          <p:cNvGraphicFramePr/>
+          <p:nvPr>
+            <p:extLst>
+              <p:ext uri="{D42A27DB-BD31-4B8C-83A1-F6EECF244321}">
+                <p14:modId xmlns:p14="http://schemas.microsoft.com/office/powerpoint/2010/main" val="1420844482"/>
+              </p:ext>
+            </p:extLst>
+          </p:nvPr>
+        </p:nvGraphicFramePr>
+        <p:xfrm>
+          <a:off x="5181600" y="5029200"/>
+          <a:ext cx="3124200" cy="1676400"/>
+        </p:xfrm>
+        <a:graphic>
+          <a:graphicData uri="http://schemas.openxmlformats.org/drawingml/2006/diagram">
+            <dgm:relIds xmlns:dgm="http://schemas.openxmlformats.org/drawingml/2006/diagram" xmlns:r="http://schemas.openxmlformats.org/officeDocument/2006/relationships" r:dm="rId3" r:lo="rId4" r:qs="rId5" r:cs="rId6"/>
+          </a:graphicData>
+        </a:graphic>
+      </p:graphicFrame>
+    </p:spTree>
+    <p:extLst>
+      <p:ext uri="{BB962C8B-B14F-4D97-AF65-F5344CB8AC3E}">
+        <p14:creationId xmlns:p14="http://schemas.microsoft.com/office/powerpoint/2010/main" val="181375898"/>
+      </p:ext>
+    </p:extLst>
+  </p:cSld>
+  <p:clrMapOvr>
+    <a:masterClrMapping/>
+  </p:clrMapOvr>
+  <p:transition>
+    <p:fade/>
+  </p:transition>
+  <p:timing>
+    <p:tnLst>
+      <p:par>
+        <p:cTn id="1" dur="indefinite" restart="never" nodeType="tmRoot"/>
+      </p:par>
+    </p:tnLst>
+  </p:timing>
+</p:sld>
+</file>
+
+<file path=ppt/slides/slide6.xml><?xml version="1.0" encoding="utf-8"?>
 <p:sld xmlns:a="http://schemas.openxmlformats.org/drawingml/2006/main" xmlns:r="http://schemas.openxmlformats.org/officeDocument/2006/relationships" xmlns:p="http://schemas.openxmlformats.org/presentationml/2006/main">
   <p:cSld>
     <p:spTree>
@@ -33245,7 +34011,7 @@
 </p:sld>
 </file>
 
-<file path=ppt/slides/slide5.xml><?xml version="1.0" encoding="utf-8"?>
+<file path=ppt/slides/slide7.xml><?xml version="1.0" encoding="utf-8"?>
 <p:sld xmlns:a="http://schemas.openxmlformats.org/drawingml/2006/main" xmlns:r="http://schemas.openxmlformats.org/officeDocument/2006/relationships" xmlns:p="http://schemas.openxmlformats.org/presentationml/2006/main">
   <p:cSld>
     <p:spTree>
@@ -33387,7 +34153,7 @@
 </p:sld>
 </file>
 
-<file path=ppt/slides/slide6.xml><?xml version="1.0" encoding="utf-8"?>
+<file path=ppt/slides/slide8.xml><?xml version="1.0" encoding="utf-8"?>
 <p:sld xmlns:a="http://schemas.openxmlformats.org/drawingml/2006/main" xmlns:r="http://schemas.openxmlformats.org/officeDocument/2006/relationships" xmlns:p="http://schemas.openxmlformats.org/presentationml/2006/main">
   <p:cSld>
     <p:spTree>
@@ -33553,7 +34319,7 @@
 </p:sld>
 </file>
 
-<file path=ppt/slides/slide7.xml><?xml version="1.0" encoding="utf-8"?>
+<file path=ppt/slides/slide9.xml><?xml version="1.0" encoding="utf-8"?>
 <p:sld xmlns:a="http://schemas.openxmlformats.org/drawingml/2006/main" xmlns:r="http://schemas.openxmlformats.org/officeDocument/2006/relationships" xmlns:p="http://schemas.openxmlformats.org/presentationml/2006/main">
   <p:cSld>
     <p:spTree>
@@ -33699,379 +34465,6 @@
     <p:extLst>
       <p:ext uri="{BB962C8B-B14F-4D97-AF65-F5344CB8AC3E}">
         <p14:creationId xmlns:p14="http://schemas.microsoft.com/office/powerpoint/2010/main" val="4038856037"/>
-      </p:ext>
-    </p:extLst>
-  </p:cSld>
-  <p:clrMapOvr>
-    <a:masterClrMapping/>
-  </p:clrMapOvr>
-  <p:transition>
-    <p:fade/>
-  </p:transition>
-  <p:timing>
-    <p:tnLst>
-      <p:par>
-        <p:cTn id="1" dur="indefinite" restart="never" nodeType="tmRoot"/>
-      </p:par>
-    </p:tnLst>
-  </p:timing>
-</p:sld>
-</file>
-
-<file path=ppt/slides/slide8.xml><?xml version="1.0" encoding="utf-8"?>
-<p:sld xmlns:a="http://schemas.openxmlformats.org/drawingml/2006/main" xmlns:r="http://schemas.openxmlformats.org/officeDocument/2006/relationships" xmlns:p="http://schemas.openxmlformats.org/presentationml/2006/main">
-  <p:cSld>
-    <p:spTree>
-      <p:nvGrpSpPr>
-        <p:cNvPr id="1" name=""/>
-        <p:cNvGrpSpPr/>
-        <p:nvPr/>
-      </p:nvGrpSpPr>
-      <p:grpSpPr>
-        <a:xfrm>
-          <a:off x="0" y="0"/>
-          <a:ext cx="0" cy="0"/>
-          <a:chOff x="0" y="0"/>
-          <a:chExt cx="0" cy="0"/>
-        </a:xfrm>
-      </p:grpSpPr>
-      <p:sp>
-        <p:nvSpPr>
-          <p:cNvPr id="2" name="Title 1"/>
-          <p:cNvSpPr>
-            <a:spLocks noGrp="1"/>
-          </p:cNvSpPr>
-          <p:nvPr>
-            <p:ph type="title"/>
-          </p:nvPr>
-        </p:nvSpPr>
-        <p:spPr>
-          <a:xfrm>
-            <a:off x="381000" y="230188"/>
-            <a:ext cx="8382000" cy="912812"/>
-          </a:xfrm>
-        </p:spPr>
-        <p:txBody>
-          <a:bodyPr>
-            <a:normAutofit fontScale="90000"/>
-          </a:bodyPr>
-          <a:lstStyle/>
-          <a:p>
-            <a:r>
-              <a:rPr lang="en-US" dirty="0" smtClean="0"/>
-              <a:t>Agent-Based Modeling</a:t>
-            </a:r>
-            <a:br>
-              <a:rPr lang="en-US" dirty="0" smtClean="0"/>
-            </a:br>
-            <a:endParaRPr lang="en-US" dirty="0">
-              <a:solidFill>
-                <a:schemeClr val="tx2"/>
-              </a:solidFill>
-            </a:endParaRPr>
-          </a:p>
-        </p:txBody>
-      </p:sp>
-      <p:sp>
-        <p:nvSpPr>
-          <p:cNvPr id="3" name="Text Placeholder 2"/>
-          <p:cNvSpPr>
-            <a:spLocks noGrp="1"/>
-          </p:cNvSpPr>
-          <p:nvPr>
-            <p:ph type="body" sz="quarter" idx="10"/>
-          </p:nvPr>
-        </p:nvSpPr>
-        <p:spPr>
-          <a:xfrm>
-            <a:off x="381000" y="990600"/>
-            <a:ext cx="8382000" cy="2209800"/>
-          </a:xfrm>
-        </p:spPr>
-        <p:txBody>
-          <a:bodyPr>
-            <a:normAutofit/>
-          </a:bodyPr>
-          <a:lstStyle/>
-          <a:p>
-            <a:r>
-              <a:rPr lang="en-US" dirty="0" smtClean="0"/>
-              <a:t>Example: Schelling’s segregation model</a:t>
-            </a:r>
-          </a:p>
-          <a:p>
-            <a:pPr lvl="1"/>
-            <a:r>
-              <a:rPr lang="en-US" dirty="0" smtClean="0"/>
-              <a:t>Agent’s preferences are just not to be too small a minority, not for fully segregated neighborhoods</a:t>
-            </a:r>
-          </a:p>
-          <a:p>
-            <a:pPr lvl="1"/>
-            <a:r>
-              <a:rPr lang="en-US" dirty="0" smtClean="0"/>
-              <a:t>But that can be the result anyway:</a:t>
-            </a:r>
-          </a:p>
-        </p:txBody>
-      </p:sp>
-      <p:pic>
-        <p:nvPicPr>
-          <p:cNvPr id="5" name="Picture 4" descr="segregation.png"/>
-          <p:cNvPicPr>
-            <a:picLocks noChangeAspect="1"/>
-          </p:cNvPicPr>
-          <p:nvPr/>
-        </p:nvPicPr>
-        <p:blipFill>
-          <a:blip r:embed="rId3">
-            <a:extLst>
-              <a:ext uri="{28A0092B-C50C-407E-A947-70E740481C1C}">
-                <a14:useLocalDpi xmlns:a14="http://schemas.microsoft.com/office/drawing/2010/main" val="0"/>
-              </a:ext>
-            </a:extLst>
-          </a:blip>
-          <a:stretch>
-            <a:fillRect/>
-          </a:stretch>
-        </p:blipFill>
-        <p:spPr>
-          <a:xfrm>
-            <a:off x="3581400" y="3048000"/>
-            <a:ext cx="4699000" cy="3524250"/>
-          </a:xfrm>
-          <a:prstGeom prst="rect">
-            <a:avLst/>
-          </a:prstGeom>
-        </p:spPr>
-      </p:pic>
-    </p:spTree>
-    <p:extLst>
-      <p:ext uri="{BB962C8B-B14F-4D97-AF65-F5344CB8AC3E}">
-        <p14:creationId xmlns:p14="http://schemas.microsoft.com/office/powerpoint/2010/main" val="1235514271"/>
-      </p:ext>
-    </p:extLst>
-  </p:cSld>
-  <p:clrMapOvr>
-    <a:masterClrMapping/>
-  </p:clrMapOvr>
-  <p:transition>
-    <p:fade/>
-  </p:transition>
-  <p:timing>
-    <p:tnLst>
-      <p:par>
-        <p:cTn id="1" dur="indefinite" restart="never" nodeType="tmRoot"/>
-      </p:par>
-    </p:tnLst>
-  </p:timing>
-</p:sld>
-</file>
-
-<file path=ppt/slides/slide9.xml><?xml version="1.0" encoding="utf-8"?>
-<p:sld xmlns:a="http://schemas.openxmlformats.org/drawingml/2006/main" xmlns:r="http://schemas.openxmlformats.org/officeDocument/2006/relationships" xmlns:p="http://schemas.openxmlformats.org/presentationml/2006/main">
-  <p:cSld>
-    <p:spTree>
-      <p:nvGrpSpPr>
-        <p:cNvPr id="1" name=""/>
-        <p:cNvGrpSpPr/>
-        <p:nvPr/>
-      </p:nvGrpSpPr>
-      <p:grpSpPr>
-        <a:xfrm>
-          <a:off x="0" y="0"/>
-          <a:ext cx="0" cy="0"/>
-          <a:chOff x="0" y="0"/>
-          <a:chExt cx="0" cy="0"/>
-        </a:xfrm>
-      </p:grpSpPr>
-      <p:sp>
-        <p:nvSpPr>
-          <p:cNvPr id="2" name="Title 1"/>
-          <p:cNvSpPr>
-            <a:spLocks noGrp="1"/>
-          </p:cNvSpPr>
-          <p:nvPr>
-            <p:ph type="title"/>
-          </p:nvPr>
-        </p:nvSpPr>
-        <p:spPr>
-          <a:xfrm>
-            <a:off x="381000" y="230188"/>
-            <a:ext cx="8382000" cy="677108"/>
-          </a:xfrm>
-        </p:spPr>
-        <p:txBody>
-          <a:bodyPr/>
-          <a:lstStyle/>
-          <a:p>
-            <a:r>
-              <a:rPr lang="en-US" dirty="0" smtClean="0"/>
-              <a:t>How to Do Generic Programming</a:t>
-            </a:r>
-            <a:endParaRPr lang="en-US" dirty="0"/>
-          </a:p>
-        </p:txBody>
-      </p:sp>
-      <p:sp>
-        <p:nvSpPr>
-          <p:cNvPr id="3" name="Text Placeholder 2"/>
-          <p:cNvSpPr>
-            <a:spLocks noGrp="1"/>
-          </p:cNvSpPr>
-          <p:nvPr>
-            <p:ph type="body" sz="quarter" idx="10"/>
-          </p:nvPr>
-        </p:nvSpPr>
-        <p:spPr>
-          <a:xfrm>
-            <a:off x="381000" y="1125149"/>
-            <a:ext cx="8382000" cy="5580451"/>
-          </a:xfrm>
-        </p:spPr>
-        <p:txBody>
-          <a:bodyPr/>
-          <a:lstStyle/>
-          <a:p>
-            <a:r>
-              <a:rPr lang="en-US" dirty="0"/>
-              <a:t>In </a:t>
-            </a:r>
-            <a:r>
-              <a:rPr lang="en-US" dirty="0" smtClean="0"/>
-              <a:t>math, the process </a:t>
-            </a:r>
-            <a:r>
-              <a:rPr lang="en-US" dirty="0"/>
-              <a:t>of generalization </a:t>
-            </a:r>
-            <a:r>
-              <a:rPr lang="en-US" dirty="0" smtClean="0"/>
-              <a:t>was</a:t>
-            </a:r>
-            <a:r>
-              <a:rPr lang="en-US" dirty="0"/>
-              <a:t>:</a:t>
-            </a:r>
-          </a:p>
-          <a:p>
-            <a:pPr lvl="1"/>
-            <a:r>
-              <a:rPr lang="en-US" dirty="0"/>
-              <a:t>Common measures</a:t>
-            </a:r>
-          </a:p>
-          <a:p>
-            <a:pPr lvl="1"/>
-            <a:r>
-              <a:rPr lang="en-US" dirty="0"/>
-              <a:t>Natural numbers </a:t>
-            </a:r>
-          </a:p>
-          <a:p>
-            <a:pPr lvl="1"/>
-            <a:r>
-              <a:rPr lang="en-US" dirty="0"/>
-              <a:t>Integers</a:t>
-            </a:r>
-          </a:p>
-          <a:p>
-            <a:pPr lvl="1"/>
-            <a:r>
-              <a:rPr lang="en-US" dirty="0"/>
-              <a:t>Rational numbers</a:t>
-            </a:r>
-          </a:p>
-          <a:p>
-            <a:pPr lvl="1"/>
-            <a:r>
-              <a:rPr lang="en-US" dirty="0"/>
-              <a:t>Polynomials</a:t>
-            </a:r>
-          </a:p>
-          <a:p>
-            <a:pPr lvl="1"/>
-            <a:r>
-              <a:rPr lang="en-US" dirty="0"/>
-              <a:t>Real </a:t>
-            </a:r>
-            <a:r>
-              <a:rPr lang="en-US" dirty="0" smtClean="0"/>
-              <a:t>numbers</a:t>
-            </a:r>
-          </a:p>
-          <a:p>
-            <a:pPr lvl="1"/>
-            <a:r>
-              <a:rPr lang="en-US" dirty="0" smtClean="0"/>
-              <a:t>Complex </a:t>
-            </a:r>
-            <a:r>
-              <a:rPr lang="en-US" dirty="0"/>
-              <a:t>numbers</a:t>
-            </a:r>
-          </a:p>
-          <a:p>
-            <a:pPr lvl="1"/>
-            <a:r>
-              <a:rPr lang="en-US" dirty="0" smtClean="0"/>
-              <a:t>Groups</a:t>
-            </a:r>
-          </a:p>
-          <a:p>
-            <a:pPr lvl="1"/>
-            <a:r>
-              <a:rPr lang="en-US" dirty="0" smtClean="0"/>
-              <a:t>Rings</a:t>
-            </a:r>
-            <a:endParaRPr lang="en-US" dirty="0"/>
-          </a:p>
-          <a:p>
-            <a:pPr lvl="1"/>
-            <a:r>
-              <a:rPr lang="en-US" dirty="0"/>
-              <a:t>Fields</a:t>
-            </a:r>
-          </a:p>
-          <a:p>
-            <a:endParaRPr lang="en-US" dirty="0"/>
-          </a:p>
-        </p:txBody>
-      </p:sp>
-      <p:pic>
-        <p:nvPicPr>
-          <p:cNvPr id="4" name="Picture 3" descr="Stonehenge.jpg"/>
-          <p:cNvPicPr>
-            <a:picLocks noChangeAspect="1"/>
-          </p:cNvPicPr>
-          <p:nvPr/>
-        </p:nvPicPr>
-        <p:blipFill>
-          <a:blip r:embed="rId2">
-            <a:extLst>
-              <a:ext uri="{28A0092B-C50C-407E-A947-70E740481C1C}">
-                <a14:useLocalDpi xmlns:a14="http://schemas.microsoft.com/office/drawing/2010/main" val="0"/>
-              </a:ext>
-            </a:extLst>
-          </a:blip>
-          <a:stretch>
-            <a:fillRect/>
-          </a:stretch>
-        </p:blipFill>
-        <p:spPr>
-          <a:xfrm>
-            <a:off x="4521200" y="3048000"/>
-            <a:ext cx="4140200" cy="3105150"/>
-          </a:xfrm>
-          <a:prstGeom prst="rect">
-            <a:avLst/>
-          </a:prstGeom>
-        </p:spPr>
-      </p:pic>
-    </p:spTree>
-    <p:extLst>
-      <p:ext uri="{BB962C8B-B14F-4D97-AF65-F5344CB8AC3E}">
-        <p14:creationId xmlns:p14="http://schemas.microsoft.com/office/powerpoint/2010/main" val="2427681662"/>
       </p:ext>
     </p:extLst>
   </p:cSld>

</xml_diff>

<commit_message>
Further work on the ABMs as abstract algebras presentation.
</commit_message>
<xml_diff>
--- a/docs/ABMsAsAlgebraic.pptx
+++ b/docs/ABMsAsAlgebraic.pptx
@@ -6,45 +6,47 @@
     <p:sldMasterId id="2147483674" r:id="rId5"/>
   </p:sldMasterIdLst>
   <p:notesMasterIdLst>
-    <p:notesMasterId r:id="rId42"/>
+    <p:notesMasterId r:id="rId44"/>
   </p:notesMasterIdLst>
   <p:sldIdLst>
     <p:sldId id="257" r:id="rId6"/>
     <p:sldId id="259" r:id="rId7"/>
     <p:sldId id="313" r:id="rId8"/>
-    <p:sldId id="315" r:id="rId9"/>
-    <p:sldId id="289" r:id="rId10"/>
-    <p:sldId id="266" r:id="rId11"/>
-    <p:sldId id="267" r:id="rId12"/>
-    <p:sldId id="269" r:id="rId13"/>
-    <p:sldId id="270" r:id="rId14"/>
-    <p:sldId id="271" r:id="rId15"/>
-    <p:sldId id="282" r:id="rId16"/>
-    <p:sldId id="283" r:id="rId17"/>
-    <p:sldId id="284" r:id="rId18"/>
-    <p:sldId id="291" r:id="rId19"/>
-    <p:sldId id="292" r:id="rId20"/>
-    <p:sldId id="311" r:id="rId21"/>
-    <p:sldId id="293" r:id="rId22"/>
-    <p:sldId id="294" r:id="rId23"/>
-    <p:sldId id="295" r:id="rId24"/>
-    <p:sldId id="296" r:id="rId25"/>
-    <p:sldId id="297" r:id="rId26"/>
-    <p:sldId id="299" r:id="rId27"/>
-    <p:sldId id="301" r:id="rId28"/>
-    <p:sldId id="302" r:id="rId29"/>
-    <p:sldId id="303" r:id="rId30"/>
-    <p:sldId id="304" r:id="rId31"/>
-    <p:sldId id="305" r:id="rId32"/>
-    <p:sldId id="306" r:id="rId33"/>
-    <p:sldId id="312" r:id="rId34"/>
-    <p:sldId id="290" r:id="rId35"/>
-    <p:sldId id="268" r:id="rId36"/>
-    <p:sldId id="307" r:id="rId37"/>
-    <p:sldId id="308" r:id="rId38"/>
-    <p:sldId id="309" r:id="rId39"/>
-    <p:sldId id="310" r:id="rId40"/>
-    <p:sldId id="314" r:id="rId41"/>
+    <p:sldId id="316" r:id="rId9"/>
+    <p:sldId id="315" r:id="rId10"/>
+    <p:sldId id="289" r:id="rId11"/>
+    <p:sldId id="266" r:id="rId12"/>
+    <p:sldId id="267" r:id="rId13"/>
+    <p:sldId id="269" r:id="rId14"/>
+    <p:sldId id="270" r:id="rId15"/>
+    <p:sldId id="271" r:id="rId16"/>
+    <p:sldId id="282" r:id="rId17"/>
+    <p:sldId id="283" r:id="rId18"/>
+    <p:sldId id="284" r:id="rId19"/>
+    <p:sldId id="291" r:id="rId20"/>
+    <p:sldId id="317" r:id="rId21"/>
+    <p:sldId id="292" r:id="rId22"/>
+    <p:sldId id="311" r:id="rId23"/>
+    <p:sldId id="293" r:id="rId24"/>
+    <p:sldId id="294" r:id="rId25"/>
+    <p:sldId id="295" r:id="rId26"/>
+    <p:sldId id="296" r:id="rId27"/>
+    <p:sldId id="297" r:id="rId28"/>
+    <p:sldId id="299" r:id="rId29"/>
+    <p:sldId id="301" r:id="rId30"/>
+    <p:sldId id="302" r:id="rId31"/>
+    <p:sldId id="303" r:id="rId32"/>
+    <p:sldId id="304" r:id="rId33"/>
+    <p:sldId id="305" r:id="rId34"/>
+    <p:sldId id="306" r:id="rId35"/>
+    <p:sldId id="312" r:id="rId36"/>
+    <p:sldId id="290" r:id="rId37"/>
+    <p:sldId id="268" r:id="rId38"/>
+    <p:sldId id="307" r:id="rId39"/>
+    <p:sldId id="308" r:id="rId40"/>
+    <p:sldId id="309" r:id="rId41"/>
+    <p:sldId id="310" r:id="rId42"/>
+    <p:sldId id="314" r:id="rId43"/>
   </p:sldIdLst>
   <p:sldSz cx="9144000" cy="6858000" type="screen4x3"/>
   <p:notesSz cx="6858000" cy="9144000"/>
@@ -23577,7 +23579,7 @@
             <a:fld id="{AB1CDEB6-C0D8-439D-94AA-7569540F08E4}" type="datetimeFigureOut">
               <a:rPr lang="en-US" smtClean="0"/>
               <a:pPr/>
-              <a:t>6/17/16</a:t>
+              <a:t>6/19/16</a:t>
             </a:fld>
             <a:endParaRPr lang="en-US"/>
           </a:p>
@@ -23935,7 +23937,7 @@
             <a:fld id="{81331B57-0BE5-4F82-AA58-76F53EFF3ADA}" type="datetime8">
               <a:rPr lang="en-US" smtClean="0"/>
               <a:pPr/>
-              <a:t>6/17/16 2:49 PM</a:t>
+              <a:t>6/19/16 1:58 AM</a:t>
             </a:fld>
             <a:endParaRPr lang="en-US" dirty="0"/>
           </a:p>
@@ -24129,7 +24131,7 @@
             <a:fld id="{81331B57-0BE5-4F82-AA58-76F53EFF3ADA}" type="datetime8">
               <a:rPr lang="en-US" smtClean="0"/>
               <a:pPr/>
-              <a:t>6/17/16 2:49 PM</a:t>
+              <a:t>6/19/16 1:58 AM</a:t>
             </a:fld>
             <a:endParaRPr lang="en-US"/>
           </a:p>
@@ -24207,7 +24209,7 @@
             <a:fld id="{EC87E0CF-87F6-4B58-B8B8-DCAB2DAAF3CA}" type="slidenum">
               <a:rPr lang="en-US" smtClean="0"/>
               <a:pPr/>
-              <a:t>31</a:t>
+              <a:t>33</a:t>
             </a:fld>
             <a:endParaRPr lang="en-US" dirty="0"/>
           </a:p>
@@ -24313,7 +24315,7 @@
             <a:fld id="{81331B57-0BE5-4F82-AA58-76F53EFF3ADA}" type="datetime8">
               <a:rPr lang="en-US" smtClean="0"/>
               <a:pPr/>
-              <a:t>6/17/16 2:49 PM</a:t>
+              <a:t>6/19/16 1:58 AM</a:t>
             </a:fld>
             <a:endParaRPr lang="en-US"/>
           </a:p>
@@ -24497,7 +24499,7 @@
             <a:fld id="{81331B57-0BE5-4F82-AA58-76F53EFF3ADA}" type="datetime8">
               <a:rPr lang="en-US" smtClean="0"/>
               <a:pPr/>
-              <a:t>6/17/16 2:49 PM</a:t>
+              <a:t>6/19/16 1:58 AM</a:t>
             </a:fld>
             <a:endParaRPr lang="en-US"/>
           </a:p>
@@ -24575,7 +24577,7 @@
             <a:fld id="{EC87E0CF-87F6-4B58-B8B8-DCAB2DAAF3CA}" type="slidenum">
               <a:rPr lang="en-US" smtClean="0"/>
               <a:pPr/>
-              <a:t>5</a:t>
+              <a:t>6</a:t>
             </a:fld>
             <a:endParaRPr lang="en-US" dirty="0"/>
           </a:p>
@@ -24681,7 +24683,7 @@
             <a:fld id="{81331B57-0BE5-4F82-AA58-76F53EFF3ADA}" type="datetime8">
               <a:rPr lang="en-US" smtClean="0"/>
               <a:pPr/>
-              <a:t>6/17/16 2:49 PM</a:t>
+              <a:t>6/19/16 1:58 AM</a:t>
             </a:fld>
             <a:endParaRPr lang="en-US"/>
           </a:p>
@@ -24759,7 +24761,7 @@
             <a:fld id="{EC87E0CF-87F6-4B58-B8B8-DCAB2DAAF3CA}" type="slidenum">
               <a:rPr lang="en-US" smtClean="0"/>
               <a:pPr/>
-              <a:t>6</a:t>
+              <a:t>7</a:t>
             </a:fld>
             <a:endParaRPr lang="en-US" dirty="0"/>
           </a:p>
@@ -24865,7 +24867,7 @@
             <a:fld id="{81331B57-0BE5-4F82-AA58-76F53EFF3ADA}" type="datetime8">
               <a:rPr lang="en-US" smtClean="0"/>
               <a:pPr/>
-              <a:t>6/17/16 2:49 PM</a:t>
+              <a:t>6/19/16 1:58 AM</a:t>
             </a:fld>
             <a:endParaRPr lang="en-US"/>
           </a:p>
@@ -24943,7 +24945,7 @@
             <a:fld id="{EC87E0CF-87F6-4B58-B8B8-DCAB2DAAF3CA}" type="slidenum">
               <a:rPr lang="en-US" smtClean="0"/>
               <a:pPr/>
-              <a:t>7</a:t>
+              <a:t>8</a:t>
             </a:fld>
             <a:endParaRPr lang="en-US" dirty="0"/>
           </a:p>
@@ -25049,7 +25051,7 @@
             <a:fld id="{81331B57-0BE5-4F82-AA58-76F53EFF3ADA}" type="datetime8">
               <a:rPr lang="en-US" smtClean="0"/>
               <a:pPr/>
-              <a:t>6/17/16 2:49 PM</a:t>
+              <a:t>6/19/16 1:58 AM</a:t>
             </a:fld>
             <a:endParaRPr lang="en-US"/>
           </a:p>
@@ -25127,7 +25129,7 @@
             <a:fld id="{EC87E0CF-87F6-4B58-B8B8-DCAB2DAAF3CA}" type="slidenum">
               <a:rPr lang="en-US" smtClean="0"/>
               <a:pPr/>
-              <a:t>8</a:t>
+              <a:t>9</a:t>
             </a:fld>
             <a:endParaRPr lang="en-US" dirty="0"/>
           </a:p>
@@ -25233,7 +25235,7 @@
             <a:fld id="{81331B57-0BE5-4F82-AA58-76F53EFF3ADA}" type="datetime8">
               <a:rPr lang="en-US" smtClean="0"/>
               <a:pPr/>
-              <a:t>6/17/16 2:49 PM</a:t>
+              <a:t>6/19/16 1:58 AM</a:t>
             </a:fld>
             <a:endParaRPr lang="en-US"/>
           </a:p>
@@ -25311,7 +25313,7 @@
             <a:fld id="{EC87E0CF-87F6-4B58-B8B8-DCAB2DAAF3CA}" type="slidenum">
               <a:rPr lang="en-US" smtClean="0"/>
               <a:pPr/>
-              <a:t>9</a:t>
+              <a:t>10</a:t>
             </a:fld>
             <a:endParaRPr lang="en-US" dirty="0"/>
           </a:p>
@@ -25417,7 +25419,7 @@
             <a:fld id="{81331B57-0BE5-4F82-AA58-76F53EFF3ADA}" type="datetime8">
               <a:rPr lang="en-US" smtClean="0"/>
               <a:pPr/>
-              <a:t>6/17/16 2:49 PM</a:t>
+              <a:t>6/19/16 1:58 AM</a:t>
             </a:fld>
             <a:endParaRPr lang="en-US"/>
           </a:p>
@@ -25495,7 +25497,7 @@
             <a:fld id="{EC87E0CF-87F6-4B58-B8B8-DCAB2DAAF3CA}" type="slidenum">
               <a:rPr lang="en-US" smtClean="0"/>
               <a:pPr/>
-              <a:t>10</a:t>
+              <a:t>11</a:t>
             </a:fld>
             <a:endParaRPr lang="en-US" dirty="0"/>
           </a:p>
@@ -25580,7 +25582,7 @@
             <a:fld id="{033A6C6C-526F-4C16-B273-CA96130954AF}" type="slidenum">
               <a:rPr lang="en-US" smtClean="0"/>
               <a:pPr/>
-              <a:t>18</a:t>
+              <a:t>20</a:t>
             </a:fld>
             <a:endParaRPr lang="en-US"/>
           </a:p>
@@ -28908,6 +28910,171 @@
         <p:spPr>
           <a:xfrm>
             <a:off x="381000" y="230188"/>
+            <a:ext cx="8382000" cy="760412"/>
+          </a:xfrm>
+        </p:spPr>
+        <p:txBody>
+          <a:bodyPr>
+            <a:normAutofit fontScale="90000"/>
+          </a:bodyPr>
+          <a:lstStyle/>
+          <a:p>
+            <a:r>
+              <a:rPr lang="en-US" smtClean="0"/>
+              <a:t>Agent-Based Modeling </a:t>
+            </a:r>
+            <a:r>
+              <a:rPr lang="en-US"/>
+              <a:t>(ABM)</a:t>
+            </a:r>
+            <a:r>
+              <a:rPr lang="en-US" dirty="0" smtClean="0"/>
+              <a:t/>
+            </a:r>
+            <a:br>
+              <a:rPr lang="en-US" dirty="0" smtClean="0"/>
+            </a:br>
+            <a:endParaRPr lang="en-US" dirty="0">
+              <a:solidFill>
+                <a:schemeClr val="tx2"/>
+              </a:solidFill>
+            </a:endParaRPr>
+          </a:p>
+        </p:txBody>
+      </p:sp>
+      <p:sp>
+        <p:nvSpPr>
+          <p:cNvPr id="3" name="Text Placeholder 2"/>
+          <p:cNvSpPr>
+            <a:spLocks noGrp="1"/>
+          </p:cNvSpPr>
+          <p:nvPr>
+            <p:ph type="body" sz="quarter" idx="10"/>
+          </p:nvPr>
+        </p:nvSpPr>
+        <p:spPr>
+          <a:xfrm>
+            <a:off x="381000" y="990600"/>
+            <a:ext cx="8382000" cy="2209800"/>
+          </a:xfrm>
+        </p:spPr>
+        <p:txBody>
+          <a:bodyPr>
+            <a:normAutofit/>
+          </a:bodyPr>
+          <a:lstStyle/>
+          <a:p>
+            <a:r>
+              <a:rPr lang="en-US" dirty="0" smtClean="0"/>
+              <a:t>Example: a forest fire model</a:t>
+            </a:r>
+          </a:p>
+          <a:p>
+            <a:pPr lvl="1"/>
+            <a:r>
+              <a:rPr lang="en-US" dirty="0" smtClean="0"/>
+              <a:t>Lightening strikes randomly, starting a fire</a:t>
+            </a:r>
+          </a:p>
+          <a:p>
+            <a:pPr lvl="1"/>
+            <a:r>
+              <a:rPr lang="en-US" dirty="0" smtClean="0"/>
+              <a:t>Trees on fire ignite neighbors</a:t>
+            </a:r>
+          </a:p>
+          <a:p>
+            <a:pPr lvl="1"/>
+            <a:r>
+              <a:rPr lang="en-US" dirty="0" smtClean="0"/>
+              <a:t>Trees grow anew in burned out spots</a:t>
+            </a:r>
+          </a:p>
+        </p:txBody>
+      </p:sp>
+      <p:pic>
+        <p:nvPicPr>
+          <p:cNvPr id="4" name="Picture 3" descr="forest_fire.png"/>
+          <p:cNvPicPr>
+            <a:picLocks noChangeAspect="1"/>
+          </p:cNvPicPr>
+          <p:nvPr/>
+        </p:nvPicPr>
+        <p:blipFill>
+          <a:blip r:embed="rId3">
+            <a:extLst>
+              <a:ext uri="{28A0092B-C50C-407E-A947-70E740481C1C}">
+                <a14:useLocalDpi xmlns:a14="http://schemas.microsoft.com/office/drawing/2010/main" val="0"/>
+              </a:ext>
+            </a:extLst>
+          </a:blip>
+          <a:stretch>
+            <a:fillRect/>
+          </a:stretch>
+        </p:blipFill>
+        <p:spPr>
+          <a:xfrm>
+            <a:off x="3581400" y="3048000"/>
+            <a:ext cx="4724400" cy="3543300"/>
+          </a:xfrm>
+          <a:prstGeom prst="rect">
+            <a:avLst/>
+          </a:prstGeom>
+        </p:spPr>
+      </p:pic>
+    </p:spTree>
+    <p:extLst>
+      <p:ext uri="{BB962C8B-B14F-4D97-AF65-F5344CB8AC3E}">
+        <p14:creationId xmlns:p14="http://schemas.microsoft.com/office/powerpoint/2010/main" val="4038856037"/>
+      </p:ext>
+    </p:extLst>
+  </p:cSld>
+  <p:clrMapOvr>
+    <a:masterClrMapping/>
+  </p:clrMapOvr>
+  <p:transition>
+    <p:fade/>
+  </p:transition>
+  <p:timing>
+    <p:tnLst>
+      <p:par>
+        <p:cTn id="1" dur="indefinite" restart="never" nodeType="tmRoot"/>
+      </p:par>
+    </p:tnLst>
+  </p:timing>
+</p:sld>
+</file>
+
+<file path=ppt/slides/slide11.xml><?xml version="1.0" encoding="utf-8"?>
+<p:sld xmlns:a="http://schemas.openxmlformats.org/drawingml/2006/main" xmlns:r="http://schemas.openxmlformats.org/officeDocument/2006/relationships" xmlns:p="http://schemas.openxmlformats.org/presentationml/2006/main">
+  <p:cSld>
+    <p:spTree>
+      <p:nvGrpSpPr>
+        <p:cNvPr id="1" name=""/>
+        <p:cNvGrpSpPr/>
+        <p:nvPr/>
+      </p:nvGrpSpPr>
+      <p:grpSpPr>
+        <a:xfrm>
+          <a:off x="0" y="0"/>
+          <a:ext cx="0" cy="0"/>
+          <a:chOff x="0" y="0"/>
+          <a:chExt cx="0" cy="0"/>
+        </a:xfrm>
+      </p:grpSpPr>
+      <p:sp>
+        <p:nvSpPr>
+          <p:cNvPr id="2" name="Title 1"/>
+          <p:cNvSpPr>
+            <a:spLocks noGrp="1"/>
+          </p:cNvSpPr>
+          <p:nvPr>
+            <p:ph type="title"/>
+          </p:nvPr>
+        </p:nvSpPr>
+        <p:spPr>
+          <a:xfrm>
+            <a:off x="381000" y="230188"/>
             <a:ext cx="8382000" cy="912812"/>
           </a:xfrm>
         </p:spPr>
@@ -29028,7 +29195,7 @@
 </p:sld>
 </file>
 
-<file path=ppt/slides/slide11.xml><?xml version="1.0" encoding="utf-8"?>
+<file path=ppt/slides/slide12.xml><?xml version="1.0" encoding="utf-8"?>
 <p:sld xmlns:a="http://schemas.openxmlformats.org/drawingml/2006/main" xmlns:r="http://schemas.openxmlformats.org/officeDocument/2006/relationships" xmlns:p="http://schemas.openxmlformats.org/presentationml/2006/main">
   <p:cSld>
     <p:spTree>
@@ -29251,7 +29418,7 @@
 </p:sld>
 </file>
 
-<file path=ppt/slides/slide12.xml><?xml version="1.0" encoding="utf-8"?>
+<file path=ppt/slides/slide13.xml><?xml version="1.0" encoding="utf-8"?>
 <p:sld xmlns:a="http://schemas.openxmlformats.org/drawingml/2006/main" xmlns:r="http://schemas.openxmlformats.org/officeDocument/2006/relationships" xmlns:p="http://schemas.openxmlformats.org/presentationml/2006/main">
   <p:cSld>
     <p:spTree>
@@ -29507,7 +29674,7 @@
 </p:sld>
 </file>
 
-<file path=ppt/slides/slide13.xml><?xml version="1.0" encoding="utf-8"?>
+<file path=ppt/slides/slide14.xml><?xml version="1.0" encoding="utf-8"?>
 <p:sld xmlns:a="http://schemas.openxmlformats.org/drawingml/2006/main" xmlns:r="http://schemas.openxmlformats.org/officeDocument/2006/relationships" xmlns:p="http://schemas.openxmlformats.org/presentationml/2006/main">
   <p:cSld>
     <p:spTree>
@@ -29656,138 +29823,6 @@
     <p:extLst>
       <p:ext uri="{BB962C8B-B14F-4D97-AF65-F5344CB8AC3E}">
         <p14:creationId xmlns:p14="http://schemas.microsoft.com/office/powerpoint/2010/main" val="3526871055"/>
-      </p:ext>
-    </p:extLst>
-  </p:cSld>
-  <p:clrMapOvr>
-    <a:masterClrMapping/>
-  </p:clrMapOvr>
-  <p:transition>
-    <p:fade/>
-  </p:transition>
-  <p:timing>
-    <p:tnLst>
-      <p:par>
-        <p:cTn id="1" dur="indefinite" restart="never" nodeType="tmRoot"/>
-      </p:par>
-    </p:tnLst>
-  </p:timing>
-</p:sld>
-</file>
-
-<file path=ppt/slides/slide14.xml><?xml version="1.0" encoding="utf-8"?>
-<p:sld xmlns:a="http://schemas.openxmlformats.org/drawingml/2006/main" xmlns:r="http://schemas.openxmlformats.org/officeDocument/2006/relationships" xmlns:p="http://schemas.openxmlformats.org/presentationml/2006/main">
-  <p:cSld>
-    <p:spTree>
-      <p:nvGrpSpPr>
-        <p:cNvPr id="1" name=""/>
-        <p:cNvGrpSpPr/>
-        <p:nvPr/>
-      </p:nvGrpSpPr>
-      <p:grpSpPr>
-        <a:xfrm>
-          <a:off x="0" y="0"/>
-          <a:ext cx="0" cy="0"/>
-          <a:chOff x="0" y="0"/>
-          <a:chExt cx="0" cy="0"/>
-        </a:xfrm>
-      </p:grpSpPr>
-      <p:sp>
-        <p:nvSpPr>
-          <p:cNvPr id="2" name="Title 1"/>
-          <p:cNvSpPr>
-            <a:spLocks noGrp="1"/>
-          </p:cNvSpPr>
-          <p:nvPr>
-            <p:ph type="title"/>
-          </p:nvPr>
-        </p:nvSpPr>
-        <p:spPr>
-          <a:xfrm>
-            <a:off x="381000" y="230188"/>
-            <a:ext cx="8382000" cy="664797"/>
-          </a:xfrm>
-        </p:spPr>
-        <p:txBody>
-          <a:bodyPr/>
-          <a:lstStyle/>
-          <a:p>
-            <a:r>
-              <a:rPr lang="en-US" dirty="0" smtClean="0"/>
-              <a:t>An Algebraic Module</a:t>
-            </a:r>
-            <a:endParaRPr lang="en-US" dirty="0"/>
-          </a:p>
-        </p:txBody>
-      </p:sp>
-      <p:sp>
-        <p:nvSpPr>
-          <p:cNvPr id="3" name="Content Placeholder 2"/>
-          <p:cNvSpPr>
-            <a:spLocks noGrp="1"/>
-          </p:cNvSpPr>
-          <p:nvPr>
-            <p:ph type="body" sz="quarter" idx="10"/>
-          </p:nvPr>
-        </p:nvSpPr>
-        <p:spPr>
-          <a:xfrm>
-            <a:off x="381000" y="1676400"/>
-            <a:ext cx="8382000" cy="4505849"/>
-          </a:xfrm>
-        </p:spPr>
-        <p:txBody>
-          <a:bodyPr/>
-          <a:lstStyle/>
-          <a:p>
-            <a:r>
-              <a:rPr lang="en-US" sz="2800" dirty="0"/>
-              <a:t>To be a module an algebraic structure must contain a primary set that is an Abelian group, G, satisfying four group axioms: closure, associativity, identity and </a:t>
-            </a:r>
-            <a:r>
-              <a:rPr lang="en-US" sz="2800" dirty="0" err="1"/>
-              <a:t>invertibility</a:t>
-            </a:r>
-            <a:r>
-              <a:rPr lang="en-US" sz="2800" dirty="0"/>
-              <a:t>. There is an operator </a:t>
-            </a:r>
-            <a:r>
-              <a:rPr lang="en-US" sz="2800" dirty="0">
-                <a:sym typeface="Symbol" charset="2"/>
-              </a:rPr>
-              <a:t></a:t>
-            </a:r>
-            <a:r>
-              <a:rPr lang="en-US" sz="2800" dirty="0"/>
-              <a:t> which takes two elements of the group and yields an element, and its operation satisfies these axioms.</a:t>
-            </a:r>
-          </a:p>
-          <a:p>
-            <a:r>
-              <a:rPr lang="en-US" sz="2800" dirty="0"/>
-              <a:t>In addition, a module contains a secondary set, R, a ring of coefficients, with a second operation, </a:t>
-            </a:r>
-            <a:r>
-              <a:rPr lang="en-US" sz="2800" dirty="0">
-                <a:sym typeface="Symbol" charset="2"/>
-              </a:rPr>
-              <a:t></a:t>
-            </a:r>
-            <a:r>
-              <a:rPr lang="en-US" sz="2800" dirty="0"/>
-              <a:t>, which takes an element of R and an element of G and produces and element of G.</a:t>
-            </a:r>
-          </a:p>
-          <a:p>
-            <a:endParaRPr lang="en-US" dirty="0"/>
-          </a:p>
-        </p:txBody>
-      </p:sp>
-    </p:spTree>
-    <p:extLst>
-      <p:ext uri="{BB962C8B-B14F-4D97-AF65-F5344CB8AC3E}">
-        <p14:creationId xmlns:p14="http://schemas.microsoft.com/office/powerpoint/2010/main" val="1957043964"/>
       </p:ext>
     </p:extLst>
   </p:cSld>
@@ -29845,22 +29880,12 @@
           <a:lstStyle/>
           <a:p>
             <a:r>
-              <a:rPr lang="en-US" dirty="0" smtClean="0">
-                <a:effectLst/>
-              </a:rPr>
-              <a:t>ABM </a:t>
-            </a:r>
-            <a:r>
-              <a:rPr lang="en-US" dirty="0">
-                <a:effectLst/>
-              </a:rPr>
-              <a:t>Interaction as a </a:t>
-            </a:r>
-            <a:r>
-              <a:rPr lang="en-US" dirty="0" smtClean="0">
-                <a:effectLst/>
-              </a:rPr>
-              <a:t>Module</a:t>
+              <a:rPr lang="en-US" dirty="0" smtClean="0"/>
+              <a:t>An Algebraic </a:t>
+            </a:r>
+            <a:r>
+              <a:rPr lang="en-US" dirty="0" err="1" smtClean="0"/>
+              <a:t>Monoid</a:t>
             </a:r>
             <a:endParaRPr lang="en-US" dirty="0"/>
           </a:p>
@@ -29873,13 +29898,13 @@
             <a:spLocks noGrp="1"/>
           </p:cNvSpPr>
           <p:nvPr>
-            <p:ph sz="half" idx="1"/>
+            <p:ph type="body" sz="quarter" idx="10"/>
           </p:nvPr>
         </p:nvSpPr>
         <p:spPr>
           <a:xfrm>
-            <a:off x="381000" y="1752600"/>
-            <a:ext cx="3657600" cy="3877985"/>
+            <a:off x="381000" y="1676400"/>
+            <a:ext cx="8382000" cy="4893647"/>
           </a:xfrm>
         </p:spPr>
         <p:txBody>
@@ -29887,73 +29912,122 @@
           <a:lstStyle/>
           <a:p>
             <a:r>
-              <a:rPr lang="en-US" dirty="0"/>
-              <a:t>Elements: Following </a:t>
-            </a:r>
-            <a:r>
-              <a:rPr lang="en-US" dirty="0" smtClean="0"/>
-              <a:t>A. N. Whitehead, </a:t>
-            </a:r>
-            <a:r>
-              <a:rPr lang="en-US" dirty="0"/>
-              <a:t>we call the elements of our group G </a:t>
-            </a:r>
-            <a:r>
-              <a:rPr lang="en-US" i="1" dirty="0" err="1"/>
-              <a:t>prehensions</a:t>
-            </a:r>
-            <a:r>
-              <a:rPr lang="en-US" dirty="0"/>
-              <a:t>. A </a:t>
-            </a:r>
-            <a:r>
-              <a:rPr lang="en-US" dirty="0" err="1"/>
-              <a:t>prehension</a:t>
-            </a:r>
-            <a:r>
-              <a:rPr lang="en-US" dirty="0"/>
-              <a:t> can be roughly understood as a state of affairs in the world </a:t>
-            </a:r>
-            <a:r>
-              <a:rPr lang="en-US" i="1" dirty="0"/>
-              <a:t>as seen from a particular point of view</a:t>
-            </a:r>
-            <a:r>
-              <a:rPr lang="en-US" dirty="0"/>
-              <a:t>. </a:t>
-            </a:r>
+              <a:rPr lang="en-US" sz="2800" dirty="0"/>
+              <a:t>To be a </a:t>
+            </a:r>
+            <a:r>
+              <a:rPr lang="en-US" sz="2800" i="1" dirty="0" err="1" smtClean="0"/>
+              <a:t>monoid</a:t>
+            </a:r>
+            <a:r>
+              <a:rPr lang="en-US" sz="2800" dirty="0" smtClean="0"/>
+              <a:t> an </a:t>
+            </a:r>
+            <a:r>
+              <a:rPr lang="en-US" sz="2800" dirty="0"/>
+              <a:t>algebraic structure must contain a primary set </a:t>
+            </a:r>
+            <a:r>
+              <a:rPr lang="en-US" sz="2800" dirty="0" smtClean="0"/>
+              <a:t>S, satisfying three </a:t>
+            </a:r>
+            <a:r>
+              <a:rPr lang="en-US" sz="2800" dirty="0"/>
+              <a:t>axioms: closure, associativity, </a:t>
+            </a:r>
+            <a:r>
+              <a:rPr lang="en-US" sz="2800" dirty="0" smtClean="0"/>
+              <a:t>and identity. </a:t>
+            </a:r>
+            <a:r>
+              <a:rPr lang="en-US" sz="2800" dirty="0"/>
+              <a:t>There is an operator </a:t>
+            </a:r>
+            <a:r>
+              <a:rPr lang="en-US" sz="2800" dirty="0">
+                <a:sym typeface="Symbol" charset="2"/>
+              </a:rPr>
+              <a:t></a:t>
+            </a:r>
+            <a:r>
+              <a:rPr lang="en-US" sz="2800" dirty="0"/>
+              <a:t> which takes two elements of the group and yields an element, and its operation satisfies these axioms.</a:t>
+            </a:r>
+          </a:p>
+          <a:p>
+            <a:r>
+              <a:rPr lang="en-US" sz="2800" dirty="0" smtClean="0"/>
+              <a:t>We may define further requirements and get more restrictively defined structures: </a:t>
+            </a:r>
+            <a:r>
+              <a:rPr lang="en-US" sz="2800" dirty="0" err="1" smtClean="0"/>
+              <a:t>e.g</a:t>
+            </a:r>
+            <a:r>
+              <a:rPr lang="en-US" sz="2800" dirty="0" smtClean="0"/>
+              <a:t>, </a:t>
+            </a:r>
+            <a:r>
+              <a:rPr lang="en-US" sz="2800" dirty="0"/>
+              <a:t>a </a:t>
+            </a:r>
+            <a:r>
+              <a:rPr lang="en-US" sz="2800" i="1" dirty="0"/>
+              <a:t>module</a:t>
+            </a:r>
+            <a:r>
+              <a:rPr lang="en-US" sz="2800" dirty="0"/>
+              <a:t> </a:t>
+            </a:r>
+            <a:r>
+              <a:rPr lang="en-US" sz="2800" dirty="0" smtClean="0"/>
+              <a:t>must be Abelian, have inverse elements, and contain </a:t>
+            </a:r>
+            <a:r>
+              <a:rPr lang="en-US" sz="2800" dirty="0"/>
+              <a:t>a secondary set, R, a ring of coefficients, with a second operation, </a:t>
+            </a:r>
+            <a:r>
+              <a:rPr lang="en-US" sz="2800" dirty="0">
+                <a:sym typeface="Symbol" charset="2"/>
+              </a:rPr>
+              <a:t></a:t>
+            </a:r>
+            <a:r>
+              <a:rPr lang="en-US" sz="2800" dirty="0"/>
+              <a:t>, which takes an element of R and an element of </a:t>
+            </a:r>
+            <a:r>
+              <a:rPr lang="en-US" sz="2800" dirty="0" smtClean="0"/>
+              <a:t>S </a:t>
+            </a:r>
+            <a:r>
+              <a:rPr lang="en-US" sz="2800" dirty="0"/>
+              <a:t>and produces </a:t>
+            </a:r>
+            <a:r>
+              <a:rPr lang="en-US" sz="2800" dirty="0" smtClean="0"/>
+              <a:t>an </a:t>
+            </a:r>
+            <a:r>
+              <a:rPr lang="en-US" sz="2800" dirty="0"/>
+              <a:t>element of </a:t>
+            </a:r>
+            <a:r>
+              <a:rPr lang="en-US" sz="2800" dirty="0" smtClean="0"/>
+              <a:t>S.</a:t>
+            </a:r>
+            <a:endParaRPr lang="en-US" sz="2800" dirty="0"/>
+          </a:p>
+          <a:p>
+            <a:endParaRPr lang="en-US" dirty="0"/>
           </a:p>
         </p:txBody>
       </p:sp>
-      <p:graphicFrame>
-        <p:nvGraphicFramePr>
-          <p:cNvPr id="5" name="Content Placeholder 4"/>
-          <p:cNvGraphicFramePr>
-            <a:graphicFrameLocks noGrp="1"/>
-          </p:cNvGraphicFramePr>
-          <p:nvPr>
-            <p:ph sz="half" idx="2"/>
-            <p:extLst>
-              <p:ext uri="{D42A27DB-BD31-4B8C-83A1-F6EECF244321}">
-                <p14:modId xmlns:p14="http://schemas.microsoft.com/office/powerpoint/2010/main" val="1082365804"/>
-              </p:ext>
-            </p:extLst>
-          </p:nvPr>
-        </p:nvGraphicFramePr>
-        <p:xfrm>
-          <a:off x="4648200" y="1676400"/>
-          <a:ext cx="4114800" cy="4191000"/>
-        </p:xfrm>
-        <a:graphic>
-          <a:graphicData uri="http://schemas.openxmlformats.org/drawingml/2006/diagram">
-            <dgm:relIds xmlns:dgm="http://schemas.openxmlformats.org/drawingml/2006/diagram" xmlns:r="http://schemas.openxmlformats.org/officeDocument/2006/relationships" r:dm="rId2" r:lo="rId3" r:qs="rId4" r:cs="rId5"/>
-          </a:graphicData>
-        </a:graphic>
-      </p:graphicFrame>
     </p:spTree>
     <p:extLst>
       <p:ext uri="{BB962C8B-B14F-4D97-AF65-F5344CB8AC3E}">
-        <p14:creationId xmlns:p14="http://schemas.microsoft.com/office/powerpoint/2010/main" val="1849000610"/>
+        <p14:creationId xmlns:p14="http://schemas.microsoft.com/office/powerpoint/2010/main" val="1957043964"/>
       </p:ext>
     </p:extLst>
   </p:cSld>
@@ -30011,8 +30085,8 @@
           <a:lstStyle/>
           <a:p>
             <a:r>
-              <a:rPr lang="en-US" dirty="0" err="1" smtClean="0"/>
-              <a:t>Prehensions</a:t>
+              <a:rPr lang="en-US" dirty="0" smtClean="0"/>
+              <a:t>Different Strokes for Different Folks</a:t>
             </a:r>
             <a:endParaRPr lang="en-US" dirty="0"/>
           </a:p>
@@ -30020,18 +30094,18 @@
       </p:sp>
       <p:sp>
         <p:nvSpPr>
-          <p:cNvPr id="3" name="Text Placeholder 2"/>
+          <p:cNvPr id="3" name="Content Placeholder 2"/>
           <p:cNvSpPr>
             <a:spLocks noGrp="1"/>
           </p:cNvSpPr>
           <p:nvPr>
-            <p:ph type="body" sz="quarter" idx="10"/>
+            <p:ph sz="half" idx="1"/>
           </p:nvPr>
         </p:nvSpPr>
         <p:spPr>
           <a:xfrm>
-            <a:off x="381000" y="1219200"/>
-            <a:ext cx="8382000" cy="2609945"/>
+            <a:off x="381000" y="1411762"/>
+            <a:ext cx="4114800" cy="1163395"/>
           </a:xfrm>
         </p:spPr>
         <p:txBody>
@@ -30040,21 +30114,43 @@
           <a:p>
             <a:r>
               <a:rPr lang="en-US" dirty="0" smtClean="0"/>
-              <a:t>Even before implementing this as a module, we had made it easy to:</a:t>
-            </a:r>
+              <a:t>The Forest Fire model turns out to be best represented as a </a:t>
+            </a:r>
+            <a:r>
+              <a:rPr lang="en-US" dirty="0" err="1" smtClean="0"/>
+              <a:t>monoid</a:t>
+            </a:r>
+            <a:r>
+              <a:rPr lang="en-US" dirty="0" smtClean="0"/>
+              <a:t>.</a:t>
+            </a:r>
+            <a:endParaRPr lang="en-US" dirty="0"/>
           </a:p>
+        </p:txBody>
+      </p:sp>
+      <p:sp>
+        <p:nvSpPr>
+          <p:cNvPr id="4" name="Content Placeholder 3"/>
+          <p:cNvSpPr>
+            <a:spLocks noGrp="1"/>
+          </p:cNvSpPr>
+          <p:nvPr>
+            <p:ph sz="half" idx="2"/>
+          </p:nvPr>
+        </p:nvSpPr>
+        <p:spPr>
+          <a:xfrm>
+            <a:off x="4645937" y="1411762"/>
+            <a:ext cx="4114800" cy="775597"/>
+          </a:xfrm>
+        </p:spPr>
+        <p:txBody>
+          <a:bodyPr/>
+          <a:lstStyle/>
           <a:p>
-            <a:pPr lvl="1"/>
             <a:r>
               <a:rPr lang="en-US" dirty="0" smtClean="0"/>
-              <a:t>Get arbitrary slices of the agent’s environment as a “view.”</a:t>
-            </a:r>
-          </a:p>
-          <a:p>
-            <a:pPr lvl="1"/>
-            <a:r>
-              <a:rPr lang="en-US" dirty="0" smtClean="0"/>
-              <a:t>Filter that view to, e.g., see only agents of a type of particular interest.</a:t>
+              <a:t>Schelling’s segregation model is a module.</a:t>
             </a:r>
             <a:endParaRPr lang="en-US" dirty="0"/>
           </a:p>
@@ -30062,7 +30158,7 @@
       </p:sp>
       <p:pic>
         <p:nvPicPr>
-          <p:cNvPr id="4" name="Picture 3"/>
+          <p:cNvPr id="5" name="Picture 4" descr="segregation.png"/>
           <p:cNvPicPr>
             <a:picLocks noChangeAspect="1"/>
           </p:cNvPicPr>
@@ -30082,18 +30178,93 @@
         </p:blipFill>
         <p:spPr>
           <a:xfrm>
-            <a:off x="381000" y="4419600"/>
-            <a:ext cx="8407831" cy="1600200"/>
+            <a:off x="5115837" y="2914987"/>
+            <a:ext cx="3175000" cy="2381250"/>
           </a:xfrm>
           <a:prstGeom prst="rect">
             <a:avLst/>
           </a:prstGeom>
         </p:spPr>
       </p:pic>
+      <p:pic>
+        <p:nvPicPr>
+          <p:cNvPr id="6" name="Picture 5" descr="forest_fire.png"/>
+          <p:cNvPicPr>
+            <a:picLocks noChangeAspect="1"/>
+          </p:cNvPicPr>
+          <p:nvPr/>
+        </p:nvPicPr>
+        <p:blipFill>
+          <a:blip r:embed="rId3">
+            <a:extLst>
+              <a:ext uri="{28A0092B-C50C-407E-A947-70E740481C1C}">
+                <a14:useLocalDpi xmlns:a14="http://schemas.microsoft.com/office/drawing/2010/main" val="0"/>
+              </a:ext>
+            </a:extLst>
+          </a:blip>
+          <a:stretch>
+            <a:fillRect/>
+          </a:stretch>
+        </p:blipFill>
+        <p:spPr>
+          <a:xfrm>
+            <a:off x="850900" y="2914987"/>
+            <a:ext cx="3175000" cy="2381250"/>
+          </a:xfrm>
+          <a:prstGeom prst="rect">
+            <a:avLst/>
+          </a:prstGeom>
+        </p:spPr>
+      </p:pic>
+      <p:sp>
+        <p:nvSpPr>
+          <p:cNvPr id="7" name="TextBox 6"/>
+          <p:cNvSpPr txBox="1"/>
+          <p:nvPr/>
+        </p:nvSpPr>
+        <p:spPr>
+          <a:xfrm>
+            <a:off x="762000" y="5636067"/>
+            <a:ext cx="7331152" cy="954107"/>
+          </a:xfrm>
+          <a:prstGeom prst="rect">
+            <a:avLst/>
+          </a:prstGeom>
+          <a:noFill/>
+        </p:spPr>
+        <p:txBody>
+          <a:bodyPr wrap="square" rtlCol="0">
+            <a:spAutoFit/>
+          </a:bodyPr>
+          <a:lstStyle/>
+          <a:p>
+            <a:pPr algn="ctr"/>
+            <a:r>
+              <a:rPr lang="en-US" sz="2800" dirty="0" smtClean="0">
+                <a:solidFill>
+                  <a:schemeClr val="accent6">
+                    <a:lumMod val="40000"/>
+                    <a:lumOff val="60000"/>
+                  </a:schemeClr>
+                </a:solidFill>
+              </a:rPr>
+              <a:t>We can now see how the second is a subclass of the first with additional axioms.</a:t>
+            </a:r>
+            <a:endParaRPr lang="en-US" sz="2800" dirty="0">
+              <a:solidFill>
+                <a:schemeClr val="accent6">
+                  <a:lumMod val="40000"/>
+                  <a:lumOff val="60000"/>
+                </a:schemeClr>
+              </a:solidFill>
+            </a:endParaRPr>
+          </a:p>
+        </p:txBody>
+      </p:sp>
     </p:spTree>
     <p:extLst>
       <p:ext uri="{BB962C8B-B14F-4D97-AF65-F5344CB8AC3E}">
-        <p14:creationId xmlns:p14="http://schemas.microsoft.com/office/powerpoint/2010/main" val="1931021824"/>
+        <p14:creationId xmlns:p14="http://schemas.microsoft.com/office/powerpoint/2010/main" val="1220646720"/>
       </p:ext>
     </p:extLst>
   </p:cSld>
@@ -30103,6 +30274,13 @@
   <p:transition>
     <p:fade/>
   </p:transition>
+  <p:timing>
+    <p:tnLst>
+      <p:par>
+        <p:cTn id="1" dur="indefinite" restart="never" nodeType="tmRoot"/>
+      </p:par>
+    </p:tnLst>
+  </p:timing>
 </p:sld>
 </file>
 
@@ -30135,8 +30313,8 @@
         </p:nvSpPr>
         <p:spPr>
           <a:xfrm>
-            <a:off x="381000" y="230188"/>
-            <a:ext cx="8382000" cy="664797"/>
+            <a:off x="152400" y="228600"/>
+            <a:ext cx="8763000" cy="1218795"/>
           </a:xfrm>
         </p:spPr>
         <p:txBody>
@@ -30144,10 +30322,24 @@
           <a:lstStyle/>
           <a:p>
             <a:r>
-              <a:rPr lang="en-US" dirty="0" err="1" smtClean="0"/>
-              <a:t>Prehending</a:t>
-            </a:r>
-            <a:endParaRPr lang="en-US" dirty="0"/>
+              <a:rPr lang="en-US" sz="4400" dirty="0" smtClean="0">
+                <a:effectLst/>
+              </a:rPr>
+              <a:t>ABM </a:t>
+            </a:r>
+            <a:r>
+              <a:rPr lang="en-US" sz="4400" dirty="0">
+                <a:effectLst/>
+              </a:rPr>
+              <a:t>Interaction as </a:t>
+            </a:r>
+            <a:r>
+              <a:rPr lang="en-US" sz="4400" dirty="0" smtClean="0">
+                <a:effectLst/>
+              </a:rPr>
+              <a:t>an Algebraic Structure</a:t>
+            </a:r>
+            <a:endParaRPr lang="en-US" sz="4400" dirty="0"/>
           </a:p>
         </p:txBody>
       </p:sp>
@@ -30163,74 +30355,50 @@
         </p:nvSpPr>
         <p:spPr>
           <a:xfrm>
-            <a:off x="381000" y="1943100"/>
-            <a:ext cx="3276600" cy="3988784"/>
+            <a:off x="381000" y="1752600"/>
+            <a:ext cx="3657600" cy="3877985"/>
           </a:xfrm>
         </p:spPr>
         <p:txBody>
           <a:bodyPr/>
           <a:lstStyle/>
           <a:p>
-            <a:pPr marL="339976" lvl="2" indent="-339976">
-              <a:buBlip>
-                <a:blip r:embed="rId2"/>
-              </a:buBlip>
-            </a:pPr>
-            <a:r>
-              <a:rPr lang="en-US" sz="3200" b="1" dirty="0"/>
-              <a:t>The operation </a:t>
-            </a:r>
-            <a:r>
-              <a:rPr lang="en-US" sz="3200" b="1" dirty="0">
-                <a:sym typeface="Symbol" charset="2"/>
-              </a:rPr>
-              <a:t></a:t>
-            </a:r>
-            <a:r>
-              <a:rPr lang="en-US" sz="3200" b="1" dirty="0"/>
-              <a:t>, which we will call “</a:t>
-            </a:r>
-            <a:r>
-              <a:rPr lang="en-US" sz="3200" b="1" dirty="0" err="1"/>
-              <a:t>prehend</a:t>
-            </a:r>
-            <a:r>
-              <a:rPr lang="en-US" sz="3200" b="1" dirty="0"/>
-              <a:t>”, accepts two </a:t>
-            </a:r>
-            <a:r>
-              <a:rPr lang="en-US" sz="3200" b="1" dirty="0" err="1"/>
+            <a:r>
+              <a:rPr lang="en-US" dirty="0"/>
+              <a:t>Elements: Following </a:t>
+            </a:r>
+            <a:r>
+              <a:rPr lang="en-US" dirty="0" smtClean="0"/>
+              <a:t>A. N. Whitehead, </a:t>
+            </a:r>
+            <a:r>
+              <a:rPr lang="en-US" dirty="0"/>
+              <a:t>we call the elements of our group G </a:t>
+            </a:r>
+            <a:r>
+              <a:rPr lang="en-US" i="1" dirty="0" err="1"/>
               <a:t>prehensions</a:t>
             </a:r>
             <a:r>
-              <a:rPr lang="en-US" sz="3200" b="1" dirty="0"/>
-              <a:t> as arguments and produces a third </a:t>
-            </a:r>
-            <a:r>
-              <a:rPr lang="en-US" sz="3200" b="1" dirty="0" err="1" smtClean="0"/>
+              <a:rPr lang="en-US" dirty="0"/>
+              <a:t>. A </a:t>
+            </a:r>
+            <a:r>
+              <a:rPr lang="en-US" dirty="0" err="1"/>
               <a:t>prehension</a:t>
             </a:r>
             <a:r>
-              <a:rPr lang="en-US" sz="3200" b="1" dirty="0"/>
-              <a:t> </a:t>
-            </a:r>
-            <a:r>
-              <a:rPr lang="en-US" sz="3200" b="1" dirty="0" smtClean="0"/>
-              <a:t>(</a:t>
-            </a:r>
-            <a:r>
-              <a:rPr lang="en-US" sz="3200" b="1" dirty="0" smtClean="0">
-                <a:solidFill>
-                  <a:schemeClr val="accent6"/>
-                </a:solidFill>
-              </a:rPr>
-              <a:t>Closure</a:t>
-            </a:r>
-            <a:r>
-              <a:rPr lang="en-US" sz="3200" b="1" dirty="0" smtClean="0"/>
-              <a:t>).</a:t>
-            </a:r>
-            <a:endParaRPr lang="en-US" sz="3200" b="1" dirty="0"/>
+              <a:rPr lang="en-US" dirty="0"/>
+              <a:t> can be roughly understood as a state of affairs in the world </a:t>
+            </a:r>
+            <a:r>
+              <a:rPr lang="en-US" i="1" dirty="0"/>
+              <a:t>as seen from a particular point of view</a:t>
+            </a:r>
+            <a:r>
+              <a:rPr lang="en-US" dirty="0"/>
+              <a:t>. </a:t>
+            </a:r>
           </a:p>
         </p:txBody>
       </p:sp>
@@ -30244,25 +30412,25 @@
             <p:ph sz="half" idx="2"/>
             <p:extLst>
               <p:ext uri="{D42A27DB-BD31-4B8C-83A1-F6EECF244321}">
-                <p14:modId xmlns:p14="http://schemas.microsoft.com/office/powerpoint/2010/main" val="1356543855"/>
+                <p14:modId xmlns:p14="http://schemas.microsoft.com/office/powerpoint/2010/main" val="1082365804"/>
               </p:ext>
             </p:extLst>
           </p:nvPr>
         </p:nvGraphicFramePr>
         <p:xfrm>
-          <a:off x="4419600" y="1676400"/>
-          <a:ext cx="4343400" cy="4419600"/>
+          <a:off x="4648200" y="1676400"/>
+          <a:ext cx="4114800" cy="4191000"/>
         </p:xfrm>
         <a:graphic>
           <a:graphicData uri="http://schemas.openxmlformats.org/drawingml/2006/diagram">
-            <dgm:relIds xmlns:dgm="http://schemas.openxmlformats.org/drawingml/2006/diagram" xmlns:r="http://schemas.openxmlformats.org/officeDocument/2006/relationships" r:dm="rId3" r:lo="rId4" r:qs="rId5" r:cs="rId6"/>
+            <dgm:relIds xmlns:dgm="http://schemas.openxmlformats.org/drawingml/2006/diagram" xmlns:r="http://schemas.openxmlformats.org/officeDocument/2006/relationships" r:dm="rId2" r:lo="rId3" r:qs="rId4" r:cs="rId5"/>
           </a:graphicData>
         </a:graphic>
       </p:graphicFrame>
     </p:spTree>
     <p:extLst>
       <p:ext uri="{BB962C8B-B14F-4D97-AF65-F5344CB8AC3E}">
-        <p14:creationId xmlns:p14="http://schemas.microsoft.com/office/powerpoint/2010/main" val="406889955"/>
+        <p14:creationId xmlns:p14="http://schemas.microsoft.com/office/powerpoint/2010/main" val="1849000610"/>
       </p:ext>
     </p:extLst>
   </p:cSld>
@@ -30320,8 +30488,8 @@
           <a:lstStyle/>
           <a:p>
             <a:r>
-              <a:rPr lang="en-US" dirty="0" smtClean="0"/>
-              <a:t>Associativity</a:t>
+              <a:rPr lang="en-US" dirty="0" err="1" smtClean="0"/>
+              <a:t>Prehensions</a:t>
             </a:r>
             <a:endParaRPr lang="en-US" dirty="0"/>
           </a:p>
@@ -30329,18 +30497,18 @@
       </p:sp>
       <p:sp>
         <p:nvSpPr>
-          <p:cNvPr id="3" name="Content Placeholder 2"/>
+          <p:cNvPr id="3" name="Text Placeholder 2"/>
           <p:cNvSpPr>
             <a:spLocks noGrp="1"/>
           </p:cNvSpPr>
           <p:nvPr>
-            <p:ph sz="half" idx="1"/>
+            <p:ph type="body" sz="quarter" idx="10"/>
           </p:nvPr>
         </p:nvSpPr>
         <p:spPr>
           <a:xfrm>
-            <a:off x="381000" y="1676400"/>
-            <a:ext cx="4114800" cy="4062651"/>
+            <a:off x="381000" y="1219200"/>
+            <a:ext cx="8382000" cy="2609945"/>
           </a:xfrm>
         </p:spPr>
         <p:txBody>
@@ -30348,177 +30516,73 @@
           <a:lstStyle/>
           <a:p>
             <a:r>
-              <a:rPr lang="en-US" sz="2400" dirty="0"/>
-              <a:t>(a </a:t>
-            </a:r>
-            <a:r>
-              <a:rPr lang="en-US" sz="2400" dirty="0">
-                <a:sym typeface="Symbol" charset="2"/>
-              </a:rPr>
-              <a:t></a:t>
-            </a:r>
-            <a:r>
-              <a:rPr lang="en-US" sz="2400" dirty="0"/>
-              <a:t> b) </a:t>
-            </a:r>
-            <a:r>
-              <a:rPr lang="en-US" sz="2400" dirty="0">
-                <a:sym typeface="Symbol" charset="2"/>
-              </a:rPr>
-              <a:t></a:t>
-            </a:r>
-            <a:r>
-              <a:rPr lang="en-US" sz="2400" dirty="0"/>
-              <a:t> c = a </a:t>
-            </a:r>
-            <a:r>
-              <a:rPr lang="en-US" sz="2400" dirty="0">
-                <a:sym typeface="Symbol" charset="2"/>
-              </a:rPr>
-              <a:t></a:t>
-            </a:r>
-            <a:r>
-              <a:rPr lang="en-US" sz="2400" dirty="0"/>
-              <a:t> (b </a:t>
-            </a:r>
-            <a:r>
-              <a:rPr lang="en-US" sz="2400" dirty="0">
-                <a:sym typeface="Symbol" charset="2"/>
-              </a:rPr>
-              <a:t></a:t>
-            </a:r>
-            <a:r>
-              <a:rPr lang="en-US" sz="2400" dirty="0"/>
-              <a:t> c) for all a, b and c. </a:t>
-            </a:r>
-            <a:endParaRPr lang="en-US" sz="2400" dirty="0" smtClean="0"/>
+              <a:rPr lang="en-US" dirty="0" smtClean="0"/>
+              <a:t>Even before implementing this as a </a:t>
+            </a:r>
+            <a:r>
+              <a:rPr lang="en-US" dirty="0" err="1" smtClean="0"/>
+              <a:t>monoid</a:t>
+            </a:r>
+            <a:r>
+              <a:rPr lang="en-US" dirty="0" smtClean="0"/>
+              <a:t>, </a:t>
+            </a:r>
+            <a:r>
+              <a:rPr lang="en-US" dirty="0" smtClean="0"/>
+              <a:t>we had made it easy to:</a:t>
+            </a:r>
           </a:p>
           <a:p>
-            <a:r>
-              <a:rPr lang="en-US" sz="2400" dirty="0" smtClean="0"/>
-              <a:t>We </a:t>
-            </a:r>
-            <a:r>
-              <a:rPr lang="en-US" sz="2400" dirty="0"/>
-              <a:t>must ensure that, say, a neighborhood can interact with a neighborhood (b </a:t>
-            </a:r>
-            <a:r>
-              <a:rPr lang="en-US" sz="2400" dirty="0">
-                <a:solidFill>
-                  <a:srgbClr val="FFFFFF"/>
-                </a:solidFill>
-                <a:sym typeface="Symbol" charset="2"/>
-              </a:rPr>
-              <a:t></a:t>
-            </a:r>
-            <a:r>
-              <a:rPr lang="en-US" sz="2400" dirty="0" smtClean="0"/>
-              <a:t> </a:t>
-            </a:r>
-            <a:r>
-              <a:rPr lang="en-US" sz="2400" dirty="0"/>
-              <a:t>c), and then with an agent (a </a:t>
-            </a:r>
-            <a:r>
-              <a:rPr lang="en-US" sz="2400" dirty="0">
-                <a:sym typeface="Symbol" charset="2"/>
-              </a:rPr>
-              <a:t></a:t>
-            </a:r>
-            <a:r>
-              <a:rPr lang="en-US" sz="2400" dirty="0" smtClean="0"/>
-              <a:t> </a:t>
-            </a:r>
-            <a:r>
-              <a:rPr lang="en-US" sz="2400" dirty="0"/>
-              <a:t>(b </a:t>
-            </a:r>
-            <a:r>
-              <a:rPr lang="en-US" sz="2400" dirty="0">
-                <a:sym typeface="Symbol" charset="2"/>
-              </a:rPr>
-              <a:t></a:t>
-            </a:r>
-            <a:r>
-              <a:rPr lang="en-US" sz="2400" dirty="0" smtClean="0"/>
-              <a:t> </a:t>
-            </a:r>
-            <a:r>
-              <a:rPr lang="en-US" sz="2400" dirty="0"/>
-              <a:t>c)). Furthermore, this must produce an identical </a:t>
-            </a:r>
-            <a:r>
-              <a:rPr lang="en-US" sz="2400" dirty="0" err="1"/>
-              <a:t>prehension</a:t>
-            </a:r>
-            <a:r>
-              <a:rPr lang="en-US" sz="2400" dirty="0"/>
-              <a:t> to that produced by an agent interacting with one neighborhood and then another one ((a </a:t>
-            </a:r>
-            <a:r>
-              <a:rPr lang="en-US" sz="2400" dirty="0">
-                <a:sym typeface="Symbol" charset="2"/>
-              </a:rPr>
-              <a:t></a:t>
-            </a:r>
-            <a:r>
-              <a:rPr lang="en-US" sz="2400" dirty="0" smtClean="0"/>
-              <a:t> </a:t>
-            </a:r>
-            <a:r>
-              <a:rPr lang="en-US" sz="2400" dirty="0"/>
-              <a:t>b</a:t>
-            </a:r>
-            <a:r>
-              <a:rPr lang="en-US" sz="2400"/>
-              <a:t>) </a:t>
-            </a:r>
-            <a:r>
-              <a:rPr lang="en-US" sz="2400">
-                <a:sym typeface="Symbol" charset="2"/>
-              </a:rPr>
-              <a:t></a:t>
-            </a:r>
-            <a:r>
-              <a:rPr lang="en-US" sz="2400" smtClean="0"/>
-              <a:t> </a:t>
-            </a:r>
-            <a:r>
-              <a:rPr lang="en-US" sz="2400" dirty="0"/>
-              <a:t>c).</a:t>
-            </a:r>
+            <a:pPr lvl="1"/>
+            <a:r>
+              <a:rPr lang="en-US" dirty="0" smtClean="0"/>
+              <a:t>Get arbitrary slices of the agent’s environment as a “view.”</a:t>
+            </a:r>
+          </a:p>
+          <a:p>
+            <a:pPr lvl="1"/>
+            <a:r>
+              <a:rPr lang="en-US" dirty="0" smtClean="0"/>
+              <a:t>Filter that view to, e.g., see only agents of a type of particular interest.</a:t>
+            </a:r>
+            <a:endParaRPr lang="en-US" dirty="0"/>
           </a:p>
         </p:txBody>
       </p:sp>
-      <p:graphicFrame>
-        <p:nvGraphicFramePr>
-          <p:cNvPr id="5" name="Content Placeholder 4"/>
-          <p:cNvGraphicFramePr>
-            <a:graphicFrameLocks noGrp="1"/>
-          </p:cNvGraphicFramePr>
-          <p:nvPr>
-            <p:ph sz="half" idx="2"/>
-            <p:extLst>
-              <p:ext uri="{D42A27DB-BD31-4B8C-83A1-F6EECF244321}">
-                <p14:modId xmlns:p14="http://schemas.microsoft.com/office/powerpoint/2010/main" val="1760850255"/>
-              </p:ext>
-            </p:extLst>
-          </p:nvPr>
-        </p:nvGraphicFramePr>
-        <p:xfrm>
-          <a:off x="4648200" y="1676400"/>
-          <a:ext cx="4114800" cy="4191000"/>
-        </p:xfrm>
-        <a:graphic>
-          <a:graphicData uri="http://schemas.openxmlformats.org/drawingml/2006/diagram">
-            <dgm:relIds xmlns:dgm="http://schemas.openxmlformats.org/drawingml/2006/diagram" xmlns:r="http://schemas.openxmlformats.org/officeDocument/2006/relationships" r:dm="rId3" r:lo="rId4" r:qs="rId5" r:cs="rId6"/>
-          </a:graphicData>
-        </a:graphic>
-      </p:graphicFrame>
+      <p:pic>
+        <p:nvPicPr>
+          <p:cNvPr id="4" name="Picture 3"/>
+          <p:cNvPicPr>
+            <a:picLocks noChangeAspect="1"/>
+          </p:cNvPicPr>
+          <p:nvPr/>
+        </p:nvPicPr>
+        <p:blipFill>
+          <a:blip r:embed="rId2">
+            <a:extLst>
+              <a:ext uri="{28A0092B-C50C-407E-A947-70E740481C1C}">
+                <a14:useLocalDpi xmlns:a14="http://schemas.microsoft.com/office/drawing/2010/main" val="0"/>
+              </a:ext>
+            </a:extLst>
+          </a:blip>
+          <a:stretch>
+            <a:fillRect/>
+          </a:stretch>
+        </p:blipFill>
+        <p:spPr>
+          <a:xfrm>
+            <a:off x="381000" y="4419600"/>
+            <a:ext cx="8407831" cy="1600200"/>
+          </a:xfrm>
+          <a:prstGeom prst="rect">
+            <a:avLst/>
+          </a:prstGeom>
+        </p:spPr>
+      </p:pic>
     </p:spTree>
     <p:extLst>
       <p:ext uri="{BB962C8B-B14F-4D97-AF65-F5344CB8AC3E}">
-        <p14:creationId xmlns:p14="http://schemas.microsoft.com/office/powerpoint/2010/main" val="272259747"/>
+        <p14:creationId xmlns:p14="http://schemas.microsoft.com/office/powerpoint/2010/main" val="1931021824"/>
       </p:ext>
     </p:extLst>
   </p:cSld>
@@ -30576,8 +30640,8 @@
           <a:lstStyle/>
           <a:p>
             <a:r>
-              <a:rPr lang="en-US" dirty="0" smtClean="0"/>
-              <a:t>Identity</a:t>
+              <a:rPr lang="en-US" dirty="0" err="1" smtClean="0"/>
+              <a:t>Prehending</a:t>
             </a:r>
             <a:endParaRPr lang="en-US" dirty="0"/>
           </a:p>
@@ -30595,50 +30659,74 @@
         </p:nvSpPr>
         <p:spPr>
           <a:xfrm>
-            <a:off x="381000" y="2743200"/>
-            <a:ext cx="4114800" cy="1551194"/>
+            <a:off x="381000" y="1943100"/>
+            <a:ext cx="3276600" cy="3988784"/>
           </a:xfrm>
         </p:spPr>
         <p:txBody>
           <a:bodyPr/>
           <a:lstStyle/>
           <a:p>
-            <a:r>
-              <a:rPr lang="en-US" dirty="0" smtClean="0">
+            <a:pPr marL="339976" lvl="2" indent="-339976">
+              <a:buBlip>
+                <a:blip r:embed="rId2"/>
+              </a:buBlip>
+            </a:pPr>
+            <a:r>
+              <a:rPr lang="en-US" sz="3200" b="1" dirty="0"/>
+              <a:t>The operation </a:t>
+            </a:r>
+            <a:r>
+              <a:rPr lang="en-US" sz="3200" b="1" dirty="0">
+                <a:sym typeface="Symbol" charset="2"/>
+              </a:rPr>
+              <a:t></a:t>
+            </a:r>
+            <a:r>
+              <a:rPr lang="en-US" sz="3200" b="1" dirty="0"/>
+              <a:t>, which we will call “</a:t>
+            </a:r>
+            <a:r>
+              <a:rPr lang="en-US" sz="3200" b="1" dirty="0" err="1"/>
+              <a:t>prehend</a:t>
+            </a:r>
+            <a:r>
+              <a:rPr lang="en-US" sz="3200" b="1" dirty="0"/>
+              <a:t>”, accepts two </a:t>
+            </a:r>
+            <a:r>
+              <a:rPr lang="en-US" sz="3200" b="1" dirty="0" err="1"/>
+              <a:t>prehensions</a:t>
+            </a:r>
+            <a:r>
+              <a:rPr lang="en-US" sz="3200" b="1" dirty="0"/>
+              <a:t> as arguments and produces a third </a:t>
+            </a:r>
+            <a:r>
+              <a:rPr lang="en-US" sz="3200" b="1" dirty="0" err="1" smtClean="0"/>
+              <a:t>prehension</a:t>
+            </a:r>
+            <a:r>
+              <a:rPr lang="en-US" sz="3200" b="1" dirty="0"/>
+              <a:t> </a:t>
+            </a:r>
+            <a:r>
+              <a:rPr lang="en-US" sz="3200" b="1" dirty="0" smtClean="0"/>
+              <a:t>(</a:t>
+            </a:r>
+            <a:r>
+              <a:rPr lang="en-US" sz="3200" b="1" dirty="0" smtClean="0">
                 <a:solidFill>
                   <a:schemeClr val="accent6"/>
                 </a:solidFill>
               </a:rPr>
-              <a:t>Identity</a:t>
-            </a:r>
-            <a:r>
-              <a:rPr lang="en-US" dirty="0"/>
-              <a:t>: Any </a:t>
-            </a:r>
-            <a:r>
-              <a:rPr lang="en-US" dirty="0" err="1"/>
-              <a:t>prehension</a:t>
-            </a:r>
-            <a:r>
-              <a:rPr lang="en-US" dirty="0"/>
-              <a:t> </a:t>
-            </a:r>
-            <a:r>
-              <a:rPr lang="en-US" dirty="0" err="1"/>
-              <a:t>prehending</a:t>
-            </a:r>
-            <a:r>
-              <a:rPr lang="en-US" dirty="0"/>
-              <a:t> the null </a:t>
-            </a:r>
-            <a:r>
-              <a:rPr lang="en-US" dirty="0" err="1"/>
-              <a:t>prehension</a:t>
-            </a:r>
-            <a:r>
-              <a:rPr lang="en-US" dirty="0"/>
-              <a:t> remains unchanged.</a:t>
-            </a:r>
+              <a:t>Closure</a:t>
+            </a:r>
+            <a:r>
+              <a:rPr lang="en-US" sz="3200" b="1" dirty="0" smtClean="0"/>
+              <a:t>).</a:t>
+            </a:r>
+            <a:endParaRPr lang="en-US" sz="3200" b="1" dirty="0"/>
           </a:p>
         </p:txBody>
       </p:sp>
@@ -30652,25 +30740,25 @@
             <p:ph sz="half" idx="2"/>
             <p:extLst>
               <p:ext uri="{D42A27DB-BD31-4B8C-83A1-F6EECF244321}">
-                <p14:modId xmlns:p14="http://schemas.microsoft.com/office/powerpoint/2010/main" val="1399496209"/>
+                <p14:modId xmlns:p14="http://schemas.microsoft.com/office/powerpoint/2010/main" val="1356543855"/>
               </p:ext>
             </p:extLst>
           </p:nvPr>
         </p:nvGraphicFramePr>
         <p:xfrm>
-          <a:off x="4648200" y="1676400"/>
-          <a:ext cx="4114800" cy="4191000"/>
+          <a:off x="4419600" y="1676400"/>
+          <a:ext cx="4343400" cy="4419600"/>
         </p:xfrm>
         <a:graphic>
           <a:graphicData uri="http://schemas.openxmlformats.org/drawingml/2006/diagram">
-            <dgm:relIds xmlns:dgm="http://schemas.openxmlformats.org/drawingml/2006/diagram" xmlns:r="http://schemas.openxmlformats.org/officeDocument/2006/relationships" r:dm="rId2" r:lo="rId3" r:qs="rId4" r:cs="rId5"/>
+            <dgm:relIds xmlns:dgm="http://schemas.openxmlformats.org/drawingml/2006/diagram" xmlns:r="http://schemas.openxmlformats.org/officeDocument/2006/relationships" r:dm="rId3" r:lo="rId4" r:qs="rId5" r:cs="rId6"/>
           </a:graphicData>
         </a:graphic>
       </p:graphicFrame>
     </p:spTree>
     <p:extLst>
       <p:ext uri="{BB962C8B-B14F-4D97-AF65-F5344CB8AC3E}">
-        <p14:creationId xmlns:p14="http://schemas.microsoft.com/office/powerpoint/2010/main" val="1039198004"/>
+        <p14:creationId xmlns:p14="http://schemas.microsoft.com/office/powerpoint/2010/main" val="406889955"/>
       </p:ext>
     </p:extLst>
   </p:cSld>
@@ -30838,8 +30926,8 @@
           <a:lstStyle/>
           <a:p>
             <a:r>
-              <a:rPr lang="en-US" dirty="0" err="1" smtClean="0"/>
-              <a:t>Commutativity</a:t>
+              <a:rPr lang="en-US" dirty="0" smtClean="0"/>
+              <a:t>Associativity</a:t>
             </a:r>
             <a:endParaRPr lang="en-US" dirty="0"/>
           </a:p>
@@ -30857,8 +30945,8 @@
         </p:nvSpPr>
         <p:spPr>
           <a:xfrm>
-            <a:off x="381000" y="2743200"/>
-            <a:ext cx="4114800" cy="1495794"/>
+            <a:off x="381000" y="1676400"/>
+            <a:ext cx="4114800" cy="4062651"/>
           </a:xfrm>
         </p:spPr>
         <p:txBody>
@@ -30866,44 +30954,144 @@
           <a:lstStyle/>
           <a:p>
             <a:r>
-              <a:rPr lang="en-US" sz="3600" b="1" dirty="0" err="1">
-                <a:solidFill>
-                  <a:schemeClr val="accent6"/>
-                </a:solidFill>
-              </a:rPr>
-              <a:t>Commutativity</a:t>
-            </a:r>
-            <a:r>
-              <a:rPr lang="en-US" sz="3600" b="1" dirty="0"/>
-              <a:t>: </a:t>
-            </a:r>
-            <a:r>
-              <a:rPr lang="en-US" sz="3600" dirty="0" smtClean="0"/>
-              <a:t>(</a:t>
-            </a:r>
-            <a:r>
-              <a:rPr lang="en-US" sz="3600" dirty="0"/>
-              <a:t>a </a:t>
-            </a:r>
-            <a:r>
-              <a:rPr lang="en-US" sz="3600" dirty="0">
+              <a:rPr lang="en-US" sz="2400" dirty="0"/>
+              <a:t>(a </a:t>
+            </a:r>
+            <a:r>
+              <a:rPr lang="en-US" sz="2400" dirty="0">
                 <a:sym typeface="Symbol" charset="2"/>
               </a:rPr>
               <a:t></a:t>
             </a:r>
             <a:r>
-              <a:rPr lang="en-US" sz="3600" dirty="0"/>
-              <a:t> b) =  (b </a:t>
-            </a:r>
-            <a:r>
-              <a:rPr lang="en-US" sz="3600" dirty="0">
+              <a:rPr lang="en-US" sz="2400" dirty="0"/>
+              <a:t> b) </a:t>
+            </a:r>
+            <a:r>
+              <a:rPr lang="en-US" sz="2400" dirty="0">
                 <a:sym typeface="Symbol" charset="2"/>
               </a:rPr>
               <a:t></a:t>
             </a:r>
             <a:r>
-              <a:rPr lang="en-US" sz="3600" dirty="0"/>
-              <a:t> a)  for all a and b. </a:t>
+              <a:rPr lang="en-US" sz="2400" dirty="0"/>
+              <a:t> c = a </a:t>
+            </a:r>
+            <a:r>
+              <a:rPr lang="en-US" sz="2400" dirty="0">
+                <a:sym typeface="Symbol" charset="2"/>
+              </a:rPr>
+              <a:t></a:t>
+            </a:r>
+            <a:r>
+              <a:rPr lang="en-US" sz="2400" dirty="0"/>
+              <a:t> (b </a:t>
+            </a:r>
+            <a:r>
+              <a:rPr lang="en-US" sz="2400" dirty="0">
+                <a:sym typeface="Symbol" charset="2"/>
+              </a:rPr>
+              <a:t></a:t>
+            </a:r>
+            <a:r>
+              <a:rPr lang="en-US" sz="2400" dirty="0"/>
+              <a:t> c) for all a, b and c. </a:t>
+            </a:r>
+            <a:endParaRPr lang="en-US" sz="2400" dirty="0" smtClean="0"/>
+          </a:p>
+          <a:p>
+            <a:r>
+              <a:rPr lang="en-US" sz="2400" dirty="0" smtClean="0"/>
+              <a:t>We </a:t>
+            </a:r>
+            <a:r>
+              <a:rPr lang="en-US" sz="2400" dirty="0"/>
+              <a:t>must ensure that, say, a neighborhood can interact with a neighborhood (b </a:t>
+            </a:r>
+            <a:r>
+              <a:rPr lang="en-US" sz="2400" dirty="0">
+                <a:solidFill>
+                  <a:srgbClr val="FFFFFF"/>
+                </a:solidFill>
+                <a:sym typeface="Symbol" charset="2"/>
+              </a:rPr>
+              <a:t></a:t>
+            </a:r>
+            <a:r>
+              <a:rPr lang="en-US" sz="2400" dirty="0" smtClean="0"/>
+              <a:t> </a:t>
+            </a:r>
+            <a:r>
+              <a:rPr lang="en-US" sz="2400" dirty="0"/>
+              <a:t>c), and then with an agent (a </a:t>
+            </a:r>
+            <a:r>
+              <a:rPr lang="en-US" sz="2400" dirty="0">
+                <a:sym typeface="Symbol" charset="2"/>
+              </a:rPr>
+              <a:t></a:t>
+            </a:r>
+            <a:r>
+              <a:rPr lang="en-US" sz="2400" dirty="0" smtClean="0"/>
+              <a:t> </a:t>
+            </a:r>
+            <a:r>
+              <a:rPr lang="en-US" sz="2400" dirty="0"/>
+              <a:t>(b </a:t>
+            </a:r>
+            <a:r>
+              <a:rPr lang="en-US" sz="2400" dirty="0">
+                <a:sym typeface="Symbol" charset="2"/>
+              </a:rPr>
+              <a:t></a:t>
+            </a:r>
+            <a:r>
+              <a:rPr lang="en-US" sz="2400" dirty="0" smtClean="0"/>
+              <a:t> </a:t>
+            </a:r>
+            <a:r>
+              <a:rPr lang="en-US" sz="2400" dirty="0"/>
+              <a:t>c)). Furthermore, this must produce an identical </a:t>
+            </a:r>
+            <a:r>
+              <a:rPr lang="en-US" sz="2400" dirty="0" err="1"/>
+              <a:t>prehension</a:t>
+            </a:r>
+            <a:r>
+              <a:rPr lang="en-US" sz="2400" dirty="0"/>
+              <a:t> to that produced by an agent interacting with one neighborhood and then another one ((a </a:t>
+            </a:r>
+            <a:r>
+              <a:rPr lang="en-US" sz="2400" dirty="0">
+                <a:sym typeface="Symbol" charset="2"/>
+              </a:rPr>
+              <a:t></a:t>
+            </a:r>
+            <a:r>
+              <a:rPr lang="en-US" sz="2400" dirty="0" smtClean="0"/>
+              <a:t> </a:t>
+            </a:r>
+            <a:r>
+              <a:rPr lang="en-US" sz="2400" dirty="0"/>
+              <a:t>b</a:t>
+            </a:r>
+            <a:r>
+              <a:rPr lang="en-US" sz="2400"/>
+              <a:t>) </a:t>
+            </a:r>
+            <a:r>
+              <a:rPr lang="en-US" sz="2400">
+                <a:sym typeface="Symbol" charset="2"/>
+              </a:rPr>
+              <a:t></a:t>
+            </a:r>
+            <a:r>
+              <a:rPr lang="en-US" sz="2400" smtClean="0"/>
+              <a:t> </a:t>
+            </a:r>
+            <a:r>
+              <a:rPr lang="en-US" sz="2400" dirty="0"/>
+              <a:t>c).</a:t>
             </a:r>
           </a:p>
         </p:txBody>
@@ -30918,25 +31106,25 @@
             <p:ph sz="half" idx="2"/>
             <p:extLst>
               <p:ext uri="{D42A27DB-BD31-4B8C-83A1-F6EECF244321}">
-                <p14:modId xmlns:p14="http://schemas.microsoft.com/office/powerpoint/2010/main" val="1181747192"/>
+                <p14:modId xmlns:p14="http://schemas.microsoft.com/office/powerpoint/2010/main" val="1760850255"/>
               </p:ext>
             </p:extLst>
           </p:nvPr>
         </p:nvGraphicFramePr>
         <p:xfrm>
-          <a:off x="4657253" y="1531544"/>
+          <a:off x="4648200" y="1676400"/>
           <a:ext cx="4114800" cy="4191000"/>
         </p:xfrm>
         <a:graphic>
           <a:graphicData uri="http://schemas.openxmlformats.org/drawingml/2006/diagram">
-            <dgm:relIds xmlns:dgm="http://schemas.openxmlformats.org/drawingml/2006/diagram" xmlns:r="http://schemas.openxmlformats.org/officeDocument/2006/relationships" r:dm="rId2" r:lo="rId3" r:qs="rId4" r:cs="rId5"/>
+            <dgm:relIds xmlns:dgm="http://schemas.openxmlformats.org/drawingml/2006/diagram" xmlns:r="http://schemas.openxmlformats.org/officeDocument/2006/relationships" r:dm="rId3" r:lo="rId4" r:qs="rId5" r:cs="rId6"/>
           </a:graphicData>
         </a:graphic>
       </p:graphicFrame>
     </p:spTree>
     <p:extLst>
       <p:ext uri="{BB962C8B-B14F-4D97-AF65-F5344CB8AC3E}">
-        <p14:creationId xmlns:p14="http://schemas.microsoft.com/office/powerpoint/2010/main" val="654603717"/>
+        <p14:creationId xmlns:p14="http://schemas.microsoft.com/office/powerpoint/2010/main" val="272259747"/>
       </p:ext>
     </p:extLst>
   </p:cSld>
@@ -30994,6 +31182,340 @@
           <a:lstStyle/>
           <a:p>
             <a:r>
+              <a:rPr lang="en-US" dirty="0" smtClean="0"/>
+              <a:t>Identity</a:t>
+            </a:r>
+            <a:endParaRPr lang="en-US" dirty="0"/>
+          </a:p>
+        </p:txBody>
+      </p:sp>
+      <p:sp>
+        <p:nvSpPr>
+          <p:cNvPr id="3" name="Content Placeholder 2"/>
+          <p:cNvSpPr>
+            <a:spLocks noGrp="1"/>
+          </p:cNvSpPr>
+          <p:nvPr>
+            <p:ph sz="half" idx="1"/>
+          </p:nvPr>
+        </p:nvSpPr>
+        <p:spPr>
+          <a:xfrm>
+            <a:off x="381000" y="2743200"/>
+            <a:ext cx="4114800" cy="1551194"/>
+          </a:xfrm>
+        </p:spPr>
+        <p:txBody>
+          <a:bodyPr/>
+          <a:lstStyle/>
+          <a:p>
+            <a:r>
+              <a:rPr lang="en-US" dirty="0" smtClean="0">
+                <a:solidFill>
+                  <a:schemeClr val="accent6"/>
+                </a:solidFill>
+              </a:rPr>
+              <a:t>Identity</a:t>
+            </a:r>
+            <a:r>
+              <a:rPr lang="en-US" dirty="0"/>
+              <a:t>: Any </a:t>
+            </a:r>
+            <a:r>
+              <a:rPr lang="en-US" dirty="0" err="1"/>
+              <a:t>prehension</a:t>
+            </a:r>
+            <a:r>
+              <a:rPr lang="en-US" dirty="0"/>
+              <a:t> </a:t>
+            </a:r>
+            <a:r>
+              <a:rPr lang="en-US" dirty="0" err="1"/>
+              <a:t>prehending</a:t>
+            </a:r>
+            <a:r>
+              <a:rPr lang="en-US" dirty="0"/>
+              <a:t> the null </a:t>
+            </a:r>
+            <a:r>
+              <a:rPr lang="en-US" dirty="0" err="1"/>
+              <a:t>prehension</a:t>
+            </a:r>
+            <a:r>
+              <a:rPr lang="en-US" dirty="0"/>
+              <a:t> remains unchanged.</a:t>
+            </a:r>
+          </a:p>
+        </p:txBody>
+      </p:sp>
+      <p:graphicFrame>
+        <p:nvGraphicFramePr>
+          <p:cNvPr id="5" name="Content Placeholder 4"/>
+          <p:cNvGraphicFramePr>
+            <a:graphicFrameLocks noGrp="1"/>
+          </p:cNvGraphicFramePr>
+          <p:nvPr>
+            <p:ph sz="half" idx="2"/>
+            <p:extLst>
+              <p:ext uri="{D42A27DB-BD31-4B8C-83A1-F6EECF244321}">
+                <p14:modId xmlns:p14="http://schemas.microsoft.com/office/powerpoint/2010/main" val="1399496209"/>
+              </p:ext>
+            </p:extLst>
+          </p:nvPr>
+        </p:nvGraphicFramePr>
+        <p:xfrm>
+          <a:off x="4648200" y="1676400"/>
+          <a:ext cx="4114800" cy="4191000"/>
+        </p:xfrm>
+        <a:graphic>
+          <a:graphicData uri="http://schemas.openxmlformats.org/drawingml/2006/diagram">
+            <dgm:relIds xmlns:dgm="http://schemas.openxmlformats.org/drawingml/2006/diagram" xmlns:r="http://schemas.openxmlformats.org/officeDocument/2006/relationships" r:dm="rId2" r:lo="rId3" r:qs="rId4" r:cs="rId5"/>
+          </a:graphicData>
+        </a:graphic>
+      </p:graphicFrame>
+    </p:spTree>
+    <p:extLst>
+      <p:ext uri="{BB962C8B-B14F-4D97-AF65-F5344CB8AC3E}">
+        <p14:creationId xmlns:p14="http://schemas.microsoft.com/office/powerpoint/2010/main" val="1039198004"/>
+      </p:ext>
+    </p:extLst>
+  </p:cSld>
+  <p:clrMapOvr>
+    <a:masterClrMapping/>
+  </p:clrMapOvr>
+  <p:transition>
+    <p:fade/>
+  </p:transition>
+  <p:timing>
+    <p:tnLst>
+      <p:par>
+        <p:cTn id="1" dur="indefinite" restart="never" nodeType="tmRoot"/>
+      </p:par>
+    </p:tnLst>
+  </p:timing>
+</p:sld>
+</file>
+
+<file path=ppt/slides/slide22.xml><?xml version="1.0" encoding="utf-8"?>
+<p:sld xmlns:a="http://schemas.openxmlformats.org/drawingml/2006/main" xmlns:r="http://schemas.openxmlformats.org/officeDocument/2006/relationships" xmlns:p="http://schemas.openxmlformats.org/presentationml/2006/main">
+  <p:cSld>
+    <p:spTree>
+      <p:nvGrpSpPr>
+        <p:cNvPr id="1" name=""/>
+        <p:cNvGrpSpPr/>
+        <p:nvPr/>
+      </p:nvGrpSpPr>
+      <p:grpSpPr>
+        <a:xfrm>
+          <a:off x="0" y="0"/>
+          <a:ext cx="0" cy="0"/>
+          <a:chOff x="0" y="0"/>
+          <a:chExt cx="0" cy="0"/>
+        </a:xfrm>
+      </p:grpSpPr>
+      <p:sp>
+        <p:nvSpPr>
+          <p:cNvPr id="2" name="Title 1"/>
+          <p:cNvSpPr>
+            <a:spLocks noGrp="1"/>
+          </p:cNvSpPr>
+          <p:nvPr>
+            <p:ph type="title"/>
+          </p:nvPr>
+        </p:nvSpPr>
+        <p:spPr>
+          <a:xfrm>
+            <a:off x="381000" y="230188"/>
+            <a:ext cx="8382000" cy="664797"/>
+          </a:xfrm>
+        </p:spPr>
+        <p:txBody>
+          <a:bodyPr/>
+          <a:lstStyle/>
+          <a:p>
+            <a:r>
+              <a:rPr lang="en-US" dirty="0" err="1" smtClean="0"/>
+              <a:t>Commutativity</a:t>
+            </a:r>
+            <a:endParaRPr lang="en-US" dirty="0"/>
+          </a:p>
+        </p:txBody>
+      </p:sp>
+      <p:sp>
+        <p:nvSpPr>
+          <p:cNvPr id="3" name="Content Placeholder 2"/>
+          <p:cNvSpPr>
+            <a:spLocks noGrp="1"/>
+          </p:cNvSpPr>
+          <p:nvPr>
+            <p:ph sz="half" idx="1"/>
+          </p:nvPr>
+        </p:nvSpPr>
+        <p:spPr>
+          <a:xfrm>
+            <a:off x="381000" y="2438400"/>
+            <a:ext cx="4114800" cy="3102388"/>
+          </a:xfrm>
+        </p:spPr>
+        <p:txBody>
+          <a:bodyPr/>
+          <a:lstStyle/>
+          <a:p>
+            <a:r>
+              <a:rPr lang="en-US" sz="3600" b="1" dirty="0" smtClean="0">
+                <a:solidFill>
+                  <a:schemeClr val="accent6"/>
+                </a:solidFill>
+              </a:rPr>
+              <a:t>For </a:t>
+            </a:r>
+            <a:r>
+              <a:rPr lang="en-US" sz="3600" b="1" smtClean="0">
+                <a:solidFill>
+                  <a:schemeClr val="accent6"/>
+                </a:solidFill>
+              </a:rPr>
+              <a:t>Abelian structures, </a:t>
+            </a:r>
+            <a:r>
+              <a:rPr lang="en-US" sz="3600" b="1" dirty="0" smtClean="0">
+                <a:solidFill>
+                  <a:schemeClr val="accent6"/>
+                </a:solidFill>
+              </a:rPr>
+              <a:t>we need:</a:t>
+            </a:r>
+          </a:p>
+          <a:p>
+            <a:r>
+              <a:rPr lang="en-US" sz="3600" b="1" dirty="0" err="1" smtClean="0">
+                <a:solidFill>
+                  <a:schemeClr val="accent6"/>
+                </a:solidFill>
+              </a:rPr>
+              <a:t>Commutativity</a:t>
+            </a:r>
+            <a:r>
+              <a:rPr lang="en-US" sz="3600" b="1" dirty="0"/>
+              <a:t>: </a:t>
+            </a:r>
+            <a:r>
+              <a:rPr lang="en-US" sz="3600" dirty="0" smtClean="0"/>
+              <a:t>(</a:t>
+            </a:r>
+            <a:r>
+              <a:rPr lang="en-US" sz="3600" dirty="0"/>
+              <a:t>a </a:t>
+            </a:r>
+            <a:r>
+              <a:rPr lang="en-US" sz="3600" dirty="0">
+                <a:sym typeface="Symbol" charset="2"/>
+              </a:rPr>
+              <a:t></a:t>
+            </a:r>
+            <a:r>
+              <a:rPr lang="en-US" sz="3600" dirty="0"/>
+              <a:t> b) =  (b </a:t>
+            </a:r>
+            <a:r>
+              <a:rPr lang="en-US" sz="3600" dirty="0">
+                <a:sym typeface="Symbol" charset="2"/>
+              </a:rPr>
+              <a:t></a:t>
+            </a:r>
+            <a:r>
+              <a:rPr lang="en-US" sz="3600" dirty="0"/>
+              <a:t> a)  for all a and b. </a:t>
+            </a:r>
+          </a:p>
+        </p:txBody>
+      </p:sp>
+      <p:graphicFrame>
+        <p:nvGraphicFramePr>
+          <p:cNvPr id="5" name="Content Placeholder 4"/>
+          <p:cNvGraphicFramePr>
+            <a:graphicFrameLocks noGrp="1"/>
+          </p:cNvGraphicFramePr>
+          <p:nvPr>
+            <p:ph sz="half" idx="2"/>
+            <p:extLst>
+              <p:ext uri="{D42A27DB-BD31-4B8C-83A1-F6EECF244321}">
+                <p14:modId xmlns:p14="http://schemas.microsoft.com/office/powerpoint/2010/main" val="1181747192"/>
+              </p:ext>
+            </p:extLst>
+          </p:nvPr>
+        </p:nvGraphicFramePr>
+        <p:xfrm>
+          <a:off x="4657253" y="1531544"/>
+          <a:ext cx="4114800" cy="4191000"/>
+        </p:xfrm>
+        <a:graphic>
+          <a:graphicData uri="http://schemas.openxmlformats.org/drawingml/2006/diagram">
+            <dgm:relIds xmlns:dgm="http://schemas.openxmlformats.org/drawingml/2006/diagram" xmlns:r="http://schemas.openxmlformats.org/officeDocument/2006/relationships" r:dm="rId2" r:lo="rId3" r:qs="rId4" r:cs="rId5"/>
+          </a:graphicData>
+        </a:graphic>
+      </p:graphicFrame>
+    </p:spTree>
+    <p:extLst>
+      <p:ext uri="{BB962C8B-B14F-4D97-AF65-F5344CB8AC3E}">
+        <p14:creationId xmlns:p14="http://schemas.microsoft.com/office/powerpoint/2010/main" val="654603717"/>
+      </p:ext>
+    </p:extLst>
+  </p:cSld>
+  <p:clrMapOvr>
+    <a:masterClrMapping/>
+  </p:clrMapOvr>
+  <p:transition>
+    <p:fade/>
+  </p:transition>
+  <p:timing>
+    <p:tnLst>
+      <p:par>
+        <p:cTn id="1" dur="indefinite" restart="never" nodeType="tmRoot"/>
+      </p:par>
+    </p:tnLst>
+  </p:timing>
+</p:sld>
+</file>
+
+<file path=ppt/slides/slide23.xml><?xml version="1.0" encoding="utf-8"?>
+<p:sld xmlns:a="http://schemas.openxmlformats.org/drawingml/2006/main" xmlns:r="http://schemas.openxmlformats.org/officeDocument/2006/relationships" xmlns:p="http://schemas.openxmlformats.org/presentationml/2006/main">
+  <p:cSld>
+    <p:spTree>
+      <p:nvGrpSpPr>
+        <p:cNvPr id="1" name=""/>
+        <p:cNvGrpSpPr/>
+        <p:nvPr/>
+      </p:nvGrpSpPr>
+      <p:grpSpPr>
+        <a:xfrm>
+          <a:off x="0" y="0"/>
+          <a:ext cx="0" cy="0"/>
+          <a:chOff x="0" y="0"/>
+          <a:chExt cx="0" cy="0"/>
+        </a:xfrm>
+      </p:grpSpPr>
+      <p:sp>
+        <p:nvSpPr>
+          <p:cNvPr id="2" name="Title 1"/>
+          <p:cNvSpPr>
+            <a:spLocks noGrp="1"/>
+          </p:cNvSpPr>
+          <p:nvPr>
+            <p:ph type="title"/>
+          </p:nvPr>
+        </p:nvSpPr>
+        <p:spPr>
+          <a:xfrm>
+            <a:off x="381000" y="230188"/>
+            <a:ext cx="8382000" cy="664797"/>
+          </a:xfrm>
+        </p:spPr>
+        <p:txBody>
+          <a:bodyPr/>
+          <a:lstStyle/>
+          <a:p>
+            <a:r>
               <a:rPr lang="en-US" dirty="0" err="1" smtClean="0"/>
               <a:t>Invertability</a:t>
             </a:r>
@@ -31014,12 +31536,23 @@
         <p:spPr>
           <a:xfrm>
             <a:off x="228600" y="2205317"/>
-            <a:ext cx="4114800" cy="3133165"/>
+            <a:ext cx="4114800" cy="3674852"/>
           </a:xfrm>
         </p:spPr>
         <p:txBody>
           <a:bodyPr/>
           <a:lstStyle/>
+          <a:p>
+            <a:pPr marL="339976" lvl="4" indent="-339976">
+              <a:buBlip>
+                <a:blip r:embed="rId2"/>
+              </a:buBlip>
+            </a:pPr>
+            <a:r>
+              <a:rPr lang="en-US" sz="3200" dirty="0" smtClean="0"/>
+              <a:t>Modules need:</a:t>
+            </a:r>
+          </a:p>
           <a:p>
             <a:pPr marL="339976" lvl="4" indent="-339976">
               <a:buBlip>
@@ -31112,7 +31645,7 @@
 </p:sld>
 </file>
 
-<file path=ppt/slides/slide22.xml><?xml version="1.0" encoding="utf-8"?>
+<file path=ppt/slides/slide24.xml><?xml version="1.0" encoding="utf-8"?>
 <p:sld xmlns:a="http://schemas.openxmlformats.org/drawingml/2006/main" xmlns:r="http://schemas.openxmlformats.org/officeDocument/2006/relationships" xmlns:p="http://schemas.openxmlformats.org/presentationml/2006/main">
   <p:cSld>
     <p:spTree>
@@ -31319,7 +31852,7 @@
 </p:sld>
 </file>
 
-<file path=ppt/slides/slide23.xml><?xml version="1.0" encoding="utf-8"?>
+<file path=ppt/slides/slide25.xml><?xml version="1.0" encoding="utf-8"?>
 <p:sld xmlns:a="http://schemas.openxmlformats.org/drawingml/2006/main" xmlns:r="http://schemas.openxmlformats.org/officeDocument/2006/relationships" xmlns:p="http://schemas.openxmlformats.org/presentationml/2006/main">
   <p:cSld>
     <p:spTree>
@@ -31463,7 +31996,7 @@
 </p:sld>
 </file>
 
-<file path=ppt/slides/slide24.xml><?xml version="1.0" encoding="utf-8"?>
+<file path=ppt/slides/slide26.xml><?xml version="1.0" encoding="utf-8"?>
 <p:sld xmlns:a="http://schemas.openxmlformats.org/drawingml/2006/main" xmlns:r="http://schemas.openxmlformats.org/officeDocument/2006/relationships" xmlns:p="http://schemas.openxmlformats.org/presentationml/2006/main">
   <p:cSld>
     <p:spTree>
@@ -31639,7 +32172,7 @@
 </p:sld>
 </file>
 
-<file path=ppt/slides/slide25.xml><?xml version="1.0" encoding="utf-8"?>
+<file path=ppt/slides/slide27.xml><?xml version="1.0" encoding="utf-8"?>
 <p:sld xmlns:a="http://schemas.openxmlformats.org/drawingml/2006/main" xmlns:r="http://schemas.openxmlformats.org/officeDocument/2006/relationships" xmlns:p="http://schemas.openxmlformats.org/presentationml/2006/main">
   <p:cSld>
     <p:spTree>
@@ -31795,7 +32328,7 @@
 </p:sld>
 </file>
 
-<file path=ppt/slides/slide26.xml><?xml version="1.0" encoding="utf-8"?>
+<file path=ppt/slides/slide28.xml><?xml version="1.0" encoding="utf-8"?>
 <p:sld xmlns:a="http://schemas.openxmlformats.org/drawingml/2006/main" xmlns:r="http://schemas.openxmlformats.org/officeDocument/2006/relationships" xmlns:p="http://schemas.openxmlformats.org/presentationml/2006/main">
   <p:cSld>
     <p:spTree>
@@ -31930,7 +32463,7 @@
 </p:sld>
 </file>
 
-<file path=ppt/slides/slide27.xml><?xml version="1.0" encoding="utf-8"?>
+<file path=ppt/slides/slide29.xml><?xml version="1.0" encoding="utf-8"?>
 <p:sld xmlns:a="http://schemas.openxmlformats.org/drawingml/2006/main" xmlns:r="http://schemas.openxmlformats.org/officeDocument/2006/relationships" xmlns:p="http://schemas.openxmlformats.org/presentationml/2006/main">
   <p:cSld>
     <p:spTree>
@@ -32064,7 +32597,246 @@
 </p:sld>
 </file>
 
-<file path=ppt/slides/slide28.xml><?xml version="1.0" encoding="utf-8"?>
+<file path=ppt/slides/slide3.xml><?xml version="1.0" encoding="utf-8"?>
+<p:sld xmlns:a="http://schemas.openxmlformats.org/drawingml/2006/main" xmlns:r="http://schemas.openxmlformats.org/officeDocument/2006/relationships" xmlns:p="http://schemas.openxmlformats.org/presentationml/2006/main">
+  <p:cSld>
+    <p:spTree>
+      <p:nvGrpSpPr>
+        <p:cNvPr id="1" name=""/>
+        <p:cNvGrpSpPr/>
+        <p:nvPr/>
+      </p:nvGrpSpPr>
+      <p:grpSpPr>
+        <a:xfrm>
+          <a:off x="0" y="0"/>
+          <a:ext cx="0" cy="0"/>
+          <a:chOff x="0" y="0"/>
+          <a:chExt cx="0" cy="0"/>
+        </a:xfrm>
+      </p:grpSpPr>
+      <p:sp>
+        <p:nvSpPr>
+          <p:cNvPr id="2" name="Title 1"/>
+          <p:cNvSpPr>
+            <a:spLocks noGrp="1"/>
+          </p:cNvSpPr>
+          <p:nvPr>
+            <p:ph type="title"/>
+          </p:nvPr>
+        </p:nvSpPr>
+        <p:spPr>
+          <a:xfrm>
+            <a:off x="381000" y="230188"/>
+            <a:ext cx="8382000" cy="664797"/>
+          </a:xfrm>
+        </p:spPr>
+        <p:txBody>
+          <a:bodyPr/>
+          <a:lstStyle/>
+          <a:p>
+            <a:r>
+              <a:rPr lang="en-US" dirty="0" smtClean="0"/>
+              <a:t>Python</a:t>
+            </a:r>
+            <a:endParaRPr lang="en-US" dirty="0"/>
+          </a:p>
+        </p:txBody>
+      </p:sp>
+      <p:sp>
+        <p:nvSpPr>
+          <p:cNvPr id="3" name="Text Placeholder 2"/>
+          <p:cNvSpPr>
+            <a:spLocks noGrp="1"/>
+          </p:cNvSpPr>
+          <p:nvPr>
+            <p:ph type="body" sz="quarter" idx="10"/>
+          </p:nvPr>
+        </p:nvSpPr>
+        <p:spPr>
+          <a:xfrm>
+            <a:off x="417214" y="1600200"/>
+            <a:ext cx="8382000" cy="1828800"/>
+          </a:xfrm>
+        </p:spPr>
+        <p:txBody>
+          <a:bodyPr/>
+          <a:lstStyle/>
+          <a:p>
+            <a:r>
+              <a:rPr lang="en-US" sz="3600" dirty="0" smtClean="0"/>
+              <a:t>A great generic programming language!</a:t>
+            </a:r>
+          </a:p>
+          <a:p>
+            <a:r>
+              <a:rPr lang="en-US" sz="3600" dirty="0" smtClean="0"/>
+              <a:t>Don’t repeat yourself</a:t>
+            </a:r>
+          </a:p>
+          <a:p>
+            <a:r>
+              <a:rPr lang="en-US" sz="3600" dirty="0"/>
+              <a:t>Duck typing</a:t>
+            </a:r>
+          </a:p>
+          <a:p>
+            <a:endParaRPr lang="en-US" sz="3600" dirty="0"/>
+          </a:p>
+        </p:txBody>
+      </p:sp>
+      <p:pic>
+        <p:nvPicPr>
+          <p:cNvPr id="5" name="Picture 4"/>
+          <p:cNvPicPr>
+            <a:picLocks noChangeAspect="1"/>
+          </p:cNvPicPr>
+          <p:nvPr/>
+        </p:nvPicPr>
+        <p:blipFill>
+          <a:blip r:embed="rId2">
+            <a:extLst>
+              <a:ext uri="{28A0092B-C50C-407E-A947-70E740481C1C}">
+                <a14:useLocalDpi xmlns:a14="http://schemas.microsoft.com/office/drawing/2010/main" val="0"/>
+              </a:ext>
+            </a:extLst>
+          </a:blip>
+          <a:stretch>
+            <a:fillRect/>
+          </a:stretch>
+        </p:blipFill>
+        <p:spPr>
+          <a:xfrm>
+            <a:off x="4038600" y="3124200"/>
+            <a:ext cx="4556125" cy="3258362"/>
+          </a:xfrm>
+          <a:prstGeom prst="rect">
+            <a:avLst/>
+          </a:prstGeom>
+        </p:spPr>
+      </p:pic>
+    </p:spTree>
+    <p:extLst>
+      <p:ext uri="{BB962C8B-B14F-4D97-AF65-F5344CB8AC3E}">
+        <p14:creationId xmlns:p14="http://schemas.microsoft.com/office/powerpoint/2010/main" val="334257492"/>
+      </p:ext>
+    </p:extLst>
+  </p:cSld>
+  <p:clrMapOvr>
+    <a:masterClrMapping/>
+  </p:clrMapOvr>
+  <p:transition>
+    <p:fade/>
+  </p:transition>
+  <p:timing>
+    <p:tnLst>
+      <p:par>
+        <p:cTn id="1" dur="indefinite" restart="never" nodeType="tmRoot">
+          <p:childTnLst>
+            <p:seq concurrent="1" nextAc="seek">
+              <p:cTn id="2" dur="indefinite" nodeType="mainSeq">
+                <p:childTnLst>
+                  <p:par>
+                    <p:cTn id="3" fill="hold">
+                      <p:stCondLst>
+                        <p:cond delay="indefinite"/>
+                      </p:stCondLst>
+                      <p:childTnLst>
+                        <p:par>
+                          <p:cTn id="4" fill="hold">
+                            <p:stCondLst>
+                              <p:cond delay="0"/>
+                            </p:stCondLst>
+                            <p:childTnLst>
+                              <p:par>
+                                <p:cTn id="5" presetID="12" presetClass="entr" presetSubtype="4" fill="hold" nodeType="clickEffect">
+                                  <p:stCondLst>
+                                    <p:cond delay="0"/>
+                                  </p:stCondLst>
+                                  <p:childTnLst>
+                                    <p:set>
+                                      <p:cBhvr>
+                                        <p:cTn id="6" dur="1" fill="hold">
+                                          <p:stCondLst>
+                                            <p:cond delay="0"/>
+                                          </p:stCondLst>
+                                        </p:cTn>
+                                        <p:tgtEl>
+                                          <p:spTgt spid="5"/>
+                                        </p:tgtEl>
+                                        <p:attrNameLst>
+                                          <p:attrName>style.visibility</p:attrName>
+                                        </p:attrNameLst>
+                                      </p:cBhvr>
+                                      <p:to>
+                                        <p:strVal val="visible"/>
+                                      </p:to>
+                                    </p:set>
+                                    <p:anim calcmode="lin" valueType="num">
+                                      <p:cBhvr additive="base">
+                                        <p:cTn id="7" dur="500"/>
+                                        <p:tgtEl>
+                                          <p:spTgt spid="5"/>
+                                        </p:tgtEl>
+                                        <p:attrNameLst>
+                                          <p:attrName>ppt_y</p:attrName>
+                                        </p:attrNameLst>
+                                      </p:cBhvr>
+                                      <p:tavLst>
+                                        <p:tav tm="0">
+                                          <p:val>
+                                            <p:strVal val="#ppt_y+#ppt_h*1.125000"/>
+                                          </p:val>
+                                        </p:tav>
+                                        <p:tav tm="100000">
+                                          <p:val>
+                                            <p:strVal val="#ppt_y"/>
+                                          </p:val>
+                                        </p:tav>
+                                      </p:tavLst>
+                                    </p:anim>
+                                    <p:animEffect transition="in" filter="wipe(up)">
+                                      <p:cBhvr>
+                                        <p:cTn id="8" dur="500"/>
+                                        <p:tgtEl>
+                                          <p:spTgt spid="5"/>
+                                        </p:tgtEl>
+                                      </p:cBhvr>
+                                    </p:animEffect>
+                                  </p:childTnLst>
+                                </p:cTn>
+                              </p:par>
+                            </p:childTnLst>
+                          </p:cTn>
+                        </p:par>
+                      </p:childTnLst>
+                    </p:cTn>
+                  </p:par>
+                </p:childTnLst>
+              </p:cTn>
+              <p:prevCondLst>
+                <p:cond evt="onPrev" delay="0">
+                  <p:tgtEl>
+                    <p:sldTgt/>
+                  </p:tgtEl>
+                </p:cond>
+              </p:prevCondLst>
+              <p:nextCondLst>
+                <p:cond evt="onNext" delay="0">
+                  <p:tgtEl>
+                    <p:sldTgt/>
+                  </p:tgtEl>
+                </p:cond>
+              </p:nextCondLst>
+            </p:seq>
+          </p:childTnLst>
+        </p:cTn>
+      </p:par>
+    </p:tnLst>
+  </p:timing>
+</p:sld>
+</file>
+
+<file path=ppt/slides/slide30.xml><?xml version="1.0" encoding="utf-8"?>
 <p:sld xmlns:a="http://schemas.openxmlformats.org/drawingml/2006/main" xmlns:r="http://schemas.openxmlformats.org/officeDocument/2006/relationships" xmlns:p="http://schemas.openxmlformats.org/presentationml/2006/main">
   <p:cSld>
     <p:spTree>
@@ -32209,7 +32981,7 @@
 </p:sld>
 </file>
 
-<file path=ppt/slides/slide29.xml><?xml version="1.0" encoding="utf-8"?>
+<file path=ppt/slides/slide31.xml><?xml version="1.0" encoding="utf-8"?>
 <p:sld xmlns:a="http://schemas.openxmlformats.org/drawingml/2006/main" xmlns:r="http://schemas.openxmlformats.org/officeDocument/2006/relationships" xmlns:p="http://schemas.openxmlformats.org/presentationml/2006/main">
   <p:cSld>
     <p:spTree>
@@ -32267,7 +33039,7 @@
         <p:spPr>
           <a:xfrm>
             <a:off x="524302" y="1143000"/>
-            <a:ext cx="8219364" cy="1772015"/>
+            <a:ext cx="8219364" cy="1249573"/>
           </a:xfrm>
         </p:spPr>
         <p:txBody>
@@ -32280,13 +33052,37 @@
             </a:r>
             <a:r>
               <a:rPr lang="en-US" dirty="0" smtClean="0"/>
-              <a:t> are a vector space in the base class.</a:t>
+              <a:t> are a vector space in </a:t>
+            </a:r>
+            <a:r>
+              <a:rPr lang="en-US" dirty="0" smtClean="0"/>
+              <a:t>one</a:t>
+            </a:r>
+            <a:r>
+              <a:rPr lang="en-US" dirty="0" smtClean="0"/>
+              <a:t> </a:t>
+            </a:r>
+            <a:r>
+              <a:rPr lang="en-US" dirty="0" smtClean="0"/>
+              <a:t>class.</a:t>
             </a:r>
           </a:p>
           <a:p>
             <a:r>
               <a:rPr lang="en-US" dirty="0" smtClean="0"/>
-              <a:t>However, any other implementation in which the module axioms are true can be sub-classed.</a:t>
+              <a:t>However, any other implementation in which the </a:t>
+            </a:r>
+            <a:r>
+              <a:rPr lang="en-US" dirty="0" smtClean="0"/>
+              <a:t>vector-space</a:t>
+            </a:r>
+            <a:r>
+              <a:rPr lang="en-US" dirty="0" smtClean="0"/>
+              <a:t> </a:t>
+            </a:r>
+            <a:r>
+              <a:rPr lang="en-US" dirty="0" smtClean="0"/>
+              <a:t>axioms are true can be sub-classed.</a:t>
             </a:r>
             <a:endParaRPr lang="en-US" dirty="0"/>
           </a:p>
@@ -32316,7 +33112,7 @@
         </p:blipFill>
         <p:spPr>
           <a:xfrm>
-            <a:off x="1030307" y="2914650"/>
+            <a:off x="992207" y="3276600"/>
             <a:ext cx="7159586" cy="3116263"/>
           </a:xfrm>
         </p:spPr>
@@ -32325,449 +33121,6 @@
     <p:extLst>
       <p:ext uri="{BB962C8B-B14F-4D97-AF65-F5344CB8AC3E}">
         <p14:creationId xmlns:p14="http://schemas.microsoft.com/office/powerpoint/2010/main" val="1408983316"/>
-      </p:ext>
-    </p:extLst>
-  </p:cSld>
-  <p:clrMapOvr>
-    <a:masterClrMapping/>
-  </p:clrMapOvr>
-  <p:transition>
-    <p:fade/>
-  </p:transition>
-</p:sld>
-</file>
-
-<file path=ppt/slides/slide3.xml><?xml version="1.0" encoding="utf-8"?>
-<p:sld xmlns:a="http://schemas.openxmlformats.org/drawingml/2006/main" xmlns:r="http://schemas.openxmlformats.org/officeDocument/2006/relationships" xmlns:p="http://schemas.openxmlformats.org/presentationml/2006/main">
-  <p:cSld>
-    <p:spTree>
-      <p:nvGrpSpPr>
-        <p:cNvPr id="1" name=""/>
-        <p:cNvGrpSpPr/>
-        <p:nvPr/>
-      </p:nvGrpSpPr>
-      <p:grpSpPr>
-        <a:xfrm>
-          <a:off x="0" y="0"/>
-          <a:ext cx="0" cy="0"/>
-          <a:chOff x="0" y="0"/>
-          <a:chExt cx="0" cy="0"/>
-        </a:xfrm>
-      </p:grpSpPr>
-      <p:sp>
-        <p:nvSpPr>
-          <p:cNvPr id="2" name="Title 1"/>
-          <p:cNvSpPr>
-            <a:spLocks noGrp="1"/>
-          </p:cNvSpPr>
-          <p:nvPr>
-            <p:ph type="title"/>
-          </p:nvPr>
-        </p:nvSpPr>
-        <p:spPr>
-          <a:xfrm>
-            <a:off x="381000" y="230188"/>
-            <a:ext cx="8382000" cy="664797"/>
-          </a:xfrm>
-        </p:spPr>
-        <p:txBody>
-          <a:bodyPr/>
-          <a:lstStyle/>
-          <a:p>
-            <a:r>
-              <a:rPr lang="en-US" dirty="0" smtClean="0"/>
-              <a:t>Python</a:t>
-            </a:r>
-            <a:endParaRPr lang="en-US" dirty="0"/>
-          </a:p>
-        </p:txBody>
-      </p:sp>
-      <p:sp>
-        <p:nvSpPr>
-          <p:cNvPr id="3" name="Text Placeholder 2"/>
-          <p:cNvSpPr>
-            <a:spLocks noGrp="1"/>
-          </p:cNvSpPr>
-          <p:nvPr>
-            <p:ph type="body" sz="quarter" idx="10"/>
-          </p:nvPr>
-        </p:nvSpPr>
-        <p:spPr>
-          <a:xfrm>
-            <a:off x="417214" y="1600200"/>
-            <a:ext cx="8382000" cy="1828800"/>
-          </a:xfrm>
-        </p:spPr>
-        <p:txBody>
-          <a:bodyPr/>
-          <a:lstStyle/>
-          <a:p>
-            <a:r>
-              <a:rPr lang="en-US" sz="3600" dirty="0" smtClean="0"/>
-              <a:t>A great generic programming language!</a:t>
-            </a:r>
-          </a:p>
-          <a:p>
-            <a:r>
-              <a:rPr lang="en-US" sz="3600" dirty="0" smtClean="0"/>
-              <a:t>Don’t repeat yourself</a:t>
-            </a:r>
-          </a:p>
-          <a:p>
-            <a:r>
-              <a:rPr lang="en-US" sz="3600" dirty="0"/>
-              <a:t>Duck typing</a:t>
-            </a:r>
-          </a:p>
-          <a:p>
-            <a:endParaRPr lang="en-US" sz="3600" dirty="0"/>
-          </a:p>
-        </p:txBody>
-      </p:sp>
-      <p:pic>
-        <p:nvPicPr>
-          <p:cNvPr id="5" name="Picture 4"/>
-          <p:cNvPicPr>
-            <a:picLocks noChangeAspect="1"/>
-          </p:cNvPicPr>
-          <p:nvPr/>
-        </p:nvPicPr>
-        <p:blipFill>
-          <a:blip r:embed="rId2">
-            <a:extLst>
-              <a:ext uri="{28A0092B-C50C-407E-A947-70E740481C1C}">
-                <a14:useLocalDpi xmlns:a14="http://schemas.microsoft.com/office/drawing/2010/main" val="0"/>
-              </a:ext>
-            </a:extLst>
-          </a:blip>
-          <a:stretch>
-            <a:fillRect/>
-          </a:stretch>
-        </p:blipFill>
-        <p:spPr>
-          <a:xfrm>
-            <a:off x="4038600" y="3124200"/>
-            <a:ext cx="4556125" cy="3258362"/>
-          </a:xfrm>
-          <a:prstGeom prst="rect">
-            <a:avLst/>
-          </a:prstGeom>
-        </p:spPr>
-      </p:pic>
-    </p:spTree>
-    <p:extLst>
-      <p:ext uri="{BB962C8B-B14F-4D97-AF65-F5344CB8AC3E}">
-        <p14:creationId xmlns:p14="http://schemas.microsoft.com/office/powerpoint/2010/main" val="334257492"/>
-      </p:ext>
-    </p:extLst>
-  </p:cSld>
-  <p:clrMapOvr>
-    <a:masterClrMapping/>
-  </p:clrMapOvr>
-  <p:transition>
-    <p:fade/>
-  </p:transition>
-</p:sld>
-</file>
-
-<file path=ppt/slides/slide30.xml><?xml version="1.0" encoding="utf-8"?>
-<p:sld xmlns:a="http://schemas.openxmlformats.org/drawingml/2006/main" xmlns:r="http://schemas.openxmlformats.org/officeDocument/2006/relationships" xmlns:p="http://schemas.openxmlformats.org/presentationml/2006/main">
-  <p:cSld>
-    <p:spTree>
-      <p:nvGrpSpPr>
-        <p:cNvPr id="1" name=""/>
-        <p:cNvGrpSpPr/>
-        <p:nvPr/>
-      </p:nvGrpSpPr>
-      <p:grpSpPr>
-        <a:xfrm>
-          <a:off x="0" y="0"/>
-          <a:ext cx="0" cy="0"/>
-          <a:chOff x="0" y="0"/>
-          <a:chExt cx="0" cy="0"/>
-        </a:xfrm>
-      </p:grpSpPr>
-      <p:sp>
-        <p:nvSpPr>
-          <p:cNvPr id="2" name="Title 1"/>
-          <p:cNvSpPr>
-            <a:spLocks noGrp="1"/>
-          </p:cNvSpPr>
-          <p:nvPr>
-            <p:ph type="title"/>
-          </p:nvPr>
-        </p:nvSpPr>
-        <p:spPr>
-          <a:xfrm>
-            <a:off x="381000" y="230188"/>
-            <a:ext cx="8153400" cy="677108"/>
-          </a:xfrm>
-        </p:spPr>
-        <p:txBody>
-          <a:bodyPr/>
-          <a:lstStyle/>
-          <a:p>
-            <a:r>
-              <a:rPr lang="en-US" dirty="0" smtClean="0"/>
-              <a:t>Final note</a:t>
-            </a:r>
-            <a:endParaRPr lang="en-US" dirty="0"/>
-          </a:p>
-        </p:txBody>
-      </p:sp>
-      <p:sp>
-        <p:nvSpPr>
-          <p:cNvPr id="3" name="Text Placeholder 2"/>
-          <p:cNvSpPr>
-            <a:spLocks noGrp="1"/>
-          </p:cNvSpPr>
-          <p:nvPr>
-            <p:ph type="body" sz="quarter" idx="10"/>
-          </p:nvPr>
-        </p:nvSpPr>
-        <p:spPr>
-          <a:xfrm>
-            <a:off x="381000" y="1371600"/>
-            <a:ext cx="8382000" cy="1661993"/>
-          </a:xfrm>
-        </p:spPr>
-        <p:txBody>
-          <a:bodyPr/>
-          <a:lstStyle/>
-          <a:p>
-            <a:r>
-              <a:rPr lang="en-US" sz="4000" dirty="0" smtClean="0"/>
-              <a:t>Contributors </a:t>
-            </a:r>
-            <a:r>
-              <a:rPr lang="en-US" sz="4000" dirty="0" smtClean="0"/>
-              <a:t>welcome!</a:t>
-            </a:r>
-            <a:br>
-              <a:rPr lang="en-US" sz="4000" dirty="0" smtClean="0"/>
-            </a:br>
-            <a:r>
-              <a:rPr lang="en-US" sz="4000" dirty="0" smtClean="0"/>
-              <a:t>The </a:t>
-            </a:r>
-            <a:r>
-              <a:rPr lang="en-US" sz="4000" dirty="0" smtClean="0"/>
-              <a:t>project is on </a:t>
-            </a:r>
-            <a:r>
-              <a:rPr lang="en-US" sz="4000" dirty="0" err="1" smtClean="0"/>
-              <a:t>GitHub</a:t>
-            </a:r>
-            <a:r>
-              <a:rPr lang="en-US" sz="4000" dirty="0"/>
-              <a:t>: https://</a:t>
-            </a:r>
-            <a:r>
-              <a:rPr lang="en-US" sz="4000" dirty="0" err="1"/>
-              <a:t>github.com</a:t>
-            </a:r>
-            <a:r>
-              <a:rPr lang="en-US" sz="4000" dirty="0"/>
-              <a:t>/</a:t>
-            </a:r>
-            <a:r>
-              <a:rPr lang="en-US" sz="4000" dirty="0" err="1"/>
-              <a:t>gcallah</a:t>
-            </a:r>
-            <a:r>
-              <a:rPr lang="en-US" sz="4000" dirty="0"/>
-              <a:t>/</a:t>
-            </a:r>
-            <a:r>
-              <a:rPr lang="en-US" sz="4000" dirty="0" err="1"/>
-              <a:t>Indra</a:t>
-            </a:r>
-            <a:endParaRPr lang="en-US" sz="4000" dirty="0" smtClean="0"/>
-          </a:p>
-        </p:txBody>
-      </p:sp>
-    </p:spTree>
-    <p:extLst>
-      <p:ext uri="{BB962C8B-B14F-4D97-AF65-F5344CB8AC3E}">
-        <p14:creationId xmlns:p14="http://schemas.microsoft.com/office/powerpoint/2010/main" val="3965056846"/>
-      </p:ext>
-    </p:extLst>
-  </p:cSld>
-  <p:clrMapOvr>
-    <a:masterClrMapping/>
-  </p:clrMapOvr>
-  <p:transition>
-    <p:fade/>
-  </p:transition>
-  <p:timing>
-    <p:tnLst>
-      <p:par>
-        <p:cTn id="1" dur="indefinite" restart="never" nodeType="tmRoot"/>
-      </p:par>
-    </p:tnLst>
-  </p:timing>
-</p:sld>
-</file>
-
-<file path=ppt/slides/slide31.xml><?xml version="1.0" encoding="utf-8"?>
-<p:sld xmlns:a="http://schemas.openxmlformats.org/drawingml/2006/main" xmlns:r="http://schemas.openxmlformats.org/officeDocument/2006/relationships" xmlns:p="http://schemas.openxmlformats.org/presentationml/2006/main">
-  <p:cSld>
-    <p:spTree>
-      <p:nvGrpSpPr>
-        <p:cNvPr id="1" name=""/>
-        <p:cNvGrpSpPr/>
-        <p:nvPr/>
-      </p:nvGrpSpPr>
-      <p:grpSpPr>
-        <a:xfrm>
-          <a:off x="0" y="0"/>
-          <a:ext cx="0" cy="0"/>
-          <a:chOff x="0" y="0"/>
-          <a:chExt cx="0" cy="0"/>
-        </a:xfrm>
-      </p:grpSpPr>
-      <p:sp>
-        <p:nvSpPr>
-          <p:cNvPr id="2" name="Title 1"/>
-          <p:cNvSpPr>
-            <a:spLocks noGrp="1"/>
-          </p:cNvSpPr>
-          <p:nvPr>
-            <p:ph type="title"/>
-          </p:nvPr>
-        </p:nvSpPr>
-        <p:spPr>
-          <a:xfrm>
-            <a:off x="381000" y="230189"/>
-            <a:ext cx="8382000" cy="836612"/>
-          </a:xfrm>
-        </p:spPr>
-        <p:txBody>
-          <a:bodyPr>
-            <a:normAutofit fontScale="90000"/>
-          </a:bodyPr>
-          <a:lstStyle/>
-          <a:p>
-            <a:r>
-              <a:rPr lang="en-US" dirty="0" smtClean="0"/>
-              <a:t>Credits</a:t>
-            </a:r>
-            <a:br>
-              <a:rPr lang="en-US" dirty="0" smtClean="0"/>
-            </a:br>
-            <a:endParaRPr lang="en-US" dirty="0">
-              <a:solidFill>
-                <a:schemeClr val="tx2"/>
-              </a:solidFill>
-            </a:endParaRPr>
-          </a:p>
-        </p:txBody>
-      </p:sp>
-      <p:sp>
-        <p:nvSpPr>
-          <p:cNvPr id="3" name="Text Placeholder 2"/>
-          <p:cNvSpPr>
-            <a:spLocks noGrp="1"/>
-          </p:cNvSpPr>
-          <p:nvPr>
-            <p:ph type="body" sz="quarter" idx="10"/>
-          </p:nvPr>
-        </p:nvSpPr>
-        <p:spPr>
-          <a:xfrm>
-            <a:off x="381000" y="838200"/>
-            <a:ext cx="8382000" cy="5486400"/>
-          </a:xfrm>
-        </p:spPr>
-        <p:txBody>
-          <a:bodyPr>
-            <a:normAutofit fontScale="92500" lnSpcReduction="10000"/>
-          </a:bodyPr>
-          <a:lstStyle/>
-          <a:p>
-            <a:endParaRPr lang="en-US" dirty="0" smtClean="0"/>
-          </a:p>
-          <a:p>
-            <a:r>
-              <a:rPr lang="en-US" sz="3000" dirty="0"/>
-              <a:t>"Knot with </a:t>
-            </a:r>
-            <a:r>
-              <a:rPr lang="en-US" sz="3000" dirty="0" err="1"/>
-              <a:t>borromean</a:t>
-            </a:r>
-            <a:r>
-              <a:rPr lang="en-US" sz="3000" dirty="0"/>
-              <a:t> rings in </a:t>
-            </a:r>
-            <a:r>
-              <a:rPr lang="en-US" sz="3000" dirty="0" err="1"/>
-              <a:t>jsj</a:t>
-            </a:r>
-            <a:r>
-              <a:rPr lang="en-US" sz="3000" dirty="0"/>
-              <a:t> </a:t>
-            </a:r>
-            <a:r>
-              <a:rPr lang="en-US" sz="3000" dirty="0" err="1"/>
-              <a:t>decomp</a:t>
-            </a:r>
-            <a:r>
-              <a:rPr lang="en-US" sz="3000" dirty="0"/>
-              <a:t> small". Licensed under CC BY-SA 3.0 via Wikipedia - </a:t>
-            </a:r>
-            <a:r>
-              <a:rPr lang="en-US" sz="3000" dirty="0">
-                <a:hlinkClick r:id="rId3"/>
-              </a:rPr>
-              <a:t>https://en.wikipedia.org/wiki/File:Knot_with_borromean_rings_in_jsj_decomp_small.png#/media/</a:t>
-            </a:r>
-            <a:r>
-              <a:rPr lang="en-US" sz="3000" dirty="0" smtClean="0">
-                <a:hlinkClick r:id="rId3"/>
-              </a:rPr>
-              <a:t>File:Knot_with_borromean_rings_in_jsj_decomp_small.png</a:t>
-            </a:r>
-            <a:endParaRPr lang="en-US" sz="3000" dirty="0" smtClean="0"/>
-          </a:p>
-          <a:p>
-            <a:r>
-              <a:rPr lang="en-US" sz="3000" dirty="0"/>
-              <a:t>"Stonehenge on 27.01.08" by </a:t>
-            </a:r>
-            <a:r>
-              <a:rPr lang="en-US" sz="3000" dirty="0" err="1"/>
-              <a:t>Mavratti</a:t>
-            </a:r>
-            <a:r>
-              <a:rPr lang="en-US" sz="3000" dirty="0"/>
-              <a:t> - Own work. Licensed under Public Domain via Wikimedia Commons - https://</a:t>
-            </a:r>
-            <a:r>
-              <a:rPr lang="en-US" sz="3000" dirty="0" err="1"/>
-              <a:t>commons.wikimedia.org</a:t>
-            </a:r>
-            <a:r>
-              <a:rPr lang="en-US" sz="3000" dirty="0"/>
-              <a:t>/wiki/File:Stonehenge_on_27.01.08.jpg#/media/File:Stonehenge_on_27.01.08.jpg</a:t>
-            </a:r>
-            <a:endParaRPr lang="en-US" sz="3000" dirty="0" smtClean="0"/>
-          </a:p>
-          <a:p>
-            <a:r>
-              <a:rPr lang="en-US" sz="3000" dirty="0" smtClean="0"/>
-              <a:t>The Mesa team at George Mason has contributed code to this project.</a:t>
-            </a:r>
-          </a:p>
-          <a:p>
-            <a:endParaRPr lang="en-US" dirty="0" smtClean="0"/>
-          </a:p>
-        </p:txBody>
-      </p:sp>
-    </p:spTree>
-    <p:extLst>
-      <p:ext uri="{BB962C8B-B14F-4D97-AF65-F5344CB8AC3E}">
-        <p14:creationId xmlns:p14="http://schemas.microsoft.com/office/powerpoint/2010/main" val="3776600832"/>
       </p:ext>
     </p:extLst>
   </p:cSld>
@@ -32817,7 +33170,7 @@
         <p:spPr>
           <a:xfrm>
             <a:off x="381000" y="230188"/>
-            <a:ext cx="8382000" cy="664797"/>
+            <a:ext cx="8153400" cy="677108"/>
           </a:xfrm>
         </p:spPr>
         <p:txBody>
@@ -32826,7 +33179,7 @@
           <a:p>
             <a:r>
               <a:rPr lang="en-US" dirty="0" smtClean="0"/>
-              <a:t>Credits</a:t>
+              <a:t>Final note</a:t>
             </a:r>
             <a:endParaRPr lang="en-US" dirty="0"/>
           </a:p>
@@ -32844,8 +33197,8 @@
         </p:nvSpPr>
         <p:spPr>
           <a:xfrm>
-            <a:off x="381000" y="1676400"/>
-            <a:ext cx="8382000" cy="4739759"/>
+            <a:off x="381000" y="1371600"/>
+            <a:ext cx="8382000" cy="1661993"/>
           </a:xfrm>
         </p:spPr>
         <p:txBody>
@@ -32853,104 +33206,52 @@
           <a:lstStyle/>
           <a:p>
             <a:r>
-              <a:rPr lang="en-US" sz="2800" dirty="0"/>
-              <a:t>"Bronze Age spear tip </a:t>
-            </a:r>
-            <a:r>
-              <a:rPr lang="en-US" sz="2800" dirty="0" err="1"/>
-              <a:t>mould</a:t>
-            </a:r>
-            <a:r>
-              <a:rPr lang="en-US" sz="2800" dirty="0"/>
-              <a:t> IMG 5123" by Photograph by Rama, Wikimedia Commons, Cc-by-sa-2.0-fr. Licensed under CC BY-SA 2.0 </a:t>
-            </a:r>
-            <a:r>
-              <a:rPr lang="en-US" sz="2800" dirty="0" err="1"/>
-              <a:t>fr</a:t>
-            </a:r>
-            <a:r>
-              <a:rPr lang="en-US" sz="2800" dirty="0"/>
-              <a:t> via Commons - </a:t>
-            </a:r>
-            <a:r>
-              <a:rPr lang="en-US" sz="2800" dirty="0">
-                <a:hlinkClick r:id="rId2"/>
-              </a:rPr>
-              <a:t>https://commons.wikimedia.org/wiki/File:Bronze_Age_spear_tip_mould_IMG_5123.jpg#/</a:t>
-            </a:r>
-            <a:r>
-              <a:rPr lang="en-US" sz="2800" dirty="0" smtClean="0">
-                <a:hlinkClick r:id="rId2"/>
-              </a:rPr>
-              <a:t>media/File:Bronze_Age_spear_tip_mould_IMG_5123.jpg</a:t>
-            </a:r>
-            <a:endParaRPr lang="en-US" sz="2800" dirty="0" smtClean="0"/>
-          </a:p>
-          <a:p>
-            <a:r>
-              <a:rPr lang="en-US" sz="2800" dirty="0"/>
-              <a:t>"</a:t>
-            </a:r>
-            <a:r>
-              <a:rPr lang="en-US" sz="2800" dirty="0" err="1"/>
-              <a:t>Axentowicz</a:t>
-            </a:r>
-            <a:r>
-              <a:rPr lang="en-US" sz="2800" dirty="0"/>
-              <a:t> The Anchorite" by </a:t>
-            </a:r>
-            <a:r>
-              <a:rPr lang="en-US" sz="2800" dirty="0" err="1"/>
-              <a:t>Teodor</a:t>
-            </a:r>
-            <a:r>
-              <a:rPr lang="en-US" sz="2800" dirty="0"/>
-              <a:t> </a:t>
-            </a:r>
-            <a:r>
-              <a:rPr lang="en-US" sz="2800" dirty="0" err="1"/>
-              <a:t>Axentowicz</a:t>
-            </a:r>
-            <a:r>
-              <a:rPr lang="en-US" sz="2800" dirty="0"/>
-              <a:t> - </a:t>
-            </a:r>
-            <a:r>
-              <a:rPr lang="en-US" sz="2800" dirty="0" err="1"/>
-              <a:t>cyfrowe.mnw.art.pl</a:t>
-            </a:r>
-            <a:r>
-              <a:rPr lang="en-US" sz="2800" dirty="0"/>
-              <a:t>. Licensed under Public Domain via Commons - https://</a:t>
-            </a:r>
-            <a:r>
-              <a:rPr lang="en-US" sz="2800" dirty="0" err="1"/>
-              <a:t>commons.wikimedia.org</a:t>
-            </a:r>
-            <a:r>
-              <a:rPr lang="en-US" sz="2800" dirty="0"/>
-              <a:t>/wiki/</a:t>
-            </a:r>
-            <a:r>
-              <a:rPr lang="en-US" sz="2800" dirty="0" err="1"/>
-              <a:t>File:Axentowicz_The_Anchorite.jpg</a:t>
-            </a:r>
-            <a:r>
-              <a:rPr lang="en-US" sz="2800" dirty="0"/>
-              <a:t>#/media/</a:t>
-            </a:r>
-            <a:r>
-              <a:rPr lang="en-US" sz="2800" dirty="0" err="1"/>
-              <a:t>File:Axentowicz_The_Anchorite.jpg</a:t>
-            </a:r>
-            <a:endParaRPr lang="en-US" sz="2800" dirty="0"/>
+              <a:rPr lang="en-US" sz="4000" dirty="0" smtClean="0"/>
+              <a:t>Contributors welcome!</a:t>
+            </a:r>
+            <a:br>
+              <a:rPr lang="en-US" sz="4000" dirty="0" smtClean="0"/>
+            </a:br>
+            <a:r>
+              <a:rPr lang="en-US" sz="4000" dirty="0" smtClean="0"/>
+              <a:t>The project is on </a:t>
+            </a:r>
+            <a:r>
+              <a:rPr lang="en-US" sz="4000" dirty="0" err="1" smtClean="0"/>
+              <a:t>GitHub</a:t>
+            </a:r>
+            <a:r>
+              <a:rPr lang="en-US" sz="4000" dirty="0"/>
+              <a:t>: https://</a:t>
+            </a:r>
+            <a:r>
+              <a:rPr lang="en-US" sz="4000" dirty="0" err="1"/>
+              <a:t>github.com</a:t>
+            </a:r>
+            <a:r>
+              <a:rPr lang="en-US" sz="4000" dirty="0"/>
+              <a:t>/</a:t>
+            </a:r>
+            <a:r>
+              <a:rPr lang="en-US" sz="4000" dirty="0" err="1"/>
+              <a:t>gcallah</a:t>
+            </a:r>
+            <a:r>
+              <a:rPr lang="en-US" sz="4000" dirty="0"/>
+              <a:t>/</a:t>
+            </a:r>
+            <a:r>
+              <a:rPr lang="en-US" sz="4000" dirty="0" err="1"/>
+              <a:t>Indra</a:t>
+            </a:r>
+            <a:endParaRPr lang="en-US" sz="4000" dirty="0" smtClean="0"/>
           </a:p>
         </p:txBody>
       </p:sp>
     </p:spTree>
     <p:extLst>
       <p:ext uri="{BB962C8B-B14F-4D97-AF65-F5344CB8AC3E}">
-        <p14:creationId xmlns:p14="http://schemas.microsoft.com/office/powerpoint/2010/main" val="1548311111"/>
+        <p14:creationId xmlns:p14="http://schemas.microsoft.com/office/powerpoint/2010/main" val="3965056846"/>
       </p:ext>
     </p:extLst>
   </p:cSld>
@@ -32999,19 +33300,28 @@
         </p:nvSpPr>
         <p:spPr>
           <a:xfrm>
-            <a:off x="381000" y="230188"/>
-            <a:ext cx="8382000" cy="664797"/>
+            <a:off x="381000" y="230189"/>
+            <a:ext cx="8382000" cy="836612"/>
           </a:xfrm>
         </p:spPr>
         <p:txBody>
-          <a:bodyPr/>
+          <a:bodyPr>
+            <a:normAutofit fontScale="90000"/>
+          </a:bodyPr>
           <a:lstStyle/>
           <a:p>
             <a:r>
               <a:rPr lang="en-US" dirty="0" smtClean="0"/>
               <a:t>Credits</a:t>
             </a:r>
-            <a:endParaRPr lang="en-US" dirty="0"/>
+            <a:br>
+              <a:rPr lang="en-US" dirty="0" smtClean="0"/>
+            </a:br>
+            <a:endParaRPr lang="en-US" dirty="0">
+              <a:solidFill>
+                <a:schemeClr val="tx2"/>
+              </a:solidFill>
+            </a:endParaRPr>
           </a:p>
         </p:txBody>
       </p:sp>
@@ -33027,76 +33337,99 @@
         </p:nvSpPr>
         <p:spPr>
           <a:xfrm>
-            <a:off x="381000" y="1371600"/>
-            <a:ext cx="8382000" cy="5127558"/>
+            <a:off x="381000" y="838200"/>
+            <a:ext cx="8382000" cy="5486400"/>
           </a:xfrm>
         </p:spPr>
         <p:txBody>
-          <a:bodyPr/>
+          <a:bodyPr>
+            <a:normAutofit fontScale="92500" lnSpcReduction="10000"/>
+          </a:bodyPr>
           <a:lstStyle/>
           <a:p>
-            <a:r>
-              <a:rPr lang="en-US" sz="2800" dirty="0"/>
-              <a:t>"</a:t>
-            </a:r>
-            <a:r>
-              <a:rPr lang="en-US" sz="2800" dirty="0" err="1"/>
-              <a:t>Perspectivephoto</a:t>
-            </a:r>
-            <a:r>
-              <a:rPr lang="en-US" sz="2800" dirty="0"/>
-              <a:t>". Licensed under CC BY 2.5 via Wikipedia - </a:t>
-            </a:r>
-            <a:r>
-              <a:rPr lang="en-US" sz="2800" dirty="0">
-                <a:hlinkClick r:id="rId2"/>
-              </a:rPr>
-              <a:t>https://en.wikipedia.org/wiki/File:Perspectivephoto.jpg#/</a:t>
-            </a:r>
-            <a:r>
-              <a:rPr lang="en-US" sz="2800" dirty="0" smtClean="0">
-                <a:hlinkClick r:id="rId2"/>
-              </a:rPr>
-              <a:t>media/File:Perspectivephoto.jpg</a:t>
-            </a:r>
-            <a:endParaRPr lang="en-US" sz="2800" dirty="0" smtClean="0"/>
+            <a:endParaRPr lang="en-US" dirty="0" smtClean="0"/>
           </a:p>
           <a:p>
             <a:r>
-              <a:rPr lang="en-US" sz="2800" dirty="0"/>
-              <a:t>"</a:t>
-            </a:r>
-            <a:r>
-              <a:rPr lang="en-US" sz="2800" dirty="0" err="1"/>
-              <a:t>Eugène</a:t>
-            </a:r>
-            <a:r>
-              <a:rPr lang="en-US" sz="2800" dirty="0"/>
-              <a:t> Delacroix - The Fanatics of Tangier - WGA06195" by </a:t>
-            </a:r>
-            <a:r>
-              <a:rPr lang="en-US" sz="2800" dirty="0" err="1"/>
-              <a:t>Eugène</a:t>
-            </a:r>
-            <a:r>
-              <a:rPr lang="en-US" sz="2800" dirty="0"/>
-              <a:t> Delacroix - 1. Web Gallery of Art:   Image  Info about artwork2. The Minneapolis Institute of Arts. Licensed under Public Domain via Commons - https://</a:t>
-            </a:r>
-            <a:r>
-              <a:rPr lang="en-US" sz="2800" dirty="0" err="1"/>
+              <a:rPr lang="en-US" sz="3000" dirty="0"/>
+              <a:t>"Knot with </a:t>
+            </a:r>
+            <a:r>
+              <a:rPr lang="en-US" sz="3000" dirty="0" err="1"/>
+              <a:t>borromean</a:t>
+            </a:r>
+            <a:r>
+              <a:rPr lang="en-US" sz="3000" dirty="0"/>
+              <a:t> rings in </a:t>
+            </a:r>
+            <a:r>
+              <a:rPr lang="en-US" sz="3000" dirty="0" err="1"/>
+              <a:t>jsj</a:t>
+            </a:r>
+            <a:r>
+              <a:rPr lang="en-US" sz="3000" dirty="0"/>
+              <a:t> </a:t>
+            </a:r>
+            <a:r>
+              <a:rPr lang="en-US" sz="3000" dirty="0" err="1"/>
+              <a:t>decomp</a:t>
+            </a:r>
+            <a:r>
+              <a:rPr lang="en-US" sz="3000" dirty="0"/>
+              <a:t> small". Licensed under CC BY-SA 3.0 via Wikipedia - </a:t>
+            </a:r>
+            <a:r>
+              <a:rPr lang="en-US" sz="3000" dirty="0">
+                <a:hlinkClick r:id="rId3"/>
+              </a:rPr>
+              <a:t>https://en.wikipedia.org/wiki/File:Knot_with_borromean_rings_in_jsj_decomp_small.png#/media/</a:t>
+            </a:r>
+            <a:r>
+              <a:rPr lang="en-US" sz="3000" dirty="0" smtClean="0">
+                <a:hlinkClick r:id="rId3"/>
+              </a:rPr>
+              <a:t>File:Knot_with_borromean_rings_in_jsj_decomp_small.png</a:t>
+            </a:r>
+            <a:endParaRPr lang="en-US" sz="3000" dirty="0" smtClean="0"/>
+          </a:p>
+          <a:p>
+            <a:r>
+              <a:rPr lang="en-US" sz="3000" dirty="0"/>
+              <a:t>"Stonehenge on 27.01.08" by </a:t>
+            </a:r>
+            <a:r>
+              <a:rPr lang="en-US" sz="3000" dirty="0" err="1"/>
+              <a:t>Mavratti</a:t>
+            </a:r>
+            <a:r>
+              <a:rPr lang="en-US" sz="3000" dirty="0"/>
+              <a:t> - Own work. Licensed under Public Domain via Wikimedia Commons - https://</a:t>
+            </a:r>
+            <a:r>
+              <a:rPr lang="en-US" sz="3000" dirty="0" err="1"/>
               <a:t>commons.wikimedia.org</a:t>
             </a:r>
             <a:r>
-              <a:rPr lang="en-US" sz="2800" dirty="0"/>
-              <a:t>/wiki/File:Eug%C3%A8ne_Delacroix_-_The_Fanatics_of_Tangier_-_WGA06195.jpg#/media/File:Eug%C3%A8ne_Delacroix_-_The_Fanatics_of_Tangier_-_WGA06195.jpg</a:t>
-            </a:r>
+              <a:rPr lang="en-US" sz="3000" dirty="0"/>
+              <a:t>/wiki/File:Stonehenge_on_27.01.08.jpg#/media/File:Stonehenge_on_27.01.08.jpg</a:t>
+            </a:r>
+            <a:endParaRPr lang="en-US" sz="3000" dirty="0" smtClean="0"/>
+          </a:p>
+          <a:p>
+            <a:r>
+              <a:rPr lang="en-US" sz="3000" dirty="0" smtClean="0"/>
+              <a:t>The Mesa team at George Mason has contributed code to this project.</a:t>
+            </a:r>
+          </a:p>
+          <a:p>
+            <a:endParaRPr lang="en-US" dirty="0" smtClean="0"/>
           </a:p>
         </p:txBody>
       </p:sp>
     </p:spTree>
     <p:extLst>
       <p:ext uri="{BB962C8B-B14F-4D97-AF65-F5344CB8AC3E}">
-        <p14:creationId xmlns:p14="http://schemas.microsoft.com/office/powerpoint/2010/main" val="1596891371"/>
+        <p14:creationId xmlns:p14="http://schemas.microsoft.com/office/powerpoint/2010/main" val="3776600832"/>
       </p:ext>
     </p:extLst>
   </p:cSld>
@@ -33174,7 +33507,7 @@
         <p:spPr>
           <a:xfrm>
             <a:off x="381000" y="1676400"/>
-            <a:ext cx="8382000" cy="3877985"/>
+            <a:ext cx="8382000" cy="4739759"/>
           </a:xfrm>
         </p:spPr>
         <p:txBody>
@@ -33183,63 +33516,74 @@
           <a:p>
             <a:r>
               <a:rPr lang="en-US" sz="2800" dirty="0"/>
-              <a:t>"Linear subspaces with shading" by </a:t>
+              <a:t>"Bronze Age spear tip </a:t>
             </a:r>
             <a:r>
               <a:rPr lang="en-US" sz="2800" dirty="0" err="1"/>
-              <a:t>Alksentrs</a:t>
+              <a:t>mould</a:t>
             </a:r>
             <a:r>
               <a:rPr lang="en-US" sz="2800" dirty="0"/>
-              <a:t> at </a:t>
+              <a:t> IMG 5123" by Photograph by Rama, Wikimedia Commons, Cc-by-sa-2.0-fr. Licensed under CC BY-SA 2.0 </a:t>
             </a:r>
             <a:r>
               <a:rPr lang="en-US" sz="2800" dirty="0" err="1"/>
-              <a:t>en.wikipedia</a:t>
+              <a:t>fr</a:t>
             </a:r>
             <a:r>
               <a:rPr lang="en-US" sz="2800" dirty="0"/>
-              <a:t> - Own work (Original text: Own work, based on en::</a:t>
+              <a:t> via Commons - </a:t>
+            </a:r>
+            <a:r>
+              <a:rPr lang="en-US" sz="2800" dirty="0">
+                <a:hlinkClick r:id="rId2"/>
+              </a:rPr>
+              <a:t>https://commons.wikimedia.org/wiki/File:Bronze_Age_spear_tip_mould_IMG_5123.jpg#/</a:t>
+            </a:r>
+            <a:r>
+              <a:rPr lang="en-US" sz="2800" dirty="0" smtClean="0">
+                <a:hlinkClick r:id="rId2"/>
+              </a:rPr>
+              <a:t>media/File:Bronze_Age_spear_tip_mould_IMG_5123.jpg</a:t>
+            </a:r>
+            <a:endParaRPr lang="en-US" sz="2800" dirty="0" smtClean="0"/>
+          </a:p>
+          <a:p>
+            <a:r>
+              <a:rPr lang="en-US" sz="2800" dirty="0"/>
+              <a:t>"</a:t>
             </a:r>
             <a:r>
               <a:rPr lang="en-US" sz="2800" dirty="0" err="1"/>
-              <a:t>Image:Linearsubspace.svg</a:t>
+              <a:t>Axentowicz</a:t>
             </a:r>
             <a:r>
               <a:rPr lang="en-US" sz="2800" dirty="0"/>
-              <a:t> (by </a:t>
+              <a:t> The Anchorite" by </a:t>
             </a:r>
             <a:r>
               <a:rPr lang="en-US" sz="2800" dirty="0" err="1"/>
-              <a:t>en:User:Jakob.scholbach</a:t>
+              <a:t>Teodor</a:t>
             </a:r>
             <a:r>
               <a:rPr lang="en-US" sz="2800" dirty="0"/>
-              <a:t>).)Transferred from </a:t>
+              <a:t> </a:t>
             </a:r>
             <a:r>
               <a:rPr lang="en-US" sz="2800" dirty="0" err="1"/>
-              <a:t>en.wikipedia</a:t>
+              <a:t>Axentowicz</a:t>
             </a:r>
             <a:r>
               <a:rPr lang="en-US" sz="2800" dirty="0"/>
-              <a:t> to Commons by </a:t>
+              <a:t> - </a:t>
             </a:r>
             <a:r>
               <a:rPr lang="en-US" sz="2800" dirty="0" err="1"/>
-              <a:t>User:Ylebru</a:t>
+              <a:t>cyfrowe.mnw.art.pl</a:t>
             </a:r>
             <a:r>
               <a:rPr lang="en-US" sz="2800" dirty="0"/>
-              <a:t> using </a:t>
-            </a:r>
-            <a:r>
-              <a:rPr lang="en-US" sz="2800" dirty="0" err="1"/>
-              <a:t>CommonsHelper</a:t>
-            </a:r>
-            <a:r>
-              <a:rPr lang="en-US" sz="2800" dirty="0"/>
-              <a:t>.. Licensed under CC BY-SA 3.0 via Commons - https://</a:t>
+              <a:t>. Licensed under Public Domain via Commons - https://</a:t>
             </a:r>
             <a:r>
               <a:rPr lang="en-US" sz="2800" dirty="0" err="1"/>
@@ -33251,7 +33595,7 @@
             </a:r>
             <a:r>
               <a:rPr lang="en-US" sz="2800" dirty="0" err="1"/>
-              <a:t>File:Linear_subspaces_with_shading.svg</a:t>
+              <a:t>File:Axentowicz_The_Anchorite.jpg</a:t>
             </a:r>
             <a:r>
               <a:rPr lang="en-US" sz="2800" dirty="0"/>
@@ -33259,7 +33603,7 @@
             </a:r>
             <a:r>
               <a:rPr lang="en-US" sz="2800" dirty="0" err="1"/>
-              <a:t>File:Linear_subspaces_with_shading.svg</a:t>
+              <a:t>File:Axentowicz_The_Anchorite.jpg</a:t>
             </a:r>
             <a:endParaRPr lang="en-US" sz="2800" dirty="0"/>
           </a:p>
@@ -33268,7 +33612,7 @@
     </p:spTree>
     <p:extLst>
       <p:ext uri="{BB962C8B-B14F-4D97-AF65-F5344CB8AC3E}">
-        <p14:creationId xmlns:p14="http://schemas.microsoft.com/office/powerpoint/2010/main" val="901497122"/>
+        <p14:creationId xmlns:p14="http://schemas.microsoft.com/office/powerpoint/2010/main" val="1548311111"/>
       </p:ext>
     </p:extLst>
   </p:cSld>
@@ -33345,8 +33689,8 @@
         </p:nvSpPr>
         <p:spPr>
           <a:xfrm>
-            <a:off x="381000" y="1295400"/>
-            <a:ext cx="8382000" cy="5120759"/>
+            <a:off x="381000" y="1371600"/>
+            <a:ext cx="8382000" cy="5127558"/>
           </a:xfrm>
         </p:spPr>
         <p:txBody>
@@ -33355,58 +33699,50 @@
           <a:p>
             <a:r>
               <a:rPr lang="en-US" sz="2800" dirty="0"/>
-              <a:t>"Hokusai-sketches---hokusai-manga-vol6-crop" by Katsushika </a:t>
+              <a:t>"</a:t>
             </a:r>
             <a:r>
               <a:rPr lang="en-US" sz="2800" dirty="0" err="1"/>
-              <a:t>Hokusaiderivative</a:t>
+              <a:t>Perspectivephoto</a:t>
             </a:r>
             <a:r>
               <a:rPr lang="en-US" sz="2800" dirty="0"/>
-              <a:t> work: </a:t>
-            </a:r>
-            <a:r>
-              <a:rPr lang="en-US" sz="2800" dirty="0" err="1"/>
-              <a:t>AMorozov</a:t>
-            </a:r>
-            <a:r>
-              <a:rPr lang="en-US" sz="2800" dirty="0"/>
-              <a:t> - Hokusai_sketches_-_hokusai_manga_vol6.jpg. Licensed under Public Domain via Commons - </a:t>
+              <a:t>". Licensed under CC BY 2.5 via Wikipedia - </a:t>
             </a:r>
             <a:r>
               <a:rPr lang="en-US" sz="2800" dirty="0">
                 <a:hlinkClick r:id="rId2"/>
               </a:rPr>
-              <a:t>https://commons.wikimedia.org/wiki/File:Hokusai-sketches---hokusai-manga-vol6-crop.jpg#/media/File:Hokusai-sketches---</a:t>
+              <a:t>https://en.wikipedia.org/wiki/File:Perspectivephoto.jpg#/</a:t>
             </a:r>
             <a:r>
               <a:rPr lang="en-US" sz="2800" dirty="0" smtClean="0">
                 <a:hlinkClick r:id="rId2"/>
               </a:rPr>
-              <a:t>hokusai-manga-vol6-crop.jpg</a:t>
+              <a:t>media/File:Perspectivephoto.jpg</a:t>
             </a:r>
             <a:endParaRPr lang="en-US" sz="2800" dirty="0" smtClean="0"/>
           </a:p>
           <a:p>
             <a:r>
               <a:rPr lang="en-US" sz="2800" dirty="0"/>
-              <a:t>Daffy Duck: By Directed by </a:t>
+              <a:t>"</a:t>
             </a:r>
             <a:r>
               <a:rPr lang="en-US" sz="2800" dirty="0" err="1"/>
-              <a:t>Friz</a:t>
+              <a:t>Eugène</a:t>
             </a:r>
             <a:r>
               <a:rPr lang="en-US" sz="2800" dirty="0"/>
-              <a:t> </a:t>
+              <a:t> Delacroix - The Fanatics of Tangier - WGA06195" by </a:t>
             </a:r>
             <a:r>
               <a:rPr lang="en-US" sz="2800" dirty="0" err="1"/>
-              <a:t>Freleng</a:t>
+              <a:t>Eugène</a:t>
             </a:r>
             <a:r>
               <a:rPr lang="en-US" sz="2800" dirty="0"/>
-              <a:t>, (Warner Bros.) - YouTube, Public Domain, https://</a:t>
+              <a:t> Delacroix - 1. Web Gallery of Art:   Image  Info about artwork2. The Minneapolis Institute of Arts. Licensed under Public Domain via Commons - https://</a:t>
             </a:r>
             <a:r>
               <a:rPr lang="en-US" sz="2800" dirty="0" err="1"/>
@@ -33414,24 +33750,15 @@
             </a:r>
             <a:r>
               <a:rPr lang="en-US" sz="2800" dirty="0"/>
-              <a:t>/w/</a:t>
-            </a:r>
-            <a:r>
-              <a:rPr lang="en-US" sz="2800" dirty="0" err="1"/>
-              <a:t>index.php?curid</a:t>
-            </a:r>
-            <a:r>
-              <a:rPr lang="en-US" sz="2800" dirty="0"/>
-              <a:t>=34296734</a:t>
-            </a:r>
-            <a:endParaRPr lang="en-US" sz="2800" dirty="0" smtClean="0"/>
+              <a:t>/wiki/File:Eug%C3%A8ne_Delacroix_-_The_Fanatics_of_Tangier_-_WGA06195.jpg#/media/File:Eug%C3%A8ne_Delacroix_-_The_Fanatics_of_Tangier_-_WGA06195.jpg</a:t>
+            </a:r>
           </a:p>
         </p:txBody>
       </p:sp>
     </p:spTree>
     <p:extLst>
       <p:ext uri="{BB962C8B-B14F-4D97-AF65-F5344CB8AC3E}">
-        <p14:creationId xmlns:p14="http://schemas.microsoft.com/office/powerpoint/2010/main" val="526432442"/>
+        <p14:creationId xmlns:p14="http://schemas.microsoft.com/office/powerpoint/2010/main" val="1596891371"/>
       </p:ext>
     </p:extLst>
   </p:cSld>
@@ -33508,6 +33835,341 @@
         </p:nvSpPr>
         <p:spPr>
           <a:xfrm>
+            <a:off x="381000" y="1676400"/>
+            <a:ext cx="8382000" cy="3877985"/>
+          </a:xfrm>
+        </p:spPr>
+        <p:txBody>
+          <a:bodyPr/>
+          <a:lstStyle/>
+          <a:p>
+            <a:r>
+              <a:rPr lang="en-US" sz="2800" dirty="0"/>
+              <a:t>"Linear subspaces with shading" by </a:t>
+            </a:r>
+            <a:r>
+              <a:rPr lang="en-US" sz="2800" dirty="0" err="1"/>
+              <a:t>Alksentrs</a:t>
+            </a:r>
+            <a:r>
+              <a:rPr lang="en-US" sz="2800" dirty="0"/>
+              <a:t> at </a:t>
+            </a:r>
+            <a:r>
+              <a:rPr lang="en-US" sz="2800" dirty="0" err="1"/>
+              <a:t>en.wikipedia</a:t>
+            </a:r>
+            <a:r>
+              <a:rPr lang="en-US" sz="2800" dirty="0"/>
+              <a:t> - Own work (Original text: Own work, based on en::</a:t>
+            </a:r>
+            <a:r>
+              <a:rPr lang="en-US" sz="2800" dirty="0" err="1"/>
+              <a:t>Image:Linearsubspace.svg</a:t>
+            </a:r>
+            <a:r>
+              <a:rPr lang="en-US" sz="2800" dirty="0"/>
+              <a:t> (by </a:t>
+            </a:r>
+            <a:r>
+              <a:rPr lang="en-US" sz="2800" dirty="0" err="1"/>
+              <a:t>en:User:Jakob.scholbach</a:t>
+            </a:r>
+            <a:r>
+              <a:rPr lang="en-US" sz="2800" dirty="0"/>
+              <a:t>).)Transferred from </a:t>
+            </a:r>
+            <a:r>
+              <a:rPr lang="en-US" sz="2800" dirty="0" err="1"/>
+              <a:t>en.wikipedia</a:t>
+            </a:r>
+            <a:r>
+              <a:rPr lang="en-US" sz="2800" dirty="0"/>
+              <a:t> to Commons by </a:t>
+            </a:r>
+            <a:r>
+              <a:rPr lang="en-US" sz="2800" dirty="0" err="1"/>
+              <a:t>User:Ylebru</a:t>
+            </a:r>
+            <a:r>
+              <a:rPr lang="en-US" sz="2800" dirty="0"/>
+              <a:t> using </a:t>
+            </a:r>
+            <a:r>
+              <a:rPr lang="en-US" sz="2800" dirty="0" err="1"/>
+              <a:t>CommonsHelper</a:t>
+            </a:r>
+            <a:r>
+              <a:rPr lang="en-US" sz="2800" dirty="0"/>
+              <a:t>.. Licensed under CC BY-SA 3.0 via Commons - https://</a:t>
+            </a:r>
+            <a:r>
+              <a:rPr lang="en-US" sz="2800" dirty="0" err="1"/>
+              <a:t>commons.wikimedia.org</a:t>
+            </a:r>
+            <a:r>
+              <a:rPr lang="en-US" sz="2800" dirty="0"/>
+              <a:t>/wiki/</a:t>
+            </a:r>
+            <a:r>
+              <a:rPr lang="en-US" sz="2800" dirty="0" err="1"/>
+              <a:t>File:Linear_subspaces_with_shading.svg</a:t>
+            </a:r>
+            <a:r>
+              <a:rPr lang="en-US" sz="2800" dirty="0"/>
+              <a:t>#/media/</a:t>
+            </a:r>
+            <a:r>
+              <a:rPr lang="en-US" sz="2800" dirty="0" err="1"/>
+              <a:t>File:Linear_subspaces_with_shading.svg</a:t>
+            </a:r>
+            <a:endParaRPr lang="en-US" sz="2800" dirty="0"/>
+          </a:p>
+        </p:txBody>
+      </p:sp>
+    </p:spTree>
+    <p:extLst>
+      <p:ext uri="{BB962C8B-B14F-4D97-AF65-F5344CB8AC3E}">
+        <p14:creationId xmlns:p14="http://schemas.microsoft.com/office/powerpoint/2010/main" val="901497122"/>
+      </p:ext>
+    </p:extLst>
+  </p:cSld>
+  <p:clrMapOvr>
+    <a:masterClrMapping/>
+  </p:clrMapOvr>
+  <p:transition>
+    <p:fade/>
+  </p:transition>
+  <p:timing>
+    <p:tnLst>
+      <p:par>
+        <p:cTn id="1" dur="indefinite" restart="never" nodeType="tmRoot"/>
+      </p:par>
+    </p:tnLst>
+  </p:timing>
+</p:sld>
+</file>
+
+<file path=ppt/slides/slide37.xml><?xml version="1.0" encoding="utf-8"?>
+<p:sld xmlns:a="http://schemas.openxmlformats.org/drawingml/2006/main" xmlns:r="http://schemas.openxmlformats.org/officeDocument/2006/relationships" xmlns:p="http://schemas.openxmlformats.org/presentationml/2006/main">
+  <p:cSld>
+    <p:spTree>
+      <p:nvGrpSpPr>
+        <p:cNvPr id="1" name=""/>
+        <p:cNvGrpSpPr/>
+        <p:nvPr/>
+      </p:nvGrpSpPr>
+      <p:grpSpPr>
+        <a:xfrm>
+          <a:off x="0" y="0"/>
+          <a:ext cx="0" cy="0"/>
+          <a:chOff x="0" y="0"/>
+          <a:chExt cx="0" cy="0"/>
+        </a:xfrm>
+      </p:grpSpPr>
+      <p:sp>
+        <p:nvSpPr>
+          <p:cNvPr id="2" name="Title 1"/>
+          <p:cNvSpPr>
+            <a:spLocks noGrp="1"/>
+          </p:cNvSpPr>
+          <p:nvPr>
+            <p:ph type="title"/>
+          </p:nvPr>
+        </p:nvSpPr>
+        <p:spPr>
+          <a:xfrm>
+            <a:off x="381000" y="230188"/>
+            <a:ext cx="8382000" cy="664797"/>
+          </a:xfrm>
+        </p:spPr>
+        <p:txBody>
+          <a:bodyPr/>
+          <a:lstStyle/>
+          <a:p>
+            <a:r>
+              <a:rPr lang="en-US" dirty="0" smtClean="0"/>
+              <a:t>Credits</a:t>
+            </a:r>
+            <a:endParaRPr lang="en-US" dirty="0"/>
+          </a:p>
+        </p:txBody>
+      </p:sp>
+      <p:sp>
+        <p:nvSpPr>
+          <p:cNvPr id="3" name="Text Placeholder 2"/>
+          <p:cNvSpPr>
+            <a:spLocks noGrp="1"/>
+          </p:cNvSpPr>
+          <p:nvPr>
+            <p:ph type="body" sz="quarter" idx="10"/>
+          </p:nvPr>
+        </p:nvSpPr>
+        <p:spPr>
+          <a:xfrm>
+            <a:off x="381000" y="1295400"/>
+            <a:ext cx="8382000" cy="5120759"/>
+          </a:xfrm>
+        </p:spPr>
+        <p:txBody>
+          <a:bodyPr/>
+          <a:lstStyle/>
+          <a:p>
+            <a:r>
+              <a:rPr lang="en-US" sz="2800" dirty="0"/>
+              <a:t>"Hokusai-sketches---hokusai-manga-vol6-crop" by Katsushika </a:t>
+            </a:r>
+            <a:r>
+              <a:rPr lang="en-US" sz="2800" dirty="0" err="1"/>
+              <a:t>Hokusaiderivative</a:t>
+            </a:r>
+            <a:r>
+              <a:rPr lang="en-US" sz="2800" dirty="0"/>
+              <a:t> work: </a:t>
+            </a:r>
+            <a:r>
+              <a:rPr lang="en-US" sz="2800" dirty="0" err="1"/>
+              <a:t>AMorozov</a:t>
+            </a:r>
+            <a:r>
+              <a:rPr lang="en-US" sz="2800" dirty="0"/>
+              <a:t> - Hokusai_sketches_-_hokusai_manga_vol6.jpg. Licensed under Public Domain via Commons - </a:t>
+            </a:r>
+            <a:r>
+              <a:rPr lang="en-US" sz="2800" dirty="0">
+                <a:hlinkClick r:id="rId2"/>
+              </a:rPr>
+              <a:t>https://commons.wikimedia.org/wiki/File:Hokusai-sketches---hokusai-manga-vol6-crop.jpg#/media/File:Hokusai-sketches---</a:t>
+            </a:r>
+            <a:r>
+              <a:rPr lang="en-US" sz="2800" dirty="0" smtClean="0">
+                <a:hlinkClick r:id="rId2"/>
+              </a:rPr>
+              <a:t>hokusai-manga-vol6-crop.jpg</a:t>
+            </a:r>
+            <a:endParaRPr lang="en-US" sz="2800" dirty="0" smtClean="0"/>
+          </a:p>
+          <a:p>
+            <a:r>
+              <a:rPr lang="en-US" sz="2800" dirty="0"/>
+              <a:t>Daffy Duck: By Directed by </a:t>
+            </a:r>
+            <a:r>
+              <a:rPr lang="en-US" sz="2800" dirty="0" err="1"/>
+              <a:t>Friz</a:t>
+            </a:r>
+            <a:r>
+              <a:rPr lang="en-US" sz="2800" dirty="0"/>
+              <a:t> </a:t>
+            </a:r>
+            <a:r>
+              <a:rPr lang="en-US" sz="2800" dirty="0" err="1"/>
+              <a:t>Freleng</a:t>
+            </a:r>
+            <a:r>
+              <a:rPr lang="en-US" sz="2800" dirty="0"/>
+              <a:t>, (Warner Bros.) - YouTube, Public Domain, https://</a:t>
+            </a:r>
+            <a:r>
+              <a:rPr lang="en-US" sz="2800" dirty="0" err="1"/>
+              <a:t>commons.wikimedia.org</a:t>
+            </a:r>
+            <a:r>
+              <a:rPr lang="en-US" sz="2800" dirty="0"/>
+              <a:t>/w/</a:t>
+            </a:r>
+            <a:r>
+              <a:rPr lang="en-US" sz="2800" dirty="0" err="1"/>
+              <a:t>index.php?curid</a:t>
+            </a:r>
+            <a:r>
+              <a:rPr lang="en-US" sz="2800" dirty="0"/>
+              <a:t>=34296734</a:t>
+            </a:r>
+            <a:endParaRPr lang="en-US" sz="2800" dirty="0" smtClean="0"/>
+          </a:p>
+        </p:txBody>
+      </p:sp>
+    </p:spTree>
+    <p:extLst>
+      <p:ext uri="{BB962C8B-B14F-4D97-AF65-F5344CB8AC3E}">
+        <p14:creationId xmlns:p14="http://schemas.microsoft.com/office/powerpoint/2010/main" val="526432442"/>
+      </p:ext>
+    </p:extLst>
+  </p:cSld>
+  <p:clrMapOvr>
+    <a:masterClrMapping/>
+  </p:clrMapOvr>
+  <p:transition>
+    <p:fade/>
+  </p:transition>
+  <p:timing>
+    <p:tnLst>
+      <p:par>
+        <p:cTn id="1" dur="indefinite" restart="never" nodeType="tmRoot"/>
+      </p:par>
+    </p:tnLst>
+  </p:timing>
+</p:sld>
+</file>
+
+<file path=ppt/slides/slide38.xml><?xml version="1.0" encoding="utf-8"?>
+<p:sld xmlns:a="http://schemas.openxmlformats.org/drawingml/2006/main" xmlns:r="http://schemas.openxmlformats.org/officeDocument/2006/relationships" xmlns:p="http://schemas.openxmlformats.org/presentationml/2006/main">
+  <p:cSld>
+    <p:spTree>
+      <p:nvGrpSpPr>
+        <p:cNvPr id="1" name=""/>
+        <p:cNvGrpSpPr/>
+        <p:nvPr/>
+      </p:nvGrpSpPr>
+      <p:grpSpPr>
+        <a:xfrm>
+          <a:off x="0" y="0"/>
+          <a:ext cx="0" cy="0"/>
+          <a:chOff x="0" y="0"/>
+          <a:chExt cx="0" cy="0"/>
+        </a:xfrm>
+      </p:grpSpPr>
+      <p:sp>
+        <p:nvSpPr>
+          <p:cNvPr id="2" name="Title 1"/>
+          <p:cNvSpPr>
+            <a:spLocks noGrp="1"/>
+          </p:cNvSpPr>
+          <p:nvPr>
+            <p:ph type="title"/>
+          </p:nvPr>
+        </p:nvSpPr>
+        <p:spPr>
+          <a:xfrm>
+            <a:off x="381000" y="230188"/>
+            <a:ext cx="8382000" cy="664797"/>
+          </a:xfrm>
+        </p:spPr>
+        <p:txBody>
+          <a:bodyPr/>
+          <a:lstStyle/>
+          <a:p>
+            <a:r>
+              <a:rPr lang="en-US" dirty="0" smtClean="0"/>
+              <a:t>Credits</a:t>
+            </a:r>
+            <a:endParaRPr lang="en-US" dirty="0"/>
+          </a:p>
+        </p:txBody>
+      </p:sp>
+      <p:sp>
+        <p:nvSpPr>
+          <p:cNvPr id="3" name="Text Placeholder 2"/>
+          <p:cNvSpPr>
+            <a:spLocks noGrp="1"/>
+          </p:cNvSpPr>
+          <p:nvPr>
+            <p:ph type="body" sz="quarter" idx="10"/>
+          </p:nvPr>
+        </p:nvSpPr>
+        <p:spPr>
+          <a:xfrm>
             <a:off x="381000" y="1295400"/>
             <a:ext cx="8382000" cy="3102388"/>
           </a:xfrm>
@@ -33584,6 +34246,155 @@
 </file>
 
 <file path=ppt/slides/slide4.xml><?xml version="1.0" encoding="utf-8"?>
+<p:sld xmlns:a="http://schemas.openxmlformats.org/drawingml/2006/main" xmlns:r="http://schemas.openxmlformats.org/officeDocument/2006/relationships" xmlns:p="http://schemas.openxmlformats.org/presentationml/2006/main">
+  <p:cSld>
+    <p:spTree>
+      <p:nvGrpSpPr>
+        <p:cNvPr id="1" name=""/>
+        <p:cNvGrpSpPr/>
+        <p:nvPr/>
+      </p:nvGrpSpPr>
+      <p:grpSpPr>
+        <a:xfrm>
+          <a:off x="0" y="0"/>
+          <a:ext cx="0" cy="0"/>
+          <a:chOff x="0" y="0"/>
+          <a:chExt cx="0" cy="0"/>
+        </a:xfrm>
+      </p:grpSpPr>
+      <p:sp>
+        <p:nvSpPr>
+          <p:cNvPr id="2" name="Title 1"/>
+          <p:cNvSpPr>
+            <a:spLocks noGrp="1"/>
+          </p:cNvSpPr>
+          <p:nvPr>
+            <p:ph type="title"/>
+          </p:nvPr>
+        </p:nvSpPr>
+        <p:spPr>
+          <a:xfrm>
+            <a:off x="381000" y="230188"/>
+            <a:ext cx="8382000" cy="664797"/>
+          </a:xfrm>
+        </p:spPr>
+        <p:txBody>
+          <a:bodyPr/>
+          <a:lstStyle/>
+          <a:p>
+            <a:r>
+              <a:rPr lang="en-US" dirty="0" smtClean="0"/>
+              <a:t>Polymorphism</a:t>
+            </a:r>
+            <a:endParaRPr lang="en-US" dirty="0"/>
+          </a:p>
+        </p:txBody>
+      </p:sp>
+      <p:sp>
+        <p:nvSpPr>
+          <p:cNvPr id="3" name="Text Placeholder 2"/>
+          <p:cNvSpPr>
+            <a:spLocks noGrp="1"/>
+          </p:cNvSpPr>
+          <p:nvPr>
+            <p:ph type="body" sz="quarter" idx="10"/>
+          </p:nvPr>
+        </p:nvSpPr>
+        <p:spPr>
+          <a:xfrm>
+            <a:off x="304800" y="1295400"/>
+            <a:ext cx="8534400" cy="4764381"/>
+          </a:xfrm>
+        </p:spPr>
+        <p:txBody>
+          <a:bodyPr/>
+          <a:lstStyle/>
+          <a:p>
+            <a:r>
+              <a:rPr lang="en-US" dirty="0" smtClean="0"/>
+              <a:t>What is the difference between generic programming and polymorphism?</a:t>
+            </a:r>
+          </a:p>
+          <a:p>
+            <a:r>
+              <a:rPr lang="en-US" dirty="0" smtClean="0"/>
+              <a:t>For Python, not much!</a:t>
+            </a:r>
+          </a:p>
+          <a:p>
+            <a:pPr lvl="1"/>
+            <a:r>
+              <a:rPr lang="en-US" dirty="0" smtClean="0"/>
+              <a:t>Just a greater focus on abstraction.</a:t>
+            </a:r>
+          </a:p>
+          <a:p>
+            <a:r>
+              <a:rPr lang="en-US" dirty="0" smtClean="0"/>
+              <a:t>Languages like C++, with stronger typing, needed extension to support generic programming:</a:t>
+            </a:r>
+          </a:p>
+          <a:p>
+            <a:pPr lvl="1"/>
+            <a:r>
+              <a:rPr lang="en-US" dirty="0" smtClean="0"/>
+              <a:t>C++ Standard Template Library, written by </a:t>
+            </a:r>
+            <a:r>
+              <a:rPr lang="en-US" dirty="0" err="1" smtClean="0"/>
+              <a:t>Stepanov</a:t>
+            </a:r>
+            <a:r>
+              <a:rPr lang="en-US" dirty="0" smtClean="0"/>
+              <a:t>:</a:t>
+            </a:r>
+          </a:p>
+          <a:p>
+            <a:pPr lvl="2"/>
+            <a:r>
+              <a:rPr lang="en-US" dirty="0" smtClean="0"/>
+              <a:t>“</a:t>
+            </a:r>
+            <a:r>
+              <a:rPr lang="en-US" dirty="0"/>
+              <a:t>For example, an algorithm to reverse a sequence can be implemented using bidirectional iterators, and then the same implementation can be used on lists, vectors and </a:t>
+            </a:r>
+            <a:r>
+              <a:rPr lang="en-US" dirty="0" err="1" smtClean="0"/>
+              <a:t>deques</a:t>
+            </a:r>
+            <a:r>
+              <a:rPr lang="en-US" dirty="0" smtClean="0"/>
+              <a:t>.” (Wikipedia)</a:t>
+            </a:r>
+            <a:endParaRPr lang="en-US" dirty="0"/>
+          </a:p>
+        </p:txBody>
+      </p:sp>
+    </p:spTree>
+    <p:extLst>
+      <p:ext uri="{BB962C8B-B14F-4D97-AF65-F5344CB8AC3E}">
+        <p14:creationId xmlns:p14="http://schemas.microsoft.com/office/powerpoint/2010/main" val="1039285656"/>
+      </p:ext>
+    </p:extLst>
+  </p:cSld>
+  <p:clrMapOvr>
+    <a:masterClrMapping/>
+  </p:clrMapOvr>
+  <p:transition>
+    <p:fade/>
+  </p:transition>
+  <p:timing>
+    <p:tnLst>
+      <p:par>
+        <p:cTn id="1" dur="indefinite" restart="never" nodeType="tmRoot"/>
+      </p:par>
+    </p:tnLst>
+  </p:timing>
+</p:sld>
+</file>
+
+<file path=ppt/slides/slide5.xml><?xml version="1.0" encoding="utf-8"?>
 <p:sld xmlns:a="http://schemas.openxmlformats.org/drawingml/2006/main" xmlns:r="http://schemas.openxmlformats.org/officeDocument/2006/relationships" xmlns:p="http://schemas.openxmlformats.org/presentationml/2006/main">
   <p:cSld>
     <p:spTree>
@@ -33650,13 +34461,29 @@
   <p:clrMapOvr>
     <a:masterClrMapping/>
   </p:clrMapOvr>
-  <p:transition>
-    <p:fade/>
-  </p:transition>
+  <mc:AlternateContent xmlns:mc="http://schemas.openxmlformats.org/markup-compatibility/2006">
+    <mc:Choice xmlns:p14="http://schemas.microsoft.com/office/powerpoint/2010/main" Requires="p14">
+      <p:transition spd="slow" p14:dur="4400">
+        <p14:honeycomb/>
+      </p:transition>
+    </mc:Choice>
+    <mc:Fallback>
+      <p:transition spd="slow">
+        <p:fade/>
+      </p:transition>
+    </mc:Fallback>
+  </mc:AlternateContent>
+  <p:timing>
+    <p:tnLst>
+      <p:par>
+        <p:cTn id="1" dur="indefinite" restart="never" nodeType="tmRoot"/>
+      </p:par>
+    </p:tnLst>
+  </p:timing>
 </p:sld>
 </file>
 
-<file path=ppt/slides/slide5.xml><?xml version="1.0" encoding="utf-8"?>
+<file path=ppt/slides/slide6.xml><?xml version="1.0" encoding="utf-8"?>
 <p:sld xmlns:a="http://schemas.openxmlformats.org/drawingml/2006/main" xmlns:r="http://schemas.openxmlformats.org/officeDocument/2006/relationships" xmlns:p="http://schemas.openxmlformats.org/presentationml/2006/main">
   <p:cSld>
     <p:spTree>
@@ -33835,7 +34662,7 @@
 </p:sld>
 </file>
 
-<file path=ppt/slides/slide6.xml><?xml version="1.0" encoding="utf-8"?>
+<file path=ppt/slides/slide7.xml><?xml version="1.0" encoding="utf-8"?>
 <p:sld xmlns:a="http://schemas.openxmlformats.org/drawingml/2006/main" xmlns:r="http://schemas.openxmlformats.org/officeDocument/2006/relationships" xmlns:p="http://schemas.openxmlformats.org/presentationml/2006/main">
   <p:cSld>
     <p:spTree>
@@ -34011,7 +34838,7 @@
 </p:sld>
 </file>
 
-<file path=ppt/slides/slide7.xml><?xml version="1.0" encoding="utf-8"?>
+<file path=ppt/slides/slide8.xml><?xml version="1.0" encoding="utf-8"?>
 <p:sld xmlns:a="http://schemas.openxmlformats.org/drawingml/2006/main" xmlns:r="http://schemas.openxmlformats.org/officeDocument/2006/relationships" xmlns:p="http://schemas.openxmlformats.org/presentationml/2006/main">
   <p:cSld>
     <p:spTree>
@@ -34153,7 +34980,7 @@
 </p:sld>
 </file>
 
-<file path=ppt/slides/slide8.xml><?xml version="1.0" encoding="utf-8"?>
+<file path=ppt/slides/slide9.xml><?xml version="1.0" encoding="utf-8"?>
 <p:sld xmlns:a="http://schemas.openxmlformats.org/drawingml/2006/main" xmlns:r="http://schemas.openxmlformats.org/officeDocument/2006/relationships" xmlns:p="http://schemas.openxmlformats.org/presentationml/2006/main">
   <p:cSld>
     <p:spTree>
@@ -34300,171 +35127,6 @@
     <p:extLst>
       <p:ext uri="{BB962C8B-B14F-4D97-AF65-F5344CB8AC3E}">
         <p14:creationId xmlns:p14="http://schemas.microsoft.com/office/powerpoint/2010/main" val="3726126062"/>
-      </p:ext>
-    </p:extLst>
-  </p:cSld>
-  <p:clrMapOvr>
-    <a:masterClrMapping/>
-  </p:clrMapOvr>
-  <p:transition>
-    <p:fade/>
-  </p:transition>
-  <p:timing>
-    <p:tnLst>
-      <p:par>
-        <p:cTn id="1" dur="indefinite" restart="never" nodeType="tmRoot"/>
-      </p:par>
-    </p:tnLst>
-  </p:timing>
-</p:sld>
-</file>
-
-<file path=ppt/slides/slide9.xml><?xml version="1.0" encoding="utf-8"?>
-<p:sld xmlns:a="http://schemas.openxmlformats.org/drawingml/2006/main" xmlns:r="http://schemas.openxmlformats.org/officeDocument/2006/relationships" xmlns:p="http://schemas.openxmlformats.org/presentationml/2006/main">
-  <p:cSld>
-    <p:spTree>
-      <p:nvGrpSpPr>
-        <p:cNvPr id="1" name=""/>
-        <p:cNvGrpSpPr/>
-        <p:nvPr/>
-      </p:nvGrpSpPr>
-      <p:grpSpPr>
-        <a:xfrm>
-          <a:off x="0" y="0"/>
-          <a:ext cx="0" cy="0"/>
-          <a:chOff x="0" y="0"/>
-          <a:chExt cx="0" cy="0"/>
-        </a:xfrm>
-      </p:grpSpPr>
-      <p:sp>
-        <p:nvSpPr>
-          <p:cNvPr id="2" name="Title 1"/>
-          <p:cNvSpPr>
-            <a:spLocks noGrp="1"/>
-          </p:cNvSpPr>
-          <p:nvPr>
-            <p:ph type="title"/>
-          </p:nvPr>
-        </p:nvSpPr>
-        <p:spPr>
-          <a:xfrm>
-            <a:off x="381000" y="230188"/>
-            <a:ext cx="8382000" cy="760412"/>
-          </a:xfrm>
-        </p:spPr>
-        <p:txBody>
-          <a:bodyPr>
-            <a:normAutofit fontScale="90000"/>
-          </a:bodyPr>
-          <a:lstStyle/>
-          <a:p>
-            <a:r>
-              <a:rPr lang="en-US" smtClean="0"/>
-              <a:t>Agent-Based Modeling </a:t>
-            </a:r>
-            <a:r>
-              <a:rPr lang="en-US"/>
-              <a:t>(ABM)</a:t>
-            </a:r>
-            <a:r>
-              <a:rPr lang="en-US" dirty="0" smtClean="0"/>
-              <a:t/>
-            </a:r>
-            <a:br>
-              <a:rPr lang="en-US" dirty="0" smtClean="0"/>
-            </a:br>
-            <a:endParaRPr lang="en-US" dirty="0">
-              <a:solidFill>
-                <a:schemeClr val="tx2"/>
-              </a:solidFill>
-            </a:endParaRPr>
-          </a:p>
-        </p:txBody>
-      </p:sp>
-      <p:sp>
-        <p:nvSpPr>
-          <p:cNvPr id="3" name="Text Placeholder 2"/>
-          <p:cNvSpPr>
-            <a:spLocks noGrp="1"/>
-          </p:cNvSpPr>
-          <p:nvPr>
-            <p:ph type="body" sz="quarter" idx="10"/>
-          </p:nvPr>
-        </p:nvSpPr>
-        <p:spPr>
-          <a:xfrm>
-            <a:off x="381000" y="990600"/>
-            <a:ext cx="8382000" cy="2209800"/>
-          </a:xfrm>
-        </p:spPr>
-        <p:txBody>
-          <a:bodyPr>
-            <a:normAutofit/>
-          </a:bodyPr>
-          <a:lstStyle/>
-          <a:p>
-            <a:r>
-              <a:rPr lang="en-US" dirty="0" smtClean="0"/>
-              <a:t>Example: a forest fire model</a:t>
-            </a:r>
-          </a:p>
-          <a:p>
-            <a:pPr lvl="1"/>
-            <a:r>
-              <a:rPr lang="en-US" dirty="0" smtClean="0"/>
-              <a:t>Lightening strikes randomly, starting a fire</a:t>
-            </a:r>
-          </a:p>
-          <a:p>
-            <a:pPr lvl="1"/>
-            <a:r>
-              <a:rPr lang="en-US" dirty="0" smtClean="0"/>
-              <a:t>Trees on fire ignite neighbors</a:t>
-            </a:r>
-          </a:p>
-          <a:p>
-            <a:pPr lvl="1"/>
-            <a:r>
-              <a:rPr lang="en-US" dirty="0" smtClean="0"/>
-              <a:t>Trees grow anew in burned out spots</a:t>
-            </a:r>
-          </a:p>
-        </p:txBody>
-      </p:sp>
-      <p:pic>
-        <p:nvPicPr>
-          <p:cNvPr id="4" name="Picture 3" descr="forest_fire.png"/>
-          <p:cNvPicPr>
-            <a:picLocks noChangeAspect="1"/>
-          </p:cNvPicPr>
-          <p:nvPr/>
-        </p:nvPicPr>
-        <p:blipFill>
-          <a:blip r:embed="rId3">
-            <a:extLst>
-              <a:ext uri="{28A0092B-C50C-407E-A947-70E740481C1C}">
-                <a14:useLocalDpi xmlns:a14="http://schemas.microsoft.com/office/drawing/2010/main" val="0"/>
-              </a:ext>
-            </a:extLst>
-          </a:blip>
-          <a:stretch>
-            <a:fillRect/>
-          </a:stretch>
-        </p:blipFill>
-        <p:spPr>
-          <a:xfrm>
-            <a:off x="3581400" y="3048000"/>
-            <a:ext cx="4724400" cy="3543300"/>
-          </a:xfrm>
-          <a:prstGeom prst="rect">
-            <a:avLst/>
-          </a:prstGeom>
-        </p:spPr>
-      </p:pic>
-    </p:spTree>
-    <p:extLst>
-      <p:ext uri="{BB962C8B-B14F-4D97-AF65-F5344CB8AC3E}">
-        <p14:creationId xmlns:p14="http://schemas.microsoft.com/office/powerpoint/2010/main" val="4038856037"/>
       </p:ext>
     </p:extLst>
   </p:cSld>

</xml_diff>

<commit_message>
Updated ABMS as algebras presentation for PyGotham.
</commit_message>
<xml_diff>
--- a/docs/ABMsAsAlgebraic.pptx
+++ b/docs/ABMsAsAlgebraic.pptx
@@ -36,10 +36,10 @@
     <p:sldId id="301" r:id="rId30"/>
     <p:sldId id="302" r:id="rId31"/>
     <p:sldId id="303" r:id="rId32"/>
-    <p:sldId id="304" r:id="rId33"/>
-    <p:sldId id="305" r:id="rId34"/>
-    <p:sldId id="306" r:id="rId35"/>
-    <p:sldId id="312" r:id="rId36"/>
+    <p:sldId id="318" r:id="rId33"/>
+    <p:sldId id="304" r:id="rId34"/>
+    <p:sldId id="305" r:id="rId35"/>
+    <p:sldId id="306" r:id="rId36"/>
     <p:sldId id="290" r:id="rId37"/>
     <p:sldId id="268" r:id="rId38"/>
     <p:sldId id="307" r:id="rId39"/>
@@ -6520,6 +6520,788 @@
   <dgm:styleLbl name="fgShp">
     <dgm:fillClrLst meth="repeat">
       <a:schemeClr val="accent5">
+        <a:tint val="40000"/>
+      </a:schemeClr>
+    </dgm:fillClrLst>
+    <dgm:linClrLst meth="repeat">
+      <a:schemeClr val="lt1"/>
+    </dgm:linClrLst>
+    <dgm:effectClrLst/>
+    <dgm:txLinClrLst/>
+    <dgm:txFillClrLst meth="repeat">
+      <a:schemeClr val="dk1"/>
+    </dgm:txFillClrLst>
+    <dgm:txEffectClrLst/>
+  </dgm:styleLbl>
+  <dgm:styleLbl name="revTx">
+    <dgm:fillClrLst meth="repeat">
+      <a:schemeClr val="lt1">
+        <a:alpha val="0"/>
+      </a:schemeClr>
+    </dgm:fillClrLst>
+    <dgm:linClrLst meth="repeat">
+      <a:schemeClr val="dk1">
+        <a:alpha val="0"/>
+      </a:schemeClr>
+    </dgm:linClrLst>
+    <dgm:effectClrLst/>
+    <dgm:txLinClrLst/>
+    <dgm:txFillClrLst meth="repeat">
+      <a:schemeClr val="tx1"/>
+    </dgm:txFillClrLst>
+    <dgm:txEffectClrLst/>
+  </dgm:styleLbl>
+</dgm:colorsDef>
+</file>
+
+<file path=ppt/diagrams/colors9.xml><?xml version="1.0" encoding="utf-8"?>
+<dgm:colorsDef xmlns:dgm="http://schemas.openxmlformats.org/drawingml/2006/diagram" xmlns:a="http://schemas.openxmlformats.org/drawingml/2006/main" uniqueId="urn:microsoft.com/office/officeart/2005/8/colors/colorful2">
+  <dgm:title val=""/>
+  <dgm:desc val=""/>
+  <dgm:catLst>
+    <dgm:cat type="colorful" pri="10200"/>
+  </dgm:catLst>
+  <dgm:styleLbl name="node0">
+    <dgm:fillClrLst meth="repeat">
+      <a:schemeClr val="accent1"/>
+    </dgm:fillClrLst>
+    <dgm:linClrLst meth="repeat">
+      <a:schemeClr val="lt1"/>
+    </dgm:linClrLst>
+    <dgm:effectClrLst/>
+    <dgm:txLinClrLst/>
+    <dgm:txFillClrLst/>
+    <dgm:txEffectClrLst/>
+  </dgm:styleLbl>
+  <dgm:styleLbl name="node1">
+    <dgm:fillClrLst>
+      <a:schemeClr val="accent2"/>
+      <a:schemeClr val="accent3"/>
+    </dgm:fillClrLst>
+    <dgm:linClrLst meth="repeat">
+      <a:schemeClr val="lt1"/>
+    </dgm:linClrLst>
+    <dgm:effectClrLst/>
+    <dgm:txLinClrLst/>
+    <dgm:txFillClrLst/>
+    <dgm:txEffectClrLst/>
+  </dgm:styleLbl>
+  <dgm:styleLbl name="alignNode1">
+    <dgm:fillClrLst>
+      <a:schemeClr val="accent2"/>
+      <a:schemeClr val="accent3"/>
+    </dgm:fillClrLst>
+    <dgm:linClrLst>
+      <a:schemeClr val="accent2"/>
+      <a:schemeClr val="accent3"/>
+    </dgm:linClrLst>
+    <dgm:effectClrLst/>
+    <dgm:txLinClrLst/>
+    <dgm:txFillClrLst/>
+    <dgm:txEffectClrLst/>
+  </dgm:styleLbl>
+  <dgm:styleLbl name="lnNode1">
+    <dgm:fillClrLst>
+      <a:schemeClr val="accent2"/>
+      <a:schemeClr val="accent3"/>
+    </dgm:fillClrLst>
+    <dgm:linClrLst meth="repeat">
+      <a:schemeClr val="lt1"/>
+    </dgm:linClrLst>
+    <dgm:effectClrLst/>
+    <dgm:txLinClrLst/>
+    <dgm:txFillClrLst/>
+    <dgm:txEffectClrLst/>
+  </dgm:styleLbl>
+  <dgm:styleLbl name="vennNode1">
+    <dgm:fillClrLst>
+      <a:schemeClr val="accent2">
+        <a:alpha val="50000"/>
+      </a:schemeClr>
+      <a:schemeClr val="accent3">
+        <a:alpha val="50000"/>
+      </a:schemeClr>
+    </dgm:fillClrLst>
+    <dgm:linClrLst meth="repeat">
+      <a:schemeClr val="lt1"/>
+    </dgm:linClrLst>
+    <dgm:effectClrLst/>
+    <dgm:txLinClrLst/>
+    <dgm:txFillClrLst/>
+    <dgm:txEffectClrLst/>
+  </dgm:styleLbl>
+  <dgm:styleLbl name="node2">
+    <dgm:fillClrLst>
+      <a:schemeClr val="accent3"/>
+    </dgm:fillClrLst>
+    <dgm:linClrLst meth="repeat">
+      <a:schemeClr val="lt1"/>
+    </dgm:linClrLst>
+    <dgm:effectClrLst/>
+    <dgm:txLinClrLst/>
+    <dgm:txFillClrLst/>
+    <dgm:txEffectClrLst/>
+  </dgm:styleLbl>
+  <dgm:styleLbl name="node3">
+    <dgm:fillClrLst>
+      <a:schemeClr val="accent4"/>
+    </dgm:fillClrLst>
+    <dgm:linClrLst meth="repeat">
+      <a:schemeClr val="lt1"/>
+    </dgm:linClrLst>
+    <dgm:effectClrLst/>
+    <dgm:txLinClrLst/>
+    <dgm:txFillClrLst/>
+    <dgm:txEffectClrLst/>
+  </dgm:styleLbl>
+  <dgm:styleLbl name="node4">
+    <dgm:fillClrLst>
+      <a:schemeClr val="accent5"/>
+    </dgm:fillClrLst>
+    <dgm:linClrLst meth="repeat">
+      <a:schemeClr val="lt1"/>
+    </dgm:linClrLst>
+    <dgm:effectClrLst/>
+    <dgm:txLinClrLst/>
+    <dgm:txFillClrLst/>
+    <dgm:txEffectClrLst/>
+  </dgm:styleLbl>
+  <dgm:styleLbl name="fgImgPlace1">
+    <dgm:fillClrLst>
+      <a:schemeClr val="accent2">
+        <a:tint val="50000"/>
+      </a:schemeClr>
+      <a:schemeClr val="accent3">
+        <a:tint val="50000"/>
+      </a:schemeClr>
+    </dgm:fillClrLst>
+    <dgm:linClrLst meth="repeat">
+      <a:schemeClr val="lt1"/>
+    </dgm:linClrLst>
+    <dgm:effectClrLst/>
+    <dgm:txLinClrLst/>
+    <dgm:txFillClrLst meth="repeat">
+      <a:schemeClr val="lt1"/>
+    </dgm:txFillClrLst>
+    <dgm:txEffectClrLst/>
+  </dgm:styleLbl>
+  <dgm:styleLbl name="alignImgPlace1">
+    <dgm:fillClrLst>
+      <a:schemeClr val="accent2">
+        <a:tint val="50000"/>
+      </a:schemeClr>
+      <a:schemeClr val="accent3">
+        <a:tint val="20000"/>
+      </a:schemeClr>
+    </dgm:fillClrLst>
+    <dgm:linClrLst meth="repeat">
+      <a:schemeClr val="lt1"/>
+    </dgm:linClrLst>
+    <dgm:effectClrLst/>
+    <dgm:txLinClrLst/>
+    <dgm:txFillClrLst meth="repeat">
+      <a:schemeClr val="lt1"/>
+    </dgm:txFillClrLst>
+    <dgm:txEffectClrLst/>
+  </dgm:styleLbl>
+  <dgm:styleLbl name="bgImgPlace1">
+    <dgm:fillClrLst>
+      <a:schemeClr val="accent2">
+        <a:tint val="50000"/>
+      </a:schemeClr>
+      <a:schemeClr val="accent3">
+        <a:tint val="20000"/>
+      </a:schemeClr>
+    </dgm:fillClrLst>
+    <dgm:linClrLst meth="repeat">
+      <a:schemeClr val="lt1"/>
+    </dgm:linClrLst>
+    <dgm:effectClrLst/>
+    <dgm:txLinClrLst/>
+    <dgm:txFillClrLst meth="repeat">
+      <a:schemeClr val="lt1"/>
+    </dgm:txFillClrLst>
+    <dgm:txEffectClrLst/>
+  </dgm:styleLbl>
+  <dgm:styleLbl name="sibTrans2D1">
+    <dgm:fillClrLst>
+      <a:schemeClr val="accent2"/>
+      <a:schemeClr val="accent3"/>
+    </dgm:fillClrLst>
+    <dgm:linClrLst meth="repeat">
+      <a:schemeClr val="lt1"/>
+    </dgm:linClrLst>
+    <dgm:effectClrLst/>
+    <dgm:txLinClrLst/>
+    <dgm:txFillClrLst/>
+    <dgm:txEffectClrLst/>
+  </dgm:styleLbl>
+  <dgm:styleLbl name="fgSibTrans2D1">
+    <dgm:fillClrLst>
+      <a:schemeClr val="accent2"/>
+      <a:schemeClr val="accent3"/>
+    </dgm:fillClrLst>
+    <dgm:linClrLst meth="repeat">
+      <a:schemeClr val="lt1"/>
+    </dgm:linClrLst>
+    <dgm:effectClrLst/>
+    <dgm:txLinClrLst/>
+    <dgm:txFillClrLst meth="repeat">
+      <a:schemeClr val="lt1"/>
+    </dgm:txFillClrLst>
+    <dgm:txEffectClrLst/>
+  </dgm:styleLbl>
+  <dgm:styleLbl name="bgSibTrans2D1">
+    <dgm:fillClrLst>
+      <a:schemeClr val="accent2"/>
+      <a:schemeClr val="accent3"/>
+    </dgm:fillClrLst>
+    <dgm:linClrLst meth="repeat">
+      <a:schemeClr val="lt1"/>
+    </dgm:linClrLst>
+    <dgm:effectClrLst/>
+    <dgm:txLinClrLst/>
+    <dgm:txFillClrLst meth="repeat">
+      <a:schemeClr val="lt1"/>
+    </dgm:txFillClrLst>
+    <dgm:txEffectClrLst/>
+  </dgm:styleLbl>
+  <dgm:styleLbl name="sibTrans1D1">
+    <dgm:fillClrLst/>
+    <dgm:linClrLst>
+      <a:schemeClr val="accent2"/>
+      <a:schemeClr val="accent3"/>
+    </dgm:linClrLst>
+    <dgm:effectClrLst/>
+    <dgm:txLinClrLst/>
+    <dgm:txFillClrLst meth="repeat">
+      <a:schemeClr val="tx1"/>
+    </dgm:txFillClrLst>
+    <dgm:txEffectClrLst/>
+  </dgm:styleLbl>
+  <dgm:styleLbl name="callout">
+    <dgm:fillClrLst meth="repeat">
+      <a:schemeClr val="accent2"/>
+    </dgm:fillClrLst>
+    <dgm:linClrLst meth="repeat">
+      <a:schemeClr val="accent2">
+        <a:tint val="50000"/>
+      </a:schemeClr>
+    </dgm:linClrLst>
+    <dgm:effectClrLst/>
+    <dgm:txLinClrLst/>
+    <dgm:txFillClrLst meth="repeat">
+      <a:schemeClr val="tx1"/>
+    </dgm:txFillClrLst>
+    <dgm:txEffectClrLst/>
+  </dgm:styleLbl>
+  <dgm:styleLbl name="asst0">
+    <dgm:fillClrLst meth="repeat">
+      <a:schemeClr val="accent2"/>
+    </dgm:fillClrLst>
+    <dgm:linClrLst meth="repeat">
+      <a:schemeClr val="lt1">
+        <a:shade val="80000"/>
+      </a:schemeClr>
+    </dgm:linClrLst>
+    <dgm:effectClrLst/>
+    <dgm:txLinClrLst/>
+    <dgm:txFillClrLst/>
+    <dgm:txEffectClrLst/>
+  </dgm:styleLbl>
+  <dgm:styleLbl name="asst1">
+    <dgm:fillClrLst meth="repeat">
+      <a:schemeClr val="accent3"/>
+    </dgm:fillClrLst>
+    <dgm:linClrLst meth="repeat">
+      <a:schemeClr val="lt1">
+        <a:shade val="80000"/>
+      </a:schemeClr>
+    </dgm:linClrLst>
+    <dgm:effectClrLst/>
+    <dgm:txLinClrLst/>
+    <dgm:txFillClrLst/>
+    <dgm:txEffectClrLst/>
+  </dgm:styleLbl>
+  <dgm:styleLbl name="asst2">
+    <dgm:fillClrLst>
+      <a:schemeClr val="accent4"/>
+    </dgm:fillClrLst>
+    <dgm:linClrLst meth="repeat">
+      <a:schemeClr val="lt1"/>
+    </dgm:linClrLst>
+    <dgm:effectClrLst/>
+    <dgm:txLinClrLst/>
+    <dgm:txFillClrLst/>
+    <dgm:txEffectClrLst/>
+  </dgm:styleLbl>
+  <dgm:styleLbl name="asst3">
+    <dgm:fillClrLst>
+      <a:schemeClr val="accent5"/>
+    </dgm:fillClrLst>
+    <dgm:linClrLst meth="repeat">
+      <a:schemeClr val="lt1"/>
+    </dgm:linClrLst>
+    <dgm:effectClrLst/>
+    <dgm:txLinClrLst/>
+    <dgm:txFillClrLst/>
+    <dgm:txEffectClrLst/>
+  </dgm:styleLbl>
+  <dgm:styleLbl name="asst4">
+    <dgm:fillClrLst>
+      <a:schemeClr val="accent6"/>
+    </dgm:fillClrLst>
+    <dgm:linClrLst meth="repeat">
+      <a:schemeClr val="lt1"/>
+    </dgm:linClrLst>
+    <dgm:effectClrLst/>
+    <dgm:txLinClrLst/>
+    <dgm:txFillClrLst/>
+    <dgm:txEffectClrLst/>
+  </dgm:styleLbl>
+  <dgm:styleLbl name="parChTrans2D1">
+    <dgm:fillClrLst meth="repeat">
+      <a:schemeClr val="accent2"/>
+    </dgm:fillClrLst>
+    <dgm:linClrLst meth="repeat">
+      <a:schemeClr val="lt1"/>
+    </dgm:linClrLst>
+    <dgm:effectClrLst/>
+    <dgm:txLinClrLst/>
+    <dgm:txFillClrLst meth="repeat">
+      <a:schemeClr val="lt1"/>
+    </dgm:txFillClrLst>
+    <dgm:txEffectClrLst/>
+  </dgm:styleLbl>
+  <dgm:styleLbl name="parChTrans2D2">
+    <dgm:fillClrLst meth="repeat">
+      <a:schemeClr val="accent3"/>
+    </dgm:fillClrLst>
+    <dgm:linClrLst meth="repeat">
+      <a:schemeClr val="lt1"/>
+    </dgm:linClrLst>
+    <dgm:effectClrLst/>
+    <dgm:txLinClrLst/>
+    <dgm:txFillClrLst/>
+    <dgm:txEffectClrLst/>
+  </dgm:styleLbl>
+  <dgm:styleLbl name="parChTrans2D3">
+    <dgm:fillClrLst meth="repeat">
+      <a:schemeClr val="accent4"/>
+    </dgm:fillClrLst>
+    <dgm:linClrLst meth="repeat">
+      <a:schemeClr val="lt1"/>
+    </dgm:linClrLst>
+    <dgm:effectClrLst/>
+    <dgm:txLinClrLst/>
+    <dgm:txFillClrLst/>
+    <dgm:txEffectClrLst/>
+  </dgm:styleLbl>
+  <dgm:styleLbl name="parChTrans2D4">
+    <dgm:fillClrLst meth="repeat">
+      <a:schemeClr val="accent5"/>
+    </dgm:fillClrLst>
+    <dgm:linClrLst meth="repeat">
+      <a:schemeClr val="lt1"/>
+    </dgm:linClrLst>
+    <dgm:effectClrLst/>
+    <dgm:txLinClrLst/>
+    <dgm:txFillClrLst meth="repeat">
+      <a:schemeClr val="lt1"/>
+    </dgm:txFillClrLst>
+    <dgm:txEffectClrLst/>
+  </dgm:styleLbl>
+  <dgm:styleLbl name="parChTrans1D1">
+    <dgm:fillClrLst meth="repeat">
+      <a:schemeClr val="accent2"/>
+    </dgm:fillClrLst>
+    <dgm:linClrLst meth="repeat">
+      <a:schemeClr val="accent2"/>
+    </dgm:linClrLst>
+    <dgm:effectClrLst/>
+    <dgm:txLinClrLst/>
+    <dgm:txFillClrLst meth="repeat">
+      <a:schemeClr val="tx1"/>
+    </dgm:txFillClrLst>
+    <dgm:txEffectClrLst/>
+  </dgm:styleLbl>
+  <dgm:styleLbl name="parChTrans1D2">
+    <dgm:fillClrLst meth="repeat">
+      <a:schemeClr val="accent2">
+        <a:tint val="90000"/>
+      </a:schemeClr>
+    </dgm:fillClrLst>
+    <dgm:linClrLst meth="repeat">
+      <a:schemeClr val="accent3"/>
+    </dgm:linClrLst>
+    <dgm:effectClrLst/>
+    <dgm:txLinClrLst/>
+    <dgm:txFillClrLst meth="repeat">
+      <a:schemeClr val="tx1"/>
+    </dgm:txFillClrLst>
+    <dgm:txEffectClrLst/>
+  </dgm:styleLbl>
+  <dgm:styleLbl name="parChTrans1D3">
+    <dgm:fillClrLst meth="repeat">
+      <a:schemeClr val="accent2">
+        <a:tint val="70000"/>
+      </a:schemeClr>
+    </dgm:fillClrLst>
+    <dgm:linClrLst meth="repeat">
+      <a:schemeClr val="accent4"/>
+    </dgm:linClrLst>
+    <dgm:effectClrLst/>
+    <dgm:txLinClrLst/>
+    <dgm:txFillClrLst meth="repeat">
+      <a:schemeClr val="tx1"/>
+    </dgm:txFillClrLst>
+    <dgm:txEffectClrLst/>
+  </dgm:styleLbl>
+  <dgm:styleLbl name="parChTrans1D4">
+    <dgm:fillClrLst meth="repeat">
+      <a:schemeClr val="accent2">
+        <a:tint val="50000"/>
+      </a:schemeClr>
+    </dgm:fillClrLst>
+    <dgm:linClrLst meth="repeat">
+      <a:schemeClr val="accent5"/>
+    </dgm:linClrLst>
+    <dgm:effectClrLst/>
+    <dgm:txLinClrLst/>
+    <dgm:txFillClrLst meth="repeat">
+      <a:schemeClr val="tx1"/>
+    </dgm:txFillClrLst>
+    <dgm:txEffectClrLst/>
+  </dgm:styleLbl>
+  <dgm:styleLbl name="fgAcc1">
+    <dgm:fillClrLst meth="repeat">
+      <a:schemeClr val="lt1">
+        <a:alpha val="90000"/>
+      </a:schemeClr>
+    </dgm:fillClrLst>
+    <dgm:linClrLst>
+      <a:schemeClr val="accent2"/>
+      <a:schemeClr val="accent3"/>
+    </dgm:linClrLst>
+    <dgm:effectClrLst/>
+    <dgm:txLinClrLst/>
+    <dgm:txFillClrLst meth="repeat">
+      <a:schemeClr val="dk1"/>
+    </dgm:txFillClrLst>
+    <dgm:txEffectClrLst/>
+  </dgm:styleLbl>
+  <dgm:styleLbl name="conFgAcc1">
+    <dgm:fillClrLst meth="repeat">
+      <a:schemeClr val="lt1">
+        <a:alpha val="90000"/>
+      </a:schemeClr>
+    </dgm:fillClrLst>
+    <dgm:linClrLst>
+      <a:schemeClr val="accent2"/>
+      <a:schemeClr val="accent3"/>
+    </dgm:linClrLst>
+    <dgm:effectClrLst/>
+    <dgm:txLinClrLst/>
+    <dgm:txFillClrLst meth="repeat">
+      <a:schemeClr val="dk1"/>
+    </dgm:txFillClrLst>
+    <dgm:txEffectClrLst/>
+  </dgm:styleLbl>
+  <dgm:styleLbl name="alignAcc1">
+    <dgm:fillClrLst meth="repeat">
+      <a:schemeClr val="lt1">
+        <a:alpha val="90000"/>
+      </a:schemeClr>
+    </dgm:fillClrLst>
+    <dgm:linClrLst>
+      <a:schemeClr val="accent2"/>
+      <a:schemeClr val="accent3"/>
+    </dgm:linClrLst>
+    <dgm:effectClrLst/>
+    <dgm:txLinClrLst/>
+    <dgm:txFillClrLst meth="repeat">
+      <a:schemeClr val="dk1"/>
+    </dgm:txFillClrLst>
+    <dgm:txEffectClrLst/>
+  </dgm:styleLbl>
+  <dgm:styleLbl name="trAlignAcc1">
+    <dgm:fillClrLst meth="repeat">
+      <a:schemeClr val="lt1">
+        <a:alpha val="40000"/>
+      </a:schemeClr>
+    </dgm:fillClrLst>
+    <dgm:linClrLst meth="repeat">
+      <a:schemeClr val="accent2"/>
+    </dgm:linClrLst>
+    <dgm:effectClrLst/>
+    <dgm:txLinClrLst/>
+    <dgm:txFillClrLst meth="repeat">
+      <a:schemeClr val="dk1"/>
+    </dgm:txFillClrLst>
+    <dgm:txEffectClrLst/>
+  </dgm:styleLbl>
+  <dgm:styleLbl name="bgAcc1">
+    <dgm:fillClrLst meth="repeat">
+      <a:schemeClr val="lt1">
+        <a:alpha val="90000"/>
+      </a:schemeClr>
+    </dgm:fillClrLst>
+    <dgm:linClrLst>
+      <a:schemeClr val="accent2"/>
+      <a:schemeClr val="accent3"/>
+    </dgm:linClrLst>
+    <dgm:effectClrLst/>
+    <dgm:txLinClrLst/>
+    <dgm:txFillClrLst meth="repeat">
+      <a:schemeClr val="dk1"/>
+    </dgm:txFillClrLst>
+    <dgm:txEffectClrLst/>
+  </dgm:styleLbl>
+  <dgm:styleLbl name="solidFgAcc1">
+    <dgm:fillClrLst meth="repeat">
+      <a:schemeClr val="lt1"/>
+    </dgm:fillClrLst>
+    <dgm:linClrLst>
+      <a:schemeClr val="accent2"/>
+      <a:schemeClr val="accent3"/>
+    </dgm:linClrLst>
+    <dgm:effectClrLst/>
+    <dgm:txLinClrLst/>
+    <dgm:txFillClrLst meth="repeat">
+      <a:schemeClr val="dk1"/>
+    </dgm:txFillClrLst>
+    <dgm:txEffectClrLst/>
+  </dgm:styleLbl>
+  <dgm:styleLbl name="solidAlignAcc1">
+    <dgm:fillClrLst meth="repeat">
+      <a:schemeClr val="lt1"/>
+    </dgm:fillClrLst>
+    <dgm:linClrLst>
+      <a:schemeClr val="accent2"/>
+      <a:schemeClr val="accent3"/>
+    </dgm:linClrLst>
+    <dgm:effectClrLst/>
+    <dgm:txLinClrLst/>
+    <dgm:txFillClrLst meth="repeat">
+      <a:schemeClr val="dk1"/>
+    </dgm:txFillClrLst>
+    <dgm:txEffectClrLst/>
+  </dgm:styleLbl>
+  <dgm:styleLbl name="solidBgAcc1">
+    <dgm:fillClrLst meth="repeat">
+      <a:schemeClr val="lt1"/>
+    </dgm:fillClrLst>
+    <dgm:linClrLst>
+      <a:schemeClr val="accent2"/>
+      <a:schemeClr val="accent3"/>
+    </dgm:linClrLst>
+    <dgm:effectClrLst/>
+    <dgm:txLinClrLst/>
+    <dgm:txFillClrLst meth="repeat">
+      <a:schemeClr val="dk1"/>
+    </dgm:txFillClrLst>
+    <dgm:txEffectClrLst/>
+  </dgm:styleLbl>
+  <dgm:styleLbl name="fgAccFollowNode1">
+    <dgm:fillClrLst>
+      <a:schemeClr val="accent2">
+        <a:tint val="40000"/>
+        <a:alpha val="90000"/>
+      </a:schemeClr>
+      <a:schemeClr val="accent3">
+        <a:tint val="40000"/>
+        <a:alpha val="90000"/>
+      </a:schemeClr>
+    </dgm:fillClrLst>
+    <dgm:linClrLst>
+      <a:schemeClr val="accent2">
+        <a:tint val="40000"/>
+        <a:alpha val="90000"/>
+      </a:schemeClr>
+      <a:schemeClr val="accent3">
+        <a:tint val="40000"/>
+        <a:alpha val="90000"/>
+      </a:schemeClr>
+    </dgm:linClrLst>
+    <dgm:effectClrLst/>
+    <dgm:txLinClrLst/>
+    <dgm:txFillClrLst meth="repeat">
+      <a:schemeClr val="dk1"/>
+    </dgm:txFillClrLst>
+    <dgm:txEffectClrLst/>
+  </dgm:styleLbl>
+  <dgm:styleLbl name="alignAccFollowNode1">
+    <dgm:fillClrLst>
+      <a:schemeClr val="accent2">
+        <a:tint val="40000"/>
+        <a:alpha val="90000"/>
+      </a:schemeClr>
+      <a:schemeClr val="accent3">
+        <a:tint val="40000"/>
+        <a:alpha val="90000"/>
+      </a:schemeClr>
+    </dgm:fillClrLst>
+    <dgm:linClrLst>
+      <a:schemeClr val="accent2">
+        <a:tint val="40000"/>
+        <a:alpha val="90000"/>
+      </a:schemeClr>
+      <a:schemeClr val="accent3">
+        <a:tint val="40000"/>
+        <a:alpha val="90000"/>
+      </a:schemeClr>
+    </dgm:linClrLst>
+    <dgm:effectClrLst/>
+    <dgm:txLinClrLst/>
+    <dgm:txFillClrLst meth="repeat">
+      <a:schemeClr val="dk1"/>
+    </dgm:txFillClrLst>
+    <dgm:txEffectClrLst/>
+  </dgm:styleLbl>
+  <dgm:styleLbl name="bgAccFollowNode1">
+    <dgm:fillClrLst>
+      <a:schemeClr val="accent2">
+        <a:tint val="40000"/>
+        <a:alpha val="90000"/>
+      </a:schemeClr>
+      <a:schemeClr val="accent3">
+        <a:tint val="40000"/>
+        <a:alpha val="90000"/>
+      </a:schemeClr>
+    </dgm:fillClrLst>
+    <dgm:linClrLst>
+      <a:schemeClr val="accent2">
+        <a:tint val="40000"/>
+        <a:alpha val="90000"/>
+      </a:schemeClr>
+      <a:schemeClr val="accent3">
+        <a:tint val="40000"/>
+        <a:alpha val="90000"/>
+      </a:schemeClr>
+    </dgm:linClrLst>
+    <dgm:effectClrLst/>
+    <dgm:txLinClrLst/>
+    <dgm:txFillClrLst meth="repeat">
+      <a:schemeClr val="dk1"/>
+    </dgm:txFillClrLst>
+    <dgm:txEffectClrLst/>
+  </dgm:styleLbl>
+  <dgm:styleLbl name="fgAcc0">
+    <dgm:fillClrLst meth="repeat">
+      <a:schemeClr val="lt1">
+        <a:alpha val="90000"/>
+      </a:schemeClr>
+    </dgm:fillClrLst>
+    <dgm:linClrLst>
+      <a:schemeClr val="accent1"/>
+    </dgm:linClrLst>
+    <dgm:effectClrLst/>
+    <dgm:txLinClrLst/>
+    <dgm:txFillClrLst meth="repeat">
+      <a:schemeClr val="dk1"/>
+    </dgm:txFillClrLst>
+    <dgm:txEffectClrLst/>
+  </dgm:styleLbl>
+  <dgm:styleLbl name="fgAcc2">
+    <dgm:fillClrLst meth="repeat">
+      <a:schemeClr val="lt1">
+        <a:alpha val="90000"/>
+      </a:schemeClr>
+    </dgm:fillClrLst>
+    <dgm:linClrLst>
+      <a:schemeClr val="accent3"/>
+    </dgm:linClrLst>
+    <dgm:effectClrLst/>
+    <dgm:txLinClrLst/>
+    <dgm:txFillClrLst meth="repeat">
+      <a:schemeClr val="dk1"/>
+    </dgm:txFillClrLst>
+    <dgm:txEffectClrLst/>
+  </dgm:styleLbl>
+  <dgm:styleLbl name="fgAcc3">
+    <dgm:fillClrLst meth="repeat">
+      <a:schemeClr val="lt1">
+        <a:alpha val="90000"/>
+      </a:schemeClr>
+    </dgm:fillClrLst>
+    <dgm:linClrLst>
+      <a:schemeClr val="accent4"/>
+    </dgm:linClrLst>
+    <dgm:effectClrLst/>
+    <dgm:txLinClrLst/>
+    <dgm:txFillClrLst meth="repeat">
+      <a:schemeClr val="dk1"/>
+    </dgm:txFillClrLst>
+    <dgm:txEffectClrLst/>
+  </dgm:styleLbl>
+  <dgm:styleLbl name="fgAcc4">
+    <dgm:fillClrLst meth="repeat">
+      <a:schemeClr val="lt1">
+        <a:alpha val="90000"/>
+      </a:schemeClr>
+    </dgm:fillClrLst>
+    <dgm:linClrLst>
+      <a:schemeClr val="accent5"/>
+    </dgm:linClrLst>
+    <dgm:effectClrLst/>
+    <dgm:txLinClrLst/>
+    <dgm:txFillClrLst meth="repeat">
+      <a:schemeClr val="dk1"/>
+    </dgm:txFillClrLst>
+    <dgm:txEffectClrLst/>
+  </dgm:styleLbl>
+  <dgm:styleLbl name="bgShp">
+    <dgm:fillClrLst meth="repeat">
+      <a:schemeClr val="accent2">
+        <a:tint val="40000"/>
+      </a:schemeClr>
+    </dgm:fillClrLst>
+    <dgm:linClrLst meth="repeat">
+      <a:schemeClr val="dk1"/>
+    </dgm:linClrLst>
+    <dgm:effectClrLst/>
+    <dgm:txLinClrLst/>
+    <dgm:txFillClrLst meth="repeat">
+      <a:schemeClr val="dk1"/>
+    </dgm:txFillClrLst>
+    <dgm:txEffectClrLst/>
+  </dgm:styleLbl>
+  <dgm:styleLbl name="dkBgShp">
+    <dgm:fillClrLst meth="repeat">
+      <a:schemeClr val="accent2">
+        <a:shade val="90000"/>
+      </a:schemeClr>
+    </dgm:fillClrLst>
+    <dgm:linClrLst meth="repeat">
+      <a:schemeClr val="dk1"/>
+    </dgm:linClrLst>
+    <dgm:effectClrLst/>
+    <dgm:txLinClrLst/>
+    <dgm:txFillClrLst meth="repeat">
+      <a:schemeClr val="lt1"/>
+    </dgm:txFillClrLst>
+    <dgm:txEffectClrLst/>
+  </dgm:styleLbl>
+  <dgm:styleLbl name="trBgShp">
+    <dgm:fillClrLst meth="repeat">
+      <a:schemeClr val="accent2">
+        <a:tint val="50000"/>
+        <a:alpha val="40000"/>
+      </a:schemeClr>
+    </dgm:fillClrLst>
+    <dgm:linClrLst meth="repeat">
+      <a:schemeClr val="accent2"/>
+    </dgm:linClrLst>
+    <dgm:effectClrLst/>
+    <dgm:txLinClrLst/>
+    <dgm:txFillClrLst meth="repeat">
+      <a:schemeClr val="lt1"/>
+    </dgm:txFillClrLst>
+    <dgm:txEffectClrLst/>
+  </dgm:styleLbl>
+  <dgm:styleLbl name="fgShp">
+    <dgm:fillClrLst meth="repeat">
+      <a:schemeClr val="accent2">
         <a:tint val="40000"/>
       </a:schemeClr>
     </dgm:fillClrLst>
@@ -8616,6 +9398,484 @@
     </a:ext>
     <a:ext uri="{C62137D5-CB1D-491B-B009-E17868A290BF}">
       <dgm14:recolorImg xmlns:dgm14="http://schemas.microsoft.com/office/drawing/2010/diagram" val="1"/>
+    </a:ext>
+  </dgm:extLst>
+</dgm:dataModel>
+</file>
+
+<file path=ppt/diagrams/data9.xml><?xml version="1.0" encoding="utf-8"?>
+<dgm:dataModel xmlns:dgm="http://schemas.openxmlformats.org/drawingml/2006/diagram" xmlns:a="http://schemas.openxmlformats.org/drawingml/2006/main">
+  <dgm:ptLst>
+    <dgm:pt modelId="{2AC110E6-F772-164D-A74E-9BCCCBE8B031}" type="doc">
+      <dgm:prSet loTypeId="urn:microsoft.com/office/officeart/2009/layout/CirclePictureHierarchy" loCatId="" qsTypeId="urn:microsoft.com/office/officeart/2005/8/quickstyle/simple4" qsCatId="simple" csTypeId="urn:microsoft.com/office/officeart/2005/8/colors/colorful2" csCatId="colorful" phldr="1"/>
+      <dgm:spPr/>
+      <dgm:t>
+        <a:bodyPr/>
+        <a:lstStyle/>
+        <a:p>
+          <a:endParaRPr lang="en-US"/>
+        </a:p>
+      </dgm:t>
+    </dgm:pt>
+    <dgm:pt modelId="{50CE8BE5-FE4F-8D40-989F-58B127300842}">
+      <dgm:prSet phldrT="[Text]"/>
+      <dgm:spPr/>
+      <dgm:t>
+        <a:bodyPr/>
+        <a:lstStyle/>
+        <a:p>
+          <a:r>
+            <a:rPr lang="en-US" dirty="0" err="1" smtClean="0"/>
+            <a:t>Prehension</a:t>
+          </a:r>
+          <a:endParaRPr lang="en-US" dirty="0"/>
+        </a:p>
+      </dgm:t>
+    </dgm:pt>
+    <dgm:pt modelId="{B0C311EB-3644-0248-A207-C561591F2130}" type="parTrans" cxnId="{5EB3EF3E-32FD-E24C-83D2-6D7748D99A93}">
+      <dgm:prSet/>
+      <dgm:spPr/>
+      <dgm:t>
+        <a:bodyPr/>
+        <a:lstStyle/>
+        <a:p>
+          <a:endParaRPr lang="en-US"/>
+        </a:p>
+      </dgm:t>
+    </dgm:pt>
+    <dgm:pt modelId="{E1DB3513-1D53-6B4E-AC85-66E578D05C9F}" type="sibTrans" cxnId="{5EB3EF3E-32FD-E24C-83D2-6D7748D99A93}">
+      <dgm:prSet/>
+      <dgm:spPr/>
+      <dgm:t>
+        <a:bodyPr/>
+        <a:lstStyle/>
+        <a:p>
+          <a:endParaRPr lang="en-US"/>
+        </a:p>
+      </dgm:t>
+    </dgm:pt>
+    <dgm:pt modelId="{5947C7E3-01D6-CA4D-974E-3BBC51416DCB}">
+      <dgm:prSet phldrT="[Text]"/>
+      <dgm:spPr/>
+      <dgm:t>
+        <a:bodyPr/>
+        <a:lstStyle/>
+        <a:p>
+          <a:r>
+            <a:rPr lang="en-US" dirty="0" smtClean="0"/>
+            <a:t>Vector Space</a:t>
+          </a:r>
+          <a:endParaRPr lang="en-US" dirty="0"/>
+        </a:p>
+      </dgm:t>
+    </dgm:pt>
+    <dgm:pt modelId="{634B3ED2-2B7E-EC44-BCDD-5D639DCE0F61}" type="parTrans" cxnId="{EEF6E9A4-2C18-DC42-B3A0-77B919DB31D9}">
+      <dgm:prSet/>
+      <dgm:spPr/>
+      <dgm:t>
+        <a:bodyPr/>
+        <a:lstStyle/>
+        <a:p>
+          <a:endParaRPr lang="en-US"/>
+        </a:p>
+      </dgm:t>
+    </dgm:pt>
+    <dgm:pt modelId="{88EC45BB-3F78-0343-86B1-90C12B59880F}" type="sibTrans" cxnId="{EEF6E9A4-2C18-DC42-B3A0-77B919DB31D9}">
+      <dgm:prSet/>
+      <dgm:spPr/>
+      <dgm:t>
+        <a:bodyPr/>
+        <a:lstStyle/>
+        <a:p>
+          <a:endParaRPr lang="en-US"/>
+        </a:p>
+      </dgm:t>
+    </dgm:pt>
+    <dgm:pt modelId="{8E742056-2AE6-854E-9FEA-BE128397F8FD}">
+      <dgm:prSet phldrT="[Text]"/>
+      <dgm:spPr/>
+      <dgm:t>
+        <a:bodyPr/>
+        <a:lstStyle/>
+        <a:p>
+          <a:r>
+            <a:rPr lang="en-US" dirty="0" smtClean="0"/>
+            <a:t>Fashion model</a:t>
+          </a:r>
+          <a:endParaRPr lang="en-US" dirty="0"/>
+        </a:p>
+      </dgm:t>
+    </dgm:pt>
+    <dgm:pt modelId="{DD3C6668-7100-A248-90FE-335F532DE7D9}" type="parTrans" cxnId="{045B215C-2BB9-D040-B40E-F9C7345F2450}">
+      <dgm:prSet/>
+      <dgm:spPr/>
+      <dgm:t>
+        <a:bodyPr/>
+        <a:lstStyle/>
+        <a:p>
+          <a:endParaRPr lang="en-US"/>
+        </a:p>
+      </dgm:t>
+    </dgm:pt>
+    <dgm:pt modelId="{6635668E-D0F5-C74D-A35C-A726D64124C2}" type="sibTrans" cxnId="{045B215C-2BB9-D040-B40E-F9C7345F2450}">
+      <dgm:prSet/>
+      <dgm:spPr/>
+      <dgm:t>
+        <a:bodyPr/>
+        <a:lstStyle/>
+        <a:p>
+          <a:endParaRPr lang="en-US"/>
+        </a:p>
+      </dgm:t>
+    </dgm:pt>
+    <dgm:pt modelId="{2E75A9C6-C8EA-9546-8733-3262A052CC00}">
+      <dgm:prSet phldrT="[Text]"/>
+      <dgm:spPr/>
+      <dgm:t>
+        <a:bodyPr/>
+        <a:lstStyle/>
+        <a:p>
+          <a:r>
+            <a:rPr lang="en-US" dirty="0" smtClean="0"/>
+            <a:t>Segregation model</a:t>
+          </a:r>
+          <a:endParaRPr lang="en-US" dirty="0"/>
+        </a:p>
+      </dgm:t>
+    </dgm:pt>
+    <dgm:pt modelId="{F46B314C-F2E1-1D4A-8A6D-BFC29AB2A3D1}" type="parTrans" cxnId="{16674432-352B-7849-9F3F-369C1CD8CE0A}">
+      <dgm:prSet/>
+      <dgm:spPr/>
+      <dgm:t>
+        <a:bodyPr/>
+        <a:lstStyle/>
+        <a:p>
+          <a:endParaRPr lang="en-US"/>
+        </a:p>
+      </dgm:t>
+    </dgm:pt>
+    <dgm:pt modelId="{27B61B99-5BA6-8849-B964-393292C0F327}" type="sibTrans" cxnId="{16674432-352B-7849-9F3F-369C1CD8CE0A}">
+      <dgm:prSet/>
+      <dgm:spPr/>
+      <dgm:t>
+        <a:bodyPr/>
+        <a:lstStyle/>
+        <a:p>
+          <a:endParaRPr lang="en-US"/>
+        </a:p>
+      </dgm:t>
+    </dgm:pt>
+    <dgm:pt modelId="{7393D429-4215-3E4F-851F-3C5E85712256}">
+      <dgm:prSet phldrT="[Text]"/>
+      <dgm:spPr/>
+      <dgm:t>
+        <a:bodyPr/>
+        <a:lstStyle/>
+        <a:p>
+          <a:r>
+            <a:rPr lang="en-US" dirty="0" smtClean="0"/>
+            <a:t>Markov chain</a:t>
+          </a:r>
+          <a:endParaRPr lang="en-US" dirty="0"/>
+        </a:p>
+      </dgm:t>
+    </dgm:pt>
+    <dgm:pt modelId="{12B274E4-18DF-1F4B-A44D-2A6EDCC2AEDF}" type="parTrans" cxnId="{0CFDD76D-5F04-7A44-BFEA-5AEEF5AB19DF}">
+      <dgm:prSet/>
+      <dgm:spPr/>
+      <dgm:t>
+        <a:bodyPr/>
+        <a:lstStyle/>
+        <a:p>
+          <a:endParaRPr lang="en-US"/>
+        </a:p>
+      </dgm:t>
+    </dgm:pt>
+    <dgm:pt modelId="{239B13B9-AFAC-994B-ADC2-B0FC2237CA42}" type="sibTrans" cxnId="{0CFDD76D-5F04-7A44-BFEA-5AEEF5AB19DF}">
+      <dgm:prSet/>
+      <dgm:spPr/>
+      <dgm:t>
+        <a:bodyPr/>
+        <a:lstStyle/>
+        <a:p>
+          <a:endParaRPr lang="en-US"/>
+        </a:p>
+      </dgm:t>
+    </dgm:pt>
+    <dgm:pt modelId="{8F02186B-4DB5-E746-A59D-B6EE971B6A15}">
+      <dgm:prSet phldrT="[Text]"/>
+      <dgm:spPr/>
+      <dgm:t>
+        <a:bodyPr/>
+        <a:lstStyle/>
+        <a:p>
+          <a:r>
+            <a:rPr lang="en-US" dirty="0" smtClean="0"/>
+            <a:t>Forest fire</a:t>
+          </a:r>
+          <a:endParaRPr lang="en-US" dirty="0"/>
+        </a:p>
+      </dgm:t>
+    </dgm:pt>
+    <dgm:pt modelId="{B63DCA60-5459-BA43-8773-949551BE5A96}" type="parTrans" cxnId="{4AEE76C3-5D53-C647-B197-3027AC114694}">
+      <dgm:prSet/>
+      <dgm:spPr/>
+      <dgm:t>
+        <a:bodyPr/>
+        <a:lstStyle/>
+        <a:p>
+          <a:endParaRPr lang="en-US"/>
+        </a:p>
+      </dgm:t>
+    </dgm:pt>
+    <dgm:pt modelId="{096A4D9F-B72B-2A46-911B-B8567288A4D6}" type="sibTrans" cxnId="{4AEE76C3-5D53-C647-B197-3027AC114694}">
+      <dgm:prSet/>
+      <dgm:spPr/>
+      <dgm:t>
+        <a:bodyPr/>
+        <a:lstStyle/>
+        <a:p>
+          <a:endParaRPr lang="en-US"/>
+        </a:p>
+      </dgm:t>
+    </dgm:pt>
+    <dgm:pt modelId="{5B69B621-125F-8C4C-A968-60E72CEDA897}" type="pres">
+      <dgm:prSet presAssocID="{2AC110E6-F772-164D-A74E-9BCCCBE8B031}" presName="hierChild1" presStyleCnt="0">
+        <dgm:presLayoutVars>
+          <dgm:chPref val="1"/>
+          <dgm:dir/>
+          <dgm:animOne val="branch"/>
+          <dgm:animLvl val="lvl"/>
+          <dgm:resizeHandles/>
+        </dgm:presLayoutVars>
+      </dgm:prSet>
+      <dgm:spPr/>
+    </dgm:pt>
+    <dgm:pt modelId="{58B3EE37-8A08-6E43-95EE-907BE55FD870}" type="pres">
+      <dgm:prSet presAssocID="{50CE8BE5-FE4F-8D40-989F-58B127300842}" presName="hierRoot1" presStyleCnt="0"/>
+      <dgm:spPr/>
+    </dgm:pt>
+    <dgm:pt modelId="{7B7C76DB-5BF7-8543-800B-2F46386A06EC}" type="pres">
+      <dgm:prSet presAssocID="{50CE8BE5-FE4F-8D40-989F-58B127300842}" presName="composite" presStyleCnt="0"/>
+      <dgm:spPr/>
+    </dgm:pt>
+    <dgm:pt modelId="{C38CC957-ED72-804C-8A9C-6E439DBFDED6}" type="pres">
+      <dgm:prSet presAssocID="{50CE8BE5-FE4F-8D40-989F-58B127300842}" presName="image" presStyleLbl="node0" presStyleIdx="0" presStyleCnt="1"/>
+      <dgm:spPr/>
+    </dgm:pt>
+    <dgm:pt modelId="{458E2CEA-2D4A-D048-848A-9EF3A29552BB}" type="pres">
+      <dgm:prSet presAssocID="{50CE8BE5-FE4F-8D40-989F-58B127300842}" presName="text" presStyleLbl="revTx" presStyleIdx="0" presStyleCnt="6">
+        <dgm:presLayoutVars>
+          <dgm:chPref val="3"/>
+        </dgm:presLayoutVars>
+      </dgm:prSet>
+      <dgm:spPr/>
+    </dgm:pt>
+    <dgm:pt modelId="{B6AEF241-F12C-FF4D-8017-6EC6691DA945}" type="pres">
+      <dgm:prSet presAssocID="{50CE8BE5-FE4F-8D40-989F-58B127300842}" presName="hierChild2" presStyleCnt="0"/>
+      <dgm:spPr/>
+    </dgm:pt>
+    <dgm:pt modelId="{C86EDF08-DE64-4A46-A556-D15AA930C60B}" type="pres">
+      <dgm:prSet presAssocID="{634B3ED2-2B7E-EC44-BCDD-5D639DCE0F61}" presName="Name10" presStyleLbl="parChTrans1D2" presStyleIdx="0" presStyleCnt="2"/>
+      <dgm:spPr/>
+    </dgm:pt>
+    <dgm:pt modelId="{FDC9D4DA-7F68-9241-9D25-F143FFBB052A}" type="pres">
+      <dgm:prSet presAssocID="{5947C7E3-01D6-CA4D-974E-3BBC51416DCB}" presName="hierRoot2" presStyleCnt="0"/>
+      <dgm:spPr/>
+    </dgm:pt>
+    <dgm:pt modelId="{50C1ABC6-A74E-374E-AE06-245969D4007F}" type="pres">
+      <dgm:prSet presAssocID="{5947C7E3-01D6-CA4D-974E-3BBC51416DCB}" presName="composite2" presStyleCnt="0"/>
+      <dgm:spPr/>
+    </dgm:pt>
+    <dgm:pt modelId="{BE353C04-56BF-AA44-B29C-1AA30BF506C0}" type="pres">
+      <dgm:prSet presAssocID="{5947C7E3-01D6-CA4D-974E-3BBC51416DCB}" presName="image2" presStyleLbl="node2" presStyleIdx="0" presStyleCnt="2"/>
+      <dgm:spPr/>
+    </dgm:pt>
+    <dgm:pt modelId="{DF09DBBF-55BC-1B47-A387-2E7B09D5AB74}" type="pres">
+      <dgm:prSet presAssocID="{5947C7E3-01D6-CA4D-974E-3BBC51416DCB}" presName="text2" presStyleLbl="revTx" presStyleIdx="1" presStyleCnt="6">
+        <dgm:presLayoutVars>
+          <dgm:chPref val="3"/>
+        </dgm:presLayoutVars>
+      </dgm:prSet>
+      <dgm:spPr/>
+    </dgm:pt>
+    <dgm:pt modelId="{25A8F0A1-DE43-D543-9A28-DDB08C3B0352}" type="pres">
+      <dgm:prSet presAssocID="{5947C7E3-01D6-CA4D-974E-3BBC51416DCB}" presName="hierChild3" presStyleCnt="0"/>
+      <dgm:spPr/>
+    </dgm:pt>
+    <dgm:pt modelId="{13B7136B-2EAC-4848-B65B-0F39B09ECCDA}" type="pres">
+      <dgm:prSet presAssocID="{DD3C6668-7100-A248-90FE-335F532DE7D9}" presName="Name17" presStyleLbl="parChTrans1D3" presStyleIdx="0" presStyleCnt="3"/>
+      <dgm:spPr/>
+    </dgm:pt>
+    <dgm:pt modelId="{F57A151E-50BB-EC46-A25B-818DC8E38060}" type="pres">
+      <dgm:prSet presAssocID="{8E742056-2AE6-854E-9FEA-BE128397F8FD}" presName="hierRoot3" presStyleCnt="0"/>
+      <dgm:spPr/>
+    </dgm:pt>
+    <dgm:pt modelId="{B0400492-DAA7-F24C-B67A-3BF8C4254974}" type="pres">
+      <dgm:prSet presAssocID="{8E742056-2AE6-854E-9FEA-BE128397F8FD}" presName="composite3" presStyleCnt="0"/>
+      <dgm:spPr/>
+    </dgm:pt>
+    <dgm:pt modelId="{EBC49A22-B099-BD46-AD21-44FA8524C224}" type="pres">
+      <dgm:prSet presAssocID="{8E742056-2AE6-854E-9FEA-BE128397F8FD}" presName="image3" presStyleLbl="node3" presStyleIdx="0" presStyleCnt="3"/>
+      <dgm:spPr/>
+    </dgm:pt>
+    <dgm:pt modelId="{B1A733B9-3613-574B-9F98-957D16DC6C04}" type="pres">
+      <dgm:prSet presAssocID="{8E742056-2AE6-854E-9FEA-BE128397F8FD}" presName="text3" presStyleLbl="revTx" presStyleIdx="2" presStyleCnt="6">
+        <dgm:presLayoutVars>
+          <dgm:chPref val="3"/>
+        </dgm:presLayoutVars>
+      </dgm:prSet>
+      <dgm:spPr/>
+    </dgm:pt>
+    <dgm:pt modelId="{79AFEBA5-7C6E-744D-BB67-405501CECE8C}" type="pres">
+      <dgm:prSet presAssocID="{8E742056-2AE6-854E-9FEA-BE128397F8FD}" presName="hierChild4" presStyleCnt="0"/>
+      <dgm:spPr/>
+    </dgm:pt>
+    <dgm:pt modelId="{AF6AA274-C165-2646-8B10-57BF2472FAF0}" type="pres">
+      <dgm:prSet presAssocID="{F46B314C-F2E1-1D4A-8A6D-BFC29AB2A3D1}" presName="Name17" presStyleLbl="parChTrans1D3" presStyleIdx="1" presStyleCnt="3"/>
+      <dgm:spPr/>
+    </dgm:pt>
+    <dgm:pt modelId="{2E5C0D61-750C-BF49-A249-895C4A98B472}" type="pres">
+      <dgm:prSet presAssocID="{2E75A9C6-C8EA-9546-8733-3262A052CC00}" presName="hierRoot3" presStyleCnt="0"/>
+      <dgm:spPr/>
+    </dgm:pt>
+    <dgm:pt modelId="{221DAE5D-60A1-B94F-AD46-ABE9A5AAC607}" type="pres">
+      <dgm:prSet presAssocID="{2E75A9C6-C8EA-9546-8733-3262A052CC00}" presName="composite3" presStyleCnt="0"/>
+      <dgm:spPr/>
+    </dgm:pt>
+    <dgm:pt modelId="{A72A3CB1-5DC8-1B44-A4CE-68D3BB31496B}" type="pres">
+      <dgm:prSet presAssocID="{2E75A9C6-C8EA-9546-8733-3262A052CC00}" presName="image3" presStyleLbl="node3" presStyleIdx="1" presStyleCnt="3"/>
+      <dgm:spPr/>
+    </dgm:pt>
+    <dgm:pt modelId="{F5BD635E-94FA-804C-BBC2-F21E897E3F76}" type="pres">
+      <dgm:prSet presAssocID="{2E75A9C6-C8EA-9546-8733-3262A052CC00}" presName="text3" presStyleLbl="revTx" presStyleIdx="3" presStyleCnt="6">
+        <dgm:presLayoutVars>
+          <dgm:chPref val="3"/>
+        </dgm:presLayoutVars>
+      </dgm:prSet>
+      <dgm:spPr/>
+    </dgm:pt>
+    <dgm:pt modelId="{154637F6-D0A3-844E-AB63-0B35CBD08203}" type="pres">
+      <dgm:prSet presAssocID="{2E75A9C6-C8EA-9546-8733-3262A052CC00}" presName="hierChild4" presStyleCnt="0"/>
+      <dgm:spPr/>
+    </dgm:pt>
+    <dgm:pt modelId="{E92107B0-854F-B241-97F9-6B4A99BFDD89}" type="pres">
+      <dgm:prSet presAssocID="{12B274E4-18DF-1F4B-A44D-2A6EDCC2AEDF}" presName="Name10" presStyleLbl="parChTrans1D2" presStyleIdx="1" presStyleCnt="2"/>
+      <dgm:spPr/>
+    </dgm:pt>
+    <dgm:pt modelId="{1F530A33-3BE1-5740-B48A-AF32CFABDE6C}" type="pres">
+      <dgm:prSet presAssocID="{7393D429-4215-3E4F-851F-3C5E85712256}" presName="hierRoot2" presStyleCnt="0"/>
+      <dgm:spPr/>
+    </dgm:pt>
+    <dgm:pt modelId="{F2499FFD-EAD3-B048-AE16-573D4DC48D78}" type="pres">
+      <dgm:prSet presAssocID="{7393D429-4215-3E4F-851F-3C5E85712256}" presName="composite2" presStyleCnt="0"/>
+      <dgm:spPr/>
+    </dgm:pt>
+    <dgm:pt modelId="{EBCDE10E-5169-6145-BF2E-07E34DEA19B6}" type="pres">
+      <dgm:prSet presAssocID="{7393D429-4215-3E4F-851F-3C5E85712256}" presName="image2" presStyleLbl="node2" presStyleIdx="1" presStyleCnt="2"/>
+      <dgm:spPr/>
+    </dgm:pt>
+    <dgm:pt modelId="{793AA1F8-448D-F048-96F5-F99C11C83C06}" type="pres">
+      <dgm:prSet presAssocID="{7393D429-4215-3E4F-851F-3C5E85712256}" presName="text2" presStyleLbl="revTx" presStyleIdx="4" presStyleCnt="6">
+        <dgm:presLayoutVars>
+          <dgm:chPref val="3"/>
+        </dgm:presLayoutVars>
+      </dgm:prSet>
+      <dgm:spPr/>
+    </dgm:pt>
+    <dgm:pt modelId="{A02B0F4F-1CA7-B448-8522-49696BD613A3}" type="pres">
+      <dgm:prSet presAssocID="{7393D429-4215-3E4F-851F-3C5E85712256}" presName="hierChild3" presStyleCnt="0"/>
+      <dgm:spPr/>
+    </dgm:pt>
+    <dgm:pt modelId="{88ABB882-E21C-E14C-917B-0DC5752A833C}" type="pres">
+      <dgm:prSet presAssocID="{B63DCA60-5459-BA43-8773-949551BE5A96}" presName="Name17" presStyleLbl="parChTrans1D3" presStyleIdx="2" presStyleCnt="3"/>
+      <dgm:spPr/>
+    </dgm:pt>
+    <dgm:pt modelId="{ACC3D9FE-3727-B04F-A975-6DDEB234387A}" type="pres">
+      <dgm:prSet presAssocID="{8F02186B-4DB5-E746-A59D-B6EE971B6A15}" presName="hierRoot3" presStyleCnt="0"/>
+      <dgm:spPr/>
+    </dgm:pt>
+    <dgm:pt modelId="{7CF59750-A7B5-1745-A119-A12A43C43DBF}" type="pres">
+      <dgm:prSet presAssocID="{8F02186B-4DB5-E746-A59D-B6EE971B6A15}" presName="composite3" presStyleCnt="0"/>
+      <dgm:spPr/>
+    </dgm:pt>
+    <dgm:pt modelId="{4716271B-2BEA-D54C-8720-8FBF05DF84AD}" type="pres">
+      <dgm:prSet presAssocID="{8F02186B-4DB5-E746-A59D-B6EE971B6A15}" presName="image3" presStyleLbl="node3" presStyleIdx="2" presStyleCnt="3"/>
+      <dgm:spPr/>
+    </dgm:pt>
+    <dgm:pt modelId="{E1D24100-DA38-774C-96CB-071D1B086443}" type="pres">
+      <dgm:prSet presAssocID="{8F02186B-4DB5-E746-A59D-B6EE971B6A15}" presName="text3" presStyleLbl="revTx" presStyleIdx="5" presStyleCnt="6">
+        <dgm:presLayoutVars>
+          <dgm:chPref val="3"/>
+        </dgm:presLayoutVars>
+      </dgm:prSet>
+      <dgm:spPr/>
+    </dgm:pt>
+    <dgm:pt modelId="{32A31B9E-E3C9-D54C-BD15-22B81C91F1BF}" type="pres">
+      <dgm:prSet presAssocID="{8F02186B-4DB5-E746-A59D-B6EE971B6A15}" presName="hierChild4" presStyleCnt="0"/>
+      <dgm:spPr/>
+    </dgm:pt>
+  </dgm:ptLst>
+  <dgm:cxnLst>
+    <dgm:cxn modelId="{EEF6E9A4-2C18-DC42-B3A0-77B919DB31D9}" srcId="{50CE8BE5-FE4F-8D40-989F-58B127300842}" destId="{5947C7E3-01D6-CA4D-974E-3BBC51416DCB}" srcOrd="0" destOrd="0" parTransId="{634B3ED2-2B7E-EC44-BCDD-5D639DCE0F61}" sibTransId="{88EC45BB-3F78-0343-86B1-90C12B59880F}"/>
+    <dgm:cxn modelId="{0CFDD76D-5F04-7A44-BFEA-5AEEF5AB19DF}" srcId="{50CE8BE5-FE4F-8D40-989F-58B127300842}" destId="{7393D429-4215-3E4F-851F-3C5E85712256}" srcOrd="1" destOrd="0" parTransId="{12B274E4-18DF-1F4B-A44D-2A6EDCC2AEDF}" sibTransId="{239B13B9-AFAC-994B-ADC2-B0FC2237CA42}"/>
+    <dgm:cxn modelId="{DB9C5B5C-4A79-7B4E-A3D6-8055C310D662}" type="presOf" srcId="{B63DCA60-5459-BA43-8773-949551BE5A96}" destId="{88ABB882-E21C-E14C-917B-0DC5752A833C}" srcOrd="0" destOrd="0" presId="urn:microsoft.com/office/officeart/2009/layout/CirclePictureHierarchy"/>
+    <dgm:cxn modelId="{0AE479EB-0EF9-D34B-8224-D07151CB5832}" type="presOf" srcId="{2E75A9C6-C8EA-9546-8733-3262A052CC00}" destId="{F5BD635E-94FA-804C-BBC2-F21E897E3F76}" srcOrd="0" destOrd="0" presId="urn:microsoft.com/office/officeart/2009/layout/CirclePictureHierarchy"/>
+    <dgm:cxn modelId="{045B215C-2BB9-D040-B40E-F9C7345F2450}" srcId="{5947C7E3-01D6-CA4D-974E-3BBC51416DCB}" destId="{8E742056-2AE6-854E-9FEA-BE128397F8FD}" srcOrd="0" destOrd="0" parTransId="{DD3C6668-7100-A248-90FE-335F532DE7D9}" sibTransId="{6635668E-D0F5-C74D-A35C-A726D64124C2}"/>
+    <dgm:cxn modelId="{3A05CB44-2E75-6146-A581-C6058E997509}" type="presOf" srcId="{8F02186B-4DB5-E746-A59D-B6EE971B6A15}" destId="{E1D24100-DA38-774C-96CB-071D1B086443}" srcOrd="0" destOrd="0" presId="urn:microsoft.com/office/officeart/2009/layout/CirclePictureHierarchy"/>
+    <dgm:cxn modelId="{4AEE76C3-5D53-C647-B197-3027AC114694}" srcId="{7393D429-4215-3E4F-851F-3C5E85712256}" destId="{8F02186B-4DB5-E746-A59D-B6EE971B6A15}" srcOrd="0" destOrd="0" parTransId="{B63DCA60-5459-BA43-8773-949551BE5A96}" sibTransId="{096A4D9F-B72B-2A46-911B-B8567288A4D6}"/>
+    <dgm:cxn modelId="{925B6507-EE59-1443-8FA7-A7FE0509B880}" type="presOf" srcId="{DD3C6668-7100-A248-90FE-335F532DE7D9}" destId="{13B7136B-2EAC-4848-B65B-0F39B09ECCDA}" srcOrd="0" destOrd="0" presId="urn:microsoft.com/office/officeart/2009/layout/CirclePictureHierarchy"/>
+    <dgm:cxn modelId="{B42C974C-D1F2-5F43-8B08-1CB5E565BEE9}" type="presOf" srcId="{50CE8BE5-FE4F-8D40-989F-58B127300842}" destId="{458E2CEA-2D4A-D048-848A-9EF3A29552BB}" srcOrd="0" destOrd="0" presId="urn:microsoft.com/office/officeart/2009/layout/CirclePictureHierarchy"/>
+    <dgm:cxn modelId="{19336CE4-5834-834E-BCF8-9B89C44290F0}" type="presOf" srcId="{12B274E4-18DF-1F4B-A44D-2A6EDCC2AEDF}" destId="{E92107B0-854F-B241-97F9-6B4A99BFDD89}" srcOrd="0" destOrd="0" presId="urn:microsoft.com/office/officeart/2009/layout/CirclePictureHierarchy"/>
+    <dgm:cxn modelId="{9CB5DF6F-CAE3-2742-95EA-E559249D4FE7}" type="presOf" srcId="{F46B314C-F2E1-1D4A-8A6D-BFC29AB2A3D1}" destId="{AF6AA274-C165-2646-8B10-57BF2472FAF0}" srcOrd="0" destOrd="0" presId="urn:microsoft.com/office/officeart/2009/layout/CirclePictureHierarchy"/>
+    <dgm:cxn modelId="{F755BA59-D952-0340-95CC-60B75B0DA401}" type="presOf" srcId="{7393D429-4215-3E4F-851F-3C5E85712256}" destId="{793AA1F8-448D-F048-96F5-F99C11C83C06}" srcOrd="0" destOrd="0" presId="urn:microsoft.com/office/officeart/2009/layout/CirclePictureHierarchy"/>
+    <dgm:cxn modelId="{5EB3EF3E-32FD-E24C-83D2-6D7748D99A93}" srcId="{2AC110E6-F772-164D-A74E-9BCCCBE8B031}" destId="{50CE8BE5-FE4F-8D40-989F-58B127300842}" srcOrd="0" destOrd="0" parTransId="{B0C311EB-3644-0248-A207-C561591F2130}" sibTransId="{E1DB3513-1D53-6B4E-AC85-66E578D05C9F}"/>
+    <dgm:cxn modelId="{ABFBFB36-E9F9-1E40-A245-89D907C88BAA}" type="presOf" srcId="{5947C7E3-01D6-CA4D-974E-3BBC51416DCB}" destId="{DF09DBBF-55BC-1B47-A387-2E7B09D5AB74}" srcOrd="0" destOrd="0" presId="urn:microsoft.com/office/officeart/2009/layout/CirclePictureHierarchy"/>
+    <dgm:cxn modelId="{16674432-352B-7849-9F3F-369C1CD8CE0A}" srcId="{5947C7E3-01D6-CA4D-974E-3BBC51416DCB}" destId="{2E75A9C6-C8EA-9546-8733-3262A052CC00}" srcOrd="1" destOrd="0" parTransId="{F46B314C-F2E1-1D4A-8A6D-BFC29AB2A3D1}" sibTransId="{27B61B99-5BA6-8849-B964-393292C0F327}"/>
+    <dgm:cxn modelId="{7CFE2B3D-AB04-154E-9470-09E31B743FDD}" type="presOf" srcId="{634B3ED2-2B7E-EC44-BCDD-5D639DCE0F61}" destId="{C86EDF08-DE64-4A46-A556-D15AA930C60B}" srcOrd="0" destOrd="0" presId="urn:microsoft.com/office/officeart/2009/layout/CirclePictureHierarchy"/>
+    <dgm:cxn modelId="{01F8F861-87A9-0543-9BD9-EB706AA52DBC}" type="presOf" srcId="{2AC110E6-F772-164D-A74E-9BCCCBE8B031}" destId="{5B69B621-125F-8C4C-A968-60E72CEDA897}" srcOrd="0" destOrd="0" presId="urn:microsoft.com/office/officeart/2009/layout/CirclePictureHierarchy"/>
+    <dgm:cxn modelId="{670DE44E-DA3A-BB47-A5A2-5F3B3659A790}" type="presOf" srcId="{8E742056-2AE6-854E-9FEA-BE128397F8FD}" destId="{B1A733B9-3613-574B-9F98-957D16DC6C04}" srcOrd="0" destOrd="0" presId="urn:microsoft.com/office/officeart/2009/layout/CirclePictureHierarchy"/>
+    <dgm:cxn modelId="{790D5EEB-CF73-FD44-BC37-077A587BD2EF}" type="presParOf" srcId="{5B69B621-125F-8C4C-A968-60E72CEDA897}" destId="{58B3EE37-8A08-6E43-95EE-907BE55FD870}" srcOrd="0" destOrd="0" presId="urn:microsoft.com/office/officeart/2009/layout/CirclePictureHierarchy"/>
+    <dgm:cxn modelId="{B1817EA3-514C-9F4A-BE1E-B66904A92DBC}" type="presParOf" srcId="{58B3EE37-8A08-6E43-95EE-907BE55FD870}" destId="{7B7C76DB-5BF7-8543-800B-2F46386A06EC}" srcOrd="0" destOrd="0" presId="urn:microsoft.com/office/officeart/2009/layout/CirclePictureHierarchy"/>
+    <dgm:cxn modelId="{B53B2732-9A36-DB49-AADF-A068B89F7D6D}" type="presParOf" srcId="{7B7C76DB-5BF7-8543-800B-2F46386A06EC}" destId="{C38CC957-ED72-804C-8A9C-6E439DBFDED6}" srcOrd="0" destOrd="0" presId="urn:microsoft.com/office/officeart/2009/layout/CirclePictureHierarchy"/>
+    <dgm:cxn modelId="{EC6E98A1-14D8-DA45-868C-E144243AE713}" type="presParOf" srcId="{7B7C76DB-5BF7-8543-800B-2F46386A06EC}" destId="{458E2CEA-2D4A-D048-848A-9EF3A29552BB}" srcOrd="1" destOrd="0" presId="urn:microsoft.com/office/officeart/2009/layout/CirclePictureHierarchy"/>
+    <dgm:cxn modelId="{AAB5BAFB-1819-9A41-BFE2-FFC1351779A5}" type="presParOf" srcId="{58B3EE37-8A08-6E43-95EE-907BE55FD870}" destId="{B6AEF241-F12C-FF4D-8017-6EC6691DA945}" srcOrd="1" destOrd="0" presId="urn:microsoft.com/office/officeart/2009/layout/CirclePictureHierarchy"/>
+    <dgm:cxn modelId="{02B19BAE-5ABA-4249-904B-C84009F7DBAD}" type="presParOf" srcId="{B6AEF241-F12C-FF4D-8017-6EC6691DA945}" destId="{C86EDF08-DE64-4A46-A556-D15AA930C60B}" srcOrd="0" destOrd="0" presId="urn:microsoft.com/office/officeart/2009/layout/CirclePictureHierarchy"/>
+    <dgm:cxn modelId="{C681B6EB-3C1D-8348-A4C3-AAE38DD4ED4A}" type="presParOf" srcId="{B6AEF241-F12C-FF4D-8017-6EC6691DA945}" destId="{FDC9D4DA-7F68-9241-9D25-F143FFBB052A}" srcOrd="1" destOrd="0" presId="urn:microsoft.com/office/officeart/2009/layout/CirclePictureHierarchy"/>
+    <dgm:cxn modelId="{85DDC3E4-FDBD-6A48-BC18-AD13962CEF59}" type="presParOf" srcId="{FDC9D4DA-7F68-9241-9D25-F143FFBB052A}" destId="{50C1ABC6-A74E-374E-AE06-245969D4007F}" srcOrd="0" destOrd="0" presId="urn:microsoft.com/office/officeart/2009/layout/CirclePictureHierarchy"/>
+    <dgm:cxn modelId="{3420D5FC-1376-AF48-AEED-D56084CCDD5A}" type="presParOf" srcId="{50C1ABC6-A74E-374E-AE06-245969D4007F}" destId="{BE353C04-56BF-AA44-B29C-1AA30BF506C0}" srcOrd="0" destOrd="0" presId="urn:microsoft.com/office/officeart/2009/layout/CirclePictureHierarchy"/>
+    <dgm:cxn modelId="{ED69102A-DBA5-DA4A-84E3-7A04E69F5823}" type="presParOf" srcId="{50C1ABC6-A74E-374E-AE06-245969D4007F}" destId="{DF09DBBF-55BC-1B47-A387-2E7B09D5AB74}" srcOrd="1" destOrd="0" presId="urn:microsoft.com/office/officeart/2009/layout/CirclePictureHierarchy"/>
+    <dgm:cxn modelId="{1FCC6229-74E2-3247-9F95-CFBEBD6A72F2}" type="presParOf" srcId="{FDC9D4DA-7F68-9241-9D25-F143FFBB052A}" destId="{25A8F0A1-DE43-D543-9A28-DDB08C3B0352}" srcOrd="1" destOrd="0" presId="urn:microsoft.com/office/officeart/2009/layout/CirclePictureHierarchy"/>
+    <dgm:cxn modelId="{A4AE3F01-9F3F-C34F-92EA-F5A3809F595B}" type="presParOf" srcId="{25A8F0A1-DE43-D543-9A28-DDB08C3B0352}" destId="{13B7136B-2EAC-4848-B65B-0F39B09ECCDA}" srcOrd="0" destOrd="0" presId="urn:microsoft.com/office/officeart/2009/layout/CirclePictureHierarchy"/>
+    <dgm:cxn modelId="{58613442-8706-3246-80D0-9C9CD2392B76}" type="presParOf" srcId="{25A8F0A1-DE43-D543-9A28-DDB08C3B0352}" destId="{F57A151E-50BB-EC46-A25B-818DC8E38060}" srcOrd="1" destOrd="0" presId="urn:microsoft.com/office/officeart/2009/layout/CirclePictureHierarchy"/>
+    <dgm:cxn modelId="{AF13F9E3-FAC0-9B42-8553-8C5F2637B030}" type="presParOf" srcId="{F57A151E-50BB-EC46-A25B-818DC8E38060}" destId="{B0400492-DAA7-F24C-B67A-3BF8C4254974}" srcOrd="0" destOrd="0" presId="urn:microsoft.com/office/officeart/2009/layout/CirclePictureHierarchy"/>
+    <dgm:cxn modelId="{8AED4EFA-F212-F14B-994E-1F8A954C6E75}" type="presParOf" srcId="{B0400492-DAA7-F24C-B67A-3BF8C4254974}" destId="{EBC49A22-B099-BD46-AD21-44FA8524C224}" srcOrd="0" destOrd="0" presId="urn:microsoft.com/office/officeart/2009/layout/CirclePictureHierarchy"/>
+    <dgm:cxn modelId="{4D9EE101-5B9F-C342-A3CC-29EFB559F7AA}" type="presParOf" srcId="{B0400492-DAA7-F24C-B67A-3BF8C4254974}" destId="{B1A733B9-3613-574B-9F98-957D16DC6C04}" srcOrd="1" destOrd="0" presId="urn:microsoft.com/office/officeart/2009/layout/CirclePictureHierarchy"/>
+    <dgm:cxn modelId="{54C3845E-5690-F946-A024-9D34E4E87F47}" type="presParOf" srcId="{F57A151E-50BB-EC46-A25B-818DC8E38060}" destId="{79AFEBA5-7C6E-744D-BB67-405501CECE8C}" srcOrd="1" destOrd="0" presId="urn:microsoft.com/office/officeart/2009/layout/CirclePictureHierarchy"/>
+    <dgm:cxn modelId="{A5C17C82-BCCF-2440-889A-802833223306}" type="presParOf" srcId="{25A8F0A1-DE43-D543-9A28-DDB08C3B0352}" destId="{AF6AA274-C165-2646-8B10-57BF2472FAF0}" srcOrd="2" destOrd="0" presId="urn:microsoft.com/office/officeart/2009/layout/CirclePictureHierarchy"/>
+    <dgm:cxn modelId="{FFD6C167-6C44-4B46-9A0B-A13EEF609337}" type="presParOf" srcId="{25A8F0A1-DE43-D543-9A28-DDB08C3B0352}" destId="{2E5C0D61-750C-BF49-A249-895C4A98B472}" srcOrd="3" destOrd="0" presId="urn:microsoft.com/office/officeart/2009/layout/CirclePictureHierarchy"/>
+    <dgm:cxn modelId="{4ABCAFD1-6C37-CA4B-BBB8-E86A69D874E8}" type="presParOf" srcId="{2E5C0D61-750C-BF49-A249-895C4A98B472}" destId="{221DAE5D-60A1-B94F-AD46-ABE9A5AAC607}" srcOrd="0" destOrd="0" presId="urn:microsoft.com/office/officeart/2009/layout/CirclePictureHierarchy"/>
+    <dgm:cxn modelId="{F8031DC1-EA1D-6448-B7C8-E0275E44D3EC}" type="presParOf" srcId="{221DAE5D-60A1-B94F-AD46-ABE9A5AAC607}" destId="{A72A3CB1-5DC8-1B44-A4CE-68D3BB31496B}" srcOrd="0" destOrd="0" presId="urn:microsoft.com/office/officeart/2009/layout/CirclePictureHierarchy"/>
+    <dgm:cxn modelId="{5AB9F194-ECDB-854B-8FF1-B0784D7C5A13}" type="presParOf" srcId="{221DAE5D-60A1-B94F-AD46-ABE9A5AAC607}" destId="{F5BD635E-94FA-804C-BBC2-F21E897E3F76}" srcOrd="1" destOrd="0" presId="urn:microsoft.com/office/officeart/2009/layout/CirclePictureHierarchy"/>
+    <dgm:cxn modelId="{C820EB78-51E8-ED43-AE96-C34B432AD99E}" type="presParOf" srcId="{2E5C0D61-750C-BF49-A249-895C4A98B472}" destId="{154637F6-D0A3-844E-AB63-0B35CBD08203}" srcOrd="1" destOrd="0" presId="urn:microsoft.com/office/officeart/2009/layout/CirclePictureHierarchy"/>
+    <dgm:cxn modelId="{1EEA5B58-DD41-5B4E-A998-6B936493C4E0}" type="presParOf" srcId="{B6AEF241-F12C-FF4D-8017-6EC6691DA945}" destId="{E92107B0-854F-B241-97F9-6B4A99BFDD89}" srcOrd="2" destOrd="0" presId="urn:microsoft.com/office/officeart/2009/layout/CirclePictureHierarchy"/>
+    <dgm:cxn modelId="{D8D8523E-52D5-E041-89BF-8B7CC1C65A1F}" type="presParOf" srcId="{B6AEF241-F12C-FF4D-8017-6EC6691DA945}" destId="{1F530A33-3BE1-5740-B48A-AF32CFABDE6C}" srcOrd="3" destOrd="0" presId="urn:microsoft.com/office/officeart/2009/layout/CirclePictureHierarchy"/>
+    <dgm:cxn modelId="{2E3EE952-1E64-EC4E-B8D0-8F0248C84D28}" type="presParOf" srcId="{1F530A33-3BE1-5740-B48A-AF32CFABDE6C}" destId="{F2499FFD-EAD3-B048-AE16-573D4DC48D78}" srcOrd="0" destOrd="0" presId="urn:microsoft.com/office/officeart/2009/layout/CirclePictureHierarchy"/>
+    <dgm:cxn modelId="{2D24C522-2974-584F-A562-B51DE34B7DE9}" type="presParOf" srcId="{F2499FFD-EAD3-B048-AE16-573D4DC48D78}" destId="{EBCDE10E-5169-6145-BF2E-07E34DEA19B6}" srcOrd="0" destOrd="0" presId="urn:microsoft.com/office/officeart/2009/layout/CirclePictureHierarchy"/>
+    <dgm:cxn modelId="{15D01FCC-8857-F842-8E36-61FEDA527EE2}" type="presParOf" srcId="{F2499FFD-EAD3-B048-AE16-573D4DC48D78}" destId="{793AA1F8-448D-F048-96F5-F99C11C83C06}" srcOrd="1" destOrd="0" presId="urn:microsoft.com/office/officeart/2009/layout/CirclePictureHierarchy"/>
+    <dgm:cxn modelId="{9F3D622E-8780-9145-AF63-8440984F740A}" type="presParOf" srcId="{1F530A33-3BE1-5740-B48A-AF32CFABDE6C}" destId="{A02B0F4F-1CA7-B448-8522-49696BD613A3}" srcOrd="1" destOrd="0" presId="urn:microsoft.com/office/officeart/2009/layout/CirclePictureHierarchy"/>
+    <dgm:cxn modelId="{2ACC61E6-07F1-1745-9185-07F5905FC62C}" type="presParOf" srcId="{A02B0F4F-1CA7-B448-8522-49696BD613A3}" destId="{88ABB882-E21C-E14C-917B-0DC5752A833C}" srcOrd="0" destOrd="0" presId="urn:microsoft.com/office/officeart/2009/layout/CirclePictureHierarchy"/>
+    <dgm:cxn modelId="{F841F00F-C3F3-804B-B050-686D376C3887}" type="presParOf" srcId="{A02B0F4F-1CA7-B448-8522-49696BD613A3}" destId="{ACC3D9FE-3727-B04F-A975-6DDEB234387A}" srcOrd="1" destOrd="0" presId="urn:microsoft.com/office/officeart/2009/layout/CirclePictureHierarchy"/>
+    <dgm:cxn modelId="{024356C5-4A13-6E4E-95A2-498FD913CE9E}" type="presParOf" srcId="{ACC3D9FE-3727-B04F-A975-6DDEB234387A}" destId="{7CF59750-A7B5-1745-A119-A12A43C43DBF}" srcOrd="0" destOrd="0" presId="urn:microsoft.com/office/officeart/2009/layout/CirclePictureHierarchy"/>
+    <dgm:cxn modelId="{58149E46-F6C8-C04F-8535-437EC6C84072}" type="presParOf" srcId="{7CF59750-A7B5-1745-A119-A12A43C43DBF}" destId="{4716271B-2BEA-D54C-8720-8FBF05DF84AD}" srcOrd="0" destOrd="0" presId="urn:microsoft.com/office/officeart/2009/layout/CirclePictureHierarchy"/>
+    <dgm:cxn modelId="{A427D0F1-70A8-604E-B36F-E08688824932}" type="presParOf" srcId="{7CF59750-A7B5-1745-A119-A12A43C43DBF}" destId="{E1D24100-DA38-774C-96CB-071D1B086443}" srcOrd="1" destOrd="0" presId="urn:microsoft.com/office/officeart/2009/layout/CirclePictureHierarchy"/>
+    <dgm:cxn modelId="{AC0EC2FC-6BC4-D44F-9F62-840510FC3FF2}" type="presParOf" srcId="{ACC3D9FE-3727-B04F-A975-6DDEB234387A}" destId="{32A31B9E-E3C9-D54C-BD15-22B81C91F1BF}" srcOrd="1" destOrd="0" presId="urn:microsoft.com/office/officeart/2009/layout/CirclePictureHierarchy"/>
+  </dgm:cxnLst>
+  <dgm:bg/>
+  <dgm:whole/>
+  <dgm:extLst>
+    <a:ext uri="http://schemas.microsoft.com/office/drawing/2008/diagram">
+      <dsp:dataModelExt xmlns:dsp="http://schemas.microsoft.com/office/drawing/2008/diagram" relId="rId6" minVer="http://schemas.openxmlformats.org/drawingml/2006/diagram"/>
     </a:ext>
   </dgm:extLst>
 </dgm:dataModel>
@@ -13657,6 +14917,1188 @@
 </dsp:drawing>
 </file>
 
+<file path=ppt/diagrams/drawing9.xml><?xml version="1.0" encoding="utf-8"?>
+<dsp:drawing xmlns:dgm="http://schemas.openxmlformats.org/drawingml/2006/diagram" xmlns:dsp="http://schemas.microsoft.com/office/drawing/2008/diagram" xmlns:a="http://schemas.openxmlformats.org/drawingml/2006/main">
+  <dsp:spTree>
+    <dsp:nvGrpSpPr>
+      <dsp:cNvPr id="0" name=""/>
+      <dsp:cNvGrpSpPr/>
+    </dsp:nvGrpSpPr>
+    <dsp:grpSpPr/>
+    <dsp:sp modelId="{88ABB882-E21C-E14C-917B-0DC5752A833C}">
+      <dsp:nvSpPr>
+        <dsp:cNvPr id="0" name=""/>
+        <dsp:cNvSpPr/>
+      </dsp:nvSpPr>
+      <dsp:spPr>
+        <a:xfrm>
+          <a:off x="4526280" y="2413952"/>
+          <a:ext cx="91440" cy="240029"/>
+        </a:xfrm>
+        <a:custGeom>
+          <a:avLst/>
+          <a:gdLst/>
+          <a:ahLst/>
+          <a:cxnLst/>
+          <a:rect l="0" t="0" r="0" b="0"/>
+          <a:pathLst>
+            <a:path>
+              <a:moveTo>
+                <a:pt x="45720" y="0"/>
+              </a:moveTo>
+              <a:lnTo>
+                <a:pt x="45720" y="240029"/>
+              </a:lnTo>
+            </a:path>
+          </a:pathLst>
+        </a:custGeom>
+        <a:noFill/>
+        <a:ln w="9525" cap="flat" cmpd="sng" algn="ctr">
+          <a:solidFill>
+            <a:schemeClr val="accent4">
+              <a:hueOff val="0"/>
+              <a:satOff val="0"/>
+              <a:lumOff val="0"/>
+              <a:alphaOff val="0"/>
+            </a:schemeClr>
+          </a:solidFill>
+          <a:prstDash val="solid"/>
+        </a:ln>
+        <a:effectLst/>
+      </dsp:spPr>
+      <dsp:style>
+        <a:lnRef idx="1">
+          <a:scrgbClr r="0" g="0" b="0"/>
+        </a:lnRef>
+        <a:fillRef idx="0">
+          <a:scrgbClr r="0" g="0" b="0"/>
+        </a:fillRef>
+        <a:effectRef idx="0">
+          <a:scrgbClr r="0" g="0" b="0"/>
+        </a:effectRef>
+        <a:fontRef idx="minor"/>
+      </dsp:style>
+    </dsp:sp>
+    <dsp:sp modelId="{E92107B0-854F-B241-97F9-6B4A99BFDD89}">
+      <dsp:nvSpPr>
+        <dsp:cNvPr id="0" name=""/>
+        <dsp:cNvSpPr/>
+      </dsp:nvSpPr>
+      <dsp:spPr>
+        <a:xfrm>
+          <a:off x="3000375" y="1411922"/>
+          <a:ext cx="1571625" cy="240030"/>
+        </a:xfrm>
+        <a:custGeom>
+          <a:avLst/>
+          <a:gdLst/>
+          <a:ahLst/>
+          <a:cxnLst/>
+          <a:rect l="0" t="0" r="0" b="0"/>
+          <a:pathLst>
+            <a:path>
+              <a:moveTo>
+                <a:pt x="0" y="0"/>
+              </a:moveTo>
+              <a:lnTo>
+                <a:pt x="0" y="120967"/>
+              </a:lnTo>
+              <a:lnTo>
+                <a:pt x="1571625" y="120967"/>
+              </a:lnTo>
+              <a:lnTo>
+                <a:pt x="1571625" y="240030"/>
+              </a:lnTo>
+            </a:path>
+          </a:pathLst>
+        </a:custGeom>
+        <a:noFill/>
+        <a:ln w="9525" cap="flat" cmpd="sng" algn="ctr">
+          <a:solidFill>
+            <a:schemeClr val="accent3">
+              <a:hueOff val="0"/>
+              <a:satOff val="0"/>
+              <a:lumOff val="0"/>
+              <a:alphaOff val="0"/>
+            </a:schemeClr>
+          </a:solidFill>
+          <a:prstDash val="solid"/>
+        </a:ln>
+        <a:effectLst/>
+      </dsp:spPr>
+      <dsp:style>
+        <a:lnRef idx="1">
+          <a:scrgbClr r="0" g="0" b="0"/>
+        </a:lnRef>
+        <a:fillRef idx="0">
+          <a:scrgbClr r="0" g="0" b="0"/>
+        </a:fillRef>
+        <a:effectRef idx="0">
+          <a:scrgbClr r="0" g="0" b="0"/>
+        </a:effectRef>
+        <a:fontRef idx="minor"/>
+      </dsp:style>
+    </dsp:sp>
+    <dsp:sp modelId="{AF6AA274-C165-2646-8B10-57BF2472FAF0}">
+      <dsp:nvSpPr>
+        <dsp:cNvPr id="0" name=""/>
+        <dsp:cNvSpPr/>
+      </dsp:nvSpPr>
+      <dsp:spPr>
+        <a:xfrm>
+          <a:off x="1428749" y="2413952"/>
+          <a:ext cx="1047749" cy="240029"/>
+        </a:xfrm>
+        <a:custGeom>
+          <a:avLst/>
+          <a:gdLst/>
+          <a:ahLst/>
+          <a:cxnLst/>
+          <a:rect l="0" t="0" r="0" b="0"/>
+          <a:pathLst>
+            <a:path>
+              <a:moveTo>
+                <a:pt x="0" y="0"/>
+              </a:moveTo>
+              <a:lnTo>
+                <a:pt x="0" y="120967"/>
+              </a:lnTo>
+              <a:lnTo>
+                <a:pt x="1047749" y="120967"/>
+              </a:lnTo>
+              <a:lnTo>
+                <a:pt x="1047749" y="240029"/>
+              </a:lnTo>
+            </a:path>
+          </a:pathLst>
+        </a:custGeom>
+        <a:noFill/>
+        <a:ln w="9525" cap="flat" cmpd="sng" algn="ctr">
+          <a:solidFill>
+            <a:schemeClr val="accent4">
+              <a:hueOff val="0"/>
+              <a:satOff val="0"/>
+              <a:lumOff val="0"/>
+              <a:alphaOff val="0"/>
+            </a:schemeClr>
+          </a:solidFill>
+          <a:prstDash val="solid"/>
+        </a:ln>
+        <a:effectLst/>
+      </dsp:spPr>
+      <dsp:style>
+        <a:lnRef idx="1">
+          <a:scrgbClr r="0" g="0" b="0"/>
+        </a:lnRef>
+        <a:fillRef idx="0">
+          <a:scrgbClr r="0" g="0" b="0"/>
+        </a:fillRef>
+        <a:effectRef idx="0">
+          <a:scrgbClr r="0" g="0" b="0"/>
+        </a:effectRef>
+        <a:fontRef idx="minor"/>
+      </dsp:style>
+    </dsp:sp>
+    <dsp:sp modelId="{13B7136B-2EAC-4848-B65B-0F39B09ECCDA}">
+      <dsp:nvSpPr>
+        <dsp:cNvPr id="0" name=""/>
+        <dsp:cNvSpPr/>
+      </dsp:nvSpPr>
+      <dsp:spPr>
+        <a:xfrm>
+          <a:off x="380999" y="2413952"/>
+          <a:ext cx="1047750" cy="240029"/>
+        </a:xfrm>
+        <a:custGeom>
+          <a:avLst/>
+          <a:gdLst/>
+          <a:ahLst/>
+          <a:cxnLst/>
+          <a:rect l="0" t="0" r="0" b="0"/>
+          <a:pathLst>
+            <a:path>
+              <a:moveTo>
+                <a:pt x="1047750" y="0"/>
+              </a:moveTo>
+              <a:lnTo>
+                <a:pt x="1047750" y="120967"/>
+              </a:lnTo>
+              <a:lnTo>
+                <a:pt x="0" y="120967"/>
+              </a:lnTo>
+              <a:lnTo>
+                <a:pt x="0" y="240029"/>
+              </a:lnTo>
+            </a:path>
+          </a:pathLst>
+        </a:custGeom>
+        <a:noFill/>
+        <a:ln w="9525" cap="flat" cmpd="sng" algn="ctr">
+          <a:solidFill>
+            <a:schemeClr val="accent4">
+              <a:hueOff val="0"/>
+              <a:satOff val="0"/>
+              <a:lumOff val="0"/>
+              <a:alphaOff val="0"/>
+            </a:schemeClr>
+          </a:solidFill>
+          <a:prstDash val="solid"/>
+        </a:ln>
+        <a:effectLst/>
+      </dsp:spPr>
+      <dsp:style>
+        <a:lnRef idx="1">
+          <a:scrgbClr r="0" g="0" b="0"/>
+        </a:lnRef>
+        <a:fillRef idx="0">
+          <a:scrgbClr r="0" g="0" b="0"/>
+        </a:fillRef>
+        <a:effectRef idx="0">
+          <a:scrgbClr r="0" g="0" b="0"/>
+        </a:effectRef>
+        <a:fontRef idx="minor"/>
+      </dsp:style>
+    </dsp:sp>
+    <dsp:sp modelId="{C86EDF08-DE64-4A46-A556-D15AA930C60B}">
+      <dsp:nvSpPr>
+        <dsp:cNvPr id="0" name=""/>
+        <dsp:cNvSpPr/>
+      </dsp:nvSpPr>
+      <dsp:spPr>
+        <a:xfrm>
+          <a:off x="1428749" y="1411922"/>
+          <a:ext cx="1571625" cy="240030"/>
+        </a:xfrm>
+        <a:custGeom>
+          <a:avLst/>
+          <a:gdLst/>
+          <a:ahLst/>
+          <a:cxnLst/>
+          <a:rect l="0" t="0" r="0" b="0"/>
+          <a:pathLst>
+            <a:path>
+              <a:moveTo>
+                <a:pt x="1571625" y="0"/>
+              </a:moveTo>
+              <a:lnTo>
+                <a:pt x="1571625" y="120967"/>
+              </a:lnTo>
+              <a:lnTo>
+                <a:pt x="0" y="120967"/>
+              </a:lnTo>
+              <a:lnTo>
+                <a:pt x="0" y="240030"/>
+              </a:lnTo>
+            </a:path>
+          </a:pathLst>
+        </a:custGeom>
+        <a:noFill/>
+        <a:ln w="9525" cap="flat" cmpd="sng" algn="ctr">
+          <a:solidFill>
+            <a:schemeClr val="accent3">
+              <a:hueOff val="0"/>
+              <a:satOff val="0"/>
+              <a:lumOff val="0"/>
+              <a:alphaOff val="0"/>
+            </a:schemeClr>
+          </a:solidFill>
+          <a:prstDash val="solid"/>
+        </a:ln>
+        <a:effectLst/>
+      </dsp:spPr>
+      <dsp:style>
+        <a:lnRef idx="1">
+          <a:scrgbClr r="0" g="0" b="0"/>
+        </a:lnRef>
+        <a:fillRef idx="0">
+          <a:scrgbClr r="0" g="0" b="0"/>
+        </a:fillRef>
+        <a:effectRef idx="0">
+          <a:scrgbClr r="0" g="0" b="0"/>
+        </a:effectRef>
+        <a:fontRef idx="minor"/>
+      </dsp:style>
+    </dsp:sp>
+    <dsp:sp modelId="{C38CC957-ED72-804C-8A9C-6E439DBFDED6}">
+      <dsp:nvSpPr>
+        <dsp:cNvPr id="0" name=""/>
+        <dsp:cNvSpPr/>
+      </dsp:nvSpPr>
+      <dsp:spPr>
+        <a:xfrm>
+          <a:off x="2619375" y="649922"/>
+          <a:ext cx="761999" cy="761999"/>
+        </a:xfrm>
+        <a:prstGeom prst="ellipse">
+          <a:avLst/>
+        </a:prstGeom>
+        <a:gradFill rotWithShape="0">
+          <a:gsLst>
+            <a:gs pos="0">
+              <a:schemeClr val="accent1">
+                <a:hueOff val="0"/>
+                <a:satOff val="0"/>
+                <a:lumOff val="0"/>
+                <a:alphaOff val="0"/>
+                <a:shade val="15000"/>
+                <a:satMod val="180000"/>
+              </a:schemeClr>
+            </a:gs>
+            <a:gs pos="50000">
+              <a:schemeClr val="accent1">
+                <a:hueOff val="0"/>
+                <a:satOff val="0"/>
+                <a:lumOff val="0"/>
+                <a:alphaOff val="0"/>
+                <a:shade val="45000"/>
+                <a:satMod val="170000"/>
+              </a:schemeClr>
+            </a:gs>
+            <a:gs pos="70000">
+              <a:schemeClr val="accent1">
+                <a:hueOff val="0"/>
+                <a:satOff val="0"/>
+                <a:lumOff val="0"/>
+                <a:alphaOff val="0"/>
+                <a:tint val="99000"/>
+                <a:shade val="65000"/>
+                <a:satMod val="155000"/>
+              </a:schemeClr>
+            </a:gs>
+            <a:gs pos="100000">
+              <a:schemeClr val="accent1">
+                <a:hueOff val="0"/>
+                <a:satOff val="0"/>
+                <a:lumOff val="0"/>
+                <a:alphaOff val="0"/>
+                <a:tint val="95500"/>
+                <a:shade val="100000"/>
+                <a:satMod val="155000"/>
+              </a:schemeClr>
+            </a:gs>
+          </a:gsLst>
+          <a:lin ang="16200000" scaled="0"/>
+        </a:gradFill>
+        <a:ln>
+          <a:noFill/>
+        </a:ln>
+        <a:effectLst>
+          <a:outerShdw blurRad="50800" dist="38100" dir="5400000" rotWithShape="0">
+            <a:srgbClr val="000000">
+              <a:alpha val="35000"/>
+            </a:srgbClr>
+          </a:outerShdw>
+        </a:effectLst>
+      </dsp:spPr>
+      <dsp:style>
+        <a:lnRef idx="0">
+          <a:scrgbClr r="0" g="0" b="0"/>
+        </a:lnRef>
+        <a:fillRef idx="3">
+          <a:scrgbClr r="0" g="0" b="0"/>
+        </a:fillRef>
+        <a:effectRef idx="2">
+          <a:scrgbClr r="0" g="0" b="0"/>
+        </a:effectRef>
+        <a:fontRef idx="minor">
+          <a:schemeClr val="lt1"/>
+        </a:fontRef>
+      </dsp:style>
+    </dsp:sp>
+    <dsp:sp modelId="{458E2CEA-2D4A-D048-848A-9EF3A29552BB}">
+      <dsp:nvSpPr>
+        <dsp:cNvPr id="0" name=""/>
+        <dsp:cNvSpPr/>
+      </dsp:nvSpPr>
+      <dsp:spPr>
+        <a:xfrm>
+          <a:off x="3381375" y="648017"/>
+          <a:ext cx="1143000" cy="761999"/>
+        </a:xfrm>
+        <a:prstGeom prst="rect">
+          <a:avLst/>
+        </a:prstGeom>
+        <a:noFill/>
+        <a:ln>
+          <a:noFill/>
+        </a:ln>
+        <a:effectLst/>
+      </dsp:spPr>
+      <dsp:style>
+        <a:lnRef idx="0">
+          <a:scrgbClr r="0" g="0" b="0"/>
+        </a:lnRef>
+        <a:fillRef idx="0">
+          <a:scrgbClr r="0" g="0" b="0"/>
+        </a:fillRef>
+        <a:effectRef idx="0">
+          <a:scrgbClr r="0" g="0" b="0"/>
+        </a:effectRef>
+        <a:fontRef idx="minor"/>
+      </dsp:style>
+      <dsp:txBody>
+        <a:bodyPr spcFirstLastPara="0" vert="horz" wrap="square" lIns="60960" tIns="60960" rIns="60960" bIns="60960" numCol="1" spcCol="1270" anchor="ctr" anchorCtr="0">
+          <a:noAutofit/>
+        </a:bodyPr>
+        <a:lstStyle/>
+        <a:p>
+          <a:pPr lvl="0" algn="l" defTabSz="711200">
+            <a:lnSpc>
+              <a:spcPct val="90000"/>
+            </a:lnSpc>
+            <a:spcBef>
+              <a:spcPct val="0"/>
+            </a:spcBef>
+            <a:spcAft>
+              <a:spcPct val="35000"/>
+            </a:spcAft>
+          </a:pPr>
+          <a:r>
+            <a:rPr lang="en-US" sz="1600" kern="1200" dirty="0" err="1" smtClean="0"/>
+            <a:t>Prehension</a:t>
+          </a:r>
+          <a:endParaRPr lang="en-US" sz="1600" kern="1200" dirty="0"/>
+        </a:p>
+      </dsp:txBody>
+      <dsp:txXfrm>
+        <a:off x="3381375" y="648017"/>
+        <a:ext cx="1143000" cy="761999"/>
+      </dsp:txXfrm>
+    </dsp:sp>
+    <dsp:sp modelId="{BE353C04-56BF-AA44-B29C-1AA30BF506C0}">
+      <dsp:nvSpPr>
+        <dsp:cNvPr id="0" name=""/>
+        <dsp:cNvSpPr/>
+      </dsp:nvSpPr>
+      <dsp:spPr>
+        <a:xfrm>
+          <a:off x="1047749" y="1651952"/>
+          <a:ext cx="761999" cy="761999"/>
+        </a:xfrm>
+        <a:prstGeom prst="ellipse">
+          <a:avLst/>
+        </a:prstGeom>
+        <a:gradFill rotWithShape="0">
+          <a:gsLst>
+            <a:gs pos="0">
+              <a:schemeClr val="accent3">
+                <a:hueOff val="0"/>
+                <a:satOff val="0"/>
+                <a:lumOff val="0"/>
+                <a:alphaOff val="0"/>
+                <a:shade val="15000"/>
+                <a:satMod val="180000"/>
+              </a:schemeClr>
+            </a:gs>
+            <a:gs pos="50000">
+              <a:schemeClr val="accent3">
+                <a:hueOff val="0"/>
+                <a:satOff val="0"/>
+                <a:lumOff val="0"/>
+                <a:alphaOff val="0"/>
+                <a:shade val="45000"/>
+                <a:satMod val="170000"/>
+              </a:schemeClr>
+            </a:gs>
+            <a:gs pos="70000">
+              <a:schemeClr val="accent3">
+                <a:hueOff val="0"/>
+                <a:satOff val="0"/>
+                <a:lumOff val="0"/>
+                <a:alphaOff val="0"/>
+                <a:tint val="99000"/>
+                <a:shade val="65000"/>
+                <a:satMod val="155000"/>
+              </a:schemeClr>
+            </a:gs>
+            <a:gs pos="100000">
+              <a:schemeClr val="accent3">
+                <a:hueOff val="0"/>
+                <a:satOff val="0"/>
+                <a:lumOff val="0"/>
+                <a:alphaOff val="0"/>
+                <a:tint val="95500"/>
+                <a:shade val="100000"/>
+                <a:satMod val="155000"/>
+              </a:schemeClr>
+            </a:gs>
+          </a:gsLst>
+          <a:lin ang="16200000" scaled="0"/>
+        </a:gradFill>
+        <a:ln>
+          <a:noFill/>
+        </a:ln>
+        <a:effectLst>
+          <a:outerShdw blurRad="50800" dist="38100" dir="5400000" rotWithShape="0">
+            <a:srgbClr val="000000">
+              <a:alpha val="35000"/>
+            </a:srgbClr>
+          </a:outerShdw>
+        </a:effectLst>
+      </dsp:spPr>
+      <dsp:style>
+        <a:lnRef idx="0">
+          <a:scrgbClr r="0" g="0" b="0"/>
+        </a:lnRef>
+        <a:fillRef idx="3">
+          <a:scrgbClr r="0" g="0" b="0"/>
+        </a:fillRef>
+        <a:effectRef idx="2">
+          <a:scrgbClr r="0" g="0" b="0"/>
+        </a:effectRef>
+        <a:fontRef idx="minor">
+          <a:schemeClr val="lt1"/>
+        </a:fontRef>
+      </dsp:style>
+    </dsp:sp>
+    <dsp:sp modelId="{DF09DBBF-55BC-1B47-A387-2E7B09D5AB74}">
+      <dsp:nvSpPr>
+        <dsp:cNvPr id="0" name=""/>
+        <dsp:cNvSpPr/>
+      </dsp:nvSpPr>
+      <dsp:spPr>
+        <a:xfrm>
+          <a:off x="1809749" y="1650047"/>
+          <a:ext cx="1143000" cy="761999"/>
+        </a:xfrm>
+        <a:prstGeom prst="rect">
+          <a:avLst/>
+        </a:prstGeom>
+        <a:noFill/>
+        <a:ln>
+          <a:noFill/>
+        </a:ln>
+        <a:effectLst/>
+      </dsp:spPr>
+      <dsp:style>
+        <a:lnRef idx="0">
+          <a:scrgbClr r="0" g="0" b="0"/>
+        </a:lnRef>
+        <a:fillRef idx="0">
+          <a:scrgbClr r="0" g="0" b="0"/>
+        </a:fillRef>
+        <a:effectRef idx="0">
+          <a:scrgbClr r="0" g="0" b="0"/>
+        </a:effectRef>
+        <a:fontRef idx="minor"/>
+      </dsp:style>
+      <dsp:txBody>
+        <a:bodyPr spcFirstLastPara="0" vert="horz" wrap="square" lIns="60960" tIns="60960" rIns="60960" bIns="60960" numCol="1" spcCol="1270" anchor="ctr" anchorCtr="0">
+          <a:noAutofit/>
+        </a:bodyPr>
+        <a:lstStyle/>
+        <a:p>
+          <a:pPr lvl="0" algn="l" defTabSz="711200">
+            <a:lnSpc>
+              <a:spcPct val="90000"/>
+            </a:lnSpc>
+            <a:spcBef>
+              <a:spcPct val="0"/>
+            </a:spcBef>
+            <a:spcAft>
+              <a:spcPct val="35000"/>
+            </a:spcAft>
+          </a:pPr>
+          <a:r>
+            <a:rPr lang="en-US" sz="1600" kern="1200" dirty="0" smtClean="0"/>
+            <a:t>Vector Space</a:t>
+          </a:r>
+          <a:endParaRPr lang="en-US" sz="1600" kern="1200" dirty="0"/>
+        </a:p>
+      </dsp:txBody>
+      <dsp:txXfrm>
+        <a:off x="1809749" y="1650047"/>
+        <a:ext cx="1143000" cy="761999"/>
+      </dsp:txXfrm>
+    </dsp:sp>
+    <dsp:sp modelId="{EBC49A22-B099-BD46-AD21-44FA8524C224}">
+      <dsp:nvSpPr>
+        <dsp:cNvPr id="0" name=""/>
+        <dsp:cNvSpPr/>
+      </dsp:nvSpPr>
+      <dsp:spPr>
+        <a:xfrm>
+          <a:off x="0" y="2653982"/>
+          <a:ext cx="761999" cy="761999"/>
+        </a:xfrm>
+        <a:prstGeom prst="ellipse">
+          <a:avLst/>
+        </a:prstGeom>
+        <a:gradFill rotWithShape="0">
+          <a:gsLst>
+            <a:gs pos="0">
+              <a:schemeClr val="accent4">
+                <a:hueOff val="0"/>
+                <a:satOff val="0"/>
+                <a:lumOff val="0"/>
+                <a:alphaOff val="0"/>
+                <a:shade val="15000"/>
+                <a:satMod val="180000"/>
+              </a:schemeClr>
+            </a:gs>
+            <a:gs pos="50000">
+              <a:schemeClr val="accent4">
+                <a:hueOff val="0"/>
+                <a:satOff val="0"/>
+                <a:lumOff val="0"/>
+                <a:alphaOff val="0"/>
+                <a:shade val="45000"/>
+                <a:satMod val="170000"/>
+              </a:schemeClr>
+            </a:gs>
+            <a:gs pos="70000">
+              <a:schemeClr val="accent4">
+                <a:hueOff val="0"/>
+                <a:satOff val="0"/>
+                <a:lumOff val="0"/>
+                <a:alphaOff val="0"/>
+                <a:tint val="99000"/>
+                <a:shade val="65000"/>
+                <a:satMod val="155000"/>
+              </a:schemeClr>
+            </a:gs>
+            <a:gs pos="100000">
+              <a:schemeClr val="accent4">
+                <a:hueOff val="0"/>
+                <a:satOff val="0"/>
+                <a:lumOff val="0"/>
+                <a:alphaOff val="0"/>
+                <a:tint val="95500"/>
+                <a:shade val="100000"/>
+                <a:satMod val="155000"/>
+              </a:schemeClr>
+            </a:gs>
+          </a:gsLst>
+          <a:lin ang="16200000" scaled="0"/>
+        </a:gradFill>
+        <a:ln>
+          <a:noFill/>
+        </a:ln>
+        <a:effectLst>
+          <a:outerShdw blurRad="50800" dist="38100" dir="5400000" rotWithShape="0">
+            <a:srgbClr val="000000">
+              <a:alpha val="35000"/>
+            </a:srgbClr>
+          </a:outerShdw>
+        </a:effectLst>
+      </dsp:spPr>
+      <dsp:style>
+        <a:lnRef idx="0">
+          <a:scrgbClr r="0" g="0" b="0"/>
+        </a:lnRef>
+        <a:fillRef idx="3">
+          <a:scrgbClr r="0" g="0" b="0"/>
+        </a:fillRef>
+        <a:effectRef idx="2">
+          <a:scrgbClr r="0" g="0" b="0"/>
+        </a:effectRef>
+        <a:fontRef idx="minor">
+          <a:schemeClr val="lt1"/>
+        </a:fontRef>
+      </dsp:style>
+    </dsp:sp>
+    <dsp:sp modelId="{B1A733B9-3613-574B-9F98-957D16DC6C04}">
+      <dsp:nvSpPr>
+        <dsp:cNvPr id="0" name=""/>
+        <dsp:cNvSpPr/>
+      </dsp:nvSpPr>
+      <dsp:spPr>
+        <a:xfrm>
+          <a:off x="761999" y="2652077"/>
+          <a:ext cx="1143000" cy="761999"/>
+        </a:xfrm>
+        <a:prstGeom prst="rect">
+          <a:avLst/>
+        </a:prstGeom>
+        <a:noFill/>
+        <a:ln>
+          <a:noFill/>
+        </a:ln>
+        <a:effectLst/>
+      </dsp:spPr>
+      <dsp:style>
+        <a:lnRef idx="0">
+          <a:scrgbClr r="0" g="0" b="0"/>
+        </a:lnRef>
+        <a:fillRef idx="0">
+          <a:scrgbClr r="0" g="0" b="0"/>
+        </a:fillRef>
+        <a:effectRef idx="0">
+          <a:scrgbClr r="0" g="0" b="0"/>
+        </a:effectRef>
+        <a:fontRef idx="minor"/>
+      </dsp:style>
+      <dsp:txBody>
+        <a:bodyPr spcFirstLastPara="0" vert="horz" wrap="square" lIns="60960" tIns="60960" rIns="60960" bIns="60960" numCol="1" spcCol="1270" anchor="ctr" anchorCtr="0">
+          <a:noAutofit/>
+        </a:bodyPr>
+        <a:lstStyle/>
+        <a:p>
+          <a:pPr lvl="0" algn="l" defTabSz="711200">
+            <a:lnSpc>
+              <a:spcPct val="90000"/>
+            </a:lnSpc>
+            <a:spcBef>
+              <a:spcPct val="0"/>
+            </a:spcBef>
+            <a:spcAft>
+              <a:spcPct val="35000"/>
+            </a:spcAft>
+          </a:pPr>
+          <a:r>
+            <a:rPr lang="en-US" sz="1600" kern="1200" dirty="0" smtClean="0"/>
+            <a:t>Fashion model</a:t>
+          </a:r>
+          <a:endParaRPr lang="en-US" sz="1600" kern="1200" dirty="0"/>
+        </a:p>
+      </dsp:txBody>
+      <dsp:txXfrm>
+        <a:off x="761999" y="2652077"/>
+        <a:ext cx="1143000" cy="761999"/>
+      </dsp:txXfrm>
+    </dsp:sp>
+    <dsp:sp modelId="{A72A3CB1-5DC8-1B44-A4CE-68D3BB31496B}">
+      <dsp:nvSpPr>
+        <dsp:cNvPr id="0" name=""/>
+        <dsp:cNvSpPr/>
+      </dsp:nvSpPr>
+      <dsp:spPr>
+        <a:xfrm>
+          <a:off x="2095499" y="2653982"/>
+          <a:ext cx="761999" cy="761999"/>
+        </a:xfrm>
+        <a:prstGeom prst="ellipse">
+          <a:avLst/>
+        </a:prstGeom>
+        <a:gradFill rotWithShape="0">
+          <a:gsLst>
+            <a:gs pos="0">
+              <a:schemeClr val="accent4">
+                <a:hueOff val="0"/>
+                <a:satOff val="0"/>
+                <a:lumOff val="0"/>
+                <a:alphaOff val="0"/>
+                <a:shade val="15000"/>
+                <a:satMod val="180000"/>
+              </a:schemeClr>
+            </a:gs>
+            <a:gs pos="50000">
+              <a:schemeClr val="accent4">
+                <a:hueOff val="0"/>
+                <a:satOff val="0"/>
+                <a:lumOff val="0"/>
+                <a:alphaOff val="0"/>
+                <a:shade val="45000"/>
+                <a:satMod val="170000"/>
+              </a:schemeClr>
+            </a:gs>
+            <a:gs pos="70000">
+              <a:schemeClr val="accent4">
+                <a:hueOff val="0"/>
+                <a:satOff val="0"/>
+                <a:lumOff val="0"/>
+                <a:alphaOff val="0"/>
+                <a:tint val="99000"/>
+                <a:shade val="65000"/>
+                <a:satMod val="155000"/>
+              </a:schemeClr>
+            </a:gs>
+            <a:gs pos="100000">
+              <a:schemeClr val="accent4">
+                <a:hueOff val="0"/>
+                <a:satOff val="0"/>
+                <a:lumOff val="0"/>
+                <a:alphaOff val="0"/>
+                <a:tint val="95500"/>
+                <a:shade val="100000"/>
+                <a:satMod val="155000"/>
+              </a:schemeClr>
+            </a:gs>
+          </a:gsLst>
+          <a:lin ang="16200000" scaled="0"/>
+        </a:gradFill>
+        <a:ln>
+          <a:noFill/>
+        </a:ln>
+        <a:effectLst>
+          <a:outerShdw blurRad="50800" dist="38100" dir="5400000" rotWithShape="0">
+            <a:srgbClr val="000000">
+              <a:alpha val="35000"/>
+            </a:srgbClr>
+          </a:outerShdw>
+        </a:effectLst>
+      </dsp:spPr>
+      <dsp:style>
+        <a:lnRef idx="0">
+          <a:scrgbClr r="0" g="0" b="0"/>
+        </a:lnRef>
+        <a:fillRef idx="3">
+          <a:scrgbClr r="0" g="0" b="0"/>
+        </a:fillRef>
+        <a:effectRef idx="2">
+          <a:scrgbClr r="0" g="0" b="0"/>
+        </a:effectRef>
+        <a:fontRef idx="minor">
+          <a:schemeClr val="lt1"/>
+        </a:fontRef>
+      </dsp:style>
+    </dsp:sp>
+    <dsp:sp modelId="{F5BD635E-94FA-804C-BBC2-F21E897E3F76}">
+      <dsp:nvSpPr>
+        <dsp:cNvPr id="0" name=""/>
+        <dsp:cNvSpPr/>
+      </dsp:nvSpPr>
+      <dsp:spPr>
+        <a:xfrm>
+          <a:off x="2857500" y="2652077"/>
+          <a:ext cx="1143000" cy="761999"/>
+        </a:xfrm>
+        <a:prstGeom prst="rect">
+          <a:avLst/>
+        </a:prstGeom>
+        <a:noFill/>
+        <a:ln>
+          <a:noFill/>
+        </a:ln>
+        <a:effectLst/>
+      </dsp:spPr>
+      <dsp:style>
+        <a:lnRef idx="0">
+          <a:scrgbClr r="0" g="0" b="0"/>
+        </a:lnRef>
+        <a:fillRef idx="0">
+          <a:scrgbClr r="0" g="0" b="0"/>
+        </a:fillRef>
+        <a:effectRef idx="0">
+          <a:scrgbClr r="0" g="0" b="0"/>
+        </a:effectRef>
+        <a:fontRef idx="minor"/>
+      </dsp:style>
+      <dsp:txBody>
+        <a:bodyPr spcFirstLastPara="0" vert="horz" wrap="square" lIns="60960" tIns="60960" rIns="60960" bIns="60960" numCol="1" spcCol="1270" anchor="ctr" anchorCtr="0">
+          <a:noAutofit/>
+        </a:bodyPr>
+        <a:lstStyle/>
+        <a:p>
+          <a:pPr lvl="0" algn="l" defTabSz="711200">
+            <a:lnSpc>
+              <a:spcPct val="90000"/>
+            </a:lnSpc>
+            <a:spcBef>
+              <a:spcPct val="0"/>
+            </a:spcBef>
+            <a:spcAft>
+              <a:spcPct val="35000"/>
+            </a:spcAft>
+          </a:pPr>
+          <a:r>
+            <a:rPr lang="en-US" sz="1600" kern="1200" dirty="0" smtClean="0"/>
+            <a:t>Segregation model</a:t>
+          </a:r>
+          <a:endParaRPr lang="en-US" sz="1600" kern="1200" dirty="0"/>
+        </a:p>
+      </dsp:txBody>
+      <dsp:txXfrm>
+        <a:off x="2857500" y="2652077"/>
+        <a:ext cx="1143000" cy="761999"/>
+      </dsp:txXfrm>
+    </dsp:sp>
+    <dsp:sp modelId="{EBCDE10E-5169-6145-BF2E-07E34DEA19B6}">
+      <dsp:nvSpPr>
+        <dsp:cNvPr id="0" name=""/>
+        <dsp:cNvSpPr/>
+      </dsp:nvSpPr>
+      <dsp:spPr>
+        <a:xfrm>
+          <a:off x="4191000" y="1651952"/>
+          <a:ext cx="761999" cy="761999"/>
+        </a:xfrm>
+        <a:prstGeom prst="ellipse">
+          <a:avLst/>
+        </a:prstGeom>
+        <a:gradFill rotWithShape="0">
+          <a:gsLst>
+            <a:gs pos="0">
+              <a:schemeClr val="accent3">
+                <a:hueOff val="0"/>
+                <a:satOff val="0"/>
+                <a:lumOff val="0"/>
+                <a:alphaOff val="0"/>
+                <a:shade val="15000"/>
+                <a:satMod val="180000"/>
+              </a:schemeClr>
+            </a:gs>
+            <a:gs pos="50000">
+              <a:schemeClr val="accent3">
+                <a:hueOff val="0"/>
+                <a:satOff val="0"/>
+                <a:lumOff val="0"/>
+                <a:alphaOff val="0"/>
+                <a:shade val="45000"/>
+                <a:satMod val="170000"/>
+              </a:schemeClr>
+            </a:gs>
+            <a:gs pos="70000">
+              <a:schemeClr val="accent3">
+                <a:hueOff val="0"/>
+                <a:satOff val="0"/>
+                <a:lumOff val="0"/>
+                <a:alphaOff val="0"/>
+                <a:tint val="99000"/>
+                <a:shade val="65000"/>
+                <a:satMod val="155000"/>
+              </a:schemeClr>
+            </a:gs>
+            <a:gs pos="100000">
+              <a:schemeClr val="accent3">
+                <a:hueOff val="0"/>
+                <a:satOff val="0"/>
+                <a:lumOff val="0"/>
+                <a:alphaOff val="0"/>
+                <a:tint val="95500"/>
+                <a:shade val="100000"/>
+                <a:satMod val="155000"/>
+              </a:schemeClr>
+            </a:gs>
+          </a:gsLst>
+          <a:lin ang="16200000" scaled="0"/>
+        </a:gradFill>
+        <a:ln>
+          <a:noFill/>
+        </a:ln>
+        <a:effectLst>
+          <a:outerShdw blurRad="50800" dist="38100" dir="5400000" rotWithShape="0">
+            <a:srgbClr val="000000">
+              <a:alpha val="35000"/>
+            </a:srgbClr>
+          </a:outerShdw>
+        </a:effectLst>
+      </dsp:spPr>
+      <dsp:style>
+        <a:lnRef idx="0">
+          <a:scrgbClr r="0" g="0" b="0"/>
+        </a:lnRef>
+        <a:fillRef idx="3">
+          <a:scrgbClr r="0" g="0" b="0"/>
+        </a:fillRef>
+        <a:effectRef idx="2">
+          <a:scrgbClr r="0" g="0" b="0"/>
+        </a:effectRef>
+        <a:fontRef idx="minor">
+          <a:schemeClr val="lt1"/>
+        </a:fontRef>
+      </dsp:style>
+    </dsp:sp>
+    <dsp:sp modelId="{793AA1F8-448D-F048-96F5-F99C11C83C06}">
+      <dsp:nvSpPr>
+        <dsp:cNvPr id="0" name=""/>
+        <dsp:cNvSpPr/>
+      </dsp:nvSpPr>
+      <dsp:spPr>
+        <a:xfrm>
+          <a:off x="4953000" y="1650047"/>
+          <a:ext cx="1143000" cy="761999"/>
+        </a:xfrm>
+        <a:prstGeom prst="rect">
+          <a:avLst/>
+        </a:prstGeom>
+        <a:noFill/>
+        <a:ln>
+          <a:noFill/>
+        </a:ln>
+        <a:effectLst/>
+      </dsp:spPr>
+      <dsp:style>
+        <a:lnRef idx="0">
+          <a:scrgbClr r="0" g="0" b="0"/>
+        </a:lnRef>
+        <a:fillRef idx="0">
+          <a:scrgbClr r="0" g="0" b="0"/>
+        </a:fillRef>
+        <a:effectRef idx="0">
+          <a:scrgbClr r="0" g="0" b="0"/>
+        </a:effectRef>
+        <a:fontRef idx="minor"/>
+      </dsp:style>
+      <dsp:txBody>
+        <a:bodyPr spcFirstLastPara="0" vert="horz" wrap="square" lIns="60960" tIns="60960" rIns="60960" bIns="60960" numCol="1" spcCol="1270" anchor="ctr" anchorCtr="0">
+          <a:noAutofit/>
+        </a:bodyPr>
+        <a:lstStyle/>
+        <a:p>
+          <a:pPr lvl="0" algn="l" defTabSz="711200">
+            <a:lnSpc>
+              <a:spcPct val="90000"/>
+            </a:lnSpc>
+            <a:spcBef>
+              <a:spcPct val="0"/>
+            </a:spcBef>
+            <a:spcAft>
+              <a:spcPct val="35000"/>
+            </a:spcAft>
+          </a:pPr>
+          <a:r>
+            <a:rPr lang="en-US" sz="1600" kern="1200" dirty="0" smtClean="0"/>
+            <a:t>Markov chain</a:t>
+          </a:r>
+          <a:endParaRPr lang="en-US" sz="1600" kern="1200" dirty="0"/>
+        </a:p>
+      </dsp:txBody>
+      <dsp:txXfrm>
+        <a:off x="4953000" y="1650047"/>
+        <a:ext cx="1143000" cy="761999"/>
+      </dsp:txXfrm>
+    </dsp:sp>
+    <dsp:sp modelId="{4716271B-2BEA-D54C-8720-8FBF05DF84AD}">
+      <dsp:nvSpPr>
+        <dsp:cNvPr id="0" name=""/>
+        <dsp:cNvSpPr/>
+      </dsp:nvSpPr>
+      <dsp:spPr>
+        <a:xfrm>
+          <a:off x="4191000" y="2653982"/>
+          <a:ext cx="761999" cy="761999"/>
+        </a:xfrm>
+        <a:prstGeom prst="ellipse">
+          <a:avLst/>
+        </a:prstGeom>
+        <a:gradFill rotWithShape="0">
+          <a:gsLst>
+            <a:gs pos="0">
+              <a:schemeClr val="accent4">
+                <a:hueOff val="0"/>
+                <a:satOff val="0"/>
+                <a:lumOff val="0"/>
+                <a:alphaOff val="0"/>
+                <a:shade val="15000"/>
+                <a:satMod val="180000"/>
+              </a:schemeClr>
+            </a:gs>
+            <a:gs pos="50000">
+              <a:schemeClr val="accent4">
+                <a:hueOff val="0"/>
+                <a:satOff val="0"/>
+                <a:lumOff val="0"/>
+                <a:alphaOff val="0"/>
+                <a:shade val="45000"/>
+                <a:satMod val="170000"/>
+              </a:schemeClr>
+            </a:gs>
+            <a:gs pos="70000">
+              <a:schemeClr val="accent4">
+                <a:hueOff val="0"/>
+                <a:satOff val="0"/>
+                <a:lumOff val="0"/>
+                <a:alphaOff val="0"/>
+                <a:tint val="99000"/>
+                <a:shade val="65000"/>
+                <a:satMod val="155000"/>
+              </a:schemeClr>
+            </a:gs>
+            <a:gs pos="100000">
+              <a:schemeClr val="accent4">
+                <a:hueOff val="0"/>
+                <a:satOff val="0"/>
+                <a:lumOff val="0"/>
+                <a:alphaOff val="0"/>
+                <a:tint val="95500"/>
+                <a:shade val="100000"/>
+                <a:satMod val="155000"/>
+              </a:schemeClr>
+            </a:gs>
+          </a:gsLst>
+          <a:lin ang="16200000" scaled="0"/>
+        </a:gradFill>
+        <a:ln>
+          <a:noFill/>
+        </a:ln>
+        <a:effectLst>
+          <a:outerShdw blurRad="50800" dist="38100" dir="5400000" rotWithShape="0">
+            <a:srgbClr val="000000">
+              <a:alpha val="35000"/>
+            </a:srgbClr>
+          </a:outerShdw>
+        </a:effectLst>
+      </dsp:spPr>
+      <dsp:style>
+        <a:lnRef idx="0">
+          <a:scrgbClr r="0" g="0" b="0"/>
+        </a:lnRef>
+        <a:fillRef idx="3">
+          <a:scrgbClr r="0" g="0" b="0"/>
+        </a:fillRef>
+        <a:effectRef idx="2">
+          <a:scrgbClr r="0" g="0" b="0"/>
+        </a:effectRef>
+        <a:fontRef idx="minor">
+          <a:schemeClr val="lt1"/>
+        </a:fontRef>
+      </dsp:style>
+    </dsp:sp>
+    <dsp:sp modelId="{E1D24100-DA38-774C-96CB-071D1B086443}">
+      <dsp:nvSpPr>
+        <dsp:cNvPr id="0" name=""/>
+        <dsp:cNvSpPr/>
+      </dsp:nvSpPr>
+      <dsp:spPr>
+        <a:xfrm>
+          <a:off x="4953000" y="2652077"/>
+          <a:ext cx="1143000" cy="761999"/>
+        </a:xfrm>
+        <a:prstGeom prst="rect">
+          <a:avLst/>
+        </a:prstGeom>
+        <a:noFill/>
+        <a:ln>
+          <a:noFill/>
+        </a:ln>
+        <a:effectLst/>
+      </dsp:spPr>
+      <dsp:style>
+        <a:lnRef idx="0">
+          <a:scrgbClr r="0" g="0" b="0"/>
+        </a:lnRef>
+        <a:fillRef idx="0">
+          <a:scrgbClr r="0" g="0" b="0"/>
+        </a:fillRef>
+        <a:effectRef idx="0">
+          <a:scrgbClr r="0" g="0" b="0"/>
+        </a:effectRef>
+        <a:fontRef idx="minor"/>
+      </dsp:style>
+      <dsp:txBody>
+        <a:bodyPr spcFirstLastPara="0" vert="horz" wrap="square" lIns="60960" tIns="60960" rIns="60960" bIns="60960" numCol="1" spcCol="1270" anchor="ctr" anchorCtr="0">
+          <a:noAutofit/>
+        </a:bodyPr>
+        <a:lstStyle/>
+        <a:p>
+          <a:pPr lvl="0" algn="l" defTabSz="711200">
+            <a:lnSpc>
+              <a:spcPct val="90000"/>
+            </a:lnSpc>
+            <a:spcBef>
+              <a:spcPct val="0"/>
+            </a:spcBef>
+            <a:spcAft>
+              <a:spcPct val="35000"/>
+            </a:spcAft>
+          </a:pPr>
+          <a:r>
+            <a:rPr lang="en-US" sz="1600" kern="1200" dirty="0" smtClean="0"/>
+            <a:t>Forest fire</a:t>
+          </a:r>
+          <a:endParaRPr lang="en-US" sz="1600" kern="1200" dirty="0"/>
+        </a:p>
+      </dsp:txBody>
+      <dsp:txXfrm>
+        <a:off x="4953000" y="2652077"/>
+        <a:ext cx="1143000" cy="761999"/>
+      </dsp:txXfrm>
+    </dsp:sp>
+  </dsp:spTree>
+</dsp:drawing>
+</file>
+
 <file path=ppt/diagrams/layout1.xml><?xml version="1.0" encoding="utf-8"?>
 <dgm:layoutDef xmlns:dgm="http://schemas.openxmlformats.org/drawingml/2006/diagram" xmlns:a="http://schemas.openxmlformats.org/drawingml/2006/main" uniqueId="urn:microsoft.com/office/officeart/2005/8/layout/equation1">
   <dgm:title val=""/>
@@ -15224,6 +17666,567 @@
 </dgm:layoutDef>
 </file>
 
+<file path=ppt/diagrams/layout9.xml><?xml version="1.0" encoding="utf-8"?>
+<dgm:layoutDef xmlns:dgm="http://schemas.openxmlformats.org/drawingml/2006/diagram" xmlns:a="http://schemas.openxmlformats.org/drawingml/2006/main" uniqueId="urn:microsoft.com/office/officeart/2009/layout/CirclePictureHierarchy">
+  <dgm:title val=""/>
+  <dgm:desc val=""/>
+  <dgm:catLst>
+    <dgm:cat type="hierarchy" pri="1750"/>
+    <dgm:cat type="picture" pri="23000"/>
+    <dgm:cat type="pictureconvert" pri="23000"/>
+  </dgm:catLst>
+  <dgm:sampData>
+    <dgm:dataModel>
+      <dgm:ptLst>
+        <dgm:pt modelId="0" type="doc"/>
+        <dgm:pt modelId="1">
+          <dgm:prSet phldr="1"/>
+        </dgm:pt>
+        <dgm:pt modelId="2">
+          <dgm:prSet phldr="1"/>
+        </dgm:pt>
+        <dgm:pt modelId="21">
+          <dgm:prSet phldr="1"/>
+        </dgm:pt>
+        <dgm:pt modelId="22">
+          <dgm:prSet phldr="1"/>
+        </dgm:pt>
+        <dgm:pt modelId="3">
+          <dgm:prSet phldr="1"/>
+        </dgm:pt>
+        <dgm:pt modelId="31">
+          <dgm:prSet phldr="1"/>
+        </dgm:pt>
+      </dgm:ptLst>
+      <dgm:cxnLst>
+        <dgm:cxn modelId="4" srcId="0" destId="1" srcOrd="0" destOrd="0"/>
+        <dgm:cxn modelId="5" srcId="1" destId="2" srcOrd="0" destOrd="0"/>
+        <dgm:cxn modelId="6" srcId="1" destId="3" srcOrd="1" destOrd="0"/>
+        <dgm:cxn modelId="23" srcId="2" destId="21" srcOrd="0" destOrd="0"/>
+        <dgm:cxn modelId="24" srcId="2" destId="22" srcOrd="1" destOrd="0"/>
+        <dgm:cxn modelId="33" srcId="3" destId="31" srcOrd="0" destOrd="0"/>
+      </dgm:cxnLst>
+      <dgm:bg/>
+      <dgm:whole/>
+    </dgm:dataModel>
+  </dgm:sampData>
+  <dgm:styleData>
+    <dgm:dataModel>
+      <dgm:ptLst>
+        <dgm:pt modelId="0" type="doc"/>
+        <dgm:pt modelId="1"/>
+        <dgm:pt modelId="11"/>
+        <dgm:pt modelId="12"/>
+      </dgm:ptLst>
+      <dgm:cxnLst>
+        <dgm:cxn modelId="2" srcId="0" destId="1" srcOrd="0" destOrd="0"/>
+        <dgm:cxn modelId="13" srcId="1" destId="11" srcOrd="0" destOrd="0"/>
+        <dgm:cxn modelId="14" srcId="1" destId="12" srcOrd="1" destOrd="0"/>
+      </dgm:cxnLst>
+      <dgm:bg/>
+      <dgm:whole/>
+    </dgm:dataModel>
+  </dgm:styleData>
+  <dgm:clrData>
+    <dgm:dataModel>
+      <dgm:ptLst>
+        <dgm:pt modelId="0" type="doc"/>
+        <dgm:pt modelId="1"/>
+        <dgm:pt modelId="2"/>
+        <dgm:pt modelId="21"/>
+        <dgm:pt modelId="211"/>
+        <dgm:pt modelId="3"/>
+        <dgm:pt modelId="31"/>
+        <dgm:pt modelId="311"/>
+      </dgm:ptLst>
+      <dgm:cxnLst>
+        <dgm:cxn modelId="4" srcId="0" destId="1" srcOrd="0" destOrd="0"/>
+        <dgm:cxn modelId="5" srcId="1" destId="2" srcOrd="0" destOrd="0"/>
+        <dgm:cxn modelId="6" srcId="1" destId="3" srcOrd="1" destOrd="0"/>
+        <dgm:cxn modelId="23" srcId="2" destId="21" srcOrd="0" destOrd="0"/>
+        <dgm:cxn modelId="24" srcId="21" destId="211" srcOrd="0" destOrd="0"/>
+        <dgm:cxn modelId="33" srcId="3" destId="31" srcOrd="0" destOrd="0"/>
+        <dgm:cxn modelId="34" srcId="31" destId="311" srcOrd="0" destOrd="0"/>
+      </dgm:cxnLst>
+      <dgm:bg/>
+      <dgm:whole/>
+    </dgm:dataModel>
+  </dgm:clrData>
+  <dgm:layoutNode name="hierChild1">
+    <dgm:varLst>
+      <dgm:chPref val="1"/>
+      <dgm:dir/>
+      <dgm:animOne val="branch"/>
+      <dgm:animLvl val="lvl"/>
+      <dgm:resizeHandles/>
+    </dgm:varLst>
+    <dgm:choose name="Name0">
+      <dgm:if name="Name1" func="var" arg="dir" op="equ" val="norm">
+        <dgm:alg type="hierChild">
+          <dgm:param type="linDir" val="fromL"/>
+        </dgm:alg>
+      </dgm:if>
+      <dgm:else name="Name2">
+        <dgm:alg type="hierChild">
+          <dgm:param type="linDir" val="fromR"/>
+        </dgm:alg>
+      </dgm:else>
+    </dgm:choose>
+    <dgm:shape xmlns:r="http://schemas.openxmlformats.org/officeDocument/2006/relationships" r:blip="">
+      <dgm:adjLst/>
+    </dgm:shape>
+    <dgm:presOf/>
+    <dgm:constrLst>
+      <dgm:constr type="primFontSz" for="des" ptType="node" op="equ" val="65"/>
+      <dgm:constr type="w" for="des" forName="composite" refType="w"/>
+      <dgm:constr type="h" for="des" forName="composite" refType="w" refFor="des" refForName="composite" fact="0.5"/>
+      <dgm:constr type="w" for="des" forName="composite2" refType="w" refFor="des" refForName="composite"/>
+      <dgm:constr type="h" for="des" forName="composite2" refType="h" refFor="des" refForName="composite"/>
+      <dgm:constr type="w" for="des" forName="composite3" refType="w" refFor="des" refForName="composite"/>
+      <dgm:constr type="h" for="des" forName="composite3" refType="h" refFor="des" refForName="composite"/>
+      <dgm:constr type="w" for="des" forName="composite4" refType="w" refFor="des" refForName="composite"/>
+      <dgm:constr type="h" for="des" forName="composite4" refType="h" refFor="des" refForName="composite"/>
+      <dgm:constr type="w" for="des" forName="composite5" refType="w" refFor="des" refForName="composite"/>
+      <dgm:constr type="h" for="des" forName="composite5" refType="h" refFor="des" refForName="composite"/>
+      <dgm:constr type="sibSp" refType="w" refFor="des" refForName="composite" fact="0.1"/>
+      <dgm:constr type="sibSp" for="des" forName="hierChild2" refType="sibSp"/>
+      <dgm:constr type="sibSp" for="des" forName="hierChild3" refType="sibSp"/>
+      <dgm:constr type="sibSp" for="des" forName="hierChild4" refType="sibSp"/>
+      <dgm:constr type="sibSp" for="des" forName="hierChild5" refType="sibSp"/>
+      <dgm:constr type="sibSp" for="des" forName="hierChild6" refType="sibSp"/>
+      <dgm:constr type="sp" for="des" forName="hierRoot1" refType="h" refFor="des" refForName="composite" fact="0.25"/>
+      <dgm:constr type="sp" for="des" forName="hierRoot2" refType="sp" refFor="des" refForName="hierRoot1"/>
+      <dgm:constr type="sp" for="des" forName="hierRoot3" refType="sp" refFor="des" refForName="hierRoot1"/>
+      <dgm:constr type="sp" for="des" forName="hierRoot4" refType="sp" refFor="des" refForName="hierRoot1"/>
+      <dgm:constr type="sp" for="des" forName="hierRoot5" refType="sp" refFor="des" refForName="hierRoot1"/>
+    </dgm:constrLst>
+    <dgm:ruleLst/>
+    <dgm:forEach name="Name3" axis="ch">
+      <dgm:forEach name="Name4" axis="self" ptType="node">
+        <dgm:layoutNode name="hierRoot1">
+          <dgm:alg type="hierRoot"/>
+          <dgm:shape xmlns:r="http://schemas.openxmlformats.org/officeDocument/2006/relationships" r:blip="">
+            <dgm:adjLst/>
+          </dgm:shape>
+          <dgm:presOf/>
+          <dgm:constrLst>
+            <dgm:constr type="bendDist" for="des" ptType="parTrans" refType="sp" fact="0.5"/>
+          </dgm:constrLst>
+          <dgm:ruleLst/>
+          <dgm:layoutNode name="composite">
+            <dgm:alg type="composite"/>
+            <dgm:shape xmlns:r="http://schemas.openxmlformats.org/officeDocument/2006/relationships" r:blip="">
+              <dgm:adjLst/>
+            </dgm:shape>
+            <dgm:presOf/>
+            <dgm:constrLst>
+              <dgm:constr type="h" for="ch" forName="image" refType="h" fact="0.8"/>
+              <dgm:constr type="w" for="ch" forName="image" refType="h" refFor="ch" refForName="image"/>
+              <dgm:constr type="t" for="ch" forName="image" refType="h" fact="0.1"/>
+              <dgm:constr type="l" for="ch" forName="image"/>
+              <dgm:constr type="w" for="ch" forName="text" refType="w" fact="0.6"/>
+              <dgm:constr type="h" for="ch" forName="text" refType="h" fact="0.8"/>
+              <dgm:constr type="t" for="ch" forName="text" refType="w" fact="0.04"/>
+              <dgm:constr type="l" for="ch" forName="text" refType="w" fact="0.4"/>
+            </dgm:constrLst>
+            <dgm:ruleLst/>
+            <dgm:layoutNode name="image" styleLbl="node0">
+              <dgm:alg type="sp"/>
+              <dgm:shape xmlns:r="http://schemas.openxmlformats.org/officeDocument/2006/relationships" type="ellipse" r:blip="" blipPhldr="1">
+                <dgm:adjLst/>
+              </dgm:shape>
+              <dgm:presOf/>
+              <dgm:constrLst/>
+              <dgm:ruleLst/>
+            </dgm:layoutNode>
+            <dgm:layoutNode name="text" styleLbl="revTx">
+              <dgm:varLst>
+                <dgm:chPref val="3"/>
+              </dgm:varLst>
+              <dgm:alg type="tx">
+                <dgm:param type="parTxLTRAlign" val="l"/>
+                <dgm:param type="parTxRTLAlign" val="r"/>
+              </dgm:alg>
+              <dgm:shape xmlns:r="http://schemas.openxmlformats.org/officeDocument/2006/relationships" type="rect" r:blip="">
+                <dgm:adjLst/>
+              </dgm:shape>
+              <dgm:presOf axis="self"/>
+              <dgm:constrLst>
+                <dgm:constr type="tMarg" refType="primFontSz" fact="0.3"/>
+                <dgm:constr type="bMarg" refType="primFontSz" fact="0.3"/>
+                <dgm:constr type="lMarg" refType="primFontSz" fact="0.3"/>
+                <dgm:constr type="rMarg" refType="primFontSz" fact="0.3"/>
+              </dgm:constrLst>
+              <dgm:ruleLst>
+                <dgm:rule type="primFontSz" val="5" fact="NaN" max="NaN"/>
+              </dgm:ruleLst>
+            </dgm:layoutNode>
+          </dgm:layoutNode>
+          <dgm:layoutNode name="hierChild2">
+            <dgm:choose name="Name5">
+              <dgm:if name="Name6" func="var" arg="dir" op="equ" val="norm">
+                <dgm:alg type="hierChild">
+                  <dgm:param type="linDir" val="fromL"/>
+                </dgm:alg>
+              </dgm:if>
+              <dgm:else name="Name7">
+                <dgm:alg type="hierChild">
+                  <dgm:param type="linDir" val="fromR"/>
+                </dgm:alg>
+              </dgm:else>
+            </dgm:choose>
+            <dgm:shape xmlns:r="http://schemas.openxmlformats.org/officeDocument/2006/relationships" r:blip="">
+              <dgm:adjLst/>
+            </dgm:shape>
+            <dgm:presOf/>
+            <dgm:constrLst/>
+            <dgm:ruleLst/>
+            <dgm:forEach name="Name8" axis="ch">
+              <dgm:forEach name="Name9" axis="self" ptType="parTrans" cnt="1">
+                <dgm:layoutNode name="Name10">
+                  <dgm:alg type="conn">
+                    <dgm:param type="dim" val="1D"/>
+                    <dgm:param type="endSty" val="noArr"/>
+                    <dgm:param type="connRout" val="bend"/>
+                    <dgm:param type="bendPt" val="end"/>
+                    <dgm:param type="begPts" val="bCtr"/>
+                    <dgm:param type="endPts" val="tCtr"/>
+                    <dgm:param type="srcNode" val="image"/>
+                    <dgm:param type="dstNode" val="image2"/>
+                  </dgm:alg>
+                  <dgm:shape xmlns:r="http://schemas.openxmlformats.org/officeDocument/2006/relationships" type="conn" r:blip="" zOrderOff="-999">
+                    <dgm:adjLst/>
+                  </dgm:shape>
+                  <dgm:presOf axis="self"/>
+                  <dgm:constrLst>
+                    <dgm:constr type="begPad"/>
+                    <dgm:constr type="endPad"/>
+                  </dgm:constrLst>
+                  <dgm:ruleLst/>
+                </dgm:layoutNode>
+              </dgm:forEach>
+              <dgm:forEach name="Name11" axis="self" ptType="node">
+                <dgm:layoutNode name="hierRoot2">
+                  <dgm:alg type="hierRoot"/>
+                  <dgm:shape xmlns:r="http://schemas.openxmlformats.org/officeDocument/2006/relationships" r:blip="">
+                    <dgm:adjLst/>
+                  </dgm:shape>
+                  <dgm:presOf/>
+                  <dgm:constrLst>
+                    <dgm:constr type="bendDist" for="des" ptType="parTrans" refType="sp" fact="0.5"/>
+                  </dgm:constrLst>
+                  <dgm:ruleLst/>
+                  <dgm:layoutNode name="composite2">
+                    <dgm:alg type="composite"/>
+                    <dgm:shape xmlns:r="http://schemas.openxmlformats.org/officeDocument/2006/relationships" r:blip="">
+                      <dgm:adjLst/>
+                    </dgm:shape>
+                    <dgm:presOf/>
+                    <dgm:constrLst>
+                      <dgm:constr type="h" for="ch" forName="image2" refType="h" fact="0.8"/>
+                      <dgm:constr type="w" for="ch" forName="image2" refType="h" refFor="ch" refForName="image2"/>
+                      <dgm:constr type="t" for="ch" forName="image2" refType="h" fact="0.1"/>
+                      <dgm:constr type="l" for="ch" forName="image2"/>
+                      <dgm:constr type="w" for="ch" forName="text2" refType="w" fact="0.6"/>
+                      <dgm:constr type="h" for="ch" forName="text2" refType="h" fact="0.8"/>
+                      <dgm:constr type="t" for="ch" forName="text2" refType="w" fact="0.04"/>
+                      <dgm:constr type="l" for="ch" forName="text2" refType="w" fact="0.4"/>
+                    </dgm:constrLst>
+                    <dgm:ruleLst/>
+                    <dgm:layoutNode name="image2">
+                      <dgm:alg type="sp"/>
+                      <dgm:shape xmlns:r="http://schemas.openxmlformats.org/officeDocument/2006/relationships" type="ellipse" r:blip="" blipPhldr="1">
+                        <dgm:adjLst/>
+                      </dgm:shape>
+                      <dgm:presOf/>
+                      <dgm:constrLst/>
+                      <dgm:ruleLst/>
+                    </dgm:layoutNode>
+                    <dgm:layoutNode name="text2" styleLbl="revTx">
+                      <dgm:varLst>
+                        <dgm:chPref val="3"/>
+                      </dgm:varLst>
+                      <dgm:alg type="tx">
+                        <dgm:param type="parTxLTRAlign" val="l"/>
+                        <dgm:param type="parTxRTLAlign" val="r"/>
+                      </dgm:alg>
+                      <dgm:shape xmlns:r="http://schemas.openxmlformats.org/officeDocument/2006/relationships" type="rect" r:blip="">
+                        <dgm:adjLst/>
+                      </dgm:shape>
+                      <dgm:presOf axis="self"/>
+                      <dgm:constrLst>
+                        <dgm:constr type="tMarg" refType="primFontSz" fact="0.3"/>
+                        <dgm:constr type="bMarg" refType="primFontSz" fact="0.3"/>
+                        <dgm:constr type="lMarg" refType="primFontSz" fact="0.3"/>
+                        <dgm:constr type="rMarg" refType="primFontSz" fact="0.3"/>
+                      </dgm:constrLst>
+                      <dgm:ruleLst>
+                        <dgm:rule type="primFontSz" val="5" fact="NaN" max="NaN"/>
+                      </dgm:ruleLst>
+                    </dgm:layoutNode>
+                  </dgm:layoutNode>
+                  <dgm:layoutNode name="hierChild3">
+                    <dgm:choose name="Name12">
+                      <dgm:if name="Name13" func="var" arg="dir" op="equ" val="norm">
+                        <dgm:alg type="hierChild">
+                          <dgm:param type="linDir" val="fromL"/>
+                        </dgm:alg>
+                      </dgm:if>
+                      <dgm:else name="Name14">
+                        <dgm:alg type="hierChild">
+                          <dgm:param type="linDir" val="fromR"/>
+                        </dgm:alg>
+                      </dgm:else>
+                    </dgm:choose>
+                    <dgm:shape xmlns:r="http://schemas.openxmlformats.org/officeDocument/2006/relationships" r:blip="">
+                      <dgm:adjLst/>
+                    </dgm:shape>
+                    <dgm:presOf/>
+                    <dgm:constrLst/>
+                    <dgm:ruleLst/>
+                    <dgm:forEach name="Name15" axis="ch">
+                      <dgm:forEach name="Name16" axis="self" ptType="parTrans" cnt="1">
+                        <dgm:layoutNode name="Name17">
+                          <dgm:alg type="conn">
+                            <dgm:param type="dim" val="1D"/>
+                            <dgm:param type="endSty" val="noArr"/>
+                            <dgm:param type="connRout" val="bend"/>
+                            <dgm:param type="bendPt" val="end"/>
+                            <dgm:param type="begPts" val="bCtr"/>
+                            <dgm:param type="endPts" val="tCtr"/>
+                            <dgm:param type="srcNode" val="image2"/>
+                            <dgm:param type="dstNode" val="image3"/>
+                          </dgm:alg>
+                          <dgm:shape xmlns:r="http://schemas.openxmlformats.org/officeDocument/2006/relationships" type="conn" r:blip="" zOrderOff="-999">
+                            <dgm:adjLst/>
+                          </dgm:shape>
+                          <dgm:presOf axis="self"/>
+                          <dgm:constrLst>
+                            <dgm:constr type="begPad"/>
+                            <dgm:constr type="endPad"/>
+                          </dgm:constrLst>
+                          <dgm:ruleLst/>
+                        </dgm:layoutNode>
+                      </dgm:forEach>
+                      <dgm:forEach name="Name18" axis="self" ptType="node">
+                        <dgm:layoutNode name="hierRoot3">
+                          <dgm:alg type="hierRoot"/>
+                          <dgm:shape xmlns:r="http://schemas.openxmlformats.org/officeDocument/2006/relationships" r:blip="">
+                            <dgm:adjLst/>
+                          </dgm:shape>
+                          <dgm:presOf/>
+                          <dgm:constrLst>
+                            <dgm:constr type="bendDist" for="des" ptType="parTrans" refType="sp" fact="0.5"/>
+                          </dgm:constrLst>
+                          <dgm:ruleLst/>
+                          <dgm:layoutNode name="composite3">
+                            <dgm:alg type="composite"/>
+                            <dgm:shape xmlns:r="http://schemas.openxmlformats.org/officeDocument/2006/relationships" r:blip="">
+                              <dgm:adjLst/>
+                            </dgm:shape>
+                            <dgm:presOf/>
+                            <dgm:constrLst>
+                              <dgm:constr type="h" for="ch" forName="image3" refType="h" fact="0.8"/>
+                              <dgm:constr type="w" for="ch" forName="image3" refType="h" refFor="ch" refForName="image3"/>
+                              <dgm:constr type="t" for="ch" forName="image3" refType="h" fact="0.1"/>
+                              <dgm:constr type="l" for="ch" forName="image3"/>
+                              <dgm:constr type="w" for="ch" forName="text3" refType="w" fact="0.6"/>
+                              <dgm:constr type="h" for="ch" forName="text3" refType="h" fact="0.8"/>
+                              <dgm:constr type="t" for="ch" forName="text3" refType="w" fact="0.04"/>
+                              <dgm:constr type="l" for="ch" forName="text3" refType="w" fact="0.4"/>
+                            </dgm:constrLst>
+                            <dgm:ruleLst/>
+                            <dgm:layoutNode name="image3">
+                              <dgm:alg type="sp"/>
+                              <dgm:shape xmlns:r="http://schemas.openxmlformats.org/officeDocument/2006/relationships" type="ellipse" r:blip="" blipPhldr="1">
+                                <dgm:adjLst/>
+                              </dgm:shape>
+                              <dgm:presOf/>
+                              <dgm:constrLst/>
+                              <dgm:ruleLst/>
+                            </dgm:layoutNode>
+                            <dgm:layoutNode name="text3" styleLbl="revTx">
+                              <dgm:varLst>
+                                <dgm:chPref val="3"/>
+                              </dgm:varLst>
+                              <dgm:alg type="tx">
+                                <dgm:param type="parTxLTRAlign" val="l"/>
+                                <dgm:param type="parTxRTLAlign" val="r"/>
+                              </dgm:alg>
+                              <dgm:shape xmlns:r="http://schemas.openxmlformats.org/officeDocument/2006/relationships" type="rect" r:blip="">
+                                <dgm:adjLst/>
+                              </dgm:shape>
+                              <dgm:presOf axis="self"/>
+                              <dgm:constrLst>
+                                <dgm:constr type="tMarg" refType="primFontSz" fact="0.3"/>
+                                <dgm:constr type="bMarg" refType="primFontSz" fact="0.3"/>
+                                <dgm:constr type="lMarg" refType="primFontSz" fact="0.3"/>
+                                <dgm:constr type="rMarg" refType="primFontSz" fact="0.3"/>
+                              </dgm:constrLst>
+                              <dgm:ruleLst>
+                                <dgm:rule type="primFontSz" val="5" fact="NaN" max="NaN"/>
+                              </dgm:ruleLst>
+                            </dgm:layoutNode>
+                          </dgm:layoutNode>
+                          <dgm:layoutNode name="hierChild4">
+                            <dgm:choose name="Name19">
+                              <dgm:if name="Name20" func="var" arg="dir" op="equ" val="norm">
+                                <dgm:alg type="hierChild">
+                                  <dgm:param type="linDir" val="fromL"/>
+                                </dgm:alg>
+                              </dgm:if>
+                              <dgm:else name="Name21">
+                                <dgm:alg type="hierChild">
+                                  <dgm:param type="linDir" val="fromR"/>
+                                </dgm:alg>
+                              </dgm:else>
+                            </dgm:choose>
+                            <dgm:shape xmlns:r="http://schemas.openxmlformats.org/officeDocument/2006/relationships" r:blip="">
+                              <dgm:adjLst/>
+                            </dgm:shape>
+                            <dgm:presOf/>
+                            <dgm:constrLst/>
+                            <dgm:ruleLst/>
+                            <dgm:forEach name="repeat" axis="ch">
+                              <dgm:forEach name="Name22" axis="self" ptType="parTrans" cnt="1">
+                                <dgm:layoutNode name="Name23">
+                                  <dgm:choose name="Name24">
+                                    <dgm:if name="Name25" axis="self" func="depth" op="lte" val="4">
+                                      <dgm:alg type="conn">
+                                        <dgm:param type="dim" val="1D"/>
+                                        <dgm:param type="endSty" val="noArr"/>
+                                        <dgm:param type="connRout" val="bend"/>
+                                        <dgm:param type="bendPt" val="end"/>
+                                        <dgm:param type="begPts" val="bCtr"/>
+                                        <dgm:param type="endPts" val="tCtr"/>
+                                        <dgm:param type="srcNode" val="image3"/>
+                                        <dgm:param type="dstNode" val="image4"/>
+                                      </dgm:alg>
+                                    </dgm:if>
+                                    <dgm:else name="Name26">
+                                      <dgm:alg type="conn">
+                                        <dgm:param type="dim" val="1D"/>
+                                        <dgm:param type="endSty" val="noArr"/>
+                                        <dgm:param type="connRout" val="bend"/>
+                                        <dgm:param type="bendPt" val="end"/>
+                                        <dgm:param type="begPts" val="bCtr"/>
+                                        <dgm:param type="endPts" val="tCtr"/>
+                                        <dgm:param type="srcNode" val="image4"/>
+                                        <dgm:param type="dstNode" val="image4"/>
+                                      </dgm:alg>
+                                    </dgm:else>
+                                  </dgm:choose>
+                                  <dgm:shape xmlns:r="http://schemas.openxmlformats.org/officeDocument/2006/relationships" type="conn" r:blip="" zOrderOff="-999">
+                                    <dgm:adjLst/>
+                                  </dgm:shape>
+                                  <dgm:presOf axis="self"/>
+                                  <dgm:constrLst>
+                                    <dgm:constr type="begPad"/>
+                                    <dgm:constr type="endPad"/>
+                                  </dgm:constrLst>
+                                  <dgm:ruleLst/>
+                                </dgm:layoutNode>
+                              </dgm:forEach>
+                              <dgm:forEach name="Name27" axis="self" ptType="node">
+                                <dgm:layoutNode name="hierRoot4">
+                                  <dgm:alg type="hierRoot"/>
+                                  <dgm:shape xmlns:r="http://schemas.openxmlformats.org/officeDocument/2006/relationships" r:blip="">
+                                    <dgm:adjLst/>
+                                  </dgm:shape>
+                                  <dgm:presOf/>
+                                  <dgm:constrLst>
+                                    <dgm:constr type="bendDist" for="des" ptType="parTrans" refType="sp" fact="0.5"/>
+                                  </dgm:constrLst>
+                                  <dgm:ruleLst/>
+                                  <dgm:layoutNode name="composite4">
+                                    <dgm:alg type="composite"/>
+                                    <dgm:shape xmlns:r="http://schemas.openxmlformats.org/officeDocument/2006/relationships" r:blip="">
+                                      <dgm:adjLst/>
+                                    </dgm:shape>
+                                    <dgm:presOf/>
+                                    <dgm:constrLst>
+                                      <dgm:constr type="h" for="ch" forName="image4" refType="h" fact="0.8"/>
+                                      <dgm:constr type="w" for="ch" forName="image4" refType="h" refFor="ch" refForName="image4"/>
+                                      <dgm:constr type="t" for="ch" forName="image4" refType="h" fact="0.1"/>
+                                      <dgm:constr type="l" for="ch" forName="image4"/>
+                                      <dgm:constr type="w" for="ch" forName="text4" refType="w" fact="0.6"/>
+                                      <dgm:constr type="h" for="ch" forName="text4" refType="h" fact="0.8"/>
+                                      <dgm:constr type="t" for="ch" forName="text4" refType="w" fact="0.04"/>
+                                      <dgm:constr type="l" for="ch" forName="text4" refType="w" fact="0.4"/>
+                                    </dgm:constrLst>
+                                    <dgm:ruleLst/>
+                                    <dgm:layoutNode name="image4">
+                                      <dgm:alg type="sp"/>
+                                      <dgm:shape xmlns:r="http://schemas.openxmlformats.org/officeDocument/2006/relationships" type="ellipse" r:blip="" blipPhldr="1">
+                                        <dgm:adjLst/>
+                                      </dgm:shape>
+                                      <dgm:presOf/>
+                                      <dgm:constrLst/>
+                                      <dgm:ruleLst/>
+                                    </dgm:layoutNode>
+                                    <dgm:layoutNode name="text4" styleLbl="revTx">
+                                      <dgm:varLst>
+                                        <dgm:chPref val="3"/>
+                                      </dgm:varLst>
+                                      <dgm:alg type="tx">
+                                        <dgm:param type="parTxLTRAlign" val="l"/>
+                                        <dgm:param type="parTxRTLAlign" val="r"/>
+                                      </dgm:alg>
+                                      <dgm:shape xmlns:r="http://schemas.openxmlformats.org/officeDocument/2006/relationships" type="rect" r:blip="">
+                                        <dgm:adjLst/>
+                                      </dgm:shape>
+                                      <dgm:presOf axis="self"/>
+                                      <dgm:constrLst>
+                                        <dgm:constr type="tMarg" refType="primFontSz" fact="0.3"/>
+                                        <dgm:constr type="bMarg" refType="primFontSz" fact="0.3"/>
+                                        <dgm:constr type="lMarg" refType="primFontSz" fact="0.3"/>
+                                        <dgm:constr type="rMarg" refType="primFontSz" fact="0.3"/>
+                                      </dgm:constrLst>
+                                      <dgm:ruleLst>
+                                        <dgm:rule type="primFontSz" val="5" fact="NaN" max="NaN"/>
+                                      </dgm:ruleLst>
+                                    </dgm:layoutNode>
+                                  </dgm:layoutNode>
+                                  <dgm:layoutNode name="hierChild5">
+                                    <dgm:choose name="Name28">
+                                      <dgm:if name="Name29" func="var" arg="dir" op="equ" val="norm">
+                                        <dgm:alg type="hierChild">
+                                          <dgm:param type="linDir" val="fromL"/>
+                                        </dgm:alg>
+                                      </dgm:if>
+                                      <dgm:else name="Name30">
+                                        <dgm:alg type="hierChild">
+                                          <dgm:param type="linDir" val="fromR"/>
+                                        </dgm:alg>
+                                      </dgm:else>
+                                    </dgm:choose>
+                                    <dgm:shape xmlns:r="http://schemas.openxmlformats.org/officeDocument/2006/relationships" r:blip="">
+                                      <dgm:adjLst/>
+                                    </dgm:shape>
+                                    <dgm:presOf/>
+                                    <dgm:constrLst/>
+                                    <dgm:ruleLst/>
+                                    <dgm:forEach name="Name31" ref="repeat"/>
+                                  </dgm:layoutNode>
+                                </dgm:layoutNode>
+                              </dgm:forEach>
+                            </dgm:forEach>
+                          </dgm:layoutNode>
+                        </dgm:layoutNode>
+                      </dgm:forEach>
+                    </dgm:forEach>
+                  </dgm:layoutNode>
+                </dgm:layoutNode>
+              </dgm:forEach>
+            </dgm:forEach>
+          </dgm:layoutNode>
+        </dgm:layoutNode>
+      </dgm:forEach>
+    </dgm:forEach>
+  </dgm:layoutNode>
+</dgm:layoutDef>
+</file>
+
 <file path=ppt/diagrams/quickStyle1.xml><?xml version="1.0" encoding="utf-8"?>
 <dgm:styleDef xmlns:dgm="http://schemas.openxmlformats.org/drawingml/2006/diagram" xmlns:a="http://schemas.openxmlformats.org/drawingml/2006/main" uniqueId="urn:microsoft.com/office/officeart/2005/8/quickstyle/simple4">
   <dgm:title val=""/>
@@ -22463,6 +25466,1040 @@
 </file>
 
 <file path=ppt/diagrams/quickStyle8.xml><?xml version="1.0" encoding="utf-8"?>
+<dgm:styleDef xmlns:dgm="http://schemas.openxmlformats.org/drawingml/2006/diagram" xmlns:a="http://schemas.openxmlformats.org/drawingml/2006/main" uniqueId="urn:microsoft.com/office/officeart/2005/8/quickstyle/simple4">
+  <dgm:title val=""/>
+  <dgm:desc val=""/>
+  <dgm:catLst>
+    <dgm:cat type="simple" pri="10400"/>
+  </dgm:catLst>
+  <dgm:scene3d>
+    <a:camera prst="orthographicFront"/>
+    <a:lightRig rig="threePt" dir="t"/>
+  </dgm:scene3d>
+  <dgm:styleLbl name="node0">
+    <dgm:scene3d>
+      <a:camera prst="orthographicFront"/>
+      <a:lightRig rig="threePt" dir="t"/>
+    </dgm:scene3d>
+    <dgm:sp3d/>
+    <dgm:txPr/>
+    <dgm:style>
+      <a:lnRef idx="0">
+        <a:scrgbClr r="0" g="0" b="0"/>
+      </a:lnRef>
+      <a:fillRef idx="3">
+        <a:scrgbClr r="0" g="0" b="0"/>
+      </a:fillRef>
+      <a:effectRef idx="2">
+        <a:scrgbClr r="0" g="0" b="0"/>
+      </a:effectRef>
+      <a:fontRef idx="minor">
+        <a:schemeClr val="lt1"/>
+      </a:fontRef>
+    </dgm:style>
+  </dgm:styleLbl>
+  <dgm:styleLbl name="lnNode1">
+    <dgm:scene3d>
+      <a:camera prst="orthographicFront"/>
+      <a:lightRig rig="threePt" dir="t"/>
+    </dgm:scene3d>
+    <dgm:sp3d/>
+    <dgm:txPr/>
+    <dgm:style>
+      <a:lnRef idx="1">
+        <a:scrgbClr r="0" g="0" b="0"/>
+      </a:lnRef>
+      <a:fillRef idx="3">
+        <a:scrgbClr r="0" g="0" b="0"/>
+      </a:fillRef>
+      <a:effectRef idx="2">
+        <a:scrgbClr r="0" g="0" b="0"/>
+      </a:effectRef>
+      <a:fontRef idx="minor">
+        <a:schemeClr val="lt1"/>
+      </a:fontRef>
+    </dgm:style>
+  </dgm:styleLbl>
+  <dgm:styleLbl name="vennNode1">
+    <dgm:scene3d>
+      <a:camera prst="orthographicFront"/>
+      <a:lightRig rig="threePt" dir="t"/>
+    </dgm:scene3d>
+    <dgm:sp3d/>
+    <dgm:txPr/>
+    <dgm:style>
+      <a:lnRef idx="0">
+        <a:scrgbClr r="0" g="0" b="0"/>
+      </a:lnRef>
+      <a:fillRef idx="3">
+        <a:scrgbClr r="0" g="0" b="0"/>
+      </a:fillRef>
+      <a:effectRef idx="0">
+        <a:scrgbClr r="0" g="0" b="0"/>
+      </a:effectRef>
+      <a:fontRef idx="minor">
+        <a:schemeClr val="tx1"/>
+      </a:fontRef>
+    </dgm:style>
+  </dgm:styleLbl>
+  <dgm:styleLbl name="alignNode1">
+    <dgm:scene3d>
+      <a:camera prst="orthographicFront"/>
+      <a:lightRig rig="threePt" dir="t"/>
+    </dgm:scene3d>
+    <dgm:sp3d/>
+    <dgm:txPr/>
+    <dgm:style>
+      <a:lnRef idx="1">
+        <a:scrgbClr r="0" g="0" b="0"/>
+      </a:lnRef>
+      <a:fillRef idx="3">
+        <a:scrgbClr r="0" g="0" b="0"/>
+      </a:fillRef>
+      <a:effectRef idx="2">
+        <a:scrgbClr r="0" g="0" b="0"/>
+      </a:effectRef>
+      <a:fontRef idx="minor">
+        <a:schemeClr val="lt1"/>
+      </a:fontRef>
+    </dgm:style>
+  </dgm:styleLbl>
+  <dgm:styleLbl name="node1">
+    <dgm:scene3d>
+      <a:camera prst="orthographicFront"/>
+      <a:lightRig rig="threePt" dir="t"/>
+    </dgm:scene3d>
+    <dgm:sp3d/>
+    <dgm:txPr/>
+    <dgm:style>
+      <a:lnRef idx="0">
+        <a:scrgbClr r="0" g="0" b="0"/>
+      </a:lnRef>
+      <a:fillRef idx="3">
+        <a:scrgbClr r="0" g="0" b="0"/>
+      </a:fillRef>
+      <a:effectRef idx="2">
+        <a:scrgbClr r="0" g="0" b="0"/>
+      </a:effectRef>
+      <a:fontRef idx="minor">
+        <a:schemeClr val="lt1"/>
+      </a:fontRef>
+    </dgm:style>
+  </dgm:styleLbl>
+  <dgm:styleLbl name="node2">
+    <dgm:scene3d>
+      <a:camera prst="orthographicFront"/>
+      <a:lightRig rig="threePt" dir="t"/>
+    </dgm:scene3d>
+    <dgm:sp3d/>
+    <dgm:txPr/>
+    <dgm:style>
+      <a:lnRef idx="0">
+        <a:scrgbClr r="0" g="0" b="0"/>
+      </a:lnRef>
+      <a:fillRef idx="3">
+        <a:scrgbClr r="0" g="0" b="0"/>
+      </a:fillRef>
+      <a:effectRef idx="2">
+        <a:scrgbClr r="0" g="0" b="0"/>
+      </a:effectRef>
+      <a:fontRef idx="minor">
+        <a:schemeClr val="lt1"/>
+      </a:fontRef>
+    </dgm:style>
+  </dgm:styleLbl>
+  <dgm:styleLbl name="node3">
+    <dgm:scene3d>
+      <a:camera prst="orthographicFront"/>
+      <a:lightRig rig="threePt" dir="t"/>
+    </dgm:scene3d>
+    <dgm:sp3d/>
+    <dgm:txPr/>
+    <dgm:style>
+      <a:lnRef idx="0">
+        <a:scrgbClr r="0" g="0" b="0"/>
+      </a:lnRef>
+      <a:fillRef idx="3">
+        <a:scrgbClr r="0" g="0" b="0"/>
+      </a:fillRef>
+      <a:effectRef idx="2">
+        <a:scrgbClr r="0" g="0" b="0"/>
+      </a:effectRef>
+      <a:fontRef idx="minor">
+        <a:schemeClr val="lt1"/>
+      </a:fontRef>
+    </dgm:style>
+  </dgm:styleLbl>
+  <dgm:styleLbl name="node4">
+    <dgm:scene3d>
+      <a:camera prst="orthographicFront"/>
+      <a:lightRig rig="threePt" dir="t"/>
+    </dgm:scene3d>
+    <dgm:sp3d/>
+    <dgm:txPr/>
+    <dgm:style>
+      <a:lnRef idx="0">
+        <a:scrgbClr r="0" g="0" b="0"/>
+      </a:lnRef>
+      <a:fillRef idx="3">
+        <a:scrgbClr r="0" g="0" b="0"/>
+      </a:fillRef>
+      <a:effectRef idx="2">
+        <a:scrgbClr r="0" g="0" b="0"/>
+      </a:effectRef>
+      <a:fontRef idx="minor">
+        <a:schemeClr val="lt1"/>
+      </a:fontRef>
+    </dgm:style>
+  </dgm:styleLbl>
+  <dgm:styleLbl name="fgImgPlace1">
+    <dgm:scene3d>
+      <a:camera prst="orthographicFront"/>
+      <a:lightRig rig="threePt" dir="t"/>
+    </dgm:scene3d>
+    <dgm:sp3d/>
+    <dgm:txPr/>
+    <dgm:style>
+      <a:lnRef idx="0">
+        <a:scrgbClr r="0" g="0" b="0"/>
+      </a:lnRef>
+      <a:fillRef idx="1">
+        <a:scrgbClr r="0" g="0" b="0"/>
+      </a:fillRef>
+      <a:effectRef idx="2">
+        <a:scrgbClr r="0" g="0" b="0"/>
+      </a:effectRef>
+      <a:fontRef idx="minor"/>
+    </dgm:style>
+  </dgm:styleLbl>
+  <dgm:styleLbl name="alignImgPlace1">
+    <dgm:scene3d>
+      <a:camera prst="orthographicFront"/>
+      <a:lightRig rig="threePt" dir="t"/>
+    </dgm:scene3d>
+    <dgm:sp3d/>
+    <dgm:txPr/>
+    <dgm:style>
+      <a:lnRef idx="0">
+        <a:scrgbClr r="0" g="0" b="0"/>
+      </a:lnRef>
+      <a:fillRef idx="1">
+        <a:scrgbClr r="0" g="0" b="0"/>
+      </a:fillRef>
+      <a:effectRef idx="2">
+        <a:scrgbClr r="0" g="0" b="0"/>
+      </a:effectRef>
+      <a:fontRef idx="minor"/>
+    </dgm:style>
+  </dgm:styleLbl>
+  <dgm:styleLbl name="bgImgPlace1">
+    <dgm:scene3d>
+      <a:camera prst="orthographicFront"/>
+      <a:lightRig rig="threePt" dir="t"/>
+    </dgm:scene3d>
+    <dgm:sp3d/>
+    <dgm:txPr/>
+    <dgm:style>
+      <a:lnRef idx="0">
+        <a:scrgbClr r="0" g="0" b="0"/>
+      </a:lnRef>
+      <a:fillRef idx="1">
+        <a:scrgbClr r="0" g="0" b="0"/>
+      </a:fillRef>
+      <a:effectRef idx="2">
+        <a:scrgbClr r="0" g="0" b="0"/>
+      </a:effectRef>
+      <a:fontRef idx="minor"/>
+    </dgm:style>
+  </dgm:styleLbl>
+  <dgm:styleLbl name="sibTrans2D1">
+    <dgm:scene3d>
+      <a:camera prst="orthographicFront"/>
+      <a:lightRig rig="threePt" dir="t"/>
+    </dgm:scene3d>
+    <dgm:sp3d/>
+    <dgm:txPr/>
+    <dgm:style>
+      <a:lnRef idx="0">
+        <a:scrgbClr r="0" g="0" b="0"/>
+      </a:lnRef>
+      <a:fillRef idx="3">
+        <a:scrgbClr r="0" g="0" b="0"/>
+      </a:fillRef>
+      <a:effectRef idx="2">
+        <a:scrgbClr r="0" g="0" b="0"/>
+      </a:effectRef>
+      <a:fontRef idx="minor">
+        <a:schemeClr val="lt1"/>
+      </a:fontRef>
+    </dgm:style>
+  </dgm:styleLbl>
+  <dgm:styleLbl name="fgSibTrans2D1">
+    <dgm:scene3d>
+      <a:camera prst="orthographicFront"/>
+      <a:lightRig rig="threePt" dir="t"/>
+    </dgm:scene3d>
+    <dgm:sp3d/>
+    <dgm:txPr/>
+    <dgm:style>
+      <a:lnRef idx="0">
+        <a:scrgbClr r="0" g="0" b="0"/>
+      </a:lnRef>
+      <a:fillRef idx="3">
+        <a:scrgbClr r="0" g="0" b="0"/>
+      </a:fillRef>
+      <a:effectRef idx="2">
+        <a:scrgbClr r="0" g="0" b="0"/>
+      </a:effectRef>
+      <a:fontRef idx="minor">
+        <a:schemeClr val="lt1"/>
+      </a:fontRef>
+    </dgm:style>
+  </dgm:styleLbl>
+  <dgm:styleLbl name="bgSibTrans2D1">
+    <dgm:scene3d>
+      <a:camera prst="orthographicFront"/>
+      <a:lightRig rig="threePt" dir="t"/>
+    </dgm:scene3d>
+    <dgm:sp3d/>
+    <dgm:txPr/>
+    <dgm:style>
+      <a:lnRef idx="0">
+        <a:scrgbClr r="0" g="0" b="0"/>
+      </a:lnRef>
+      <a:fillRef idx="3">
+        <a:scrgbClr r="0" g="0" b="0"/>
+      </a:fillRef>
+      <a:effectRef idx="2">
+        <a:scrgbClr r="0" g="0" b="0"/>
+      </a:effectRef>
+      <a:fontRef idx="minor">
+        <a:schemeClr val="lt1"/>
+      </a:fontRef>
+    </dgm:style>
+  </dgm:styleLbl>
+  <dgm:styleLbl name="sibTrans1D1">
+    <dgm:scene3d>
+      <a:camera prst="orthographicFront"/>
+      <a:lightRig rig="threePt" dir="t"/>
+    </dgm:scene3d>
+    <dgm:sp3d/>
+    <dgm:txPr/>
+    <dgm:style>
+      <a:lnRef idx="1">
+        <a:scrgbClr r="0" g="0" b="0"/>
+      </a:lnRef>
+      <a:fillRef idx="0">
+        <a:scrgbClr r="0" g="0" b="0"/>
+      </a:fillRef>
+      <a:effectRef idx="0">
+        <a:scrgbClr r="0" g="0" b="0"/>
+      </a:effectRef>
+      <a:fontRef idx="minor"/>
+    </dgm:style>
+  </dgm:styleLbl>
+  <dgm:styleLbl name="callout">
+    <dgm:scene3d>
+      <a:camera prst="orthographicFront"/>
+      <a:lightRig rig="threePt" dir="t"/>
+    </dgm:scene3d>
+    <dgm:sp3d/>
+    <dgm:txPr/>
+    <dgm:style>
+      <a:lnRef idx="2">
+        <a:scrgbClr r="0" g="0" b="0"/>
+      </a:lnRef>
+      <a:fillRef idx="1">
+        <a:scrgbClr r="0" g="0" b="0"/>
+      </a:fillRef>
+      <a:effectRef idx="1">
+        <a:scrgbClr r="0" g="0" b="0"/>
+      </a:effectRef>
+      <a:fontRef idx="minor"/>
+    </dgm:style>
+  </dgm:styleLbl>
+  <dgm:styleLbl name="asst0">
+    <dgm:scene3d>
+      <a:camera prst="orthographicFront"/>
+      <a:lightRig rig="threePt" dir="t"/>
+    </dgm:scene3d>
+    <dgm:sp3d/>
+    <dgm:txPr/>
+    <dgm:style>
+      <a:lnRef idx="0">
+        <a:scrgbClr r="0" g="0" b="0"/>
+      </a:lnRef>
+      <a:fillRef idx="3">
+        <a:scrgbClr r="0" g="0" b="0"/>
+      </a:fillRef>
+      <a:effectRef idx="2">
+        <a:scrgbClr r="0" g="0" b="0"/>
+      </a:effectRef>
+      <a:fontRef idx="minor">
+        <a:schemeClr val="lt1"/>
+      </a:fontRef>
+    </dgm:style>
+  </dgm:styleLbl>
+  <dgm:styleLbl name="asst1">
+    <dgm:scene3d>
+      <a:camera prst="orthographicFront"/>
+      <a:lightRig rig="threePt" dir="t"/>
+    </dgm:scene3d>
+    <dgm:sp3d/>
+    <dgm:txPr/>
+    <dgm:style>
+      <a:lnRef idx="0">
+        <a:scrgbClr r="0" g="0" b="0"/>
+      </a:lnRef>
+      <a:fillRef idx="3">
+        <a:scrgbClr r="0" g="0" b="0"/>
+      </a:fillRef>
+      <a:effectRef idx="2">
+        <a:scrgbClr r="0" g="0" b="0"/>
+      </a:effectRef>
+      <a:fontRef idx="minor">
+        <a:schemeClr val="lt1"/>
+      </a:fontRef>
+    </dgm:style>
+  </dgm:styleLbl>
+  <dgm:styleLbl name="asst2">
+    <dgm:scene3d>
+      <a:camera prst="orthographicFront"/>
+      <a:lightRig rig="threePt" dir="t"/>
+    </dgm:scene3d>
+    <dgm:sp3d/>
+    <dgm:txPr/>
+    <dgm:style>
+      <a:lnRef idx="0">
+        <a:scrgbClr r="0" g="0" b="0"/>
+      </a:lnRef>
+      <a:fillRef idx="3">
+        <a:scrgbClr r="0" g="0" b="0"/>
+      </a:fillRef>
+      <a:effectRef idx="2">
+        <a:scrgbClr r="0" g="0" b="0"/>
+      </a:effectRef>
+      <a:fontRef idx="minor">
+        <a:schemeClr val="lt1"/>
+      </a:fontRef>
+    </dgm:style>
+  </dgm:styleLbl>
+  <dgm:styleLbl name="asst3">
+    <dgm:scene3d>
+      <a:camera prst="orthographicFront"/>
+      <a:lightRig rig="threePt" dir="t"/>
+    </dgm:scene3d>
+    <dgm:sp3d/>
+    <dgm:txPr/>
+    <dgm:style>
+      <a:lnRef idx="0">
+        <a:scrgbClr r="0" g="0" b="0"/>
+      </a:lnRef>
+      <a:fillRef idx="3">
+        <a:scrgbClr r="0" g="0" b="0"/>
+      </a:fillRef>
+      <a:effectRef idx="2">
+        <a:scrgbClr r="0" g="0" b="0"/>
+      </a:effectRef>
+      <a:fontRef idx="minor">
+        <a:schemeClr val="lt1"/>
+      </a:fontRef>
+    </dgm:style>
+  </dgm:styleLbl>
+  <dgm:styleLbl name="asst4">
+    <dgm:scene3d>
+      <a:camera prst="orthographicFront"/>
+      <a:lightRig rig="threePt" dir="t"/>
+    </dgm:scene3d>
+    <dgm:sp3d/>
+    <dgm:txPr/>
+    <dgm:style>
+      <a:lnRef idx="0">
+        <a:scrgbClr r="0" g="0" b="0"/>
+      </a:lnRef>
+      <a:fillRef idx="3">
+        <a:scrgbClr r="0" g="0" b="0"/>
+      </a:fillRef>
+      <a:effectRef idx="2">
+        <a:scrgbClr r="0" g="0" b="0"/>
+      </a:effectRef>
+      <a:fontRef idx="minor">
+        <a:schemeClr val="lt1"/>
+      </a:fontRef>
+    </dgm:style>
+  </dgm:styleLbl>
+  <dgm:styleLbl name="parChTrans2D1">
+    <dgm:scene3d>
+      <a:camera prst="orthographicFront"/>
+      <a:lightRig rig="threePt" dir="t"/>
+    </dgm:scene3d>
+    <dgm:sp3d/>
+    <dgm:txPr/>
+    <dgm:style>
+      <a:lnRef idx="0">
+        <a:scrgbClr r="0" g="0" b="0"/>
+      </a:lnRef>
+      <a:fillRef idx="3">
+        <a:scrgbClr r="0" g="0" b="0"/>
+      </a:fillRef>
+      <a:effectRef idx="2">
+        <a:scrgbClr r="0" g="0" b="0"/>
+      </a:effectRef>
+      <a:fontRef idx="minor">
+        <a:schemeClr val="lt1"/>
+      </a:fontRef>
+    </dgm:style>
+  </dgm:styleLbl>
+  <dgm:styleLbl name="parChTrans2D2">
+    <dgm:scene3d>
+      <a:camera prst="orthographicFront"/>
+      <a:lightRig rig="threePt" dir="t"/>
+    </dgm:scene3d>
+    <dgm:sp3d/>
+    <dgm:txPr/>
+    <dgm:style>
+      <a:lnRef idx="0">
+        <a:scrgbClr r="0" g="0" b="0"/>
+      </a:lnRef>
+      <a:fillRef idx="3">
+        <a:scrgbClr r="0" g="0" b="0"/>
+      </a:fillRef>
+      <a:effectRef idx="2">
+        <a:scrgbClr r="0" g="0" b="0"/>
+      </a:effectRef>
+      <a:fontRef idx="minor">
+        <a:schemeClr val="lt1"/>
+      </a:fontRef>
+    </dgm:style>
+  </dgm:styleLbl>
+  <dgm:styleLbl name="parChTrans2D3">
+    <dgm:scene3d>
+      <a:camera prst="orthographicFront"/>
+      <a:lightRig rig="threePt" dir="t"/>
+    </dgm:scene3d>
+    <dgm:sp3d/>
+    <dgm:txPr/>
+    <dgm:style>
+      <a:lnRef idx="1">
+        <a:scrgbClr r="0" g="0" b="0"/>
+      </a:lnRef>
+      <a:fillRef idx="3">
+        <a:scrgbClr r="0" g="0" b="0"/>
+      </a:fillRef>
+      <a:effectRef idx="2">
+        <a:scrgbClr r="0" g="0" b="0"/>
+      </a:effectRef>
+      <a:fontRef idx="minor">
+        <a:schemeClr val="lt1"/>
+      </a:fontRef>
+    </dgm:style>
+  </dgm:styleLbl>
+  <dgm:styleLbl name="parChTrans2D4">
+    <dgm:scene3d>
+      <a:camera prst="orthographicFront"/>
+      <a:lightRig rig="threePt" dir="t"/>
+    </dgm:scene3d>
+    <dgm:sp3d/>
+    <dgm:txPr/>
+    <dgm:style>
+      <a:lnRef idx="1">
+        <a:scrgbClr r="0" g="0" b="0"/>
+      </a:lnRef>
+      <a:fillRef idx="3">
+        <a:scrgbClr r="0" g="0" b="0"/>
+      </a:fillRef>
+      <a:effectRef idx="2">
+        <a:scrgbClr r="0" g="0" b="0"/>
+      </a:effectRef>
+      <a:fontRef idx="minor">
+        <a:schemeClr val="lt1"/>
+      </a:fontRef>
+    </dgm:style>
+  </dgm:styleLbl>
+  <dgm:styleLbl name="parChTrans1D1">
+    <dgm:scene3d>
+      <a:camera prst="orthographicFront"/>
+      <a:lightRig rig="threePt" dir="t"/>
+    </dgm:scene3d>
+    <dgm:sp3d/>
+    <dgm:txPr/>
+    <dgm:style>
+      <a:lnRef idx="1">
+        <a:scrgbClr r="0" g="0" b="0"/>
+      </a:lnRef>
+      <a:fillRef idx="0">
+        <a:scrgbClr r="0" g="0" b="0"/>
+      </a:fillRef>
+      <a:effectRef idx="0">
+        <a:scrgbClr r="0" g="0" b="0"/>
+      </a:effectRef>
+      <a:fontRef idx="minor"/>
+    </dgm:style>
+  </dgm:styleLbl>
+  <dgm:styleLbl name="parChTrans1D2">
+    <dgm:scene3d>
+      <a:camera prst="orthographicFront"/>
+      <a:lightRig rig="threePt" dir="t"/>
+    </dgm:scene3d>
+    <dgm:sp3d/>
+    <dgm:txPr/>
+    <dgm:style>
+      <a:lnRef idx="1">
+        <a:scrgbClr r="0" g="0" b="0"/>
+      </a:lnRef>
+      <a:fillRef idx="0">
+        <a:scrgbClr r="0" g="0" b="0"/>
+      </a:fillRef>
+      <a:effectRef idx="0">
+        <a:scrgbClr r="0" g="0" b="0"/>
+      </a:effectRef>
+      <a:fontRef idx="minor"/>
+    </dgm:style>
+  </dgm:styleLbl>
+  <dgm:styleLbl name="parChTrans1D3">
+    <dgm:scene3d>
+      <a:camera prst="orthographicFront"/>
+      <a:lightRig rig="threePt" dir="t"/>
+    </dgm:scene3d>
+    <dgm:sp3d/>
+    <dgm:txPr/>
+    <dgm:style>
+      <a:lnRef idx="1">
+        <a:scrgbClr r="0" g="0" b="0"/>
+      </a:lnRef>
+      <a:fillRef idx="0">
+        <a:scrgbClr r="0" g="0" b="0"/>
+      </a:fillRef>
+      <a:effectRef idx="0">
+        <a:scrgbClr r="0" g="0" b="0"/>
+      </a:effectRef>
+      <a:fontRef idx="minor"/>
+    </dgm:style>
+  </dgm:styleLbl>
+  <dgm:styleLbl name="parChTrans1D4">
+    <dgm:scene3d>
+      <a:camera prst="orthographicFront"/>
+      <a:lightRig rig="threePt" dir="t"/>
+    </dgm:scene3d>
+    <dgm:sp3d/>
+    <dgm:txPr/>
+    <dgm:style>
+      <a:lnRef idx="1">
+        <a:scrgbClr r="0" g="0" b="0"/>
+      </a:lnRef>
+      <a:fillRef idx="0">
+        <a:scrgbClr r="0" g="0" b="0"/>
+      </a:fillRef>
+      <a:effectRef idx="0">
+        <a:scrgbClr r="0" g="0" b="0"/>
+      </a:effectRef>
+      <a:fontRef idx="minor"/>
+    </dgm:style>
+  </dgm:styleLbl>
+  <dgm:styleLbl name="fgAcc1">
+    <dgm:scene3d>
+      <a:camera prst="orthographicFront"/>
+      <a:lightRig rig="threePt" dir="t"/>
+    </dgm:scene3d>
+    <dgm:sp3d/>
+    <dgm:txPr/>
+    <dgm:style>
+      <a:lnRef idx="1">
+        <a:scrgbClr r="0" g="0" b="0"/>
+      </a:lnRef>
+      <a:fillRef idx="1">
+        <a:scrgbClr r="0" g="0" b="0"/>
+      </a:fillRef>
+      <a:effectRef idx="0">
+        <a:scrgbClr r="0" g="0" b="0"/>
+      </a:effectRef>
+      <a:fontRef idx="minor"/>
+    </dgm:style>
+  </dgm:styleLbl>
+  <dgm:styleLbl name="conFgAcc1">
+    <dgm:scene3d>
+      <a:camera prst="orthographicFront"/>
+      <a:lightRig rig="threePt" dir="t"/>
+    </dgm:scene3d>
+    <dgm:sp3d/>
+    <dgm:txPr/>
+    <dgm:style>
+      <a:lnRef idx="1">
+        <a:scrgbClr r="0" g="0" b="0"/>
+      </a:lnRef>
+      <a:fillRef idx="1">
+        <a:scrgbClr r="0" g="0" b="0"/>
+      </a:fillRef>
+      <a:effectRef idx="0">
+        <a:scrgbClr r="0" g="0" b="0"/>
+      </a:effectRef>
+      <a:fontRef idx="minor"/>
+    </dgm:style>
+  </dgm:styleLbl>
+  <dgm:styleLbl name="alignAcc1">
+    <dgm:scene3d>
+      <a:camera prst="orthographicFront"/>
+      <a:lightRig rig="threePt" dir="t"/>
+    </dgm:scene3d>
+    <dgm:sp3d/>
+    <dgm:txPr/>
+    <dgm:style>
+      <a:lnRef idx="1">
+        <a:scrgbClr r="0" g="0" b="0"/>
+      </a:lnRef>
+      <a:fillRef idx="1">
+        <a:scrgbClr r="0" g="0" b="0"/>
+      </a:fillRef>
+      <a:effectRef idx="0">
+        <a:scrgbClr r="0" g="0" b="0"/>
+      </a:effectRef>
+      <a:fontRef idx="minor"/>
+    </dgm:style>
+  </dgm:styleLbl>
+  <dgm:styleLbl name="trAlignAcc1">
+    <dgm:scene3d>
+      <a:camera prst="orthographicFront"/>
+      <a:lightRig rig="threePt" dir="t"/>
+    </dgm:scene3d>
+    <dgm:sp3d/>
+    <dgm:txPr/>
+    <dgm:style>
+      <a:lnRef idx="1">
+        <a:scrgbClr r="0" g="0" b="0"/>
+      </a:lnRef>
+      <a:fillRef idx="1">
+        <a:scrgbClr r="0" g="0" b="0"/>
+      </a:fillRef>
+      <a:effectRef idx="0">
+        <a:scrgbClr r="0" g="0" b="0"/>
+      </a:effectRef>
+      <a:fontRef idx="minor"/>
+    </dgm:style>
+  </dgm:styleLbl>
+  <dgm:styleLbl name="bgAcc1">
+    <dgm:scene3d>
+      <a:camera prst="orthographicFront"/>
+      <a:lightRig rig="threePt" dir="t"/>
+    </dgm:scene3d>
+    <dgm:sp3d/>
+    <dgm:txPr/>
+    <dgm:style>
+      <a:lnRef idx="1">
+        <a:scrgbClr r="0" g="0" b="0"/>
+      </a:lnRef>
+      <a:fillRef idx="1">
+        <a:scrgbClr r="0" g="0" b="0"/>
+      </a:fillRef>
+      <a:effectRef idx="0">
+        <a:scrgbClr r="0" g="0" b="0"/>
+      </a:effectRef>
+      <a:fontRef idx="minor"/>
+    </dgm:style>
+  </dgm:styleLbl>
+  <dgm:styleLbl name="solidFgAcc1">
+    <dgm:scene3d>
+      <a:camera prst="orthographicFront"/>
+      <a:lightRig rig="threePt" dir="t"/>
+    </dgm:scene3d>
+    <dgm:sp3d/>
+    <dgm:txPr/>
+    <dgm:style>
+      <a:lnRef idx="1">
+        <a:scrgbClr r="0" g="0" b="0"/>
+      </a:lnRef>
+      <a:fillRef idx="1">
+        <a:scrgbClr r="0" g="0" b="0"/>
+      </a:fillRef>
+      <a:effectRef idx="0">
+        <a:scrgbClr r="0" g="0" b="0"/>
+      </a:effectRef>
+      <a:fontRef idx="minor"/>
+    </dgm:style>
+  </dgm:styleLbl>
+  <dgm:styleLbl name="solidAlignAcc1">
+    <dgm:scene3d>
+      <a:camera prst="orthographicFront"/>
+      <a:lightRig rig="threePt" dir="t"/>
+    </dgm:scene3d>
+    <dgm:sp3d/>
+    <dgm:txPr/>
+    <dgm:style>
+      <a:lnRef idx="1">
+        <a:scrgbClr r="0" g="0" b="0"/>
+      </a:lnRef>
+      <a:fillRef idx="1">
+        <a:scrgbClr r="0" g="0" b="0"/>
+      </a:fillRef>
+      <a:effectRef idx="0">
+        <a:scrgbClr r="0" g="0" b="0"/>
+      </a:effectRef>
+      <a:fontRef idx="minor"/>
+    </dgm:style>
+  </dgm:styleLbl>
+  <dgm:styleLbl name="solidBgAcc1">
+    <dgm:scene3d>
+      <a:camera prst="orthographicFront"/>
+      <a:lightRig rig="threePt" dir="t"/>
+    </dgm:scene3d>
+    <dgm:sp3d/>
+    <dgm:txPr/>
+    <dgm:style>
+      <a:lnRef idx="1">
+        <a:scrgbClr r="0" g="0" b="0"/>
+      </a:lnRef>
+      <a:fillRef idx="1">
+        <a:scrgbClr r="0" g="0" b="0"/>
+      </a:fillRef>
+      <a:effectRef idx="0">
+        <a:scrgbClr r="0" g="0" b="0"/>
+      </a:effectRef>
+      <a:fontRef idx="minor"/>
+    </dgm:style>
+  </dgm:styleLbl>
+  <dgm:styleLbl name="fgAccFollowNode1">
+    <dgm:scene3d>
+      <a:camera prst="orthographicFront"/>
+      <a:lightRig rig="threePt" dir="t"/>
+    </dgm:scene3d>
+    <dgm:sp3d/>
+    <dgm:txPr/>
+    <dgm:style>
+      <a:lnRef idx="1">
+        <a:scrgbClr r="0" g="0" b="0"/>
+      </a:lnRef>
+      <a:fillRef idx="1">
+        <a:scrgbClr r="0" g="0" b="0"/>
+      </a:fillRef>
+      <a:effectRef idx="0">
+        <a:scrgbClr r="0" g="0" b="0"/>
+      </a:effectRef>
+      <a:fontRef idx="minor"/>
+    </dgm:style>
+  </dgm:styleLbl>
+  <dgm:styleLbl name="alignAccFollowNode1">
+    <dgm:scene3d>
+      <a:camera prst="orthographicFront"/>
+      <a:lightRig rig="threePt" dir="t"/>
+    </dgm:scene3d>
+    <dgm:sp3d/>
+    <dgm:txPr/>
+    <dgm:style>
+      <a:lnRef idx="1">
+        <a:scrgbClr r="0" g="0" b="0"/>
+      </a:lnRef>
+      <a:fillRef idx="1">
+        <a:scrgbClr r="0" g="0" b="0"/>
+      </a:fillRef>
+      <a:effectRef idx="0">
+        <a:scrgbClr r="0" g="0" b="0"/>
+      </a:effectRef>
+      <a:fontRef idx="minor"/>
+    </dgm:style>
+  </dgm:styleLbl>
+  <dgm:styleLbl name="bgAccFollowNode1">
+    <dgm:scene3d>
+      <a:camera prst="orthographicFront"/>
+      <a:lightRig rig="threePt" dir="t"/>
+    </dgm:scene3d>
+    <dgm:sp3d/>
+    <dgm:txPr/>
+    <dgm:style>
+      <a:lnRef idx="1">
+        <a:scrgbClr r="0" g="0" b="0"/>
+      </a:lnRef>
+      <a:fillRef idx="1">
+        <a:scrgbClr r="0" g="0" b="0"/>
+      </a:fillRef>
+      <a:effectRef idx="0">
+        <a:scrgbClr r="0" g="0" b="0"/>
+      </a:effectRef>
+      <a:fontRef idx="minor"/>
+    </dgm:style>
+  </dgm:styleLbl>
+  <dgm:styleLbl name="fgAcc0">
+    <dgm:scene3d>
+      <a:camera prst="orthographicFront"/>
+      <a:lightRig rig="threePt" dir="t"/>
+    </dgm:scene3d>
+    <dgm:sp3d/>
+    <dgm:txPr/>
+    <dgm:style>
+      <a:lnRef idx="1">
+        <a:scrgbClr r="0" g="0" b="0"/>
+      </a:lnRef>
+      <a:fillRef idx="1">
+        <a:scrgbClr r="0" g="0" b="0"/>
+      </a:fillRef>
+      <a:effectRef idx="0">
+        <a:scrgbClr r="0" g="0" b="0"/>
+      </a:effectRef>
+      <a:fontRef idx="minor"/>
+    </dgm:style>
+  </dgm:styleLbl>
+  <dgm:styleLbl name="fgAcc2">
+    <dgm:scene3d>
+      <a:camera prst="orthographicFront"/>
+      <a:lightRig rig="threePt" dir="t"/>
+    </dgm:scene3d>
+    <dgm:sp3d/>
+    <dgm:txPr/>
+    <dgm:style>
+      <a:lnRef idx="1">
+        <a:scrgbClr r="0" g="0" b="0"/>
+      </a:lnRef>
+      <a:fillRef idx="1">
+        <a:scrgbClr r="0" g="0" b="0"/>
+      </a:fillRef>
+      <a:effectRef idx="0">
+        <a:scrgbClr r="0" g="0" b="0"/>
+      </a:effectRef>
+      <a:fontRef idx="minor"/>
+    </dgm:style>
+  </dgm:styleLbl>
+  <dgm:styleLbl name="fgAcc3">
+    <dgm:scene3d>
+      <a:camera prst="orthographicFront"/>
+      <a:lightRig rig="threePt" dir="t"/>
+    </dgm:scene3d>
+    <dgm:sp3d/>
+    <dgm:txPr/>
+    <dgm:style>
+      <a:lnRef idx="1">
+        <a:scrgbClr r="0" g="0" b="0"/>
+      </a:lnRef>
+      <a:fillRef idx="1">
+        <a:scrgbClr r="0" g="0" b="0"/>
+      </a:fillRef>
+      <a:effectRef idx="0">
+        <a:scrgbClr r="0" g="0" b="0"/>
+      </a:effectRef>
+      <a:fontRef idx="minor"/>
+    </dgm:style>
+  </dgm:styleLbl>
+  <dgm:styleLbl name="fgAcc4">
+    <dgm:scene3d>
+      <a:camera prst="orthographicFront"/>
+      <a:lightRig rig="threePt" dir="t"/>
+    </dgm:scene3d>
+    <dgm:sp3d/>
+    <dgm:txPr/>
+    <dgm:style>
+      <a:lnRef idx="1">
+        <a:scrgbClr r="0" g="0" b="0"/>
+      </a:lnRef>
+      <a:fillRef idx="1">
+        <a:scrgbClr r="0" g="0" b="0"/>
+      </a:fillRef>
+      <a:effectRef idx="0">
+        <a:scrgbClr r="0" g="0" b="0"/>
+      </a:effectRef>
+      <a:fontRef idx="minor"/>
+    </dgm:style>
+  </dgm:styleLbl>
+  <dgm:styleLbl name="bgShp">
+    <dgm:scene3d>
+      <a:camera prst="orthographicFront"/>
+      <a:lightRig rig="threePt" dir="t"/>
+    </dgm:scene3d>
+    <dgm:sp3d/>
+    <dgm:txPr/>
+    <dgm:style>
+      <a:lnRef idx="0">
+        <a:scrgbClr r="0" g="0" b="0"/>
+      </a:lnRef>
+      <a:fillRef idx="1">
+        <a:scrgbClr r="0" g="0" b="0"/>
+      </a:fillRef>
+      <a:effectRef idx="2">
+        <a:scrgbClr r="0" g="0" b="0"/>
+      </a:effectRef>
+      <a:fontRef idx="minor"/>
+    </dgm:style>
+  </dgm:styleLbl>
+  <dgm:styleLbl name="dkBgShp">
+    <dgm:scene3d>
+      <a:camera prst="orthographicFront"/>
+      <a:lightRig rig="threePt" dir="t"/>
+    </dgm:scene3d>
+    <dgm:sp3d/>
+    <dgm:txPr/>
+    <dgm:style>
+      <a:lnRef idx="0">
+        <a:scrgbClr r="0" g="0" b="0"/>
+      </a:lnRef>
+      <a:fillRef idx="1">
+        <a:scrgbClr r="0" g="0" b="0"/>
+      </a:fillRef>
+      <a:effectRef idx="2">
+        <a:scrgbClr r="0" g="0" b="0"/>
+      </a:effectRef>
+      <a:fontRef idx="minor"/>
+    </dgm:style>
+  </dgm:styleLbl>
+  <dgm:styleLbl name="trBgShp">
+    <dgm:scene3d>
+      <a:camera prst="orthographicFront"/>
+      <a:lightRig rig="threePt" dir="t"/>
+    </dgm:scene3d>
+    <dgm:sp3d/>
+    <dgm:txPr/>
+    <dgm:style>
+      <a:lnRef idx="0">
+        <a:scrgbClr r="0" g="0" b="0"/>
+      </a:lnRef>
+      <a:fillRef idx="1">
+        <a:scrgbClr r="0" g="0" b="0"/>
+      </a:fillRef>
+      <a:effectRef idx="0">
+        <a:scrgbClr r="0" g="0" b="0"/>
+      </a:effectRef>
+      <a:fontRef idx="minor"/>
+    </dgm:style>
+  </dgm:styleLbl>
+  <dgm:styleLbl name="fgShp">
+    <dgm:scene3d>
+      <a:camera prst="orthographicFront"/>
+      <a:lightRig rig="threePt" dir="t"/>
+    </dgm:scene3d>
+    <dgm:sp3d/>
+    <dgm:txPr/>
+    <dgm:style>
+      <a:lnRef idx="0">
+        <a:scrgbClr r="0" g="0" b="0"/>
+      </a:lnRef>
+      <a:fillRef idx="3">
+        <a:scrgbClr r="0" g="0" b="0"/>
+      </a:fillRef>
+      <a:effectRef idx="2">
+        <a:scrgbClr r="0" g="0" b="0"/>
+      </a:effectRef>
+      <a:fontRef idx="minor"/>
+    </dgm:style>
+  </dgm:styleLbl>
+  <dgm:styleLbl name="revTx">
+    <dgm:scene3d>
+      <a:camera prst="orthographicFront"/>
+      <a:lightRig rig="threePt" dir="t"/>
+    </dgm:scene3d>
+    <dgm:sp3d/>
+    <dgm:txPr/>
+    <dgm:style>
+      <a:lnRef idx="0">
+        <a:scrgbClr r="0" g="0" b="0"/>
+      </a:lnRef>
+      <a:fillRef idx="0">
+        <a:scrgbClr r="0" g="0" b="0"/>
+      </a:fillRef>
+      <a:effectRef idx="0">
+        <a:scrgbClr r="0" g="0" b="0"/>
+      </a:effectRef>
+      <a:fontRef idx="minor"/>
+    </dgm:style>
+  </dgm:styleLbl>
+</dgm:styleDef>
+</file>
+
+<file path=ppt/diagrams/quickStyle9.xml><?xml version="1.0" encoding="utf-8"?>
 <dgm:styleDef xmlns:dgm="http://schemas.openxmlformats.org/drawingml/2006/diagram" xmlns:a="http://schemas.openxmlformats.org/drawingml/2006/main" uniqueId="urn:microsoft.com/office/officeart/2005/8/quickstyle/simple4">
   <dgm:title val=""/>
   <dgm:desc val=""/>
@@ -23579,7 +27616,7 @@
             <a:fld id="{AB1CDEB6-C0D8-439D-94AA-7569540F08E4}" type="datetimeFigureOut">
               <a:rPr lang="en-US" smtClean="0"/>
               <a:pPr/>
-              <a:t>6/19/16</a:t>
+              <a:t>7/15/16</a:t>
             </a:fld>
             <a:endParaRPr lang="en-US"/>
           </a:p>
@@ -23937,7 +27974,7 @@
             <a:fld id="{81331B57-0BE5-4F82-AA58-76F53EFF3ADA}" type="datetime8">
               <a:rPr lang="en-US" smtClean="0"/>
               <a:pPr/>
-              <a:t>6/19/16 1:58 AM</a:t>
+              <a:t>7/15/16 2:01 PM</a:t>
             </a:fld>
             <a:endParaRPr lang="en-US" dirty="0"/>
           </a:p>
@@ -24131,7 +28168,7 @@
             <a:fld id="{81331B57-0BE5-4F82-AA58-76F53EFF3ADA}" type="datetime8">
               <a:rPr lang="en-US" smtClean="0"/>
               <a:pPr/>
-              <a:t>6/19/16 1:58 AM</a:t>
+              <a:t>7/15/16 2:02 PM</a:t>
             </a:fld>
             <a:endParaRPr lang="en-US"/>
           </a:p>
@@ -24315,7 +28352,7 @@
             <a:fld id="{81331B57-0BE5-4F82-AA58-76F53EFF3ADA}" type="datetime8">
               <a:rPr lang="en-US" smtClean="0"/>
               <a:pPr/>
-              <a:t>6/19/16 1:58 AM</a:t>
+              <a:t>7/15/16 2:01 PM</a:t>
             </a:fld>
             <a:endParaRPr lang="en-US"/>
           </a:p>
@@ -24499,7 +28536,7 @@
             <a:fld id="{81331B57-0BE5-4F82-AA58-76F53EFF3ADA}" type="datetime8">
               <a:rPr lang="en-US" smtClean="0"/>
               <a:pPr/>
-              <a:t>6/19/16 1:58 AM</a:t>
+              <a:t>7/15/16 2:01 PM</a:t>
             </a:fld>
             <a:endParaRPr lang="en-US"/>
           </a:p>
@@ -24683,7 +28720,7 @@
             <a:fld id="{81331B57-0BE5-4F82-AA58-76F53EFF3ADA}" type="datetime8">
               <a:rPr lang="en-US" smtClean="0"/>
               <a:pPr/>
-              <a:t>6/19/16 1:58 AM</a:t>
+              <a:t>7/15/16 2:02 PM</a:t>
             </a:fld>
             <a:endParaRPr lang="en-US"/>
           </a:p>
@@ -24867,7 +28904,7 @@
             <a:fld id="{81331B57-0BE5-4F82-AA58-76F53EFF3ADA}" type="datetime8">
               <a:rPr lang="en-US" smtClean="0"/>
               <a:pPr/>
-              <a:t>6/19/16 1:58 AM</a:t>
+              <a:t>7/15/16 2:02 PM</a:t>
             </a:fld>
             <a:endParaRPr lang="en-US"/>
           </a:p>
@@ -25051,7 +29088,7 @@
             <a:fld id="{81331B57-0BE5-4F82-AA58-76F53EFF3ADA}" type="datetime8">
               <a:rPr lang="en-US" smtClean="0"/>
               <a:pPr/>
-              <a:t>6/19/16 1:58 AM</a:t>
+              <a:t>7/15/16 2:02 PM</a:t>
             </a:fld>
             <a:endParaRPr lang="en-US"/>
           </a:p>
@@ -25235,7 +29272,7 @@
             <a:fld id="{81331B57-0BE5-4F82-AA58-76F53EFF3ADA}" type="datetime8">
               <a:rPr lang="en-US" smtClean="0"/>
               <a:pPr/>
-              <a:t>6/19/16 1:58 AM</a:t>
+              <a:t>7/15/16 2:02 PM</a:t>
             </a:fld>
             <a:endParaRPr lang="en-US"/>
           </a:p>
@@ -25419,7 +29456,7 @@
             <a:fld id="{81331B57-0BE5-4F82-AA58-76F53EFF3ADA}" type="datetime8">
               <a:rPr lang="en-US" smtClean="0"/>
               <a:pPr/>
-              <a:t>6/19/16 1:58 AM</a:t>
+              <a:t>7/15/16 2:02 PM</a:t>
             </a:fld>
             <a:endParaRPr lang="en-US"/>
           </a:p>
@@ -29112,7 +33149,7 @@
         <p:spPr>
           <a:xfrm>
             <a:off x="381000" y="990600"/>
-            <a:ext cx="8382000" cy="2209800"/>
+            <a:ext cx="8382000" cy="1981200"/>
           </a:xfrm>
         </p:spPr>
         <p:txBody>
@@ -29130,7 +33167,19 @@
             <a:pPr lvl="1"/>
             <a:r>
               <a:rPr lang="en-US" dirty="0" smtClean="0"/>
-              <a:t>Agent’s preferences are just not to be too small a minority, not for fully segregated neighborhoods</a:t>
+              <a:t>Agent’s preferences are just not to be too </a:t>
+            </a:r>
+            <a:r>
+              <a:rPr lang="en-US" dirty="0" smtClean="0"/>
+              <a:t>much of</a:t>
+            </a:r>
+            <a:r>
+              <a:rPr lang="en-US" dirty="0" smtClean="0"/>
+              <a:t> </a:t>
+            </a:r>
+            <a:r>
+              <a:rPr lang="en-US" dirty="0" smtClean="0"/>
+              <a:t>a minority, not for fully segregated neighborhoods</a:t>
             </a:r>
           </a:p>
           <a:p>
@@ -30117,8 +34166,8 @@
               <a:t>The Forest Fire model turns out to be best represented as a </a:t>
             </a:r>
             <a:r>
-              <a:rPr lang="en-US" dirty="0" err="1" smtClean="0"/>
-              <a:t>monoid</a:t>
+              <a:rPr lang="en-US" dirty="0" smtClean="0"/>
+              <a:t>group</a:t>
             </a:r>
             <a:r>
               <a:rPr lang="en-US" dirty="0" smtClean="0"/>
@@ -30240,6 +34289,17 @@
           <a:p>
             <a:pPr algn="ctr"/>
             <a:r>
+              <a:rPr lang="en-US" sz="2800" dirty="0">
+                <a:solidFill>
+                  <a:schemeClr val="accent6">
+                    <a:lumMod val="40000"/>
+                    <a:lumOff val="60000"/>
+                  </a:schemeClr>
+                </a:solidFill>
+              </a:rPr>
+              <a:t>T</a:t>
+            </a:r>
+            <a:r>
               <a:rPr lang="en-US" sz="2800" dirty="0" smtClean="0">
                 <a:solidFill>
                   <a:schemeClr val="accent6">
@@ -30248,7 +34308,51 @@
                   </a:schemeClr>
                 </a:solidFill>
               </a:rPr>
-              <a:t>We can now see how the second is a subclass of the first with additional axioms.</a:t>
+              <a:t>he </a:t>
+            </a:r>
+            <a:r>
+              <a:rPr lang="en-US" sz="2800" dirty="0" smtClean="0">
+                <a:solidFill>
+                  <a:schemeClr val="accent6">
+                    <a:lumMod val="40000"/>
+                    <a:lumOff val="60000"/>
+                  </a:schemeClr>
+                </a:solidFill>
+              </a:rPr>
+              <a:t>second </a:t>
+            </a:r>
+            <a:r>
+              <a:rPr lang="en-US" sz="2800" dirty="0" smtClean="0">
+                <a:solidFill>
+                  <a:schemeClr val="accent6">
+                    <a:lumMod val="40000"/>
+                    <a:lumOff val="60000"/>
+                  </a:schemeClr>
+                </a:solidFill>
+              </a:rPr>
+              <a:t>structure is </a:t>
+            </a:r>
+            <a:r>
+              <a:rPr lang="en-US" sz="2800" dirty="0" smtClean="0">
+                <a:solidFill>
+                  <a:schemeClr val="accent6">
+                    <a:lumMod val="40000"/>
+                    <a:lumOff val="60000"/>
+                  </a:schemeClr>
+                </a:solidFill>
+              </a:rPr>
+              <a:t>a subclass of the first with additional </a:t>
+            </a:r>
+            <a:r>
+              <a:rPr lang="en-US" sz="2800" dirty="0" smtClean="0">
+                <a:solidFill>
+                  <a:schemeClr val="accent6">
+                    <a:lumMod val="40000"/>
+                    <a:lumOff val="60000"/>
+                  </a:schemeClr>
+                </a:solidFill>
+              </a:rPr>
+              <a:t>axioms required to be true.</a:t>
             </a:r>
             <a:endParaRPr lang="en-US" sz="2800" dirty="0">
               <a:solidFill>
@@ -30517,15 +34621,11 @@
           <a:p>
             <a:r>
               <a:rPr lang="en-US" dirty="0" smtClean="0"/>
-              <a:t>Even before implementing this as a </a:t>
-            </a:r>
-            <a:r>
-              <a:rPr lang="en-US" dirty="0" err="1" smtClean="0"/>
-              <a:t>monoid</a:t>
+              <a:t>Even before implementing </a:t>
             </a:r>
             <a:r>
               <a:rPr lang="en-US" dirty="0" smtClean="0"/>
-              <a:t>, </a:t>
+              <a:t>this, </a:t>
             </a:r>
             <a:r>
               <a:rPr lang="en-US" dirty="0" smtClean="0"/>
@@ -32367,6 +36467,117 @@
           <a:p>
             <a:r>
               <a:rPr lang="en-US" dirty="0" smtClean="0"/>
+              <a:t>Actual Achievements</a:t>
+            </a:r>
+            <a:endParaRPr lang="en-US" dirty="0"/>
+          </a:p>
+        </p:txBody>
+      </p:sp>
+      <p:sp>
+        <p:nvSpPr>
+          <p:cNvPr id="3" name="Text Placeholder 2"/>
+          <p:cNvSpPr>
+            <a:spLocks noGrp="1"/>
+          </p:cNvSpPr>
+          <p:nvPr>
+            <p:ph type="body" sz="quarter" idx="10"/>
+          </p:nvPr>
+        </p:nvSpPr>
+        <p:spPr>
+          <a:xfrm>
+            <a:off x="371475" y="1447800"/>
+            <a:ext cx="8382000" cy="443198"/>
+          </a:xfrm>
+        </p:spPr>
+        <p:txBody>
+          <a:bodyPr/>
+          <a:lstStyle/>
+          <a:p>
+            <a:r>
+              <a:rPr lang="en-US" dirty="0" smtClean="0"/>
+              <a:t>Implemented so far:</a:t>
+            </a:r>
+            <a:endParaRPr lang="en-US" dirty="0"/>
+          </a:p>
+        </p:txBody>
+      </p:sp>
+      <p:graphicFrame>
+        <p:nvGraphicFramePr>
+          <p:cNvPr id="4" name="Diagram 3"/>
+          <p:cNvGraphicFramePr/>
+          <p:nvPr>
+            <p:extLst>
+              <p:ext uri="{D42A27DB-BD31-4B8C-83A1-F6EECF244321}">
+                <p14:modId xmlns:p14="http://schemas.microsoft.com/office/powerpoint/2010/main" val="297980700"/>
+              </p:ext>
+            </p:extLst>
+          </p:nvPr>
+        </p:nvGraphicFramePr>
+        <p:xfrm>
+          <a:off x="1524000" y="2108200"/>
+          <a:ext cx="6096000" cy="4064000"/>
+        </p:xfrm>
+        <a:graphic>
+          <a:graphicData uri="http://schemas.openxmlformats.org/drawingml/2006/diagram">
+            <dgm:relIds xmlns:dgm="http://schemas.openxmlformats.org/drawingml/2006/diagram" xmlns:r="http://schemas.openxmlformats.org/officeDocument/2006/relationships" r:dm="rId2" r:lo="rId3" r:qs="rId4" r:cs="rId5"/>
+          </a:graphicData>
+        </a:graphic>
+      </p:graphicFrame>
+    </p:spTree>
+    <p:extLst>
+      <p:ext uri="{BB962C8B-B14F-4D97-AF65-F5344CB8AC3E}">
+        <p14:creationId xmlns:p14="http://schemas.microsoft.com/office/powerpoint/2010/main" val="361548523"/>
+      </p:ext>
+    </p:extLst>
+  </p:cSld>
+  <p:clrMapOvr>
+    <a:masterClrMapping/>
+  </p:clrMapOvr>
+  <p:transition>
+    <p:fade/>
+  </p:transition>
+</p:sld>
+</file>
+
+<file path=ppt/slides/slide29.xml><?xml version="1.0" encoding="utf-8"?>
+<p:sld xmlns:a="http://schemas.openxmlformats.org/drawingml/2006/main" xmlns:r="http://schemas.openxmlformats.org/officeDocument/2006/relationships" xmlns:p="http://schemas.openxmlformats.org/presentationml/2006/main">
+  <p:cSld>
+    <p:spTree>
+      <p:nvGrpSpPr>
+        <p:cNvPr id="1" name=""/>
+        <p:cNvGrpSpPr/>
+        <p:nvPr/>
+      </p:nvGrpSpPr>
+      <p:grpSpPr>
+        <a:xfrm>
+          <a:off x="0" y="0"/>
+          <a:ext cx="0" cy="0"/>
+          <a:chOff x="0" y="0"/>
+          <a:chExt cx="0" cy="0"/>
+        </a:xfrm>
+      </p:grpSpPr>
+      <p:sp>
+        <p:nvSpPr>
+          <p:cNvPr id="2" name="Title 1"/>
+          <p:cNvSpPr>
+            <a:spLocks noGrp="1"/>
+          </p:cNvSpPr>
+          <p:nvPr>
+            <p:ph type="title"/>
+          </p:nvPr>
+        </p:nvSpPr>
+        <p:spPr>
+          <a:xfrm>
+            <a:off x="381000" y="230188"/>
+            <a:ext cx="8382000" cy="664797"/>
+          </a:xfrm>
+        </p:spPr>
+        <p:txBody>
+          <a:bodyPr/>
+          <a:lstStyle/>
+          <a:p>
+            <a:r>
+              <a:rPr lang="en-US" dirty="0" smtClean="0"/>
               <a:t>What’s the Point?</a:t>
             </a:r>
             <a:endParaRPr lang="en-US" dirty="0"/>
@@ -32444,140 +36655,6 @@
     <p:extLst>
       <p:ext uri="{BB962C8B-B14F-4D97-AF65-F5344CB8AC3E}">
         <p14:creationId xmlns:p14="http://schemas.microsoft.com/office/powerpoint/2010/main" val="1217424829"/>
-      </p:ext>
-    </p:extLst>
-  </p:cSld>
-  <p:clrMapOvr>
-    <a:masterClrMapping/>
-  </p:clrMapOvr>
-  <p:transition>
-    <p:fade/>
-  </p:transition>
-  <p:timing>
-    <p:tnLst>
-      <p:par>
-        <p:cTn id="1" dur="indefinite" restart="never" nodeType="tmRoot"/>
-      </p:par>
-    </p:tnLst>
-  </p:timing>
-</p:sld>
-</file>
-
-<file path=ppt/slides/slide29.xml><?xml version="1.0" encoding="utf-8"?>
-<p:sld xmlns:a="http://schemas.openxmlformats.org/drawingml/2006/main" xmlns:r="http://schemas.openxmlformats.org/officeDocument/2006/relationships" xmlns:p="http://schemas.openxmlformats.org/presentationml/2006/main">
-  <p:cSld>
-    <p:spTree>
-      <p:nvGrpSpPr>
-        <p:cNvPr id="1" name=""/>
-        <p:cNvGrpSpPr/>
-        <p:nvPr/>
-      </p:nvGrpSpPr>
-      <p:grpSpPr>
-        <a:xfrm>
-          <a:off x="0" y="0"/>
-          <a:ext cx="0" cy="0"/>
-          <a:chOff x="0" y="0"/>
-          <a:chExt cx="0" cy="0"/>
-        </a:xfrm>
-      </p:grpSpPr>
-      <p:sp>
-        <p:nvSpPr>
-          <p:cNvPr id="2" name="Title 1"/>
-          <p:cNvSpPr>
-            <a:spLocks noGrp="1"/>
-          </p:cNvSpPr>
-          <p:nvPr>
-            <p:ph type="title"/>
-          </p:nvPr>
-        </p:nvSpPr>
-        <p:spPr>
-          <a:xfrm>
-            <a:off x="381000" y="230188"/>
-            <a:ext cx="8382000" cy="664797"/>
-          </a:xfrm>
-        </p:spPr>
-        <p:txBody>
-          <a:bodyPr/>
-          <a:lstStyle/>
-          <a:p>
-            <a:r>
-              <a:rPr lang="en-US" dirty="0"/>
-              <a:t>What’s the Point?</a:t>
-            </a:r>
-          </a:p>
-        </p:txBody>
-      </p:sp>
-      <p:sp>
-        <p:nvSpPr>
-          <p:cNvPr id="3" name="Content Placeholder 2"/>
-          <p:cNvSpPr>
-            <a:spLocks noGrp="1"/>
-          </p:cNvSpPr>
-          <p:nvPr>
-            <p:ph sz="half" idx="1"/>
-          </p:nvPr>
-        </p:nvSpPr>
-        <p:spPr>
-          <a:xfrm>
-            <a:off x="381000" y="2399228"/>
-            <a:ext cx="3810000" cy="2745343"/>
-          </a:xfrm>
-        </p:spPr>
-        <p:txBody>
-          <a:bodyPr/>
-          <a:lstStyle/>
-          <a:p>
-            <a:pPr marL="339976" lvl="2" indent="-339976">
-              <a:buBlip>
-                <a:blip r:embed="rId2"/>
-              </a:buBlip>
-            </a:pPr>
-            <a:r>
-              <a:rPr lang="en-US" sz="3200" b="1" dirty="0"/>
-              <a:t>We will have taken a huge step towards enabling “fill-in-the-template” style programming of ABMs.</a:t>
-            </a:r>
-          </a:p>
-          <a:p>
-            <a:pPr marL="0" indent="0">
-              <a:buNone/>
-            </a:pPr>
-            <a:endParaRPr lang="en-US" dirty="0"/>
-          </a:p>
-        </p:txBody>
-      </p:sp>
-      <p:pic>
-        <p:nvPicPr>
-          <p:cNvPr id="5" name="Content Placeholder 4"/>
-          <p:cNvPicPr>
-            <a:picLocks noGrp="1" noChangeAspect="1"/>
-          </p:cNvPicPr>
-          <p:nvPr>
-            <p:ph sz="half" idx="2"/>
-          </p:nvPr>
-        </p:nvPicPr>
-        <p:blipFill>
-          <a:blip r:embed="rId3">
-            <a:extLst>
-              <a:ext uri="{28A0092B-C50C-407E-A947-70E740481C1C}">
-                <a14:useLocalDpi xmlns:a14="http://schemas.microsoft.com/office/drawing/2010/main" val="0"/>
-              </a:ext>
-            </a:extLst>
-          </a:blip>
-          <a:stretch>
-            <a:fillRect/>
-          </a:stretch>
-        </p:blipFill>
-        <p:spPr>
-          <a:xfrm>
-            <a:off x="4800600" y="2399228"/>
-            <a:ext cx="3962400" cy="2745343"/>
-          </a:xfrm>
-        </p:spPr>
-      </p:pic>
-    </p:spTree>
-    <p:extLst>
-      <p:ext uri="{BB962C8B-B14F-4D97-AF65-F5344CB8AC3E}">
-        <p14:creationId xmlns:p14="http://schemas.microsoft.com/office/powerpoint/2010/main" val="2110678333"/>
       </p:ext>
     </p:extLst>
   </p:cSld>
@@ -32892,8 +36969,8 @@
         </p:nvSpPr>
         <p:spPr>
           <a:xfrm>
-            <a:off x="381000" y="1981200"/>
-            <a:ext cx="3886200" cy="3276600"/>
+            <a:off x="381000" y="2399228"/>
+            <a:ext cx="3810000" cy="2745343"/>
           </a:xfrm>
         </p:spPr>
         <p:txBody>
@@ -32907,31 +36984,20 @@
             </a:pPr>
             <a:r>
               <a:rPr lang="en-US" sz="3200" b="1" dirty="0"/>
-              <a:t>We open up the possibility of using known properties </a:t>
-            </a:r>
-            <a:r>
-              <a:rPr lang="en-US" sz="3200" b="1"/>
-              <a:t>of </a:t>
-            </a:r>
-            <a:r>
-              <a:rPr lang="en-US" sz="3200" b="1" smtClean="0"/>
-              <a:t>algebraic structures </a:t>
-            </a:r>
-            <a:r>
-              <a:rPr lang="en-US" sz="3200" b="1" dirty="0"/>
-              <a:t>to identify properties of our ABM</a:t>
-            </a:r>
-            <a:r>
-              <a:rPr lang="en-US" sz="3200" b="1" dirty="0" smtClean="0"/>
-              <a:t>.</a:t>
-            </a:r>
-            <a:endParaRPr lang="en-US" sz="3200" b="1" dirty="0"/>
+              <a:t>We will have taken a huge step towards enabling “fill-in-the-template” style programming of ABMs.</a:t>
+            </a:r>
+          </a:p>
+          <a:p>
+            <a:pPr marL="0" indent="0">
+              <a:buNone/>
+            </a:pPr>
+            <a:endParaRPr lang="en-US" dirty="0"/>
           </a:p>
         </p:txBody>
       </p:sp>
       <p:pic>
         <p:nvPicPr>
-          <p:cNvPr id="7" name="Content Placeholder 6"/>
+          <p:cNvPr id="5" name="Content Placeholder 4"/>
           <p:cNvPicPr>
             <a:picLocks noGrp="1" noChangeAspect="1"/>
           </p:cNvPicPr>
@@ -32953,15 +37019,15 @@
         </p:blipFill>
         <p:spPr>
           <a:xfrm>
-            <a:off x="4641410" y="1958566"/>
-            <a:ext cx="4114800" cy="2987977"/>
+            <a:off x="4800600" y="2399228"/>
+            <a:ext cx="3962400" cy="2745343"/>
           </a:xfrm>
         </p:spPr>
       </p:pic>
     </p:spTree>
     <p:extLst>
       <p:ext uri="{BB962C8B-B14F-4D97-AF65-F5344CB8AC3E}">
-        <p14:creationId xmlns:p14="http://schemas.microsoft.com/office/powerpoint/2010/main" val="1327860845"/>
+        <p14:creationId xmlns:p14="http://schemas.microsoft.com/office/powerpoint/2010/main" val="2110678333"/>
       </p:ext>
     </p:extLst>
   </p:cSld>
@@ -33019,10 +37085,9 @@
           <a:lstStyle/>
           <a:p>
             <a:r>
-              <a:rPr lang="en-US" dirty="0" smtClean="0"/>
-              <a:t>Implementation Sample</a:t>
-            </a:r>
-            <a:endParaRPr lang="en-US" dirty="0"/>
+              <a:rPr lang="en-US" dirty="0"/>
+              <a:t>What’s the Point?</a:t>
+            </a:r>
           </a:p>
         </p:txBody>
       </p:sp>
@@ -33038,59 +37103,46 @@
         </p:nvSpPr>
         <p:spPr>
           <a:xfrm>
-            <a:off x="524302" y="1143000"/>
-            <a:ext cx="8219364" cy="1249573"/>
+            <a:off x="381000" y="1981200"/>
+            <a:ext cx="3886200" cy="3276600"/>
           </a:xfrm>
         </p:spPr>
         <p:txBody>
           <a:bodyPr/>
           <a:lstStyle/>
           <a:p>
-            <a:r>
-              <a:rPr lang="en-US" dirty="0" err="1" smtClean="0"/>
-              <a:t>Prehensions</a:t>
-            </a:r>
-            <a:r>
-              <a:rPr lang="en-US" dirty="0" smtClean="0"/>
-              <a:t> are a vector space in </a:t>
-            </a:r>
-            <a:r>
-              <a:rPr lang="en-US" dirty="0" smtClean="0"/>
-              <a:t>one</a:t>
-            </a:r>
-            <a:r>
-              <a:rPr lang="en-US" dirty="0" smtClean="0"/>
-              <a:t> </a:t>
-            </a:r>
-            <a:r>
-              <a:rPr lang="en-US" dirty="0" smtClean="0"/>
-              <a:t>class.</a:t>
-            </a:r>
-          </a:p>
-          <a:p>
-            <a:r>
-              <a:rPr lang="en-US" dirty="0" smtClean="0"/>
-              <a:t>However, any other implementation in which the </a:t>
-            </a:r>
-            <a:r>
-              <a:rPr lang="en-US" dirty="0" smtClean="0"/>
-              <a:t>vector-space</a:t>
-            </a:r>
-            <a:r>
-              <a:rPr lang="en-US" dirty="0" smtClean="0"/>
-              <a:t> </a:t>
-            </a:r>
-            <a:r>
-              <a:rPr lang="en-US" dirty="0" smtClean="0"/>
-              <a:t>axioms are true can be sub-classed.</a:t>
-            </a:r>
-            <a:endParaRPr lang="en-US" dirty="0"/>
+            <a:pPr marL="339976" lvl="2" indent="-339976">
+              <a:buBlip>
+                <a:blip r:embed="rId2"/>
+              </a:buBlip>
+            </a:pPr>
+            <a:r>
+              <a:rPr lang="en-US" sz="3200" b="1" dirty="0"/>
+              <a:t>We open up the possibility of using known properties </a:t>
+            </a:r>
+            <a:r>
+              <a:rPr lang="en-US" sz="3200" b="1"/>
+              <a:t>of </a:t>
+            </a:r>
+            <a:r>
+              <a:rPr lang="en-US" sz="3200" b="1" smtClean="0"/>
+              <a:t>algebraic structures </a:t>
+            </a:r>
+            <a:r>
+              <a:rPr lang="en-US" sz="3200" b="1" dirty="0"/>
+              <a:t>to identify properties of our ABM</a:t>
+            </a:r>
+            <a:r>
+              <a:rPr lang="en-US" sz="3200" b="1" dirty="0" smtClean="0"/>
+              <a:t>.</a:t>
+            </a:r>
+            <a:endParaRPr lang="en-US" sz="3200" b="1" dirty="0"/>
           </a:p>
         </p:txBody>
       </p:sp>
       <p:pic>
         <p:nvPicPr>
-          <p:cNvPr id="5" name="Content Placeholder 4"/>
+          <p:cNvPr id="7" name="Content Placeholder 6"/>
           <p:cNvPicPr>
             <a:picLocks noGrp="1" noChangeAspect="1"/>
           </p:cNvPicPr>
@@ -33099,7 +37151,7 @@
           </p:nvPr>
         </p:nvPicPr>
         <p:blipFill>
-          <a:blip r:embed="rId2">
+          <a:blip r:embed="rId3">
             <a:extLst>
               <a:ext uri="{28A0092B-C50C-407E-A947-70E740481C1C}">
                 <a14:useLocalDpi xmlns:a14="http://schemas.microsoft.com/office/drawing/2010/main" val="0"/>
@@ -33112,15 +37164,15 @@
         </p:blipFill>
         <p:spPr>
           <a:xfrm>
-            <a:off x="992207" y="3276600"/>
-            <a:ext cx="7159586" cy="3116263"/>
+            <a:off x="4641410" y="1958566"/>
+            <a:ext cx="4114800" cy="2987977"/>
           </a:xfrm>
         </p:spPr>
       </p:pic>
     </p:spTree>
     <p:extLst>
       <p:ext uri="{BB962C8B-B14F-4D97-AF65-F5344CB8AC3E}">
-        <p14:creationId xmlns:p14="http://schemas.microsoft.com/office/powerpoint/2010/main" val="1408983316"/>
+        <p14:creationId xmlns:p14="http://schemas.microsoft.com/office/powerpoint/2010/main" val="1327860845"/>
       </p:ext>
     </p:extLst>
   </p:cSld>
@@ -34318,8 +38370,21 @@
           <a:p>
             <a:r>
               <a:rPr lang="en-US" dirty="0" smtClean="0"/>
-              <a:t>For Python, not much!</a:t>
-            </a:r>
+              <a:t>For Python, not </a:t>
+            </a:r>
+            <a:r>
+              <a:rPr lang="en-US" dirty="0" smtClean="0"/>
+              <a:t>much, because of </a:t>
+            </a:r>
+            <a:r>
+              <a:rPr lang="en-US" i="1" dirty="0" smtClean="0"/>
+              <a:t>duck typing</a:t>
+            </a:r>
+            <a:r>
+              <a:rPr lang="en-US" dirty="0" smtClean="0"/>
+              <a:t>.</a:t>
+            </a:r>
+            <a:endParaRPr lang="en-US" dirty="0" smtClean="0"/>
           </a:p>
           <a:p>
             <a:pPr lvl="1"/>
@@ -34461,13 +38526,13 @@
   <p:clrMapOvr>
     <a:masterClrMapping/>
   </p:clrMapOvr>
-  <mc:AlternateContent xmlns:mc="http://schemas.openxmlformats.org/markup-compatibility/2006">
-    <mc:Choice xmlns:p14="http://schemas.microsoft.com/office/powerpoint/2010/main" Requires="p14">
+  <mc:AlternateContent xmlns:mc="http://schemas.openxmlformats.org/markup-compatibility/2006" xmlns:p14="http://schemas.microsoft.com/office/powerpoint/2010/main">
+    <mc:Choice Requires="p14">
       <p:transition spd="slow" p14:dur="4400">
         <p14:honeycomb/>
       </p:transition>
     </mc:Choice>
-    <mc:Fallback>
+    <mc:Fallback xmlns="">
       <p:transition spd="slow">
         <p:fade/>
       </p:transition>
@@ -34605,8 +38670,21 @@
             <a:pPr lvl="2"/>
             <a:r>
               <a:rPr lang="en-US" dirty="0" smtClean="0"/>
-              <a:t>Be commutative</a:t>
-            </a:r>
+              <a:t>Be </a:t>
+            </a:r>
+            <a:r>
+              <a:rPr lang="en-US" dirty="0" smtClean="0"/>
+              <a:t>commutative (</a:t>
+            </a:r>
+            <a:r>
+              <a:rPr lang="en-US" i="1" dirty="0" smtClean="0"/>
+              <a:t>if Abelian group!</a:t>
+            </a:r>
+            <a:r>
+              <a:rPr lang="en-US" dirty="0" smtClean="0"/>
+              <a:t>)</a:t>
+            </a:r>
+            <a:endParaRPr lang="en-US" dirty="0" smtClean="0"/>
           </a:p>
           <a:p>
             <a:pPr lvl="2"/>
@@ -35027,7 +39105,15 @@
                   <a:schemeClr val="tx2"/>
                 </a:solidFill>
               </a:rPr>
-              <a:t>Generating complex macro-behavior from simple rule</a:t>
+              <a:t>Generating complex macro-behavior from simple </a:t>
+            </a:r>
+            <a:r>
+              <a:rPr lang="en-US" sz="3600" dirty="0" smtClean="0">
+                <a:solidFill>
+                  <a:schemeClr val="tx2"/>
+                </a:solidFill>
+              </a:rPr>
+              <a:t>rules</a:t>
             </a:r>
             <a:endParaRPr lang="en-US" dirty="0">
               <a:solidFill>

</xml_diff>

<commit_message>
Further work on PyGotham presentation.
</commit_message>
<xml_diff>
--- a/docs/ABMsAsAlgebraic.pptx
+++ b/docs/ABMsAsAlgebraic.pptx
@@ -9639,6 +9639,52 @@
         </a:p>
       </dgm:t>
     </dgm:pt>
+    <dgm:pt modelId="{1AB75FD3-4C30-B24B-8DB5-5A27033277D6}">
+      <dgm:prSet/>
+      <dgm:spPr/>
+      <dgm:t>
+        <a:bodyPr/>
+        <a:lstStyle/>
+        <a:p>
+          <a:r>
+            <a:rPr lang="en-US" dirty="0" smtClean="0"/>
+            <a:t>Sand pile</a:t>
+          </a:r>
+          <a:endParaRPr lang="en-US" dirty="0"/>
+        </a:p>
+      </dgm:t>
+    </dgm:pt>
+    <dgm:pt modelId="{5B3C7606-B9F0-CE49-B274-816CB6A65616}" type="parTrans" cxnId="{56C39063-EFDD-424E-B9E0-3C23150B1633}">
+      <dgm:prSet/>
+      <dgm:spPr/>
+    </dgm:pt>
+    <dgm:pt modelId="{40584D13-979A-6749-9B12-7A169FB1A457}" type="sibTrans" cxnId="{56C39063-EFDD-424E-B9E0-3C23150B1633}">
+      <dgm:prSet/>
+      <dgm:spPr/>
+    </dgm:pt>
+    <dgm:pt modelId="{0ABB7A46-78A7-044F-B660-A6F29C6BDE74}">
+      <dgm:prSet/>
+      <dgm:spPr/>
+      <dgm:t>
+        <a:bodyPr/>
+        <a:lstStyle/>
+        <a:p>
+          <a:r>
+            <a:rPr lang="en-US" smtClean="0"/>
+            <a:t>Market exchange</a:t>
+          </a:r>
+          <a:endParaRPr lang="en-US"/>
+        </a:p>
+      </dgm:t>
+    </dgm:pt>
+    <dgm:pt modelId="{4392CD87-719E-9E4C-94D9-1C9438B92CF5}" type="parTrans" cxnId="{B5FC367F-E3B4-3D4D-9910-766AD0DC9976}">
+      <dgm:prSet/>
+      <dgm:spPr/>
+    </dgm:pt>
+    <dgm:pt modelId="{0AF22048-2F58-4240-BED2-74F59EF900EA}" type="sibTrans" cxnId="{B5FC367F-E3B4-3D4D-9910-766AD0DC9976}">
+      <dgm:prSet/>
+      <dgm:spPr/>
+    </dgm:pt>
     <dgm:pt modelId="{5B69B621-125F-8C4C-A968-60E72CEDA897}" type="pres">
       <dgm:prSet presAssocID="{2AC110E6-F772-164D-A74E-9BCCCBE8B031}" presName="hierChild1" presStyleCnt="0">
         <dgm:presLayoutVars>
@@ -9650,6 +9696,13 @@
         </dgm:presLayoutVars>
       </dgm:prSet>
       <dgm:spPr/>
+      <dgm:t>
+        <a:bodyPr/>
+        <a:lstStyle/>
+        <a:p>
+          <a:endParaRPr lang="en-US"/>
+        </a:p>
+      </dgm:t>
     </dgm:pt>
     <dgm:pt modelId="{58B3EE37-8A08-6E43-95EE-907BE55FD870}" type="pres">
       <dgm:prSet presAssocID="{50CE8BE5-FE4F-8D40-989F-58B127300842}" presName="hierRoot1" presStyleCnt="0"/>
@@ -9664,12 +9717,19 @@
       <dgm:spPr/>
     </dgm:pt>
     <dgm:pt modelId="{458E2CEA-2D4A-D048-848A-9EF3A29552BB}" type="pres">
-      <dgm:prSet presAssocID="{50CE8BE5-FE4F-8D40-989F-58B127300842}" presName="text" presStyleLbl="revTx" presStyleIdx="0" presStyleCnt="6">
+      <dgm:prSet presAssocID="{50CE8BE5-FE4F-8D40-989F-58B127300842}" presName="text" presStyleLbl="revTx" presStyleIdx="0" presStyleCnt="8">
         <dgm:presLayoutVars>
           <dgm:chPref val="3"/>
         </dgm:presLayoutVars>
       </dgm:prSet>
       <dgm:spPr/>
+      <dgm:t>
+        <a:bodyPr/>
+        <a:lstStyle/>
+        <a:p>
+          <a:endParaRPr lang="en-US"/>
+        </a:p>
+      </dgm:t>
     </dgm:pt>
     <dgm:pt modelId="{B6AEF241-F12C-FF4D-8017-6EC6691DA945}" type="pres">
       <dgm:prSet presAssocID="{50CE8BE5-FE4F-8D40-989F-58B127300842}" presName="hierChild2" presStyleCnt="0"/>
@@ -9678,6 +9738,13 @@
     <dgm:pt modelId="{C86EDF08-DE64-4A46-A556-D15AA930C60B}" type="pres">
       <dgm:prSet presAssocID="{634B3ED2-2B7E-EC44-BCDD-5D639DCE0F61}" presName="Name10" presStyleLbl="parChTrans1D2" presStyleIdx="0" presStyleCnt="2"/>
       <dgm:spPr/>
+      <dgm:t>
+        <a:bodyPr/>
+        <a:lstStyle/>
+        <a:p>
+          <a:endParaRPr lang="en-US"/>
+        </a:p>
+      </dgm:t>
     </dgm:pt>
     <dgm:pt modelId="{FDC9D4DA-7F68-9241-9D25-F143FFBB052A}" type="pres">
       <dgm:prSet presAssocID="{5947C7E3-01D6-CA4D-974E-3BBC51416DCB}" presName="hierRoot2" presStyleCnt="0"/>
@@ -9692,20 +9759,34 @@
       <dgm:spPr/>
     </dgm:pt>
     <dgm:pt modelId="{DF09DBBF-55BC-1B47-A387-2E7B09D5AB74}" type="pres">
-      <dgm:prSet presAssocID="{5947C7E3-01D6-CA4D-974E-3BBC51416DCB}" presName="text2" presStyleLbl="revTx" presStyleIdx="1" presStyleCnt="6">
+      <dgm:prSet presAssocID="{5947C7E3-01D6-CA4D-974E-3BBC51416DCB}" presName="text2" presStyleLbl="revTx" presStyleIdx="1" presStyleCnt="8">
         <dgm:presLayoutVars>
           <dgm:chPref val="3"/>
         </dgm:presLayoutVars>
       </dgm:prSet>
       <dgm:spPr/>
+      <dgm:t>
+        <a:bodyPr/>
+        <a:lstStyle/>
+        <a:p>
+          <a:endParaRPr lang="en-US"/>
+        </a:p>
+      </dgm:t>
     </dgm:pt>
     <dgm:pt modelId="{25A8F0A1-DE43-D543-9A28-DDB08C3B0352}" type="pres">
       <dgm:prSet presAssocID="{5947C7E3-01D6-CA4D-974E-3BBC51416DCB}" presName="hierChild3" presStyleCnt="0"/>
       <dgm:spPr/>
     </dgm:pt>
     <dgm:pt modelId="{13B7136B-2EAC-4848-B65B-0F39B09ECCDA}" type="pres">
-      <dgm:prSet presAssocID="{DD3C6668-7100-A248-90FE-335F532DE7D9}" presName="Name17" presStyleLbl="parChTrans1D3" presStyleIdx="0" presStyleCnt="3"/>
+      <dgm:prSet presAssocID="{DD3C6668-7100-A248-90FE-335F532DE7D9}" presName="Name17" presStyleLbl="parChTrans1D3" presStyleIdx="0" presStyleCnt="5"/>
       <dgm:spPr/>
+      <dgm:t>
+        <a:bodyPr/>
+        <a:lstStyle/>
+        <a:p>
+          <a:endParaRPr lang="en-US"/>
+        </a:p>
+      </dgm:t>
     </dgm:pt>
     <dgm:pt modelId="{F57A151E-50BB-EC46-A25B-818DC8E38060}" type="pres">
       <dgm:prSet presAssocID="{8E742056-2AE6-854E-9FEA-BE128397F8FD}" presName="hierRoot3" presStyleCnt="0"/>
@@ -9716,24 +9797,38 @@
       <dgm:spPr/>
     </dgm:pt>
     <dgm:pt modelId="{EBC49A22-B099-BD46-AD21-44FA8524C224}" type="pres">
-      <dgm:prSet presAssocID="{8E742056-2AE6-854E-9FEA-BE128397F8FD}" presName="image3" presStyleLbl="node3" presStyleIdx="0" presStyleCnt="3"/>
+      <dgm:prSet presAssocID="{8E742056-2AE6-854E-9FEA-BE128397F8FD}" presName="image3" presStyleLbl="node3" presStyleIdx="0" presStyleCnt="5"/>
       <dgm:spPr/>
     </dgm:pt>
     <dgm:pt modelId="{B1A733B9-3613-574B-9F98-957D16DC6C04}" type="pres">
-      <dgm:prSet presAssocID="{8E742056-2AE6-854E-9FEA-BE128397F8FD}" presName="text3" presStyleLbl="revTx" presStyleIdx="2" presStyleCnt="6">
+      <dgm:prSet presAssocID="{8E742056-2AE6-854E-9FEA-BE128397F8FD}" presName="text3" presStyleLbl="revTx" presStyleIdx="2" presStyleCnt="8">
         <dgm:presLayoutVars>
           <dgm:chPref val="3"/>
         </dgm:presLayoutVars>
       </dgm:prSet>
       <dgm:spPr/>
+      <dgm:t>
+        <a:bodyPr/>
+        <a:lstStyle/>
+        <a:p>
+          <a:endParaRPr lang="en-US"/>
+        </a:p>
+      </dgm:t>
     </dgm:pt>
     <dgm:pt modelId="{79AFEBA5-7C6E-744D-BB67-405501CECE8C}" type="pres">
       <dgm:prSet presAssocID="{8E742056-2AE6-854E-9FEA-BE128397F8FD}" presName="hierChild4" presStyleCnt="0"/>
       <dgm:spPr/>
     </dgm:pt>
     <dgm:pt modelId="{AF6AA274-C165-2646-8B10-57BF2472FAF0}" type="pres">
-      <dgm:prSet presAssocID="{F46B314C-F2E1-1D4A-8A6D-BFC29AB2A3D1}" presName="Name17" presStyleLbl="parChTrans1D3" presStyleIdx="1" presStyleCnt="3"/>
+      <dgm:prSet presAssocID="{F46B314C-F2E1-1D4A-8A6D-BFC29AB2A3D1}" presName="Name17" presStyleLbl="parChTrans1D3" presStyleIdx="1" presStyleCnt="5"/>
       <dgm:spPr/>
+      <dgm:t>
+        <a:bodyPr/>
+        <a:lstStyle/>
+        <a:p>
+          <a:endParaRPr lang="en-US"/>
+        </a:p>
+      </dgm:t>
     </dgm:pt>
     <dgm:pt modelId="{2E5C0D61-750C-BF49-A249-895C4A98B472}" type="pres">
       <dgm:prSet presAssocID="{2E75A9C6-C8EA-9546-8733-3262A052CC00}" presName="hierRoot3" presStyleCnt="0"/>
@@ -9744,24 +9839,66 @@
       <dgm:spPr/>
     </dgm:pt>
     <dgm:pt modelId="{A72A3CB1-5DC8-1B44-A4CE-68D3BB31496B}" type="pres">
-      <dgm:prSet presAssocID="{2E75A9C6-C8EA-9546-8733-3262A052CC00}" presName="image3" presStyleLbl="node3" presStyleIdx="1" presStyleCnt="3"/>
+      <dgm:prSet presAssocID="{2E75A9C6-C8EA-9546-8733-3262A052CC00}" presName="image3" presStyleLbl="node3" presStyleIdx="1" presStyleCnt="5"/>
       <dgm:spPr/>
     </dgm:pt>
     <dgm:pt modelId="{F5BD635E-94FA-804C-BBC2-F21E897E3F76}" type="pres">
-      <dgm:prSet presAssocID="{2E75A9C6-C8EA-9546-8733-3262A052CC00}" presName="text3" presStyleLbl="revTx" presStyleIdx="3" presStyleCnt="6">
+      <dgm:prSet presAssocID="{2E75A9C6-C8EA-9546-8733-3262A052CC00}" presName="text3" presStyleLbl="revTx" presStyleIdx="3" presStyleCnt="8">
+        <dgm:presLayoutVars>
+          <dgm:chPref val="3"/>
+        </dgm:presLayoutVars>
+      </dgm:prSet>
+      <dgm:spPr/>
+      <dgm:t>
+        <a:bodyPr/>
+        <a:lstStyle/>
+        <a:p>
+          <a:endParaRPr lang="en-US"/>
+        </a:p>
+      </dgm:t>
+    </dgm:pt>
+    <dgm:pt modelId="{154637F6-D0A3-844E-AB63-0B35CBD08203}" type="pres">
+      <dgm:prSet presAssocID="{2E75A9C6-C8EA-9546-8733-3262A052CC00}" presName="hierChild4" presStyleCnt="0"/>
+      <dgm:spPr/>
+    </dgm:pt>
+    <dgm:pt modelId="{349F3BDB-77D3-B24A-802E-3E0BEB312606}" type="pres">
+      <dgm:prSet presAssocID="{4392CD87-719E-9E4C-94D9-1C9438B92CF5}" presName="Name17" presStyleLbl="parChTrans1D3" presStyleIdx="2" presStyleCnt="5"/>
+      <dgm:spPr/>
+    </dgm:pt>
+    <dgm:pt modelId="{EFAFDCEC-E856-264C-90CF-9BB75B90CE2C}" type="pres">
+      <dgm:prSet presAssocID="{0ABB7A46-78A7-044F-B660-A6F29C6BDE74}" presName="hierRoot3" presStyleCnt="0"/>
+      <dgm:spPr/>
+    </dgm:pt>
+    <dgm:pt modelId="{10599CB9-B149-B54D-9C97-1FB3820DB9F6}" type="pres">
+      <dgm:prSet presAssocID="{0ABB7A46-78A7-044F-B660-A6F29C6BDE74}" presName="composite3" presStyleCnt="0"/>
+      <dgm:spPr/>
+    </dgm:pt>
+    <dgm:pt modelId="{937C2AA6-E74E-E243-9558-44A6ACC0DFF0}" type="pres">
+      <dgm:prSet presAssocID="{0ABB7A46-78A7-044F-B660-A6F29C6BDE74}" presName="image3" presStyleLbl="node3" presStyleIdx="2" presStyleCnt="5"/>
+      <dgm:spPr/>
+    </dgm:pt>
+    <dgm:pt modelId="{6C1E050A-E5E0-814D-9813-6C8E4D9CC316}" type="pres">
+      <dgm:prSet presAssocID="{0ABB7A46-78A7-044F-B660-A6F29C6BDE74}" presName="text3" presStyleLbl="revTx" presStyleIdx="4" presStyleCnt="8">
         <dgm:presLayoutVars>
           <dgm:chPref val="3"/>
         </dgm:presLayoutVars>
       </dgm:prSet>
       <dgm:spPr/>
     </dgm:pt>
-    <dgm:pt modelId="{154637F6-D0A3-844E-AB63-0B35CBD08203}" type="pres">
-      <dgm:prSet presAssocID="{2E75A9C6-C8EA-9546-8733-3262A052CC00}" presName="hierChild4" presStyleCnt="0"/>
+    <dgm:pt modelId="{309C6921-0BF6-894F-A54B-07EC658341B7}" type="pres">
+      <dgm:prSet presAssocID="{0ABB7A46-78A7-044F-B660-A6F29C6BDE74}" presName="hierChild4" presStyleCnt="0"/>
       <dgm:spPr/>
     </dgm:pt>
     <dgm:pt modelId="{E92107B0-854F-B241-97F9-6B4A99BFDD89}" type="pres">
       <dgm:prSet presAssocID="{12B274E4-18DF-1F4B-A44D-2A6EDCC2AEDF}" presName="Name10" presStyleLbl="parChTrans1D2" presStyleIdx="1" presStyleCnt="2"/>
       <dgm:spPr/>
+      <dgm:t>
+        <a:bodyPr/>
+        <a:lstStyle/>
+        <a:p>
+          <a:endParaRPr lang="en-US"/>
+        </a:p>
+      </dgm:t>
     </dgm:pt>
     <dgm:pt modelId="{1F530A33-3BE1-5740-B48A-AF32CFABDE6C}" type="pres">
       <dgm:prSet presAssocID="{7393D429-4215-3E4F-851F-3C5E85712256}" presName="hierRoot2" presStyleCnt="0"/>
@@ -9776,20 +9913,34 @@
       <dgm:spPr/>
     </dgm:pt>
     <dgm:pt modelId="{793AA1F8-448D-F048-96F5-F99C11C83C06}" type="pres">
-      <dgm:prSet presAssocID="{7393D429-4215-3E4F-851F-3C5E85712256}" presName="text2" presStyleLbl="revTx" presStyleIdx="4" presStyleCnt="6">
+      <dgm:prSet presAssocID="{7393D429-4215-3E4F-851F-3C5E85712256}" presName="text2" presStyleLbl="revTx" presStyleIdx="5" presStyleCnt="8">
         <dgm:presLayoutVars>
           <dgm:chPref val="3"/>
         </dgm:presLayoutVars>
       </dgm:prSet>
       <dgm:spPr/>
+      <dgm:t>
+        <a:bodyPr/>
+        <a:lstStyle/>
+        <a:p>
+          <a:endParaRPr lang="en-US"/>
+        </a:p>
+      </dgm:t>
     </dgm:pt>
     <dgm:pt modelId="{A02B0F4F-1CA7-B448-8522-49696BD613A3}" type="pres">
       <dgm:prSet presAssocID="{7393D429-4215-3E4F-851F-3C5E85712256}" presName="hierChild3" presStyleCnt="0"/>
       <dgm:spPr/>
     </dgm:pt>
     <dgm:pt modelId="{88ABB882-E21C-E14C-917B-0DC5752A833C}" type="pres">
-      <dgm:prSet presAssocID="{B63DCA60-5459-BA43-8773-949551BE5A96}" presName="Name17" presStyleLbl="parChTrans1D3" presStyleIdx="2" presStyleCnt="3"/>
+      <dgm:prSet presAssocID="{B63DCA60-5459-BA43-8773-949551BE5A96}" presName="Name17" presStyleLbl="parChTrans1D3" presStyleIdx="3" presStyleCnt="5"/>
       <dgm:spPr/>
+      <dgm:t>
+        <a:bodyPr/>
+        <a:lstStyle/>
+        <a:p>
+          <a:endParaRPr lang="en-US"/>
+        </a:p>
+      </dgm:t>
     </dgm:pt>
     <dgm:pt modelId="{ACC3D9FE-3727-B04F-A975-6DDEB234387A}" type="pres">
       <dgm:prSet presAssocID="{8F02186B-4DB5-E746-A59D-B6EE971B6A15}" presName="hierRoot3" presStyleCnt="0"/>
@@ -9800,41 +9951,82 @@
       <dgm:spPr/>
     </dgm:pt>
     <dgm:pt modelId="{4716271B-2BEA-D54C-8720-8FBF05DF84AD}" type="pres">
-      <dgm:prSet presAssocID="{8F02186B-4DB5-E746-A59D-B6EE971B6A15}" presName="image3" presStyleLbl="node3" presStyleIdx="2" presStyleCnt="3"/>
+      <dgm:prSet presAssocID="{8F02186B-4DB5-E746-A59D-B6EE971B6A15}" presName="image3" presStyleLbl="node3" presStyleIdx="3" presStyleCnt="5"/>
       <dgm:spPr/>
     </dgm:pt>
     <dgm:pt modelId="{E1D24100-DA38-774C-96CB-071D1B086443}" type="pres">
-      <dgm:prSet presAssocID="{8F02186B-4DB5-E746-A59D-B6EE971B6A15}" presName="text3" presStyleLbl="revTx" presStyleIdx="5" presStyleCnt="6">
+      <dgm:prSet presAssocID="{8F02186B-4DB5-E746-A59D-B6EE971B6A15}" presName="text3" presStyleLbl="revTx" presStyleIdx="6" presStyleCnt="8">
+        <dgm:presLayoutVars>
+          <dgm:chPref val="3"/>
+        </dgm:presLayoutVars>
+      </dgm:prSet>
+      <dgm:spPr/>
+      <dgm:t>
+        <a:bodyPr/>
+        <a:lstStyle/>
+        <a:p>
+          <a:endParaRPr lang="en-US"/>
+        </a:p>
+      </dgm:t>
+    </dgm:pt>
+    <dgm:pt modelId="{32A31B9E-E3C9-D54C-BD15-22B81C91F1BF}" type="pres">
+      <dgm:prSet presAssocID="{8F02186B-4DB5-E746-A59D-B6EE971B6A15}" presName="hierChild4" presStyleCnt="0"/>
+      <dgm:spPr/>
+    </dgm:pt>
+    <dgm:pt modelId="{E1C7E81B-03A0-2D48-939A-99F8D1DFADB4}" type="pres">
+      <dgm:prSet presAssocID="{5B3C7606-B9F0-CE49-B274-816CB6A65616}" presName="Name17" presStyleLbl="parChTrans1D3" presStyleIdx="4" presStyleCnt="5"/>
+      <dgm:spPr/>
+    </dgm:pt>
+    <dgm:pt modelId="{D4694270-56D7-BE4E-AC3B-4A1981F138E4}" type="pres">
+      <dgm:prSet presAssocID="{1AB75FD3-4C30-B24B-8DB5-5A27033277D6}" presName="hierRoot3" presStyleCnt="0"/>
+      <dgm:spPr/>
+    </dgm:pt>
+    <dgm:pt modelId="{9D7096BF-9FD8-E642-8444-29E4193E1D5A}" type="pres">
+      <dgm:prSet presAssocID="{1AB75FD3-4C30-B24B-8DB5-5A27033277D6}" presName="composite3" presStyleCnt="0"/>
+      <dgm:spPr/>
+    </dgm:pt>
+    <dgm:pt modelId="{26CA25AD-9F33-6045-B827-835832CB20EA}" type="pres">
+      <dgm:prSet presAssocID="{1AB75FD3-4C30-B24B-8DB5-5A27033277D6}" presName="image3" presStyleLbl="node3" presStyleIdx="4" presStyleCnt="5"/>
+      <dgm:spPr/>
+    </dgm:pt>
+    <dgm:pt modelId="{E583DA9E-7A18-BD43-A205-CF6EB8F09FF6}" type="pres">
+      <dgm:prSet presAssocID="{1AB75FD3-4C30-B24B-8DB5-5A27033277D6}" presName="text3" presStyleLbl="revTx" presStyleIdx="7" presStyleCnt="8">
         <dgm:presLayoutVars>
           <dgm:chPref val="3"/>
         </dgm:presLayoutVars>
       </dgm:prSet>
       <dgm:spPr/>
     </dgm:pt>
-    <dgm:pt modelId="{32A31B9E-E3C9-D54C-BD15-22B81C91F1BF}" type="pres">
-      <dgm:prSet presAssocID="{8F02186B-4DB5-E746-A59D-B6EE971B6A15}" presName="hierChild4" presStyleCnt="0"/>
+    <dgm:pt modelId="{171BC581-D5ED-2840-B311-B06BB70194CB}" type="pres">
+      <dgm:prSet presAssocID="{1AB75FD3-4C30-B24B-8DB5-5A27033277D6}" presName="hierChild4" presStyleCnt="0"/>
       <dgm:spPr/>
     </dgm:pt>
   </dgm:ptLst>
   <dgm:cxnLst>
+    <dgm:cxn modelId="{4AEE76C3-5D53-C647-B197-3027AC114694}" srcId="{7393D429-4215-3E4F-851F-3C5E85712256}" destId="{8F02186B-4DB5-E746-A59D-B6EE971B6A15}" srcOrd="0" destOrd="0" parTransId="{B63DCA60-5459-BA43-8773-949551BE5A96}" sibTransId="{096A4D9F-B72B-2A46-911B-B8567288A4D6}"/>
+    <dgm:cxn modelId="{B42C974C-D1F2-5F43-8B08-1CB5E565BEE9}" type="presOf" srcId="{50CE8BE5-FE4F-8D40-989F-58B127300842}" destId="{458E2CEA-2D4A-D048-848A-9EF3A29552BB}" srcOrd="0" destOrd="0" presId="urn:microsoft.com/office/officeart/2009/layout/CirclePictureHierarchy"/>
+    <dgm:cxn modelId="{045B215C-2BB9-D040-B40E-F9C7345F2450}" srcId="{5947C7E3-01D6-CA4D-974E-3BBC51416DCB}" destId="{8E742056-2AE6-854E-9FEA-BE128397F8FD}" srcOrd="0" destOrd="0" parTransId="{DD3C6668-7100-A248-90FE-335F532DE7D9}" sibTransId="{6635668E-D0F5-C74D-A35C-A726D64124C2}"/>
+    <dgm:cxn modelId="{9CB5DF6F-CAE3-2742-95EA-E559249D4FE7}" type="presOf" srcId="{F46B314C-F2E1-1D4A-8A6D-BFC29AB2A3D1}" destId="{AF6AA274-C165-2646-8B10-57BF2472FAF0}" srcOrd="0" destOrd="0" presId="urn:microsoft.com/office/officeart/2009/layout/CirclePictureHierarchy"/>
+    <dgm:cxn modelId="{7CFE2B3D-AB04-154E-9470-09E31B743FDD}" type="presOf" srcId="{634B3ED2-2B7E-EC44-BCDD-5D639DCE0F61}" destId="{C86EDF08-DE64-4A46-A556-D15AA930C60B}" srcOrd="0" destOrd="0" presId="urn:microsoft.com/office/officeart/2009/layout/CirclePictureHierarchy"/>
+    <dgm:cxn modelId="{B5FC367F-E3B4-3D4D-9910-766AD0DC9976}" srcId="{5947C7E3-01D6-CA4D-974E-3BBC51416DCB}" destId="{0ABB7A46-78A7-044F-B660-A6F29C6BDE74}" srcOrd="2" destOrd="0" parTransId="{4392CD87-719E-9E4C-94D9-1C9438B92CF5}" sibTransId="{0AF22048-2F58-4240-BED2-74F59EF900EA}"/>
+    <dgm:cxn modelId="{19336CE4-5834-834E-BCF8-9B89C44290F0}" type="presOf" srcId="{12B274E4-18DF-1F4B-A44D-2A6EDCC2AEDF}" destId="{E92107B0-854F-B241-97F9-6B4A99BFDD89}" srcOrd="0" destOrd="0" presId="urn:microsoft.com/office/officeart/2009/layout/CirclePictureHierarchy"/>
+    <dgm:cxn modelId="{0CFDD76D-5F04-7A44-BFEA-5AEEF5AB19DF}" srcId="{50CE8BE5-FE4F-8D40-989F-58B127300842}" destId="{7393D429-4215-3E4F-851F-3C5E85712256}" srcOrd="1" destOrd="0" parTransId="{12B274E4-18DF-1F4B-A44D-2A6EDCC2AEDF}" sibTransId="{239B13B9-AFAC-994B-ADC2-B0FC2237CA42}"/>
+    <dgm:cxn modelId="{670DE44E-DA3A-BB47-A5A2-5F3B3659A790}" type="presOf" srcId="{8E742056-2AE6-854E-9FEA-BE128397F8FD}" destId="{B1A733B9-3613-574B-9F98-957D16DC6C04}" srcOrd="0" destOrd="0" presId="urn:microsoft.com/office/officeart/2009/layout/CirclePictureHierarchy"/>
+    <dgm:cxn modelId="{15272987-660B-3B4F-818B-B1874B43BADC}" type="presOf" srcId="{1AB75FD3-4C30-B24B-8DB5-5A27033277D6}" destId="{E583DA9E-7A18-BD43-A205-CF6EB8F09FF6}" srcOrd="0" destOrd="0" presId="urn:microsoft.com/office/officeart/2009/layout/CirclePictureHierarchy"/>
+    <dgm:cxn modelId="{16674432-352B-7849-9F3F-369C1CD8CE0A}" srcId="{5947C7E3-01D6-CA4D-974E-3BBC51416DCB}" destId="{2E75A9C6-C8EA-9546-8733-3262A052CC00}" srcOrd="1" destOrd="0" parTransId="{F46B314C-F2E1-1D4A-8A6D-BFC29AB2A3D1}" sibTransId="{27B61B99-5BA6-8849-B964-393292C0F327}"/>
+    <dgm:cxn modelId="{0AE479EB-0EF9-D34B-8224-D07151CB5832}" type="presOf" srcId="{2E75A9C6-C8EA-9546-8733-3262A052CC00}" destId="{F5BD635E-94FA-804C-BBC2-F21E897E3F76}" srcOrd="0" destOrd="0" presId="urn:microsoft.com/office/officeart/2009/layout/CirclePictureHierarchy"/>
+    <dgm:cxn modelId="{925B6507-EE59-1443-8FA7-A7FE0509B880}" type="presOf" srcId="{DD3C6668-7100-A248-90FE-335F532DE7D9}" destId="{13B7136B-2EAC-4848-B65B-0F39B09ECCDA}" srcOrd="0" destOrd="0" presId="urn:microsoft.com/office/officeart/2009/layout/CirclePictureHierarchy"/>
+    <dgm:cxn modelId="{ABFBFB36-E9F9-1E40-A245-89D907C88BAA}" type="presOf" srcId="{5947C7E3-01D6-CA4D-974E-3BBC51416DCB}" destId="{DF09DBBF-55BC-1B47-A387-2E7B09D5AB74}" srcOrd="0" destOrd="0" presId="urn:microsoft.com/office/officeart/2009/layout/CirclePictureHierarchy"/>
+    <dgm:cxn modelId="{3A05CB44-2E75-6146-A581-C6058E997509}" type="presOf" srcId="{8F02186B-4DB5-E746-A59D-B6EE971B6A15}" destId="{E1D24100-DA38-774C-96CB-071D1B086443}" srcOrd="0" destOrd="0" presId="urn:microsoft.com/office/officeart/2009/layout/CirclePictureHierarchy"/>
+    <dgm:cxn modelId="{C0D965AF-C04D-1647-AA32-12C0264AD169}" type="presOf" srcId="{0ABB7A46-78A7-044F-B660-A6F29C6BDE74}" destId="{6C1E050A-E5E0-814D-9813-6C8E4D9CC316}" srcOrd="0" destOrd="0" presId="urn:microsoft.com/office/officeart/2009/layout/CirclePictureHierarchy"/>
+    <dgm:cxn modelId="{5EB3EF3E-32FD-E24C-83D2-6D7748D99A93}" srcId="{2AC110E6-F772-164D-A74E-9BCCCBE8B031}" destId="{50CE8BE5-FE4F-8D40-989F-58B127300842}" srcOrd="0" destOrd="0" parTransId="{B0C311EB-3644-0248-A207-C561591F2130}" sibTransId="{E1DB3513-1D53-6B4E-AC85-66E578D05C9F}"/>
     <dgm:cxn modelId="{EEF6E9A4-2C18-DC42-B3A0-77B919DB31D9}" srcId="{50CE8BE5-FE4F-8D40-989F-58B127300842}" destId="{5947C7E3-01D6-CA4D-974E-3BBC51416DCB}" srcOrd="0" destOrd="0" parTransId="{634B3ED2-2B7E-EC44-BCDD-5D639DCE0F61}" sibTransId="{88EC45BB-3F78-0343-86B1-90C12B59880F}"/>
-    <dgm:cxn modelId="{0CFDD76D-5F04-7A44-BFEA-5AEEF5AB19DF}" srcId="{50CE8BE5-FE4F-8D40-989F-58B127300842}" destId="{7393D429-4215-3E4F-851F-3C5E85712256}" srcOrd="1" destOrd="0" parTransId="{12B274E4-18DF-1F4B-A44D-2A6EDCC2AEDF}" sibTransId="{239B13B9-AFAC-994B-ADC2-B0FC2237CA42}"/>
+    <dgm:cxn modelId="{01F8F861-87A9-0543-9BD9-EB706AA52DBC}" type="presOf" srcId="{2AC110E6-F772-164D-A74E-9BCCCBE8B031}" destId="{5B69B621-125F-8C4C-A968-60E72CEDA897}" srcOrd="0" destOrd="0" presId="urn:microsoft.com/office/officeart/2009/layout/CirclePictureHierarchy"/>
+    <dgm:cxn modelId="{F755BA59-D952-0340-95CC-60B75B0DA401}" type="presOf" srcId="{7393D429-4215-3E4F-851F-3C5E85712256}" destId="{793AA1F8-448D-F048-96F5-F99C11C83C06}" srcOrd="0" destOrd="0" presId="urn:microsoft.com/office/officeart/2009/layout/CirclePictureHierarchy"/>
+    <dgm:cxn modelId="{56C39063-EFDD-424E-B9E0-3C23150B1633}" srcId="{7393D429-4215-3E4F-851F-3C5E85712256}" destId="{1AB75FD3-4C30-B24B-8DB5-5A27033277D6}" srcOrd="1" destOrd="0" parTransId="{5B3C7606-B9F0-CE49-B274-816CB6A65616}" sibTransId="{40584D13-979A-6749-9B12-7A169FB1A457}"/>
     <dgm:cxn modelId="{DB9C5B5C-4A79-7B4E-A3D6-8055C310D662}" type="presOf" srcId="{B63DCA60-5459-BA43-8773-949551BE5A96}" destId="{88ABB882-E21C-E14C-917B-0DC5752A833C}" srcOrd="0" destOrd="0" presId="urn:microsoft.com/office/officeart/2009/layout/CirclePictureHierarchy"/>
-    <dgm:cxn modelId="{0AE479EB-0EF9-D34B-8224-D07151CB5832}" type="presOf" srcId="{2E75A9C6-C8EA-9546-8733-3262A052CC00}" destId="{F5BD635E-94FA-804C-BBC2-F21E897E3F76}" srcOrd="0" destOrd="0" presId="urn:microsoft.com/office/officeart/2009/layout/CirclePictureHierarchy"/>
-    <dgm:cxn modelId="{045B215C-2BB9-D040-B40E-F9C7345F2450}" srcId="{5947C7E3-01D6-CA4D-974E-3BBC51416DCB}" destId="{8E742056-2AE6-854E-9FEA-BE128397F8FD}" srcOrd="0" destOrd="0" parTransId="{DD3C6668-7100-A248-90FE-335F532DE7D9}" sibTransId="{6635668E-D0F5-C74D-A35C-A726D64124C2}"/>
-    <dgm:cxn modelId="{3A05CB44-2E75-6146-A581-C6058E997509}" type="presOf" srcId="{8F02186B-4DB5-E746-A59D-B6EE971B6A15}" destId="{E1D24100-DA38-774C-96CB-071D1B086443}" srcOrd="0" destOrd="0" presId="urn:microsoft.com/office/officeart/2009/layout/CirclePictureHierarchy"/>
-    <dgm:cxn modelId="{4AEE76C3-5D53-C647-B197-3027AC114694}" srcId="{7393D429-4215-3E4F-851F-3C5E85712256}" destId="{8F02186B-4DB5-E746-A59D-B6EE971B6A15}" srcOrd="0" destOrd="0" parTransId="{B63DCA60-5459-BA43-8773-949551BE5A96}" sibTransId="{096A4D9F-B72B-2A46-911B-B8567288A4D6}"/>
-    <dgm:cxn modelId="{925B6507-EE59-1443-8FA7-A7FE0509B880}" type="presOf" srcId="{DD3C6668-7100-A248-90FE-335F532DE7D9}" destId="{13B7136B-2EAC-4848-B65B-0F39B09ECCDA}" srcOrd="0" destOrd="0" presId="urn:microsoft.com/office/officeart/2009/layout/CirclePictureHierarchy"/>
-    <dgm:cxn modelId="{B42C974C-D1F2-5F43-8B08-1CB5E565BEE9}" type="presOf" srcId="{50CE8BE5-FE4F-8D40-989F-58B127300842}" destId="{458E2CEA-2D4A-D048-848A-9EF3A29552BB}" srcOrd="0" destOrd="0" presId="urn:microsoft.com/office/officeart/2009/layout/CirclePictureHierarchy"/>
-    <dgm:cxn modelId="{19336CE4-5834-834E-BCF8-9B89C44290F0}" type="presOf" srcId="{12B274E4-18DF-1F4B-A44D-2A6EDCC2AEDF}" destId="{E92107B0-854F-B241-97F9-6B4A99BFDD89}" srcOrd="0" destOrd="0" presId="urn:microsoft.com/office/officeart/2009/layout/CirclePictureHierarchy"/>
-    <dgm:cxn modelId="{9CB5DF6F-CAE3-2742-95EA-E559249D4FE7}" type="presOf" srcId="{F46B314C-F2E1-1D4A-8A6D-BFC29AB2A3D1}" destId="{AF6AA274-C165-2646-8B10-57BF2472FAF0}" srcOrd="0" destOrd="0" presId="urn:microsoft.com/office/officeart/2009/layout/CirclePictureHierarchy"/>
-    <dgm:cxn modelId="{F755BA59-D952-0340-95CC-60B75B0DA401}" type="presOf" srcId="{7393D429-4215-3E4F-851F-3C5E85712256}" destId="{793AA1F8-448D-F048-96F5-F99C11C83C06}" srcOrd="0" destOrd="0" presId="urn:microsoft.com/office/officeart/2009/layout/CirclePictureHierarchy"/>
-    <dgm:cxn modelId="{5EB3EF3E-32FD-E24C-83D2-6D7748D99A93}" srcId="{2AC110E6-F772-164D-A74E-9BCCCBE8B031}" destId="{50CE8BE5-FE4F-8D40-989F-58B127300842}" srcOrd="0" destOrd="0" parTransId="{B0C311EB-3644-0248-A207-C561591F2130}" sibTransId="{E1DB3513-1D53-6B4E-AC85-66E578D05C9F}"/>
-    <dgm:cxn modelId="{ABFBFB36-E9F9-1E40-A245-89D907C88BAA}" type="presOf" srcId="{5947C7E3-01D6-CA4D-974E-3BBC51416DCB}" destId="{DF09DBBF-55BC-1B47-A387-2E7B09D5AB74}" srcOrd="0" destOrd="0" presId="urn:microsoft.com/office/officeart/2009/layout/CirclePictureHierarchy"/>
-    <dgm:cxn modelId="{16674432-352B-7849-9F3F-369C1CD8CE0A}" srcId="{5947C7E3-01D6-CA4D-974E-3BBC51416DCB}" destId="{2E75A9C6-C8EA-9546-8733-3262A052CC00}" srcOrd="1" destOrd="0" parTransId="{F46B314C-F2E1-1D4A-8A6D-BFC29AB2A3D1}" sibTransId="{27B61B99-5BA6-8849-B964-393292C0F327}"/>
-    <dgm:cxn modelId="{7CFE2B3D-AB04-154E-9470-09E31B743FDD}" type="presOf" srcId="{634B3ED2-2B7E-EC44-BCDD-5D639DCE0F61}" destId="{C86EDF08-DE64-4A46-A556-D15AA930C60B}" srcOrd="0" destOrd="0" presId="urn:microsoft.com/office/officeart/2009/layout/CirclePictureHierarchy"/>
-    <dgm:cxn modelId="{01F8F861-87A9-0543-9BD9-EB706AA52DBC}" type="presOf" srcId="{2AC110E6-F772-164D-A74E-9BCCCBE8B031}" destId="{5B69B621-125F-8C4C-A968-60E72CEDA897}" srcOrd="0" destOrd="0" presId="urn:microsoft.com/office/officeart/2009/layout/CirclePictureHierarchy"/>
-    <dgm:cxn modelId="{670DE44E-DA3A-BB47-A5A2-5F3B3659A790}" type="presOf" srcId="{8E742056-2AE6-854E-9FEA-BE128397F8FD}" destId="{B1A733B9-3613-574B-9F98-957D16DC6C04}" srcOrd="0" destOrd="0" presId="urn:microsoft.com/office/officeart/2009/layout/CirclePictureHierarchy"/>
+    <dgm:cxn modelId="{5F3A5FBB-769D-3D43-9D8E-6874A1532D20}" type="presOf" srcId="{5B3C7606-B9F0-CE49-B274-816CB6A65616}" destId="{E1C7E81B-03A0-2D48-939A-99F8D1DFADB4}" srcOrd="0" destOrd="0" presId="urn:microsoft.com/office/officeart/2009/layout/CirclePictureHierarchy"/>
+    <dgm:cxn modelId="{BC69B35C-EA31-3440-A949-3FC734AB8539}" type="presOf" srcId="{4392CD87-719E-9E4C-94D9-1C9438B92CF5}" destId="{349F3BDB-77D3-B24A-802E-3E0BEB312606}" srcOrd="0" destOrd="0" presId="urn:microsoft.com/office/officeart/2009/layout/CirclePictureHierarchy"/>
     <dgm:cxn modelId="{790D5EEB-CF73-FD44-BC37-077A587BD2EF}" type="presParOf" srcId="{5B69B621-125F-8C4C-A968-60E72CEDA897}" destId="{58B3EE37-8A08-6E43-95EE-907BE55FD870}" srcOrd="0" destOrd="0" presId="urn:microsoft.com/office/officeart/2009/layout/CirclePictureHierarchy"/>
     <dgm:cxn modelId="{B1817EA3-514C-9F4A-BE1E-B66904A92DBC}" type="presParOf" srcId="{58B3EE37-8A08-6E43-95EE-907BE55FD870}" destId="{7B7C76DB-5BF7-8543-800B-2F46386A06EC}" srcOrd="0" destOrd="0" presId="urn:microsoft.com/office/officeart/2009/layout/CirclePictureHierarchy"/>
     <dgm:cxn modelId="{B53B2732-9A36-DB49-AADF-A068B89F7D6D}" type="presParOf" srcId="{7B7C76DB-5BF7-8543-800B-2F46386A06EC}" destId="{C38CC957-ED72-804C-8A9C-6E439DBFDED6}" srcOrd="0" destOrd="0" presId="urn:microsoft.com/office/officeart/2009/layout/CirclePictureHierarchy"/>
@@ -9858,6 +10050,12 @@
     <dgm:cxn modelId="{F8031DC1-EA1D-6448-B7C8-E0275E44D3EC}" type="presParOf" srcId="{221DAE5D-60A1-B94F-AD46-ABE9A5AAC607}" destId="{A72A3CB1-5DC8-1B44-A4CE-68D3BB31496B}" srcOrd="0" destOrd="0" presId="urn:microsoft.com/office/officeart/2009/layout/CirclePictureHierarchy"/>
     <dgm:cxn modelId="{5AB9F194-ECDB-854B-8FF1-B0784D7C5A13}" type="presParOf" srcId="{221DAE5D-60A1-B94F-AD46-ABE9A5AAC607}" destId="{F5BD635E-94FA-804C-BBC2-F21E897E3F76}" srcOrd="1" destOrd="0" presId="urn:microsoft.com/office/officeart/2009/layout/CirclePictureHierarchy"/>
     <dgm:cxn modelId="{C820EB78-51E8-ED43-AE96-C34B432AD99E}" type="presParOf" srcId="{2E5C0D61-750C-BF49-A249-895C4A98B472}" destId="{154637F6-D0A3-844E-AB63-0B35CBD08203}" srcOrd="1" destOrd="0" presId="urn:microsoft.com/office/officeart/2009/layout/CirclePictureHierarchy"/>
+    <dgm:cxn modelId="{DD98572F-5929-F947-B3D1-FD66FBE8F3F5}" type="presParOf" srcId="{25A8F0A1-DE43-D543-9A28-DDB08C3B0352}" destId="{349F3BDB-77D3-B24A-802E-3E0BEB312606}" srcOrd="4" destOrd="0" presId="urn:microsoft.com/office/officeart/2009/layout/CirclePictureHierarchy"/>
+    <dgm:cxn modelId="{10C300FC-AC97-3640-A5A8-D3E9869F308F}" type="presParOf" srcId="{25A8F0A1-DE43-D543-9A28-DDB08C3B0352}" destId="{EFAFDCEC-E856-264C-90CF-9BB75B90CE2C}" srcOrd="5" destOrd="0" presId="urn:microsoft.com/office/officeart/2009/layout/CirclePictureHierarchy"/>
+    <dgm:cxn modelId="{C31A9A6E-0289-9643-90D9-8DCE1C362D80}" type="presParOf" srcId="{EFAFDCEC-E856-264C-90CF-9BB75B90CE2C}" destId="{10599CB9-B149-B54D-9C97-1FB3820DB9F6}" srcOrd="0" destOrd="0" presId="urn:microsoft.com/office/officeart/2009/layout/CirclePictureHierarchy"/>
+    <dgm:cxn modelId="{834338C2-2598-0844-B104-30885E505D71}" type="presParOf" srcId="{10599CB9-B149-B54D-9C97-1FB3820DB9F6}" destId="{937C2AA6-E74E-E243-9558-44A6ACC0DFF0}" srcOrd="0" destOrd="0" presId="urn:microsoft.com/office/officeart/2009/layout/CirclePictureHierarchy"/>
+    <dgm:cxn modelId="{C20A43E3-F2C9-8947-9C38-A073A75CB682}" type="presParOf" srcId="{10599CB9-B149-B54D-9C97-1FB3820DB9F6}" destId="{6C1E050A-E5E0-814D-9813-6C8E4D9CC316}" srcOrd="1" destOrd="0" presId="urn:microsoft.com/office/officeart/2009/layout/CirclePictureHierarchy"/>
+    <dgm:cxn modelId="{BD8E83E7-C4E5-D444-9A89-A108C6797395}" type="presParOf" srcId="{EFAFDCEC-E856-264C-90CF-9BB75B90CE2C}" destId="{309C6921-0BF6-894F-A54B-07EC658341B7}" srcOrd="1" destOrd="0" presId="urn:microsoft.com/office/officeart/2009/layout/CirclePictureHierarchy"/>
     <dgm:cxn modelId="{1EEA5B58-DD41-5B4E-A998-6B936493C4E0}" type="presParOf" srcId="{B6AEF241-F12C-FF4D-8017-6EC6691DA945}" destId="{E92107B0-854F-B241-97F9-6B4A99BFDD89}" srcOrd="2" destOrd="0" presId="urn:microsoft.com/office/officeart/2009/layout/CirclePictureHierarchy"/>
     <dgm:cxn modelId="{D8D8523E-52D5-E041-89BF-8B7CC1C65A1F}" type="presParOf" srcId="{B6AEF241-F12C-FF4D-8017-6EC6691DA945}" destId="{1F530A33-3BE1-5740-B48A-AF32CFABDE6C}" srcOrd="3" destOrd="0" presId="urn:microsoft.com/office/officeart/2009/layout/CirclePictureHierarchy"/>
     <dgm:cxn modelId="{2E3EE952-1E64-EC4E-B8D0-8F0248C84D28}" type="presParOf" srcId="{1F530A33-3BE1-5740-B48A-AF32CFABDE6C}" destId="{F2499FFD-EAD3-B048-AE16-573D4DC48D78}" srcOrd="0" destOrd="0" presId="urn:microsoft.com/office/officeart/2009/layout/CirclePictureHierarchy"/>
@@ -9870,6 +10068,12 @@
     <dgm:cxn modelId="{58149E46-F6C8-C04F-8535-437EC6C84072}" type="presParOf" srcId="{7CF59750-A7B5-1745-A119-A12A43C43DBF}" destId="{4716271B-2BEA-D54C-8720-8FBF05DF84AD}" srcOrd="0" destOrd="0" presId="urn:microsoft.com/office/officeart/2009/layout/CirclePictureHierarchy"/>
     <dgm:cxn modelId="{A427D0F1-70A8-604E-B36F-E08688824932}" type="presParOf" srcId="{7CF59750-A7B5-1745-A119-A12A43C43DBF}" destId="{E1D24100-DA38-774C-96CB-071D1B086443}" srcOrd="1" destOrd="0" presId="urn:microsoft.com/office/officeart/2009/layout/CirclePictureHierarchy"/>
     <dgm:cxn modelId="{AC0EC2FC-6BC4-D44F-9F62-840510FC3FF2}" type="presParOf" srcId="{ACC3D9FE-3727-B04F-A975-6DDEB234387A}" destId="{32A31B9E-E3C9-D54C-BD15-22B81C91F1BF}" srcOrd="1" destOrd="0" presId="urn:microsoft.com/office/officeart/2009/layout/CirclePictureHierarchy"/>
+    <dgm:cxn modelId="{E197848C-B579-004F-A20E-90D8151BE8DA}" type="presParOf" srcId="{A02B0F4F-1CA7-B448-8522-49696BD613A3}" destId="{E1C7E81B-03A0-2D48-939A-99F8D1DFADB4}" srcOrd="2" destOrd="0" presId="urn:microsoft.com/office/officeart/2009/layout/CirclePictureHierarchy"/>
+    <dgm:cxn modelId="{993444A8-FC70-1243-AE70-5547960E6B41}" type="presParOf" srcId="{A02B0F4F-1CA7-B448-8522-49696BD613A3}" destId="{D4694270-56D7-BE4E-AC3B-4A1981F138E4}" srcOrd="3" destOrd="0" presId="urn:microsoft.com/office/officeart/2009/layout/CirclePictureHierarchy"/>
+    <dgm:cxn modelId="{9CBEC5D1-16DA-024C-A6D3-A3F403ACC177}" type="presParOf" srcId="{D4694270-56D7-BE4E-AC3B-4A1981F138E4}" destId="{9D7096BF-9FD8-E642-8444-29E4193E1D5A}" srcOrd="0" destOrd="0" presId="urn:microsoft.com/office/officeart/2009/layout/CirclePictureHierarchy"/>
+    <dgm:cxn modelId="{03612748-0B1A-3D4F-8B9A-F5A6EDF276A3}" type="presParOf" srcId="{9D7096BF-9FD8-E642-8444-29E4193E1D5A}" destId="{26CA25AD-9F33-6045-B827-835832CB20EA}" srcOrd="0" destOrd="0" presId="urn:microsoft.com/office/officeart/2009/layout/CirclePictureHierarchy"/>
+    <dgm:cxn modelId="{38285702-A166-EC40-8FDF-93DA558C8C7D}" type="presParOf" srcId="{9D7096BF-9FD8-E642-8444-29E4193E1D5A}" destId="{E583DA9E-7A18-BD43-A205-CF6EB8F09FF6}" srcOrd="1" destOrd="0" presId="urn:microsoft.com/office/officeart/2009/layout/CirclePictureHierarchy"/>
+    <dgm:cxn modelId="{5DFBAF86-B903-634D-B507-89846522CEF8}" type="presParOf" srcId="{D4694270-56D7-BE4E-AC3B-4A1981F138E4}" destId="{171BC581-D5ED-2840-B311-B06BB70194CB}" srcOrd="1" destOrd="0" presId="urn:microsoft.com/office/officeart/2009/layout/CirclePictureHierarchy"/>
   </dgm:cxnLst>
   <dgm:bg/>
   <dgm:whole/>
@@ -14925,15 +15129,15 @@
       <dsp:cNvGrpSpPr/>
     </dsp:nvGrpSpPr>
     <dsp:grpSpPr/>
-    <dsp:sp modelId="{88ABB882-E21C-E14C-917B-0DC5752A833C}">
+    <dsp:sp modelId="{E1C7E81B-03A0-2D48-939A-99F8D1DFADB4}">
       <dsp:nvSpPr>
         <dsp:cNvPr id="0" name=""/>
         <dsp:cNvSpPr/>
       </dsp:nvSpPr>
       <dsp:spPr>
         <a:xfrm>
-          <a:off x="4526280" y="2413952"/>
-          <a:ext cx="91440" cy="240029"/>
+          <a:off x="6049376" y="2483744"/>
+          <a:ext cx="821145" cy="188117"/>
         </a:xfrm>
         <a:custGeom>
           <a:avLst/>
@@ -14944,10 +15148,76 @@
           <a:pathLst>
             <a:path>
               <a:moveTo>
-                <a:pt x="45720" y="0"/>
+                <a:pt x="0" y="0"/>
               </a:moveTo>
               <a:lnTo>
-                <a:pt x="45720" y="240029"/>
+                <a:pt x="0" y="94805"/>
+              </a:lnTo>
+              <a:lnTo>
+                <a:pt x="821145" y="94805"/>
+              </a:lnTo>
+              <a:lnTo>
+                <a:pt x="821145" y="188117"/>
+              </a:lnTo>
+            </a:path>
+          </a:pathLst>
+        </a:custGeom>
+        <a:noFill/>
+        <a:ln w="9525" cap="flat" cmpd="sng" algn="ctr">
+          <a:solidFill>
+            <a:schemeClr val="accent4">
+              <a:hueOff val="0"/>
+              <a:satOff val="0"/>
+              <a:lumOff val="0"/>
+              <a:alphaOff val="0"/>
+            </a:schemeClr>
+          </a:solidFill>
+          <a:prstDash val="solid"/>
+        </a:ln>
+        <a:effectLst/>
+      </dsp:spPr>
+      <dsp:style>
+        <a:lnRef idx="1">
+          <a:scrgbClr r="0" g="0" b="0"/>
+        </a:lnRef>
+        <a:fillRef idx="0">
+          <a:scrgbClr r="0" g="0" b="0"/>
+        </a:fillRef>
+        <a:effectRef idx="0">
+          <a:scrgbClr r="0" g="0" b="0"/>
+        </a:effectRef>
+        <a:fontRef idx="minor"/>
+      </dsp:style>
+    </dsp:sp>
+    <dsp:sp modelId="{88ABB882-E21C-E14C-917B-0DC5752A833C}">
+      <dsp:nvSpPr>
+        <dsp:cNvPr id="0" name=""/>
+        <dsp:cNvSpPr/>
+      </dsp:nvSpPr>
+      <dsp:spPr>
+        <a:xfrm>
+          <a:off x="5228230" y="2483744"/>
+          <a:ext cx="821145" cy="188117"/>
+        </a:xfrm>
+        <a:custGeom>
+          <a:avLst/>
+          <a:gdLst/>
+          <a:ahLst/>
+          <a:cxnLst/>
+          <a:rect l="0" t="0" r="0" b="0"/>
+          <a:pathLst>
+            <a:path>
+              <a:moveTo>
+                <a:pt x="821145" y="0"/>
+              </a:moveTo>
+              <a:lnTo>
+                <a:pt x="821145" y="94805"/>
+              </a:lnTo>
+              <a:lnTo>
+                <a:pt x="0" y="94805"/>
+              </a:lnTo>
+              <a:lnTo>
+                <a:pt x="0" y="188117"/>
               </a:lnTo>
             </a:path>
           </a:pathLst>
@@ -14986,8 +15256,8 @@
       </dsp:nvSpPr>
       <dsp:spPr>
         <a:xfrm>
-          <a:off x="3000375" y="1411922"/>
-          <a:ext cx="1571625" cy="240030"/>
+          <a:off x="3996512" y="1698430"/>
+          <a:ext cx="2052864" cy="188117"/>
         </a:xfrm>
         <a:custGeom>
           <a:avLst/>
@@ -15001,13 +15271,13 @@
                 <a:pt x="0" y="0"/>
               </a:moveTo>
               <a:lnTo>
-                <a:pt x="0" y="120967"/>
+                <a:pt x="0" y="94805"/>
               </a:lnTo>
               <a:lnTo>
-                <a:pt x="1571625" y="120967"/>
+                <a:pt x="2052864" y="94805"/>
               </a:lnTo>
               <a:lnTo>
-                <a:pt x="1571625" y="240030"/>
+                <a:pt x="2052864" y="188117"/>
               </a:lnTo>
             </a:path>
           </a:pathLst>
@@ -15039,15 +15309,15 @@
         <a:fontRef idx="minor"/>
       </dsp:style>
     </dsp:sp>
-    <dsp:sp modelId="{AF6AA274-C165-2646-8B10-57BF2472FAF0}">
+    <dsp:sp modelId="{349F3BDB-77D3-B24A-802E-3E0BEB312606}">
       <dsp:nvSpPr>
         <dsp:cNvPr id="0" name=""/>
         <dsp:cNvSpPr/>
       </dsp:nvSpPr>
       <dsp:spPr>
         <a:xfrm>
-          <a:off x="1428749" y="2413952"/>
-          <a:ext cx="1047749" cy="240029"/>
+          <a:off x="1943647" y="2483744"/>
+          <a:ext cx="1642291" cy="188117"/>
         </a:xfrm>
         <a:custGeom>
           <a:avLst/>
@@ -15061,13 +15331,67 @@
                 <a:pt x="0" y="0"/>
               </a:moveTo>
               <a:lnTo>
-                <a:pt x="0" y="120967"/>
+                <a:pt x="0" y="94805"/>
               </a:lnTo>
               <a:lnTo>
-                <a:pt x="1047749" y="120967"/>
+                <a:pt x="1642291" y="94805"/>
               </a:lnTo>
               <a:lnTo>
-                <a:pt x="1047749" y="240029"/>
+                <a:pt x="1642291" y="188117"/>
+              </a:lnTo>
+            </a:path>
+          </a:pathLst>
+        </a:custGeom>
+        <a:noFill/>
+        <a:ln w="9525" cap="flat" cmpd="sng" algn="ctr">
+          <a:solidFill>
+            <a:schemeClr val="accent4">
+              <a:hueOff val="0"/>
+              <a:satOff val="0"/>
+              <a:lumOff val="0"/>
+              <a:alphaOff val="0"/>
+            </a:schemeClr>
+          </a:solidFill>
+          <a:prstDash val="solid"/>
+        </a:ln>
+        <a:effectLst/>
+      </dsp:spPr>
+      <dsp:style>
+        <a:lnRef idx="1">
+          <a:scrgbClr r="0" g="0" b="0"/>
+        </a:lnRef>
+        <a:fillRef idx="0">
+          <a:scrgbClr r="0" g="0" b="0"/>
+        </a:fillRef>
+        <a:effectRef idx="0">
+          <a:scrgbClr r="0" g="0" b="0"/>
+        </a:effectRef>
+        <a:fontRef idx="minor"/>
+      </dsp:style>
+    </dsp:sp>
+    <dsp:sp modelId="{AF6AA274-C165-2646-8B10-57BF2472FAF0}">
+      <dsp:nvSpPr>
+        <dsp:cNvPr id="0" name=""/>
+        <dsp:cNvSpPr/>
+      </dsp:nvSpPr>
+      <dsp:spPr>
+        <a:xfrm>
+          <a:off x="1897927" y="2483744"/>
+          <a:ext cx="91440" cy="188117"/>
+        </a:xfrm>
+        <a:custGeom>
+          <a:avLst/>
+          <a:gdLst/>
+          <a:ahLst/>
+          <a:cxnLst/>
+          <a:rect l="0" t="0" r="0" b="0"/>
+          <a:pathLst>
+            <a:path>
+              <a:moveTo>
+                <a:pt x="45720" y="0"/>
+              </a:moveTo>
+              <a:lnTo>
+                <a:pt x="45720" y="188117"/>
               </a:lnTo>
             </a:path>
           </a:pathLst>
@@ -15106,8 +15430,8 @@
       </dsp:nvSpPr>
       <dsp:spPr>
         <a:xfrm>
-          <a:off x="380999" y="2413952"/>
-          <a:ext cx="1047750" cy="240029"/>
+          <a:off x="301355" y="2483744"/>
+          <a:ext cx="1642291" cy="188117"/>
         </a:xfrm>
         <a:custGeom>
           <a:avLst/>
@@ -15118,16 +15442,16 @@
           <a:pathLst>
             <a:path>
               <a:moveTo>
-                <a:pt x="1047750" y="0"/>
+                <a:pt x="1642291" y="0"/>
               </a:moveTo>
               <a:lnTo>
-                <a:pt x="1047750" y="120967"/>
+                <a:pt x="1642291" y="94805"/>
               </a:lnTo>
               <a:lnTo>
-                <a:pt x="0" y="120967"/>
+                <a:pt x="0" y="94805"/>
               </a:lnTo>
               <a:lnTo>
-                <a:pt x="0" y="240029"/>
+                <a:pt x="0" y="188117"/>
               </a:lnTo>
             </a:path>
           </a:pathLst>
@@ -15166,8 +15490,8 @@
       </dsp:nvSpPr>
       <dsp:spPr>
         <a:xfrm>
-          <a:off x="1428749" y="1411922"/>
-          <a:ext cx="1571625" cy="240030"/>
+          <a:off x="1943647" y="1698430"/>
+          <a:ext cx="2052864" cy="188117"/>
         </a:xfrm>
         <a:custGeom>
           <a:avLst/>
@@ -15178,16 +15502,16 @@
           <a:pathLst>
             <a:path>
               <a:moveTo>
-                <a:pt x="1571625" y="0"/>
+                <a:pt x="2052864" y="0"/>
               </a:moveTo>
               <a:lnTo>
-                <a:pt x="1571625" y="120967"/>
+                <a:pt x="2052864" y="94805"/>
               </a:lnTo>
               <a:lnTo>
-                <a:pt x="0" y="120967"/>
+                <a:pt x="0" y="94805"/>
               </a:lnTo>
               <a:lnTo>
-                <a:pt x="0" y="240030"/>
+                <a:pt x="0" y="188117"/>
               </a:lnTo>
             </a:path>
           </a:pathLst>
@@ -15226,8 +15550,8 @@
       </dsp:nvSpPr>
       <dsp:spPr>
         <a:xfrm>
-          <a:off x="2619375" y="649922"/>
-          <a:ext cx="761999" cy="761999"/>
+          <a:off x="3697913" y="1101234"/>
+          <a:ext cx="597196" cy="597196"/>
         </a:xfrm>
         <a:prstGeom prst="ellipse">
           <a:avLst/>
@@ -15312,8 +15636,8 @@
       </dsp:nvSpPr>
       <dsp:spPr>
         <a:xfrm>
-          <a:off x="3381375" y="648017"/>
-          <a:ext cx="1143000" cy="761999"/>
+          <a:off x="4295110" y="1099741"/>
+          <a:ext cx="895795" cy="597196"/>
         </a:xfrm>
         <a:prstGeom prst="rect">
           <a:avLst/>
@@ -15337,12 +15661,12 @@
         <a:fontRef idx="minor"/>
       </dsp:style>
       <dsp:txBody>
-        <a:bodyPr spcFirstLastPara="0" vert="horz" wrap="square" lIns="60960" tIns="60960" rIns="60960" bIns="60960" numCol="1" spcCol="1270" anchor="ctr" anchorCtr="0">
+        <a:bodyPr spcFirstLastPara="0" vert="horz" wrap="square" lIns="49530" tIns="49530" rIns="49530" bIns="49530" numCol="1" spcCol="1270" anchor="ctr" anchorCtr="0">
           <a:noAutofit/>
         </a:bodyPr>
         <a:lstStyle/>
         <a:p>
-          <a:pPr lvl="0" algn="l" defTabSz="711200">
+          <a:pPr lvl="0" algn="l" defTabSz="577850">
             <a:lnSpc>
               <a:spcPct val="90000"/>
             </a:lnSpc>
@@ -15354,15 +15678,15 @@
             </a:spcAft>
           </a:pPr>
           <a:r>
-            <a:rPr lang="en-US" sz="1600" kern="1200" dirty="0" err="1" smtClean="0"/>
+            <a:rPr lang="en-US" sz="1300" kern="1200" dirty="0" err="1" smtClean="0"/>
             <a:t>Prehension</a:t>
           </a:r>
-          <a:endParaRPr lang="en-US" sz="1600" kern="1200" dirty="0"/>
+          <a:endParaRPr lang="en-US" sz="1300" kern="1200" dirty="0"/>
         </a:p>
       </dsp:txBody>
       <dsp:txXfrm>
-        <a:off x="3381375" y="648017"/>
-        <a:ext cx="1143000" cy="761999"/>
+        <a:off x="4295110" y="1099741"/>
+        <a:ext cx="895795" cy="597196"/>
       </dsp:txXfrm>
     </dsp:sp>
     <dsp:sp modelId="{BE353C04-56BF-AA44-B29C-1AA30BF506C0}">
@@ -15372,8 +15696,8 @@
       </dsp:nvSpPr>
       <dsp:spPr>
         <a:xfrm>
-          <a:off x="1047749" y="1651952"/>
-          <a:ext cx="761999" cy="761999"/>
+          <a:off x="1645049" y="1886548"/>
+          <a:ext cx="597196" cy="597196"/>
         </a:xfrm>
         <a:prstGeom prst="ellipse">
           <a:avLst/>
@@ -15458,8 +15782,8 @@
       </dsp:nvSpPr>
       <dsp:spPr>
         <a:xfrm>
-          <a:off x="1809749" y="1650047"/>
-          <a:ext cx="1143000" cy="761999"/>
+          <a:off x="2242246" y="1885055"/>
+          <a:ext cx="895795" cy="597196"/>
         </a:xfrm>
         <a:prstGeom prst="rect">
           <a:avLst/>
@@ -15483,12 +15807,12 @@
         <a:fontRef idx="minor"/>
       </dsp:style>
       <dsp:txBody>
-        <a:bodyPr spcFirstLastPara="0" vert="horz" wrap="square" lIns="60960" tIns="60960" rIns="60960" bIns="60960" numCol="1" spcCol="1270" anchor="ctr" anchorCtr="0">
+        <a:bodyPr spcFirstLastPara="0" vert="horz" wrap="square" lIns="49530" tIns="49530" rIns="49530" bIns="49530" numCol="1" spcCol="1270" anchor="ctr" anchorCtr="0">
           <a:noAutofit/>
         </a:bodyPr>
         <a:lstStyle/>
         <a:p>
-          <a:pPr lvl="0" algn="l" defTabSz="711200">
+          <a:pPr lvl="0" algn="l" defTabSz="577850">
             <a:lnSpc>
               <a:spcPct val="90000"/>
             </a:lnSpc>
@@ -15500,15 +15824,15 @@
             </a:spcAft>
           </a:pPr>
           <a:r>
-            <a:rPr lang="en-US" sz="1600" kern="1200" dirty="0" smtClean="0"/>
+            <a:rPr lang="en-US" sz="1300" kern="1200" dirty="0" smtClean="0"/>
             <a:t>Vector Space</a:t>
           </a:r>
-          <a:endParaRPr lang="en-US" sz="1600" kern="1200" dirty="0"/>
+          <a:endParaRPr lang="en-US" sz="1300" kern="1200" dirty="0"/>
         </a:p>
       </dsp:txBody>
       <dsp:txXfrm>
-        <a:off x="1809749" y="1650047"/>
-        <a:ext cx="1143000" cy="761999"/>
+        <a:off x="2242246" y="1885055"/>
+        <a:ext cx="895795" cy="597196"/>
       </dsp:txXfrm>
     </dsp:sp>
     <dsp:sp modelId="{EBC49A22-B099-BD46-AD21-44FA8524C224}">
@@ -15518,8 +15842,8 @@
       </dsp:nvSpPr>
       <dsp:spPr>
         <a:xfrm>
-          <a:off x="0" y="2653982"/>
-          <a:ext cx="761999" cy="761999"/>
+          <a:off x="2757" y="2671862"/>
+          <a:ext cx="597196" cy="597196"/>
         </a:xfrm>
         <a:prstGeom prst="ellipse">
           <a:avLst/>
@@ -15604,8 +15928,8 @@
       </dsp:nvSpPr>
       <dsp:spPr>
         <a:xfrm>
-          <a:off x="761999" y="2652077"/>
-          <a:ext cx="1143000" cy="761999"/>
+          <a:off x="599954" y="2670369"/>
+          <a:ext cx="895795" cy="597196"/>
         </a:xfrm>
         <a:prstGeom prst="rect">
           <a:avLst/>
@@ -15629,12 +15953,12 @@
         <a:fontRef idx="minor"/>
       </dsp:style>
       <dsp:txBody>
-        <a:bodyPr spcFirstLastPara="0" vert="horz" wrap="square" lIns="60960" tIns="60960" rIns="60960" bIns="60960" numCol="1" spcCol="1270" anchor="ctr" anchorCtr="0">
+        <a:bodyPr spcFirstLastPara="0" vert="horz" wrap="square" lIns="49530" tIns="49530" rIns="49530" bIns="49530" numCol="1" spcCol="1270" anchor="ctr" anchorCtr="0">
           <a:noAutofit/>
         </a:bodyPr>
         <a:lstStyle/>
         <a:p>
-          <a:pPr lvl="0" algn="l" defTabSz="711200">
+          <a:pPr lvl="0" algn="l" defTabSz="577850">
             <a:lnSpc>
               <a:spcPct val="90000"/>
             </a:lnSpc>
@@ -15646,15 +15970,15 @@
             </a:spcAft>
           </a:pPr>
           <a:r>
-            <a:rPr lang="en-US" sz="1600" kern="1200" dirty="0" smtClean="0"/>
+            <a:rPr lang="en-US" sz="1300" kern="1200" dirty="0" smtClean="0"/>
             <a:t>Fashion model</a:t>
           </a:r>
-          <a:endParaRPr lang="en-US" sz="1600" kern="1200" dirty="0"/>
+          <a:endParaRPr lang="en-US" sz="1300" kern="1200" dirty="0"/>
         </a:p>
       </dsp:txBody>
       <dsp:txXfrm>
-        <a:off x="761999" y="2652077"/>
-        <a:ext cx="1143000" cy="761999"/>
+        <a:off x="599954" y="2670369"/>
+        <a:ext cx="895795" cy="597196"/>
       </dsp:txXfrm>
     </dsp:sp>
     <dsp:sp modelId="{A72A3CB1-5DC8-1B44-A4CE-68D3BB31496B}">
@@ -15664,8 +15988,8 @@
       </dsp:nvSpPr>
       <dsp:spPr>
         <a:xfrm>
-          <a:off x="2095499" y="2653982"/>
-          <a:ext cx="761999" cy="761999"/>
+          <a:off x="1645049" y="2671862"/>
+          <a:ext cx="597196" cy="597196"/>
         </a:xfrm>
         <a:prstGeom prst="ellipse">
           <a:avLst/>
@@ -15750,8 +16074,8 @@
       </dsp:nvSpPr>
       <dsp:spPr>
         <a:xfrm>
-          <a:off x="2857500" y="2652077"/>
-          <a:ext cx="1143000" cy="761999"/>
+          <a:off x="2242246" y="2670369"/>
+          <a:ext cx="895795" cy="597196"/>
         </a:xfrm>
         <a:prstGeom prst="rect">
           <a:avLst/>
@@ -15775,12 +16099,12 @@
         <a:fontRef idx="minor"/>
       </dsp:style>
       <dsp:txBody>
-        <a:bodyPr spcFirstLastPara="0" vert="horz" wrap="square" lIns="60960" tIns="60960" rIns="60960" bIns="60960" numCol="1" spcCol="1270" anchor="ctr" anchorCtr="0">
+        <a:bodyPr spcFirstLastPara="0" vert="horz" wrap="square" lIns="49530" tIns="49530" rIns="49530" bIns="49530" numCol="1" spcCol="1270" anchor="ctr" anchorCtr="0">
           <a:noAutofit/>
         </a:bodyPr>
         <a:lstStyle/>
         <a:p>
-          <a:pPr lvl="0" algn="l" defTabSz="711200">
+          <a:pPr lvl="0" algn="l" defTabSz="577850">
             <a:lnSpc>
               <a:spcPct val="90000"/>
             </a:lnSpc>
@@ -15792,15 +16116,161 @@
             </a:spcAft>
           </a:pPr>
           <a:r>
-            <a:rPr lang="en-US" sz="1600" kern="1200" dirty="0" smtClean="0"/>
+            <a:rPr lang="en-US" sz="1300" kern="1200" dirty="0" smtClean="0"/>
             <a:t>Segregation model</a:t>
           </a:r>
-          <a:endParaRPr lang="en-US" sz="1600" kern="1200" dirty="0"/>
+          <a:endParaRPr lang="en-US" sz="1300" kern="1200" dirty="0"/>
         </a:p>
       </dsp:txBody>
       <dsp:txXfrm>
-        <a:off x="2857500" y="2652077"/>
-        <a:ext cx="1143000" cy="761999"/>
+        <a:off x="2242246" y="2670369"/>
+        <a:ext cx="895795" cy="597196"/>
+      </dsp:txXfrm>
+    </dsp:sp>
+    <dsp:sp modelId="{937C2AA6-E74E-E243-9558-44A6ACC0DFF0}">
+      <dsp:nvSpPr>
+        <dsp:cNvPr id="0" name=""/>
+        <dsp:cNvSpPr/>
+      </dsp:nvSpPr>
+      <dsp:spPr>
+        <a:xfrm>
+          <a:off x="3287340" y="2671862"/>
+          <a:ext cx="597196" cy="597196"/>
+        </a:xfrm>
+        <a:prstGeom prst="ellipse">
+          <a:avLst/>
+        </a:prstGeom>
+        <a:gradFill rotWithShape="0">
+          <a:gsLst>
+            <a:gs pos="0">
+              <a:schemeClr val="accent4">
+                <a:hueOff val="0"/>
+                <a:satOff val="0"/>
+                <a:lumOff val="0"/>
+                <a:alphaOff val="0"/>
+                <a:shade val="15000"/>
+                <a:satMod val="180000"/>
+              </a:schemeClr>
+            </a:gs>
+            <a:gs pos="50000">
+              <a:schemeClr val="accent4">
+                <a:hueOff val="0"/>
+                <a:satOff val="0"/>
+                <a:lumOff val="0"/>
+                <a:alphaOff val="0"/>
+                <a:shade val="45000"/>
+                <a:satMod val="170000"/>
+              </a:schemeClr>
+            </a:gs>
+            <a:gs pos="70000">
+              <a:schemeClr val="accent4">
+                <a:hueOff val="0"/>
+                <a:satOff val="0"/>
+                <a:lumOff val="0"/>
+                <a:alphaOff val="0"/>
+                <a:tint val="99000"/>
+                <a:shade val="65000"/>
+                <a:satMod val="155000"/>
+              </a:schemeClr>
+            </a:gs>
+            <a:gs pos="100000">
+              <a:schemeClr val="accent4">
+                <a:hueOff val="0"/>
+                <a:satOff val="0"/>
+                <a:lumOff val="0"/>
+                <a:alphaOff val="0"/>
+                <a:tint val="95500"/>
+                <a:shade val="100000"/>
+                <a:satMod val="155000"/>
+              </a:schemeClr>
+            </a:gs>
+          </a:gsLst>
+          <a:lin ang="16200000" scaled="0"/>
+        </a:gradFill>
+        <a:ln>
+          <a:noFill/>
+        </a:ln>
+        <a:effectLst>
+          <a:outerShdw blurRad="50800" dist="38100" dir="5400000" rotWithShape="0">
+            <a:srgbClr val="000000">
+              <a:alpha val="35000"/>
+            </a:srgbClr>
+          </a:outerShdw>
+        </a:effectLst>
+      </dsp:spPr>
+      <dsp:style>
+        <a:lnRef idx="0">
+          <a:scrgbClr r="0" g="0" b="0"/>
+        </a:lnRef>
+        <a:fillRef idx="3">
+          <a:scrgbClr r="0" g="0" b="0"/>
+        </a:fillRef>
+        <a:effectRef idx="2">
+          <a:scrgbClr r="0" g="0" b="0"/>
+        </a:effectRef>
+        <a:fontRef idx="minor">
+          <a:schemeClr val="lt1"/>
+        </a:fontRef>
+      </dsp:style>
+    </dsp:sp>
+    <dsp:sp modelId="{6C1E050A-E5E0-814D-9813-6C8E4D9CC316}">
+      <dsp:nvSpPr>
+        <dsp:cNvPr id="0" name=""/>
+        <dsp:cNvSpPr/>
+      </dsp:nvSpPr>
+      <dsp:spPr>
+        <a:xfrm>
+          <a:off x="3884537" y="2670369"/>
+          <a:ext cx="895795" cy="597196"/>
+        </a:xfrm>
+        <a:prstGeom prst="rect">
+          <a:avLst/>
+        </a:prstGeom>
+        <a:noFill/>
+        <a:ln>
+          <a:noFill/>
+        </a:ln>
+        <a:effectLst/>
+      </dsp:spPr>
+      <dsp:style>
+        <a:lnRef idx="0">
+          <a:scrgbClr r="0" g="0" b="0"/>
+        </a:lnRef>
+        <a:fillRef idx="0">
+          <a:scrgbClr r="0" g="0" b="0"/>
+        </a:fillRef>
+        <a:effectRef idx="0">
+          <a:scrgbClr r="0" g="0" b="0"/>
+        </a:effectRef>
+        <a:fontRef idx="minor"/>
+      </dsp:style>
+      <dsp:txBody>
+        <a:bodyPr spcFirstLastPara="0" vert="horz" wrap="square" lIns="49530" tIns="49530" rIns="49530" bIns="49530" numCol="1" spcCol="1270" anchor="ctr" anchorCtr="0">
+          <a:noAutofit/>
+        </a:bodyPr>
+        <a:lstStyle/>
+        <a:p>
+          <a:pPr lvl="0" algn="l" defTabSz="577850">
+            <a:lnSpc>
+              <a:spcPct val="90000"/>
+            </a:lnSpc>
+            <a:spcBef>
+              <a:spcPct val="0"/>
+            </a:spcBef>
+            <a:spcAft>
+              <a:spcPct val="35000"/>
+            </a:spcAft>
+          </a:pPr>
+          <a:r>
+            <a:rPr lang="en-US" sz="1300" kern="1200" smtClean="0"/>
+            <a:t>Market exchange</a:t>
+          </a:r>
+          <a:endParaRPr lang="en-US" sz="1300" kern="1200"/>
+        </a:p>
+      </dsp:txBody>
+      <dsp:txXfrm>
+        <a:off x="3884537" y="2670369"/>
+        <a:ext cx="895795" cy="597196"/>
       </dsp:txXfrm>
     </dsp:sp>
     <dsp:sp modelId="{EBCDE10E-5169-6145-BF2E-07E34DEA19B6}">
@@ -15810,8 +16280,8 @@
       </dsp:nvSpPr>
       <dsp:spPr>
         <a:xfrm>
-          <a:off x="4191000" y="1651952"/>
-          <a:ext cx="761999" cy="761999"/>
+          <a:off x="5750778" y="1886548"/>
+          <a:ext cx="597196" cy="597196"/>
         </a:xfrm>
         <a:prstGeom prst="ellipse">
           <a:avLst/>
@@ -15896,8 +16366,8 @@
       </dsp:nvSpPr>
       <dsp:spPr>
         <a:xfrm>
-          <a:off x="4953000" y="1650047"/>
-          <a:ext cx="1143000" cy="761999"/>
+          <a:off x="6347975" y="1885055"/>
+          <a:ext cx="895795" cy="597196"/>
         </a:xfrm>
         <a:prstGeom prst="rect">
           <a:avLst/>
@@ -15921,12 +16391,12 @@
         <a:fontRef idx="minor"/>
       </dsp:style>
       <dsp:txBody>
-        <a:bodyPr spcFirstLastPara="0" vert="horz" wrap="square" lIns="60960" tIns="60960" rIns="60960" bIns="60960" numCol="1" spcCol="1270" anchor="ctr" anchorCtr="0">
+        <a:bodyPr spcFirstLastPara="0" vert="horz" wrap="square" lIns="49530" tIns="49530" rIns="49530" bIns="49530" numCol="1" spcCol="1270" anchor="ctr" anchorCtr="0">
           <a:noAutofit/>
         </a:bodyPr>
         <a:lstStyle/>
         <a:p>
-          <a:pPr lvl="0" algn="l" defTabSz="711200">
+          <a:pPr lvl="0" algn="l" defTabSz="577850">
             <a:lnSpc>
               <a:spcPct val="90000"/>
             </a:lnSpc>
@@ -15938,15 +16408,15 @@
             </a:spcAft>
           </a:pPr>
           <a:r>
-            <a:rPr lang="en-US" sz="1600" kern="1200" dirty="0" smtClean="0"/>
+            <a:rPr lang="en-US" sz="1300" kern="1200" dirty="0" smtClean="0"/>
             <a:t>Markov chain</a:t>
           </a:r>
-          <a:endParaRPr lang="en-US" sz="1600" kern="1200" dirty="0"/>
+          <a:endParaRPr lang="en-US" sz="1300" kern="1200" dirty="0"/>
         </a:p>
       </dsp:txBody>
       <dsp:txXfrm>
-        <a:off x="4953000" y="1650047"/>
-        <a:ext cx="1143000" cy="761999"/>
+        <a:off x="6347975" y="1885055"/>
+        <a:ext cx="895795" cy="597196"/>
       </dsp:txXfrm>
     </dsp:sp>
     <dsp:sp modelId="{4716271B-2BEA-D54C-8720-8FBF05DF84AD}">
@@ -15956,8 +16426,8 @@
       </dsp:nvSpPr>
       <dsp:spPr>
         <a:xfrm>
-          <a:off x="4191000" y="2653982"/>
-          <a:ext cx="761999" cy="761999"/>
+          <a:off x="4929632" y="2671862"/>
+          <a:ext cx="597196" cy="597196"/>
         </a:xfrm>
         <a:prstGeom prst="ellipse">
           <a:avLst/>
@@ -16042,8 +16512,8 @@
       </dsp:nvSpPr>
       <dsp:spPr>
         <a:xfrm>
-          <a:off x="4953000" y="2652077"/>
-          <a:ext cx="1143000" cy="761999"/>
+          <a:off x="5526829" y="2670369"/>
+          <a:ext cx="895795" cy="597196"/>
         </a:xfrm>
         <a:prstGeom prst="rect">
           <a:avLst/>
@@ -16067,12 +16537,12 @@
         <a:fontRef idx="minor"/>
       </dsp:style>
       <dsp:txBody>
-        <a:bodyPr spcFirstLastPara="0" vert="horz" wrap="square" lIns="60960" tIns="60960" rIns="60960" bIns="60960" numCol="1" spcCol="1270" anchor="ctr" anchorCtr="0">
+        <a:bodyPr spcFirstLastPara="0" vert="horz" wrap="square" lIns="49530" tIns="49530" rIns="49530" bIns="49530" numCol="1" spcCol="1270" anchor="ctr" anchorCtr="0">
           <a:noAutofit/>
         </a:bodyPr>
         <a:lstStyle/>
         <a:p>
-          <a:pPr lvl="0" algn="l" defTabSz="711200">
+          <a:pPr lvl="0" algn="l" defTabSz="577850">
             <a:lnSpc>
               <a:spcPct val="90000"/>
             </a:lnSpc>
@@ -16084,15 +16554,161 @@
             </a:spcAft>
           </a:pPr>
           <a:r>
-            <a:rPr lang="en-US" sz="1600" kern="1200" dirty="0" smtClean="0"/>
+            <a:rPr lang="en-US" sz="1300" kern="1200" dirty="0" smtClean="0"/>
             <a:t>Forest fire</a:t>
           </a:r>
-          <a:endParaRPr lang="en-US" sz="1600" kern="1200" dirty="0"/>
+          <a:endParaRPr lang="en-US" sz="1300" kern="1200" dirty="0"/>
         </a:p>
       </dsp:txBody>
       <dsp:txXfrm>
-        <a:off x="4953000" y="2652077"/>
-        <a:ext cx="1143000" cy="761999"/>
+        <a:off x="5526829" y="2670369"/>
+        <a:ext cx="895795" cy="597196"/>
+      </dsp:txXfrm>
+    </dsp:sp>
+    <dsp:sp modelId="{26CA25AD-9F33-6045-B827-835832CB20EA}">
+      <dsp:nvSpPr>
+        <dsp:cNvPr id="0" name=""/>
+        <dsp:cNvSpPr/>
+      </dsp:nvSpPr>
+      <dsp:spPr>
+        <a:xfrm>
+          <a:off x="6571924" y="2671862"/>
+          <a:ext cx="597196" cy="597196"/>
+        </a:xfrm>
+        <a:prstGeom prst="ellipse">
+          <a:avLst/>
+        </a:prstGeom>
+        <a:gradFill rotWithShape="0">
+          <a:gsLst>
+            <a:gs pos="0">
+              <a:schemeClr val="accent4">
+                <a:hueOff val="0"/>
+                <a:satOff val="0"/>
+                <a:lumOff val="0"/>
+                <a:alphaOff val="0"/>
+                <a:shade val="15000"/>
+                <a:satMod val="180000"/>
+              </a:schemeClr>
+            </a:gs>
+            <a:gs pos="50000">
+              <a:schemeClr val="accent4">
+                <a:hueOff val="0"/>
+                <a:satOff val="0"/>
+                <a:lumOff val="0"/>
+                <a:alphaOff val="0"/>
+                <a:shade val="45000"/>
+                <a:satMod val="170000"/>
+              </a:schemeClr>
+            </a:gs>
+            <a:gs pos="70000">
+              <a:schemeClr val="accent4">
+                <a:hueOff val="0"/>
+                <a:satOff val="0"/>
+                <a:lumOff val="0"/>
+                <a:alphaOff val="0"/>
+                <a:tint val="99000"/>
+                <a:shade val="65000"/>
+                <a:satMod val="155000"/>
+              </a:schemeClr>
+            </a:gs>
+            <a:gs pos="100000">
+              <a:schemeClr val="accent4">
+                <a:hueOff val="0"/>
+                <a:satOff val="0"/>
+                <a:lumOff val="0"/>
+                <a:alphaOff val="0"/>
+                <a:tint val="95500"/>
+                <a:shade val="100000"/>
+                <a:satMod val="155000"/>
+              </a:schemeClr>
+            </a:gs>
+          </a:gsLst>
+          <a:lin ang="16200000" scaled="0"/>
+        </a:gradFill>
+        <a:ln>
+          <a:noFill/>
+        </a:ln>
+        <a:effectLst>
+          <a:outerShdw blurRad="50800" dist="38100" dir="5400000" rotWithShape="0">
+            <a:srgbClr val="000000">
+              <a:alpha val="35000"/>
+            </a:srgbClr>
+          </a:outerShdw>
+        </a:effectLst>
+      </dsp:spPr>
+      <dsp:style>
+        <a:lnRef idx="0">
+          <a:scrgbClr r="0" g="0" b="0"/>
+        </a:lnRef>
+        <a:fillRef idx="3">
+          <a:scrgbClr r="0" g="0" b="0"/>
+        </a:fillRef>
+        <a:effectRef idx="2">
+          <a:scrgbClr r="0" g="0" b="0"/>
+        </a:effectRef>
+        <a:fontRef idx="minor">
+          <a:schemeClr val="lt1"/>
+        </a:fontRef>
+      </dsp:style>
+    </dsp:sp>
+    <dsp:sp modelId="{E583DA9E-7A18-BD43-A205-CF6EB8F09FF6}">
+      <dsp:nvSpPr>
+        <dsp:cNvPr id="0" name=""/>
+        <dsp:cNvSpPr/>
+      </dsp:nvSpPr>
+      <dsp:spPr>
+        <a:xfrm>
+          <a:off x="7169121" y="2670369"/>
+          <a:ext cx="895795" cy="597196"/>
+        </a:xfrm>
+        <a:prstGeom prst="rect">
+          <a:avLst/>
+        </a:prstGeom>
+        <a:noFill/>
+        <a:ln>
+          <a:noFill/>
+        </a:ln>
+        <a:effectLst/>
+      </dsp:spPr>
+      <dsp:style>
+        <a:lnRef idx="0">
+          <a:scrgbClr r="0" g="0" b="0"/>
+        </a:lnRef>
+        <a:fillRef idx="0">
+          <a:scrgbClr r="0" g="0" b="0"/>
+        </a:fillRef>
+        <a:effectRef idx="0">
+          <a:scrgbClr r="0" g="0" b="0"/>
+        </a:effectRef>
+        <a:fontRef idx="minor"/>
+      </dsp:style>
+      <dsp:txBody>
+        <a:bodyPr spcFirstLastPara="0" vert="horz" wrap="square" lIns="49530" tIns="49530" rIns="49530" bIns="49530" numCol="1" spcCol="1270" anchor="ctr" anchorCtr="0">
+          <a:noAutofit/>
+        </a:bodyPr>
+        <a:lstStyle/>
+        <a:p>
+          <a:pPr lvl="0" algn="l" defTabSz="577850">
+            <a:lnSpc>
+              <a:spcPct val="90000"/>
+            </a:lnSpc>
+            <a:spcBef>
+              <a:spcPct val="0"/>
+            </a:spcBef>
+            <a:spcAft>
+              <a:spcPct val="35000"/>
+            </a:spcAft>
+          </a:pPr>
+          <a:r>
+            <a:rPr lang="en-US" sz="1300" kern="1200" dirty="0" smtClean="0"/>
+            <a:t>Sand pile</a:t>
+          </a:r>
+          <a:endParaRPr lang="en-US" sz="1300" kern="1200" dirty="0"/>
+        </a:p>
+      </dsp:txBody>
+      <dsp:txXfrm>
+        <a:off x="7169121" y="2670369"/>
+        <a:ext cx="895795" cy="597196"/>
       </dsp:txXfrm>
     </dsp:sp>
   </dsp:spTree>
@@ -27616,7 +28232,7 @@
             <a:fld id="{AB1CDEB6-C0D8-439D-94AA-7569540F08E4}" type="datetimeFigureOut">
               <a:rPr lang="en-US" smtClean="0"/>
               <a:pPr/>
-              <a:t>7/15/16</a:t>
+              <a:t>7/16/16</a:t>
             </a:fld>
             <a:endParaRPr lang="en-US"/>
           </a:p>
@@ -27974,7 +28590,7 @@
             <a:fld id="{81331B57-0BE5-4F82-AA58-76F53EFF3ADA}" type="datetime8">
               <a:rPr lang="en-US" smtClean="0"/>
               <a:pPr/>
-              <a:t>7/15/16 2:01 PM</a:t>
+              <a:t>7/16/16 8:56 AM</a:t>
             </a:fld>
             <a:endParaRPr lang="en-US" dirty="0"/>
           </a:p>
@@ -28168,7 +28784,7 @@
             <a:fld id="{81331B57-0BE5-4F82-AA58-76F53EFF3ADA}" type="datetime8">
               <a:rPr lang="en-US" smtClean="0"/>
               <a:pPr/>
-              <a:t>7/15/16 2:02 PM</a:t>
+              <a:t>7/16/16 8:56 AM</a:t>
             </a:fld>
             <a:endParaRPr lang="en-US"/>
           </a:p>
@@ -28352,7 +28968,7 @@
             <a:fld id="{81331B57-0BE5-4F82-AA58-76F53EFF3ADA}" type="datetime8">
               <a:rPr lang="en-US" smtClean="0"/>
               <a:pPr/>
-              <a:t>7/15/16 2:01 PM</a:t>
+              <a:t>7/16/16 8:56 AM</a:t>
             </a:fld>
             <a:endParaRPr lang="en-US"/>
           </a:p>
@@ -28536,7 +29152,7 @@
             <a:fld id="{81331B57-0BE5-4F82-AA58-76F53EFF3ADA}" type="datetime8">
               <a:rPr lang="en-US" smtClean="0"/>
               <a:pPr/>
-              <a:t>7/15/16 2:01 PM</a:t>
+              <a:t>7/16/16 8:56 AM</a:t>
             </a:fld>
             <a:endParaRPr lang="en-US"/>
           </a:p>
@@ -28720,7 +29336,7 @@
             <a:fld id="{81331B57-0BE5-4F82-AA58-76F53EFF3ADA}" type="datetime8">
               <a:rPr lang="en-US" smtClean="0"/>
               <a:pPr/>
-              <a:t>7/15/16 2:02 PM</a:t>
+              <a:t>7/16/16 8:56 AM</a:t>
             </a:fld>
             <a:endParaRPr lang="en-US"/>
           </a:p>
@@ -28904,7 +29520,7 @@
             <a:fld id="{81331B57-0BE5-4F82-AA58-76F53EFF3ADA}" type="datetime8">
               <a:rPr lang="en-US" smtClean="0"/>
               <a:pPr/>
-              <a:t>7/15/16 2:02 PM</a:t>
+              <a:t>7/16/16 8:56 AM</a:t>
             </a:fld>
             <a:endParaRPr lang="en-US"/>
           </a:p>
@@ -29088,7 +29704,7 @@
             <a:fld id="{81331B57-0BE5-4F82-AA58-76F53EFF3ADA}" type="datetime8">
               <a:rPr lang="en-US" smtClean="0"/>
               <a:pPr/>
-              <a:t>7/15/16 2:02 PM</a:t>
+              <a:t>7/16/16 8:56 AM</a:t>
             </a:fld>
             <a:endParaRPr lang="en-US"/>
           </a:p>
@@ -29272,7 +29888,7 @@
             <a:fld id="{81331B57-0BE5-4F82-AA58-76F53EFF3ADA}" type="datetime8">
               <a:rPr lang="en-US" smtClean="0"/>
               <a:pPr/>
-              <a:t>7/15/16 2:02 PM</a:t>
+              <a:t>7/16/16 8:56 AM</a:t>
             </a:fld>
             <a:endParaRPr lang="en-US"/>
           </a:p>
@@ -29456,7 +30072,7 @@
             <a:fld id="{81331B57-0BE5-4F82-AA58-76F53EFF3ADA}" type="datetime8">
               <a:rPr lang="en-US" smtClean="0"/>
               <a:pPr/>
-              <a:t>7/15/16 2:02 PM</a:t>
+              <a:t>7/16/16 8:56 AM</a:t>
             </a:fld>
             <a:endParaRPr lang="en-US"/>
           </a:p>
@@ -33167,19 +33783,7 @@
             <a:pPr lvl="1"/>
             <a:r>
               <a:rPr lang="en-US" dirty="0" smtClean="0"/>
-              <a:t>Agent’s preferences are just not to be too </a:t>
-            </a:r>
-            <a:r>
-              <a:rPr lang="en-US" dirty="0" smtClean="0"/>
-              <a:t>much of</a:t>
-            </a:r>
-            <a:r>
-              <a:rPr lang="en-US" dirty="0" smtClean="0"/>
-              <a:t> </a:t>
-            </a:r>
-            <a:r>
-              <a:rPr lang="en-US" dirty="0" smtClean="0"/>
-              <a:t>a minority, not for fully segregated neighborhoods</a:t>
+              <a:t>Agent’s preferences are just not to be too much of a minority, not for fully segregated neighborhoods</a:t>
             </a:r>
           </a:p>
           <a:p>
@@ -34163,15 +34767,7 @@
           <a:p>
             <a:r>
               <a:rPr lang="en-US" dirty="0" smtClean="0"/>
-              <a:t>The Forest Fire model turns out to be best represented as a </a:t>
-            </a:r>
-            <a:r>
-              <a:rPr lang="en-US" dirty="0" smtClean="0"/>
-              <a:t>group</a:t>
-            </a:r>
-            <a:r>
-              <a:rPr lang="en-US" dirty="0" smtClean="0"/>
-              <a:t>.</a:t>
+              <a:t>The Forest Fire model turns out to be best represented as a group.</a:t>
             </a:r>
             <a:endParaRPr lang="en-US" dirty="0"/>
           </a:p>
@@ -34308,51 +34904,7 @@
                   </a:schemeClr>
                 </a:solidFill>
               </a:rPr>
-              <a:t>he </a:t>
-            </a:r>
-            <a:r>
-              <a:rPr lang="en-US" sz="2800" dirty="0" smtClean="0">
-                <a:solidFill>
-                  <a:schemeClr val="accent6">
-                    <a:lumMod val="40000"/>
-                    <a:lumOff val="60000"/>
-                  </a:schemeClr>
-                </a:solidFill>
-              </a:rPr>
-              <a:t>second </a:t>
-            </a:r>
-            <a:r>
-              <a:rPr lang="en-US" sz="2800" dirty="0" smtClean="0">
-                <a:solidFill>
-                  <a:schemeClr val="accent6">
-                    <a:lumMod val="40000"/>
-                    <a:lumOff val="60000"/>
-                  </a:schemeClr>
-                </a:solidFill>
-              </a:rPr>
-              <a:t>structure is </a:t>
-            </a:r>
-            <a:r>
-              <a:rPr lang="en-US" sz="2800" dirty="0" smtClean="0">
-                <a:solidFill>
-                  <a:schemeClr val="accent6">
-                    <a:lumMod val="40000"/>
-                    <a:lumOff val="60000"/>
-                  </a:schemeClr>
-                </a:solidFill>
-              </a:rPr>
-              <a:t>a subclass of the first with additional </a:t>
-            </a:r>
-            <a:r>
-              <a:rPr lang="en-US" sz="2800" dirty="0" smtClean="0">
-                <a:solidFill>
-                  <a:schemeClr val="accent6">
-                    <a:lumMod val="40000"/>
-                    <a:lumOff val="60000"/>
-                  </a:schemeClr>
-                </a:solidFill>
-              </a:rPr>
-              <a:t>axioms required to be true.</a:t>
+              <a:t>he second structure is a subclass of the first with additional axioms required to be true.</a:t>
             </a:r>
             <a:endParaRPr lang="en-US" sz="2800" dirty="0">
               <a:solidFill>
@@ -34621,15 +35173,7 @@
           <a:p>
             <a:r>
               <a:rPr lang="en-US" dirty="0" smtClean="0"/>
-              <a:t>Even before implementing </a:t>
-            </a:r>
-            <a:r>
-              <a:rPr lang="en-US" dirty="0" smtClean="0"/>
-              <a:t>this, </a:t>
-            </a:r>
-            <a:r>
-              <a:rPr lang="en-US" dirty="0" smtClean="0"/>
-              <a:t>we had made it easy to:</a:t>
+              <a:t>Even before implementing this, we had made it easy to:</a:t>
             </a:r>
           </a:p>
           <a:p>
@@ -36508,14 +37052,14 @@
           <p:nvPr>
             <p:extLst>
               <p:ext uri="{D42A27DB-BD31-4B8C-83A1-F6EECF244321}">
-                <p14:modId xmlns:p14="http://schemas.microsoft.com/office/powerpoint/2010/main" val="297980700"/>
+                <p14:modId xmlns:p14="http://schemas.microsoft.com/office/powerpoint/2010/main" val="168141087"/>
               </p:ext>
             </p:extLst>
           </p:nvPr>
         </p:nvGraphicFramePr>
         <p:xfrm>
-          <a:off x="1524000" y="2108200"/>
-          <a:ext cx="6096000" cy="4064000"/>
+          <a:off x="609600" y="2057400"/>
+          <a:ext cx="8067674" cy="4368800"/>
         </p:xfrm>
         <a:graphic>
           <a:graphicData uri="http://schemas.openxmlformats.org/drawingml/2006/diagram">
@@ -38370,11 +38914,7 @@
           <a:p>
             <a:r>
               <a:rPr lang="en-US" dirty="0" smtClean="0"/>
-              <a:t>For Python, not </a:t>
-            </a:r>
-            <a:r>
-              <a:rPr lang="en-US" dirty="0" smtClean="0"/>
-              <a:t>much, because of </a:t>
+              <a:t>For Python, not much, because of </a:t>
             </a:r>
             <a:r>
               <a:rPr lang="en-US" i="1" dirty="0" smtClean="0"/>
@@ -38384,7 +38924,6 @@
               <a:rPr lang="en-US" dirty="0" smtClean="0"/>
               <a:t>.</a:t>
             </a:r>
-            <a:endParaRPr lang="en-US" dirty="0" smtClean="0"/>
           </a:p>
           <a:p>
             <a:pPr lvl="1"/>
@@ -38670,11 +39209,7 @@
             <a:pPr lvl="2"/>
             <a:r>
               <a:rPr lang="en-US" dirty="0" smtClean="0"/>
-              <a:t>Be </a:t>
-            </a:r>
-            <a:r>
-              <a:rPr lang="en-US" dirty="0" smtClean="0"/>
-              <a:t>commutative (</a:t>
+              <a:t>Be commutative (</a:t>
             </a:r>
             <a:r>
               <a:rPr lang="en-US" i="1" dirty="0" smtClean="0"/>
@@ -38684,7 +39219,6 @@
               <a:rPr lang="en-US" dirty="0" smtClean="0"/>
               <a:t>)</a:t>
             </a:r>
-            <a:endParaRPr lang="en-US" dirty="0" smtClean="0"/>
           </a:p>
           <a:p>
             <a:pPr lvl="2"/>
@@ -39105,15 +39639,7 @@
                   <a:schemeClr val="tx2"/>
                 </a:solidFill>
               </a:rPr>
-              <a:t>Generating complex macro-behavior from simple </a:t>
-            </a:r>
-            <a:r>
-              <a:rPr lang="en-US" sz="3600" dirty="0" smtClean="0">
-                <a:solidFill>
-                  <a:schemeClr val="tx2"/>
-                </a:solidFill>
-              </a:rPr>
-              <a:t>rules</a:t>
+              <a:t>Generating complex macro-behavior from simple rules</a:t>
             </a:r>
             <a:endParaRPr lang="en-US" dirty="0">
               <a:solidFill>

</xml_diff>